<commit_message>
finished update CD sign in and route
</commit_message>
<xml_diff>
--- a/docs/COMPONENT-DIAGRAM.pptx
+++ b/docs/COMPONENT-DIAGRAM.pptx
@@ -4,10 +4,12 @@
   <p:sldMasterIdLst>
     <p:sldMasterId id="2147483648" r:id="rId1"/>
   </p:sldMasterIdLst>
+  <p:notesMasterIdLst>
+    <p:notesMasterId r:id="rId4"/>
+  </p:notesMasterIdLst>
   <p:sldIdLst>
     <p:sldId id="256" r:id="rId2"/>
-    <p:sldId id="259" r:id="rId3"/>
-    <p:sldId id="258" r:id="rId4"/>
+    <p:sldId id="260" r:id="rId3"/>
   </p:sldIdLst>
   <p:sldSz cx="12192000" cy="6858000"/>
   <p:notesSz cx="6858000" cy="9144000"/>
@@ -114,6 +116,411 @@
 </p:presentation>
 </file>
 
+<file path=ppt/notesMasters/notesMaster1.xml><?xml version="1.0" encoding="utf-8"?>
+<p:notesMaster xmlns:a="http://schemas.openxmlformats.org/drawingml/2006/main" xmlns:r="http://schemas.openxmlformats.org/officeDocument/2006/relationships" xmlns:p="http://schemas.openxmlformats.org/presentationml/2006/main">
+  <p:cSld>
+    <p:bg>
+      <p:bgRef idx="1001">
+        <a:schemeClr val="bg1"/>
+      </p:bgRef>
+    </p:bg>
+    <p:spTree>
+      <p:nvGrpSpPr>
+        <p:cNvPr id="1" name=""/>
+        <p:cNvGrpSpPr/>
+        <p:nvPr/>
+      </p:nvGrpSpPr>
+      <p:grpSpPr>
+        <a:xfrm>
+          <a:off x="0" y="0"/>
+          <a:ext cx="0" cy="0"/>
+          <a:chOff x="0" y="0"/>
+          <a:chExt cx="0" cy="0"/>
+        </a:xfrm>
+      </p:grpSpPr>
+      <p:sp>
+        <p:nvSpPr>
+          <p:cNvPr id="2" name="Header Placeholder 1"/>
+          <p:cNvSpPr>
+            <a:spLocks noGrp="1"/>
+          </p:cNvSpPr>
+          <p:nvPr>
+            <p:ph type="hdr" sz="quarter"/>
+          </p:nvPr>
+        </p:nvSpPr>
+        <p:spPr>
+          <a:xfrm>
+            <a:off x="0" y="0"/>
+            <a:ext cx="2971800" cy="458788"/>
+          </a:xfrm>
+          <a:prstGeom prst="rect">
+            <a:avLst/>
+          </a:prstGeom>
+        </p:spPr>
+        <p:txBody>
+          <a:bodyPr vert="horz" lIns="91440" tIns="45720" rIns="91440" bIns="45720" rtlCol="0"/>
+          <a:lstStyle>
+            <a:lvl1pPr algn="l">
+              <a:defRPr sz="1200"/>
+            </a:lvl1pPr>
+          </a:lstStyle>
+          <a:p>
+            <a:endParaRPr lang="en-US"/>
+          </a:p>
+        </p:txBody>
+      </p:sp>
+      <p:sp>
+        <p:nvSpPr>
+          <p:cNvPr id="3" name="Date Placeholder 2"/>
+          <p:cNvSpPr>
+            <a:spLocks noGrp="1"/>
+          </p:cNvSpPr>
+          <p:nvPr>
+            <p:ph type="dt" idx="1"/>
+          </p:nvPr>
+        </p:nvSpPr>
+        <p:spPr>
+          <a:xfrm>
+            <a:off x="3884613" y="0"/>
+            <a:ext cx="2971800" cy="458788"/>
+          </a:xfrm>
+          <a:prstGeom prst="rect">
+            <a:avLst/>
+          </a:prstGeom>
+        </p:spPr>
+        <p:txBody>
+          <a:bodyPr vert="horz" lIns="91440" tIns="45720" rIns="91440" bIns="45720" rtlCol="0"/>
+          <a:lstStyle>
+            <a:lvl1pPr algn="r">
+              <a:defRPr sz="1200"/>
+            </a:lvl1pPr>
+          </a:lstStyle>
+          <a:p>
+            <a:fld id="{E88365C0-BE66-4276-A4A8-B9C86C352910}" type="datetimeFigureOut">
+              <a:rPr lang="en-US" smtClean="0"/>
+              <a:t>11/27/2021</a:t>
+            </a:fld>
+            <a:endParaRPr lang="en-US"/>
+          </a:p>
+        </p:txBody>
+      </p:sp>
+      <p:sp>
+        <p:nvSpPr>
+          <p:cNvPr id="4" name="Slide Image Placeholder 3"/>
+          <p:cNvSpPr>
+            <a:spLocks noGrp="1" noRot="1" noChangeAspect="1"/>
+          </p:cNvSpPr>
+          <p:nvPr>
+            <p:ph type="sldImg" idx="2"/>
+          </p:nvPr>
+        </p:nvSpPr>
+        <p:spPr>
+          <a:xfrm>
+            <a:off x="685800" y="1143000"/>
+            <a:ext cx="5486400" cy="3086100"/>
+          </a:xfrm>
+          <a:prstGeom prst="rect">
+            <a:avLst/>
+          </a:prstGeom>
+          <a:noFill/>
+          <a:ln w="12700">
+            <a:solidFill>
+              <a:prstClr val="black"/>
+            </a:solidFill>
+          </a:ln>
+        </p:spPr>
+        <p:txBody>
+          <a:bodyPr vert="horz" lIns="91440" tIns="45720" rIns="91440" bIns="45720" rtlCol="0" anchor="ctr"/>
+          <a:lstStyle/>
+          <a:p>
+            <a:endParaRPr lang="en-US"/>
+          </a:p>
+        </p:txBody>
+      </p:sp>
+      <p:sp>
+        <p:nvSpPr>
+          <p:cNvPr id="5" name="Notes Placeholder 4"/>
+          <p:cNvSpPr>
+            <a:spLocks noGrp="1"/>
+          </p:cNvSpPr>
+          <p:nvPr>
+            <p:ph type="body" sz="quarter" idx="3"/>
+          </p:nvPr>
+        </p:nvSpPr>
+        <p:spPr>
+          <a:xfrm>
+            <a:off x="685800" y="4400550"/>
+            <a:ext cx="5486400" cy="3600450"/>
+          </a:xfrm>
+          <a:prstGeom prst="rect">
+            <a:avLst/>
+          </a:prstGeom>
+        </p:spPr>
+        <p:txBody>
+          <a:bodyPr vert="horz" lIns="91440" tIns="45720" rIns="91440" bIns="45720" rtlCol="0"/>
+          <a:lstStyle/>
+          <a:p>
+            <a:pPr lvl="0"/>
+            <a:r>
+              <a:rPr lang="en-US"/>
+              <a:t>Click to edit Master text styles</a:t>
+            </a:r>
+          </a:p>
+          <a:p>
+            <a:pPr lvl="1"/>
+            <a:r>
+              <a:rPr lang="en-US"/>
+              <a:t>Second level</a:t>
+            </a:r>
+          </a:p>
+          <a:p>
+            <a:pPr lvl="2"/>
+            <a:r>
+              <a:rPr lang="en-US"/>
+              <a:t>Third level</a:t>
+            </a:r>
+          </a:p>
+          <a:p>
+            <a:pPr lvl="3"/>
+            <a:r>
+              <a:rPr lang="en-US"/>
+              <a:t>Fourth level</a:t>
+            </a:r>
+          </a:p>
+          <a:p>
+            <a:pPr lvl="4"/>
+            <a:r>
+              <a:rPr lang="en-US"/>
+              <a:t>Fifth level</a:t>
+            </a:r>
+          </a:p>
+        </p:txBody>
+      </p:sp>
+      <p:sp>
+        <p:nvSpPr>
+          <p:cNvPr id="6" name="Footer Placeholder 5"/>
+          <p:cNvSpPr>
+            <a:spLocks noGrp="1"/>
+          </p:cNvSpPr>
+          <p:nvPr>
+            <p:ph type="ftr" sz="quarter" idx="4"/>
+          </p:nvPr>
+        </p:nvSpPr>
+        <p:spPr>
+          <a:xfrm>
+            <a:off x="0" y="8685213"/>
+            <a:ext cx="2971800" cy="458787"/>
+          </a:xfrm>
+          <a:prstGeom prst="rect">
+            <a:avLst/>
+          </a:prstGeom>
+        </p:spPr>
+        <p:txBody>
+          <a:bodyPr vert="horz" lIns="91440" tIns="45720" rIns="91440" bIns="45720" rtlCol="0" anchor="b"/>
+          <a:lstStyle>
+            <a:lvl1pPr algn="l">
+              <a:defRPr sz="1200"/>
+            </a:lvl1pPr>
+          </a:lstStyle>
+          <a:p>
+            <a:endParaRPr lang="en-US"/>
+          </a:p>
+        </p:txBody>
+      </p:sp>
+      <p:sp>
+        <p:nvSpPr>
+          <p:cNvPr id="7" name="Slide Number Placeholder 6"/>
+          <p:cNvSpPr>
+            <a:spLocks noGrp="1"/>
+          </p:cNvSpPr>
+          <p:nvPr>
+            <p:ph type="sldNum" sz="quarter" idx="5"/>
+          </p:nvPr>
+        </p:nvSpPr>
+        <p:spPr>
+          <a:xfrm>
+            <a:off x="3884613" y="8685213"/>
+            <a:ext cx="2971800" cy="458787"/>
+          </a:xfrm>
+          <a:prstGeom prst="rect">
+            <a:avLst/>
+          </a:prstGeom>
+        </p:spPr>
+        <p:txBody>
+          <a:bodyPr vert="horz" lIns="91440" tIns="45720" rIns="91440" bIns="45720" rtlCol="0" anchor="b"/>
+          <a:lstStyle>
+            <a:lvl1pPr algn="r">
+              <a:defRPr sz="1200"/>
+            </a:lvl1pPr>
+          </a:lstStyle>
+          <a:p>
+            <a:fld id="{26CCE312-6582-4D75-8391-D20671542F92}" type="slidenum">
+              <a:rPr lang="en-US" smtClean="0"/>
+              <a:t>‹#›</a:t>
+            </a:fld>
+            <a:endParaRPr lang="en-US"/>
+          </a:p>
+        </p:txBody>
+      </p:sp>
+    </p:spTree>
+    <p:extLst>
+      <p:ext uri="{BB962C8B-B14F-4D97-AF65-F5344CB8AC3E}">
+        <p14:creationId xmlns:p14="http://schemas.microsoft.com/office/powerpoint/2010/main" val="3769351854"/>
+      </p:ext>
+    </p:extLst>
+  </p:cSld>
+  <p:clrMap bg1="lt1" tx1="dk1" bg2="lt2" tx2="dk2" accent1="accent1" accent2="accent2" accent3="accent3" accent4="accent4" accent5="accent5" accent6="accent6" hlink="hlink" folHlink="folHlink"/>
+  <p:notesStyle>
+    <a:lvl1pPr marL="0" algn="l" defTabSz="914400" rtl="0" eaLnBrk="1" latinLnBrk="0" hangingPunct="1">
+      <a:defRPr sz="1200" kern="1200">
+        <a:solidFill>
+          <a:schemeClr val="tx1"/>
+        </a:solidFill>
+        <a:latin typeface="+mn-lt"/>
+        <a:ea typeface="+mn-ea"/>
+        <a:cs typeface="+mn-cs"/>
+      </a:defRPr>
+    </a:lvl1pPr>
+    <a:lvl2pPr marL="457200" algn="l" defTabSz="914400" rtl="0" eaLnBrk="1" latinLnBrk="0" hangingPunct="1">
+      <a:defRPr sz="1200" kern="1200">
+        <a:solidFill>
+          <a:schemeClr val="tx1"/>
+        </a:solidFill>
+        <a:latin typeface="+mn-lt"/>
+        <a:ea typeface="+mn-ea"/>
+        <a:cs typeface="+mn-cs"/>
+      </a:defRPr>
+    </a:lvl2pPr>
+    <a:lvl3pPr marL="914400" algn="l" defTabSz="914400" rtl="0" eaLnBrk="1" latinLnBrk="0" hangingPunct="1">
+      <a:defRPr sz="1200" kern="1200">
+        <a:solidFill>
+          <a:schemeClr val="tx1"/>
+        </a:solidFill>
+        <a:latin typeface="+mn-lt"/>
+        <a:ea typeface="+mn-ea"/>
+        <a:cs typeface="+mn-cs"/>
+      </a:defRPr>
+    </a:lvl3pPr>
+    <a:lvl4pPr marL="1371600" algn="l" defTabSz="914400" rtl="0" eaLnBrk="1" latinLnBrk="0" hangingPunct="1">
+      <a:defRPr sz="1200" kern="1200">
+        <a:solidFill>
+          <a:schemeClr val="tx1"/>
+        </a:solidFill>
+        <a:latin typeface="+mn-lt"/>
+        <a:ea typeface="+mn-ea"/>
+        <a:cs typeface="+mn-cs"/>
+      </a:defRPr>
+    </a:lvl4pPr>
+    <a:lvl5pPr marL="1828800" algn="l" defTabSz="914400" rtl="0" eaLnBrk="1" latinLnBrk="0" hangingPunct="1">
+      <a:defRPr sz="1200" kern="1200">
+        <a:solidFill>
+          <a:schemeClr val="tx1"/>
+        </a:solidFill>
+        <a:latin typeface="+mn-lt"/>
+        <a:ea typeface="+mn-ea"/>
+        <a:cs typeface="+mn-cs"/>
+      </a:defRPr>
+    </a:lvl5pPr>
+    <a:lvl6pPr marL="2286000" algn="l" defTabSz="914400" rtl="0" eaLnBrk="1" latinLnBrk="0" hangingPunct="1">
+      <a:defRPr sz="1200" kern="1200">
+        <a:solidFill>
+          <a:schemeClr val="tx1"/>
+        </a:solidFill>
+        <a:latin typeface="+mn-lt"/>
+        <a:ea typeface="+mn-ea"/>
+        <a:cs typeface="+mn-cs"/>
+      </a:defRPr>
+    </a:lvl6pPr>
+    <a:lvl7pPr marL="2743200" algn="l" defTabSz="914400" rtl="0" eaLnBrk="1" latinLnBrk="0" hangingPunct="1">
+      <a:defRPr sz="1200" kern="1200">
+        <a:solidFill>
+          <a:schemeClr val="tx1"/>
+        </a:solidFill>
+        <a:latin typeface="+mn-lt"/>
+        <a:ea typeface="+mn-ea"/>
+        <a:cs typeface="+mn-cs"/>
+      </a:defRPr>
+    </a:lvl7pPr>
+    <a:lvl8pPr marL="3200400" algn="l" defTabSz="914400" rtl="0" eaLnBrk="1" latinLnBrk="0" hangingPunct="1">
+      <a:defRPr sz="1200" kern="1200">
+        <a:solidFill>
+          <a:schemeClr val="tx1"/>
+        </a:solidFill>
+        <a:latin typeface="+mn-lt"/>
+        <a:ea typeface="+mn-ea"/>
+        <a:cs typeface="+mn-cs"/>
+      </a:defRPr>
+    </a:lvl8pPr>
+    <a:lvl9pPr marL="3657600" algn="l" defTabSz="914400" rtl="0" eaLnBrk="1" latinLnBrk="0" hangingPunct="1">
+      <a:defRPr sz="1200" kern="1200">
+        <a:solidFill>
+          <a:schemeClr val="tx1"/>
+        </a:solidFill>
+        <a:latin typeface="+mn-lt"/>
+        <a:ea typeface="+mn-ea"/>
+        <a:cs typeface="+mn-cs"/>
+      </a:defRPr>
+    </a:lvl9pPr>
+  </p:notesStyle>
+</p:notesMaster>
+</file>
+
+<file path=ppt/notesSlides/notesSlide1.xml><?xml version="1.0" encoding="utf-8"?>
+<p:notes xmlns:a="http://schemas.openxmlformats.org/drawingml/2006/main" xmlns:r="http://schemas.openxmlformats.org/officeDocument/2006/relationships" xmlns:p="http://schemas.openxmlformats.org/presentationml/2006/main">
+  <p:cSld>
+    <p:spTree>
+      <p:nvGrpSpPr>
+        <p:cNvPr id="1" name=""/>
+        <p:cNvGrpSpPr/>
+        <p:nvPr/>
+      </p:nvGrpSpPr>
+      <p:grpSpPr>
+        <a:xfrm>
+          <a:off x="0" y="0"/>
+          <a:ext cx="0" cy="0"/>
+          <a:chOff x="0" y="0"/>
+          <a:chExt cx="0" cy="0"/>
+        </a:xfrm>
+      </p:grpSpPr>
+      <p:sp>
+        <p:nvSpPr>
+          <p:cNvPr id="2" name="Slide Image Placeholder 1"/>
+          <p:cNvSpPr>
+            <a:spLocks noGrp="1" noRot="1" noChangeAspect="1"/>
+          </p:cNvSpPr>
+          <p:nvPr>
+            <p:ph type="sldImg" idx="2"/>
+          </p:nvPr>
+        </p:nvSpPr>
+        <p:spPr/>
+      </p:sp>
+      <p:sp>
+        <p:nvSpPr>
+          <p:cNvPr id="3" name="Text Placeholder 2"/>
+          <p:cNvSpPr>
+            <a:spLocks noGrp="1"/>
+          </p:cNvSpPr>
+          <p:nvPr>
+            <p:ph type="body" idx="3"/>
+          </p:nvPr>
+        </p:nvSpPr>
+        <p:spPr/>
+        <p:txBody>
+          <a:bodyPr/>
+          <a:lstStyle/>
+          <a:p>
+            <a:endParaRPr lang="en-US"/>
+          </a:p>
+        </p:txBody>
+      </p:sp>
+    </p:spTree>
+  </p:cSld>
+  <p:clrMapOvr>
+    <a:masterClrMapping/>
+  </p:clrMapOvr>
+</p:notes>
+</file>
+
 <file path=ppt/slideLayouts/slideLayout1.xml><?xml version="1.0" encoding="utf-8"?>
 <p:sldLayout xmlns:a="http://schemas.openxmlformats.org/drawingml/2006/main" xmlns:r="http://schemas.openxmlformats.org/officeDocument/2006/relationships" xmlns:p="http://schemas.openxmlformats.org/presentationml/2006/main" type="title" preserve="1">
   <p:cSld name="Title Slide">
@@ -243,7 +650,7 @@
           <a:p>
             <a:fld id="{28BE630F-C39C-4DB9-8258-0B48CA067079}" type="datetimeFigureOut">
               <a:rPr lang="en-US" smtClean="0"/>
-              <a:t>11/25/2021</a:t>
+              <a:t>11/27/2021</a:t>
             </a:fld>
             <a:endParaRPr lang="en-US"/>
           </a:p>
@@ -411,7 +818,7 @@
           <a:p>
             <a:fld id="{28BE630F-C39C-4DB9-8258-0B48CA067079}" type="datetimeFigureOut">
               <a:rPr lang="en-US" smtClean="0"/>
-              <a:t>11/25/2021</a:t>
+              <a:t>11/27/2021</a:t>
             </a:fld>
             <a:endParaRPr lang="en-US"/>
           </a:p>
@@ -589,7 +996,7 @@
           <a:p>
             <a:fld id="{28BE630F-C39C-4DB9-8258-0B48CA067079}" type="datetimeFigureOut">
               <a:rPr lang="en-US" smtClean="0"/>
-              <a:t>11/25/2021</a:t>
+              <a:t>11/27/2021</a:t>
             </a:fld>
             <a:endParaRPr lang="en-US"/>
           </a:p>
@@ -757,7 +1164,7 @@
           <a:p>
             <a:fld id="{28BE630F-C39C-4DB9-8258-0B48CA067079}" type="datetimeFigureOut">
               <a:rPr lang="en-US" smtClean="0"/>
-              <a:t>11/25/2021</a:t>
+              <a:t>11/27/2021</a:t>
             </a:fld>
             <a:endParaRPr lang="en-US"/>
           </a:p>
@@ -1002,7 +1409,7 @@
           <a:p>
             <a:fld id="{28BE630F-C39C-4DB9-8258-0B48CA067079}" type="datetimeFigureOut">
               <a:rPr lang="en-US" smtClean="0"/>
-              <a:t>11/25/2021</a:t>
+              <a:t>11/27/2021</a:t>
             </a:fld>
             <a:endParaRPr lang="en-US"/>
           </a:p>
@@ -1231,7 +1638,7 @@
           <a:p>
             <a:fld id="{28BE630F-C39C-4DB9-8258-0B48CA067079}" type="datetimeFigureOut">
               <a:rPr lang="en-US" smtClean="0"/>
-              <a:t>11/25/2021</a:t>
+              <a:t>11/27/2021</a:t>
             </a:fld>
             <a:endParaRPr lang="en-US"/>
           </a:p>
@@ -1595,7 +2002,7 @@
           <a:p>
             <a:fld id="{28BE630F-C39C-4DB9-8258-0B48CA067079}" type="datetimeFigureOut">
               <a:rPr lang="en-US" smtClean="0"/>
-              <a:t>11/25/2021</a:t>
+              <a:t>11/27/2021</a:t>
             </a:fld>
             <a:endParaRPr lang="en-US"/>
           </a:p>
@@ -1712,7 +2119,7 @@
           <a:p>
             <a:fld id="{28BE630F-C39C-4DB9-8258-0B48CA067079}" type="datetimeFigureOut">
               <a:rPr lang="en-US" smtClean="0"/>
-              <a:t>11/25/2021</a:t>
+              <a:t>11/27/2021</a:t>
             </a:fld>
             <a:endParaRPr lang="en-US"/>
           </a:p>
@@ -1807,7 +2214,7 @@
           <a:p>
             <a:fld id="{28BE630F-C39C-4DB9-8258-0B48CA067079}" type="datetimeFigureOut">
               <a:rPr lang="en-US" smtClean="0"/>
-              <a:t>11/25/2021</a:t>
+              <a:t>11/27/2021</a:t>
             </a:fld>
             <a:endParaRPr lang="en-US"/>
           </a:p>
@@ -2082,7 +2489,7 @@
           <a:p>
             <a:fld id="{28BE630F-C39C-4DB9-8258-0B48CA067079}" type="datetimeFigureOut">
               <a:rPr lang="en-US" smtClean="0"/>
-              <a:t>11/25/2021</a:t>
+              <a:t>11/27/2021</a:t>
             </a:fld>
             <a:endParaRPr lang="en-US"/>
           </a:p>
@@ -2334,7 +2741,7 @@
           <a:p>
             <a:fld id="{28BE630F-C39C-4DB9-8258-0B48CA067079}" type="datetimeFigureOut">
               <a:rPr lang="en-US" smtClean="0"/>
-              <a:t>11/25/2021</a:t>
+              <a:t>11/27/2021</a:t>
             </a:fld>
             <a:endParaRPr lang="en-US"/>
           </a:p>
@@ -2545,7 +2952,7 @@
           <a:p>
             <a:fld id="{28BE630F-C39C-4DB9-8258-0B48CA067079}" type="datetimeFigureOut">
               <a:rPr lang="en-US" smtClean="0"/>
-              <a:t>11/25/2021</a:t>
+              <a:t>11/27/2021</a:t>
             </a:fld>
             <a:endParaRPr lang="en-US"/>
           </a:p>
@@ -3207,57 +3614,24 @@
       </p:grpSpPr>
       <p:sp>
         <p:nvSpPr>
-          <p:cNvPr id="4" name="TextBox 3"/>
-          <p:cNvSpPr txBox="1"/>
-          <p:nvPr/>
-        </p:nvSpPr>
-        <p:spPr>
-          <a:xfrm>
-            <a:off x="877724" y="450449"/>
-            <a:ext cx="639919" cy="303481"/>
-          </a:xfrm>
-          <a:prstGeom prst="rect">
-            <a:avLst/>
-          </a:prstGeom>
-          <a:noFill/>
-        </p:spPr>
-        <p:txBody>
-          <a:bodyPr wrap="none" rtlCol="0">
-            <a:spAutoFit/>
-          </a:bodyPr>
-          <a:lstStyle/>
-          <a:p>
-            <a:r>
-              <a:rPr lang="en-US" sz="1372" b="1" i="1" dirty="0">
-                <a:solidFill>
-                  <a:srgbClr val="FF0000"/>
-                </a:solidFill>
-              </a:rPr>
-              <a:t>&lt;app&gt;</a:t>
-            </a:r>
-          </a:p>
-        </p:txBody>
-      </p:sp>
-      <p:sp>
-        <p:nvSpPr>
-          <p:cNvPr id="5" name="Rounded Rectangle 4"/>
+          <p:cNvPr id="4" name="Rectangle 3"/>
           <p:cNvSpPr/>
           <p:nvPr/>
         </p:nvSpPr>
         <p:spPr>
           <a:xfrm>
-            <a:off x="391667" y="279868"/>
-            <a:ext cx="1650319" cy="1318222"/>
-          </a:xfrm>
-          <a:prstGeom prst="roundRect">
+            <a:off x="5229860" y="5342890"/>
+            <a:ext cx="1578610" cy="953770"/>
+          </a:xfrm>
+          <a:prstGeom prst="rect">
             <a:avLst/>
           </a:prstGeom>
           <a:noFill/>
           <a:ln>
             <a:solidFill>
-              <a:srgbClr val="FF0000"/>
+              <a:schemeClr val="accent1"/>
             </a:solidFill>
-            <a:prstDash val="lgDash"/>
+            <a:prstDash val="sysDash"/>
           </a:ln>
         </p:spPr>
         <p:style>
@@ -3281,20 +3655,20 @@
           <a:lstStyle/>
           <a:p>
             <a:pPr algn="ctr"/>
-            <a:endParaRPr lang="en-US" sz="1372"/>
-          </a:p>
-        </p:txBody>
-      </p:sp>
-      <p:sp>
-        <p:nvSpPr>
-          <p:cNvPr id="6" name="TextBox 5"/>
+            <a:endParaRPr lang="en-US"/>
+          </a:p>
+        </p:txBody>
+      </p:sp>
+      <p:sp>
+        <p:nvSpPr>
+          <p:cNvPr id="5" name="Text Box 4"/>
           <p:cNvSpPr txBox="1"/>
           <p:nvPr/>
         </p:nvSpPr>
         <p:spPr>
           <a:xfrm>
-            <a:off x="866649" y="726337"/>
-            <a:ext cx="623889" cy="303481"/>
+            <a:off x="5560695" y="5443855"/>
+            <a:ext cx="1003300" cy="368300"/>
           </a:xfrm>
           <a:prstGeom prst="rect">
             <a:avLst/>
@@ -3302,116 +3676,40 @@
           <a:noFill/>
         </p:spPr>
         <p:txBody>
-          <a:bodyPr wrap="none" rtlCol="0">
+          <a:bodyPr wrap="square" rtlCol="0">
             <a:spAutoFit/>
           </a:bodyPr>
           <a:lstStyle/>
           <a:p>
             <a:r>
-              <a:rPr lang="en-US" sz="1372" dirty="0"/>
-              <a:t>User[]</a:t>
-            </a:r>
-          </a:p>
-        </p:txBody>
-      </p:sp>
-      <p:sp>
-        <p:nvSpPr>
-          <p:cNvPr id="7" name="TextBox 6"/>
-          <p:cNvSpPr txBox="1"/>
+              <a:rPr lang="" altLang="en-US"/>
+              <a:t>&lt;app&gt; </a:t>
+            </a:r>
+          </a:p>
+        </p:txBody>
+      </p:sp>
+      <p:sp>
+        <p:nvSpPr>
+          <p:cNvPr id="6" name="Rectangle 5"/>
+          <p:cNvSpPr/>
           <p:nvPr/>
         </p:nvSpPr>
         <p:spPr>
           <a:xfrm>
-            <a:off x="391667" y="1750066"/>
-            <a:ext cx="4954177" cy="303481"/>
+            <a:off x="8699500" y="5342255"/>
+            <a:ext cx="1628775" cy="570230"/>
           </a:xfrm>
           <a:prstGeom prst="rect">
             <a:avLst/>
           </a:prstGeom>
           <a:noFill/>
-        </p:spPr>
-        <p:txBody>
-          <a:bodyPr wrap="none" rtlCol="0">
-            <a:spAutoFit/>
-          </a:bodyPr>
-          <a:lstStyle/>
-          <a:p>
-            <a:r>
-              <a:rPr lang="en-US" sz="1372" dirty="0"/>
-              <a:t>// A component with a list of student, events, and category as data</a:t>
-            </a:r>
-          </a:p>
-        </p:txBody>
-      </p:sp>
-      <p:sp>
-        <p:nvSpPr>
-          <p:cNvPr id="11" name="TextBox 10"/>
-          <p:cNvSpPr txBox="1"/>
-          <p:nvPr/>
-        </p:nvSpPr>
-        <p:spPr>
-          <a:xfrm>
-            <a:off x="464251" y="3703715"/>
-            <a:ext cx="2449068" cy="303481"/>
-          </a:xfrm>
-          <a:prstGeom prst="rect">
-            <a:avLst/>
-          </a:prstGeom>
-          <a:noFill/>
-        </p:spPr>
-        <p:txBody>
-          <a:bodyPr wrap="none" rtlCol="0">
-            <a:spAutoFit/>
-          </a:bodyPr>
-          <a:lstStyle/>
-          <a:p>
-            <a:r>
-              <a:rPr lang="en-US" sz="1372" dirty="0"/>
-              <a:t>// </a:t>
-            </a:r>
-            <a:r>
-              <a:rPr lang="en-US" sz="1372" dirty="0">
-                <a:solidFill>
-                  <a:srgbClr val="FF0000"/>
-                </a:solidFill>
-              </a:rPr>
-              <a:t>app</a:t>
-            </a:r>
-            <a:r>
-              <a:rPr lang="en-US" sz="1372" dirty="0"/>
-              <a:t> send users to </a:t>
-            </a:r>
-            <a:r>
-              <a:rPr lang="en-US" sz="1372" dirty="0">
-                <a:solidFill>
-                  <a:srgbClr val="FF0000"/>
-                </a:solidFill>
-              </a:rPr>
-              <a:t>user-card </a:t>
-            </a:r>
-          </a:p>
-        </p:txBody>
-      </p:sp>
-      <p:sp>
-        <p:nvSpPr>
-          <p:cNvPr id="17" name="Rounded Rectangle 16"/>
-          <p:cNvSpPr/>
-          <p:nvPr/>
-        </p:nvSpPr>
-        <p:spPr>
-          <a:xfrm>
-            <a:off x="3056973" y="2408786"/>
-            <a:ext cx="1650319" cy="1166483"/>
-          </a:xfrm>
-          <a:prstGeom prst="roundRect">
-            <a:avLst/>
-          </a:prstGeom>
-          <a:noFill/>
-          <a:ln>
+          <a:ln w="12700" cmpd="sng">
             <a:solidFill>
-              <a:srgbClr val="FF0000"/>
+              <a:schemeClr val="accent1">
+                <a:shade val="50000"/>
+              </a:schemeClr>
             </a:solidFill>
-            <a:prstDash val="lgDash"/>
+            <a:prstDash val="sysDot"/>
           </a:ln>
         </p:spPr>
         <p:style>
@@ -3435,20 +3733,20 @@
           <a:lstStyle/>
           <a:p>
             <a:pPr algn="ctr"/>
-            <a:endParaRPr lang="en-US" sz="1372"/>
-          </a:p>
-        </p:txBody>
-      </p:sp>
-      <p:sp>
-        <p:nvSpPr>
-          <p:cNvPr id="18" name="TextBox 17"/>
+            <a:endParaRPr lang="en-US"/>
+          </a:p>
+        </p:txBody>
+      </p:sp>
+      <p:sp>
+        <p:nvSpPr>
+          <p:cNvPr id="7" name="Text Box 6"/>
           <p:cNvSpPr txBox="1"/>
           <p:nvPr/>
         </p:nvSpPr>
         <p:spPr>
           <a:xfrm>
-            <a:off x="3542344" y="3002401"/>
-            <a:ext cx="670568" cy="303481"/>
+            <a:off x="8889365" y="5443855"/>
+            <a:ext cx="1306830" cy="368300"/>
           </a:xfrm>
           <a:prstGeom prst="rect">
             <a:avLst/>
@@ -3456,35 +3754,38 @@
           <a:noFill/>
         </p:spPr>
         <p:txBody>
-          <a:bodyPr wrap="none" rtlCol="0">
+          <a:bodyPr wrap="square" rtlCol="0">
             <a:spAutoFit/>
           </a:bodyPr>
           <a:lstStyle/>
           <a:p>
             <a:r>
-              <a:rPr lang="en-US" sz="1372" dirty="0"/>
-              <a:t>users[]</a:t>
-            </a:r>
-          </a:p>
-        </p:txBody>
-      </p:sp>
-      <p:sp>
-        <p:nvSpPr>
-          <p:cNvPr id="22" name="Right Arrow 21"/>
+              <a:rPr lang="" altLang="en-US" dirty="0"/>
+              <a:t>&lt;sign-in&gt;</a:t>
+            </a:r>
+          </a:p>
+        </p:txBody>
+      </p:sp>
+      <p:sp>
+        <p:nvSpPr>
+          <p:cNvPr id="8" name="Left Arrow 7"/>
           <p:cNvSpPr/>
           <p:nvPr/>
         </p:nvSpPr>
         <p:spPr>
           <a:xfrm>
-            <a:off x="2197551" y="2768367"/>
-            <a:ext cx="696809" cy="333683"/>
-          </a:xfrm>
-          <a:prstGeom prst="rightArrow">
+            <a:off x="7391400" y="5710555"/>
+            <a:ext cx="733425" cy="180975"/>
+          </a:xfrm>
+          <a:prstGeom prst="leftArrow">
             <a:avLst/>
           </a:prstGeom>
           <a:solidFill>
-            <a:schemeClr val="accent6"/>
+            <a:srgbClr val="FF0000"/>
           </a:solidFill>
+          <a:ln>
+            <a:noFill/>
+          </a:ln>
         </p:spPr>
         <p:style>
           <a:lnRef idx="2">
@@ -3503,29 +3804,24 @@
           </a:fontRef>
         </p:style>
         <p:txBody>
-          <a:bodyPr rot="0" spcFirstLastPara="0" vertOverflow="overflow" horzOverflow="overflow" vert="horz" wrap="square" lIns="69681" tIns="34840" rIns="69681" bIns="34840" numCol="1" spcCol="0" rtlCol="0" fromWordArt="0" anchor="ctr" anchorCtr="0" forceAA="0" compatLnSpc="1">
-            <a:prstTxWarp prst="textNoShape">
-              <a:avLst/>
-            </a:prstTxWarp>
-            <a:noAutofit/>
-          </a:bodyPr>
+          <a:bodyPr rtlCol="0" anchor="ctr"/>
           <a:lstStyle/>
           <a:p>
             <a:pPr algn="ctr"/>
-            <a:endParaRPr lang="en-US" sz="1372"/>
-          </a:p>
-        </p:txBody>
-      </p:sp>
-      <p:sp>
-        <p:nvSpPr>
-          <p:cNvPr id="24" name="TextBox 23"/>
+            <a:endParaRPr lang="en-US"/>
+          </a:p>
+        </p:txBody>
+      </p:sp>
+      <p:sp>
+        <p:nvSpPr>
+          <p:cNvPr id="9" name="Text Box 8"/>
           <p:cNvSpPr txBox="1"/>
           <p:nvPr/>
         </p:nvSpPr>
         <p:spPr>
           <a:xfrm>
-            <a:off x="2188492" y="2550268"/>
-            <a:ext cx="670248" cy="303481"/>
+            <a:off x="7451090" y="5342255"/>
+            <a:ext cx="614680" cy="368300"/>
           </a:xfrm>
           <a:prstGeom prst="rect">
             <a:avLst/>
@@ -3539,26 +3835,26 @@
           <a:lstStyle/>
           <a:p>
             <a:r>
-              <a:rPr lang="en-US" sz="1372" b="1" dirty="0">
+              <a:rPr lang="" altLang="en-US">
                 <a:solidFill>
-                  <a:schemeClr val="accent6"/>
+                  <a:srgbClr val="FF0000"/>
                 </a:solidFill>
               </a:rPr>
-              <a:t>PROPS</a:t>
-            </a:r>
-          </a:p>
-        </p:txBody>
-      </p:sp>
-      <p:sp>
-        <p:nvSpPr>
-          <p:cNvPr id="25" name="TextBox 24"/>
+              <a:t>emit</a:t>
+            </a:r>
+          </a:p>
+        </p:txBody>
+      </p:sp>
+      <p:sp>
+        <p:nvSpPr>
+          <p:cNvPr id="10" name="Text Box 9"/>
           <p:cNvSpPr txBox="1"/>
           <p:nvPr/>
         </p:nvSpPr>
         <p:spPr>
           <a:xfrm>
-            <a:off x="3316542" y="2569859"/>
-            <a:ext cx="1045735" cy="303481"/>
+            <a:off x="7331075" y="5913755"/>
+            <a:ext cx="845103" cy="307777"/>
           </a:xfrm>
           <a:prstGeom prst="rect">
             <a:avLst/>
@@ -3572,62 +3868,93 @@
           <a:lstStyle/>
           <a:p>
             <a:r>
-              <a:rPr lang="en-US" sz="1372" b="1" i="1" dirty="0">
+              <a:rPr lang="" altLang="en-US" sz="1400" dirty="0"/>
+              <a:t>@signIn</a:t>
+            </a:r>
+          </a:p>
+        </p:txBody>
+      </p:sp>
+      <p:sp>
+        <p:nvSpPr>
+          <p:cNvPr id="11" name="Text Box 10"/>
+          <p:cNvSpPr txBox="1"/>
+          <p:nvPr/>
+        </p:nvSpPr>
+        <p:spPr>
+          <a:xfrm>
+            <a:off x="5610225" y="5847080"/>
+            <a:ext cx="881380" cy="368300"/>
+          </a:xfrm>
+          <a:prstGeom prst="rect">
+            <a:avLst/>
+          </a:prstGeom>
+          <a:noFill/>
+        </p:spPr>
+        <p:txBody>
+          <a:bodyPr wrap="none" rtlCol="0">
+            <a:spAutoFit/>
+          </a:bodyPr>
+          <a:lstStyle/>
+          <a:p>
+            <a:r>
+              <a:rPr lang="" altLang="en-US">
                 <a:solidFill>
-                  <a:srgbClr val="FF0000"/>
+                  <a:srgbClr val="00B050"/>
                 </a:solidFill>
               </a:rPr>
-              <a:t>&lt;user-card&gt;</a:t>
-            </a:r>
-          </a:p>
-        </p:txBody>
-      </p:sp>
-      <p:cxnSp>
-        <p:nvCxnSpPr>
-          <p:cNvPr id="30" name="Straight Connector 29"/>
-          <p:cNvCxnSpPr/>
+              <a:t>user [ ]</a:t>
+            </a:r>
+          </a:p>
+        </p:txBody>
+      </p:sp>
+      <p:sp>
+        <p:nvSpPr>
+          <p:cNvPr id="16" name="Left Brace 15"/>
+          <p:cNvSpPr/>
           <p:nvPr/>
-        </p:nvCxnSpPr>
+        </p:nvSpPr>
         <p:spPr>
           <a:xfrm>
-            <a:off x="5733143" y="0"/>
-            <a:ext cx="29028" cy="6858000"/>
-          </a:xfrm>
-          <a:prstGeom prst="line">
+            <a:off x="4869180" y="1623695"/>
+            <a:ext cx="360680" cy="2800350"/>
+          </a:xfrm>
+          <a:prstGeom prst="leftBrace">
             <a:avLst/>
           </a:prstGeom>
         </p:spPr>
         <p:style>
           <a:lnRef idx="1">
-            <a:schemeClr val="accent1"/>
+            <a:schemeClr val="accent2"/>
           </a:lnRef>
           <a:fillRef idx="0">
-            <a:schemeClr val="accent1"/>
+            <a:schemeClr val="accent2"/>
           </a:fillRef>
           <a:effectRef idx="0">
-            <a:schemeClr val="accent1"/>
+            <a:schemeClr val="accent2"/>
           </a:effectRef>
           <a:fontRef idx="minor">
             <a:schemeClr val="tx1"/>
           </a:fontRef>
         </p:style>
-      </p:cxnSp>
-      <p:sp>
-        <p:nvSpPr>
-          <p:cNvPr id="51" name="TextBox 50">
-            <a:extLst>
-              <a:ext uri="{FF2B5EF4-FFF2-40B4-BE49-F238E27FC236}">
-                <a16:creationId xmlns:a16="http://schemas.microsoft.com/office/drawing/2014/main" id="{1A194725-94AB-4944-9475-B2A0834F9477}"/>
-              </a:ext>
-            </a:extLst>
-          </p:cNvPr>
+        <p:txBody>
+          <a:bodyPr rtlCol="0" anchor="ctr"/>
+          <a:lstStyle/>
+          <a:p>
+            <a:pPr algn="ctr"/>
+            <a:endParaRPr lang="en-US" sz="6600"/>
+          </a:p>
+        </p:txBody>
+      </p:sp>
+      <p:sp>
+        <p:nvSpPr>
+          <p:cNvPr id="17" name="Text Box 16"/>
           <p:cNvSpPr txBox="1"/>
           <p:nvPr/>
         </p:nvSpPr>
         <p:spPr>
           <a:xfrm>
-            <a:off x="831895" y="918995"/>
-            <a:ext cx="693395" cy="303481"/>
+            <a:off x="3303270" y="2839720"/>
+            <a:ext cx="1306195" cy="368300"/>
           </a:xfrm>
           <a:prstGeom prst="rect">
             <a:avLst/>
@@ -3635,118 +3962,68 @@
           <a:noFill/>
         </p:spPr>
         <p:txBody>
-          <a:bodyPr wrap="none" rtlCol="0">
+          <a:bodyPr wrap="square" rtlCol="0">
             <a:spAutoFit/>
           </a:bodyPr>
           <a:lstStyle/>
           <a:p>
             <a:r>
-              <a:rPr lang="en-US" sz="1372" dirty="0"/>
-              <a:t>Event[]</a:t>
-            </a:r>
-          </a:p>
-        </p:txBody>
-      </p:sp>
-      <p:sp>
-        <p:nvSpPr>
-          <p:cNvPr id="52" name="TextBox 51">
-            <a:extLst>
-              <a:ext uri="{FF2B5EF4-FFF2-40B4-BE49-F238E27FC236}">
-                <a16:creationId xmlns:a16="http://schemas.microsoft.com/office/drawing/2014/main" id="{F84B52FB-4EE6-4A45-BF48-E65387D53FC0}"/>
-              </a:ext>
-            </a:extLst>
-          </p:cNvPr>
-          <p:cNvSpPr txBox="1"/>
-          <p:nvPr/>
-        </p:nvSpPr>
-        <p:spPr>
-          <a:xfrm>
-            <a:off x="746023" y="1086431"/>
-            <a:ext cx="934230" cy="303481"/>
-          </a:xfrm>
-          <a:prstGeom prst="rect">
-            <a:avLst/>
-          </a:prstGeom>
-          <a:noFill/>
-        </p:spPr>
-        <p:txBody>
-          <a:bodyPr wrap="none" rtlCol="0">
-            <a:spAutoFit/>
-          </a:bodyPr>
-          <a:lstStyle/>
-          <a:p>
-            <a:r>
-              <a:rPr lang="en-US" sz="1372" dirty="0"/>
-              <a:t>Category[]</a:t>
-            </a:r>
-          </a:p>
-        </p:txBody>
-      </p:sp>
-      <p:sp>
-        <p:nvSpPr>
-          <p:cNvPr id="53" name="TextBox 52">
-            <a:extLst>
-              <a:ext uri="{FF2B5EF4-FFF2-40B4-BE49-F238E27FC236}">
-                <a16:creationId xmlns:a16="http://schemas.microsoft.com/office/drawing/2014/main" id="{108D4D35-D7CA-44AD-8BAA-C8A65B37494E}"/>
-              </a:ext>
-            </a:extLst>
-          </p:cNvPr>
-          <p:cNvSpPr txBox="1"/>
-          <p:nvPr/>
-        </p:nvSpPr>
-        <p:spPr>
-          <a:xfrm>
-            <a:off x="877724" y="2423174"/>
-            <a:ext cx="639919" cy="303481"/>
-          </a:xfrm>
-          <a:prstGeom prst="rect">
-            <a:avLst/>
-          </a:prstGeom>
-          <a:noFill/>
-        </p:spPr>
-        <p:txBody>
-          <a:bodyPr wrap="none" rtlCol="0">
-            <a:spAutoFit/>
-          </a:bodyPr>
-          <a:lstStyle/>
-          <a:p>
-            <a:r>
-              <a:rPr lang="en-US" sz="1372" b="1" i="1" dirty="0">
+              <a:rPr lang="en-US" altLang="en-US" b="1" dirty="0">
                 <a:solidFill>
-                  <a:srgbClr val="FF0000"/>
+                  <a:srgbClr val="00B050"/>
                 </a:solidFill>
               </a:rPr>
-              <a:t>&lt;app&gt;</a:t>
-            </a:r>
-          </a:p>
-        </p:txBody>
-      </p:sp>
-      <p:sp>
-        <p:nvSpPr>
-          <p:cNvPr id="54" name="Rounded Rectangle 4">
-            <a:extLst>
-              <a:ext uri="{FF2B5EF4-FFF2-40B4-BE49-F238E27FC236}">
-                <a16:creationId xmlns:a16="http://schemas.microsoft.com/office/drawing/2014/main" id="{C297D618-7111-44F6-86F2-8E89C9EEDBFC}"/>
-              </a:ext>
-            </a:extLst>
-          </p:cNvPr>
+              <a:t>&lt;</a:t>
+            </a:r>
+            <a:r>
+              <a:rPr lang="" altLang="en-US" b="1" dirty="0">
+                <a:solidFill>
+                  <a:srgbClr val="00B050"/>
+                </a:solidFill>
+              </a:rPr>
+              <a:t>sign-in</a:t>
+            </a:r>
+            <a:r>
+              <a:rPr lang="en-US" altLang="en-US" b="1" dirty="0">
+                <a:solidFill>
+                  <a:srgbClr val="00B050"/>
+                </a:solidFill>
+              </a:rPr>
+              <a:t>&gt;</a:t>
+            </a:r>
+            <a:r>
+              <a:rPr lang="en-US" altLang="en-US" b="1" dirty="0">
+                <a:solidFill>
+                  <a:schemeClr val="accent5">
+                    <a:lumMod val="75000"/>
+                  </a:schemeClr>
+                </a:solidFill>
+              </a:rPr>
+              <a:t> </a:t>
+            </a:r>
+          </a:p>
+        </p:txBody>
+      </p:sp>
+      <p:sp>
+        <p:nvSpPr>
+          <p:cNvPr id="18" name="Rounded Rectangle 17"/>
           <p:cNvSpPr/>
           <p:nvPr/>
         </p:nvSpPr>
         <p:spPr>
           <a:xfrm>
-            <a:off x="391667" y="2252593"/>
-            <a:ext cx="1650319" cy="1318222"/>
+            <a:off x="55880" y="5287645"/>
+            <a:ext cx="4387215" cy="1487170"/>
           </a:xfrm>
           <a:prstGeom prst="roundRect">
             <a:avLst/>
           </a:prstGeom>
           <a:noFill/>
-          <a:ln>
+          <a:ln w="28575" cmpd="sng">
             <a:solidFill>
-              <a:srgbClr val="FF0000"/>
+              <a:srgbClr val="00B050"/>
             </a:solidFill>
-            <a:prstDash val="lgDash"/>
+            <a:prstDash val="sysDot"/>
           </a:ln>
         </p:spPr>
         <p:style>
@@ -3770,16 +4047,99 @@
           <a:lstStyle/>
           <a:p>
             <a:pPr algn="ctr"/>
-            <a:endParaRPr lang="en-US" sz="1372"/>
-          </a:p>
-        </p:txBody>
-      </p:sp>
-      <p:sp>
-        <p:nvSpPr>
-          <p:cNvPr id="55" name="TextBox 54">
+            <a:endParaRPr lang="en-US"/>
+          </a:p>
+        </p:txBody>
+      </p:sp>
+      <p:sp>
+        <p:nvSpPr>
+          <p:cNvPr id="19" name="Text Box 18"/>
+          <p:cNvSpPr txBox="1"/>
+          <p:nvPr/>
+        </p:nvSpPr>
+        <p:spPr>
+          <a:xfrm>
+            <a:off x="187960" y="5467478"/>
+            <a:ext cx="4314825" cy="1200329"/>
+          </a:xfrm>
+          <a:prstGeom prst="rect">
+            <a:avLst/>
+          </a:prstGeom>
+          <a:noFill/>
+        </p:spPr>
+        <p:txBody>
+          <a:bodyPr wrap="square" rtlCol="0">
+            <a:spAutoFit/>
+          </a:bodyPr>
+          <a:lstStyle/>
+          <a:p>
+            <a:r>
+              <a:rPr lang="" altLang="en-US" b="1" dirty="0">
+                <a:solidFill>
+                  <a:srgbClr val="FF0000"/>
+                </a:solidFill>
+              </a:rPr>
+              <a:t>- Check email is matching</a:t>
+            </a:r>
+          </a:p>
+          <a:p>
+            <a:r>
+              <a:rPr lang="" altLang="en-US" b="1" dirty="0">
+                <a:solidFill>
+                  <a:srgbClr val="FF0000"/>
+                </a:solidFill>
+              </a:rPr>
+              <a:t>- Check password is matching</a:t>
+            </a:r>
+          </a:p>
+          <a:p>
+            <a:r>
+              <a:rPr lang="" altLang="en-US" b="1" dirty="0">
+                <a:solidFill>
+                  <a:srgbClr val="FF0000"/>
+                </a:solidFill>
+              </a:rPr>
+              <a:t>- Display message if password and email is not valid</a:t>
+            </a:r>
+          </a:p>
+        </p:txBody>
+      </p:sp>
+      <p:pic>
+        <p:nvPicPr>
+          <p:cNvPr id="3" name="Picture 2">
             <a:extLst>
               <a:ext uri="{FF2B5EF4-FFF2-40B4-BE49-F238E27FC236}">
-                <a16:creationId xmlns:a16="http://schemas.microsoft.com/office/drawing/2014/main" id="{D1E4D378-8C98-4294-88B2-FFE9BD3E5ACF}"/>
+                <a16:creationId xmlns:a16="http://schemas.microsoft.com/office/drawing/2014/main" id="{7244FC2F-2583-4FA8-84A1-01494549D84D}"/>
+              </a:ext>
+            </a:extLst>
+          </p:cNvPr>
+          <p:cNvPicPr>
+            <a:picLocks noChangeAspect="1"/>
+          </p:cNvPicPr>
+          <p:nvPr/>
+        </p:nvPicPr>
+        <p:blipFill>
+          <a:blip r:embed="rId3"/>
+          <a:stretch>
+            <a:fillRect/>
+          </a:stretch>
+        </p:blipFill>
+        <p:spPr>
+          <a:xfrm>
+            <a:off x="5560695" y="561340"/>
+            <a:ext cx="5067300" cy="4398010"/>
+          </a:xfrm>
+          <a:prstGeom prst="rect">
+            <a:avLst/>
+          </a:prstGeom>
+        </p:spPr>
+      </p:pic>
+      <p:sp>
+        <p:nvSpPr>
+          <p:cNvPr id="2" name="TextBox 1">
+            <a:extLst>
+              <a:ext uri="{FF2B5EF4-FFF2-40B4-BE49-F238E27FC236}">
+                <a16:creationId xmlns:a16="http://schemas.microsoft.com/office/drawing/2014/main" id="{65018BAB-6649-4104-9676-A8131B106536}"/>
               </a:ext>
             </a:extLst>
           </p:cNvPr>
@@ -3788,8 +4148,8 @@
         </p:nvSpPr>
         <p:spPr>
           <a:xfrm>
-            <a:off x="866649" y="2699062"/>
-            <a:ext cx="623889" cy="303481"/>
+            <a:off x="497522" y="878994"/>
+            <a:ext cx="4207828" cy="707886"/>
           </a:xfrm>
           <a:prstGeom prst="rect">
             <a:avLst/>
@@ -3797,1962 +4157,19 @@
           <a:noFill/>
         </p:spPr>
         <p:txBody>
-          <a:bodyPr wrap="none" rtlCol="0">
+          <a:bodyPr wrap="square" rtlCol="0">
             <a:spAutoFit/>
           </a:bodyPr>
           <a:lstStyle/>
           <a:p>
             <a:r>
-              <a:rPr lang="en-US" sz="1372" dirty="0"/>
-              <a:t>User[]</a:t>
-            </a:r>
-          </a:p>
-        </p:txBody>
-      </p:sp>
-      <p:sp>
-        <p:nvSpPr>
-          <p:cNvPr id="56" name="TextBox 55">
-            <a:extLst>
-              <a:ext uri="{FF2B5EF4-FFF2-40B4-BE49-F238E27FC236}">
-                <a16:creationId xmlns:a16="http://schemas.microsoft.com/office/drawing/2014/main" id="{2D290394-859C-4C6E-AFD4-42DE25D99862}"/>
-              </a:ext>
-            </a:extLst>
-          </p:cNvPr>
-          <p:cNvSpPr txBox="1"/>
-          <p:nvPr/>
-        </p:nvSpPr>
-        <p:spPr>
-          <a:xfrm>
-            <a:off x="831895" y="2891720"/>
-            <a:ext cx="693395" cy="303481"/>
-          </a:xfrm>
-          <a:prstGeom prst="rect">
-            <a:avLst/>
-          </a:prstGeom>
-          <a:noFill/>
-        </p:spPr>
-        <p:txBody>
-          <a:bodyPr wrap="none" rtlCol="0">
-            <a:spAutoFit/>
-          </a:bodyPr>
-          <a:lstStyle/>
-          <a:p>
-            <a:r>
-              <a:rPr lang="en-US" sz="1372" dirty="0"/>
-              <a:t>Event[]</a:t>
-            </a:r>
-          </a:p>
-        </p:txBody>
-      </p:sp>
-      <p:sp>
-        <p:nvSpPr>
-          <p:cNvPr id="57" name="TextBox 56">
-            <a:extLst>
-              <a:ext uri="{FF2B5EF4-FFF2-40B4-BE49-F238E27FC236}">
-                <a16:creationId xmlns:a16="http://schemas.microsoft.com/office/drawing/2014/main" id="{E8AC594B-C499-4562-8DB7-8A3EBD9FAA9D}"/>
-              </a:ext>
-            </a:extLst>
-          </p:cNvPr>
-          <p:cNvSpPr txBox="1"/>
-          <p:nvPr/>
-        </p:nvSpPr>
-        <p:spPr>
-          <a:xfrm>
-            <a:off x="746023" y="3059156"/>
-            <a:ext cx="934230" cy="303481"/>
-          </a:xfrm>
-          <a:prstGeom prst="rect">
-            <a:avLst/>
-          </a:prstGeom>
-          <a:noFill/>
-        </p:spPr>
-        <p:txBody>
-          <a:bodyPr wrap="none" rtlCol="0">
-            <a:spAutoFit/>
-          </a:bodyPr>
-          <a:lstStyle/>
-          <a:p>
-            <a:r>
-              <a:rPr lang="en-US" sz="1372" dirty="0"/>
-              <a:t>Category[]</a:t>
-            </a:r>
-          </a:p>
-        </p:txBody>
-      </p:sp>
-      <p:sp>
-        <p:nvSpPr>
-          <p:cNvPr id="59" name="Rounded Rectangle 16">
-            <a:extLst>
-              <a:ext uri="{FF2B5EF4-FFF2-40B4-BE49-F238E27FC236}">
-                <a16:creationId xmlns:a16="http://schemas.microsoft.com/office/drawing/2014/main" id="{6DF50634-71C6-458E-AAF5-1C9F0E63DBCC}"/>
-              </a:ext>
-            </a:extLst>
-          </p:cNvPr>
-          <p:cNvSpPr/>
-          <p:nvPr/>
-        </p:nvSpPr>
-        <p:spPr>
-          <a:xfrm>
-            <a:off x="3056973" y="4296289"/>
-            <a:ext cx="1650319" cy="1166483"/>
-          </a:xfrm>
-          <a:prstGeom prst="roundRect">
-            <a:avLst/>
-          </a:prstGeom>
-          <a:noFill/>
-          <a:ln>
-            <a:solidFill>
-              <a:srgbClr val="FF0000"/>
-            </a:solidFill>
-            <a:prstDash val="lgDash"/>
-          </a:ln>
-        </p:spPr>
-        <p:style>
-          <a:lnRef idx="2">
-            <a:schemeClr val="accent1">
-              <a:shade val="50000"/>
-            </a:schemeClr>
-          </a:lnRef>
-          <a:fillRef idx="1">
-            <a:schemeClr val="accent1"/>
-          </a:fillRef>
-          <a:effectRef idx="0">
-            <a:schemeClr val="accent1"/>
-          </a:effectRef>
-          <a:fontRef idx="minor">
-            <a:schemeClr val="lt1"/>
-          </a:fontRef>
-        </p:style>
-        <p:txBody>
-          <a:bodyPr rtlCol="0" anchor="ctr"/>
-          <a:lstStyle/>
-          <a:p>
-            <a:pPr algn="ctr"/>
-            <a:endParaRPr lang="en-US" sz="1372"/>
-          </a:p>
-        </p:txBody>
-      </p:sp>
-      <p:sp>
-        <p:nvSpPr>
-          <p:cNvPr id="60" name="TextBox 59">
-            <a:extLst>
-              <a:ext uri="{FF2B5EF4-FFF2-40B4-BE49-F238E27FC236}">
-                <a16:creationId xmlns:a16="http://schemas.microsoft.com/office/drawing/2014/main" id="{29654ADC-3AA8-4795-B0A4-134685DFE516}"/>
-              </a:ext>
-            </a:extLst>
-          </p:cNvPr>
-          <p:cNvSpPr txBox="1"/>
-          <p:nvPr/>
-        </p:nvSpPr>
-        <p:spPr>
-          <a:xfrm>
-            <a:off x="3418703" y="4879530"/>
-            <a:ext cx="767198" cy="303481"/>
-          </a:xfrm>
-          <a:prstGeom prst="rect">
-            <a:avLst/>
-          </a:prstGeom>
-          <a:noFill/>
-        </p:spPr>
-        <p:txBody>
-          <a:bodyPr wrap="none" rtlCol="0">
-            <a:spAutoFit/>
-          </a:bodyPr>
-          <a:lstStyle/>
-          <a:p>
-            <a:r>
-              <a:rPr lang="en-US" sz="1372" dirty="0"/>
-              <a:t>events[]</a:t>
-            </a:r>
-          </a:p>
-        </p:txBody>
-      </p:sp>
-      <p:sp>
-        <p:nvSpPr>
-          <p:cNvPr id="61" name="Right Arrow 21">
-            <a:extLst>
-              <a:ext uri="{FF2B5EF4-FFF2-40B4-BE49-F238E27FC236}">
-                <a16:creationId xmlns:a16="http://schemas.microsoft.com/office/drawing/2014/main" id="{F02A0B61-CFAD-4DD5-81E5-566ECF424FFC}"/>
-              </a:ext>
-            </a:extLst>
-          </p:cNvPr>
-          <p:cNvSpPr/>
-          <p:nvPr/>
-        </p:nvSpPr>
-        <p:spPr>
-          <a:xfrm>
-            <a:off x="2197551" y="4655870"/>
-            <a:ext cx="696809" cy="333683"/>
-          </a:xfrm>
-          <a:prstGeom prst="rightArrow">
-            <a:avLst/>
-          </a:prstGeom>
-          <a:solidFill>
-            <a:schemeClr val="accent6"/>
-          </a:solidFill>
-        </p:spPr>
-        <p:style>
-          <a:lnRef idx="2">
-            <a:schemeClr val="accent1">
-              <a:shade val="50000"/>
-            </a:schemeClr>
-          </a:lnRef>
-          <a:fillRef idx="1">
-            <a:schemeClr val="accent1"/>
-          </a:fillRef>
-          <a:effectRef idx="0">
-            <a:schemeClr val="accent1"/>
-          </a:effectRef>
-          <a:fontRef idx="minor">
-            <a:schemeClr val="lt1"/>
-          </a:fontRef>
-        </p:style>
-        <p:txBody>
-          <a:bodyPr rot="0" spcFirstLastPara="0" vertOverflow="overflow" horzOverflow="overflow" vert="horz" wrap="square" lIns="69681" tIns="34840" rIns="69681" bIns="34840" numCol="1" spcCol="0" rtlCol="0" fromWordArt="0" anchor="ctr" anchorCtr="0" forceAA="0" compatLnSpc="1">
-            <a:prstTxWarp prst="textNoShape">
-              <a:avLst/>
-            </a:prstTxWarp>
-            <a:noAutofit/>
-          </a:bodyPr>
-          <a:lstStyle/>
-          <a:p>
-            <a:pPr algn="ctr"/>
-            <a:endParaRPr lang="en-US" sz="1372"/>
-          </a:p>
-        </p:txBody>
-      </p:sp>
-      <p:sp>
-        <p:nvSpPr>
-          <p:cNvPr id="63" name="TextBox 62">
-            <a:extLst>
-              <a:ext uri="{FF2B5EF4-FFF2-40B4-BE49-F238E27FC236}">
-                <a16:creationId xmlns:a16="http://schemas.microsoft.com/office/drawing/2014/main" id="{38E22B90-D7AF-4C7F-BFA8-3DD7F167E5AD}"/>
-              </a:ext>
-            </a:extLst>
-          </p:cNvPr>
-          <p:cNvSpPr txBox="1"/>
-          <p:nvPr/>
-        </p:nvSpPr>
-        <p:spPr>
-          <a:xfrm>
-            <a:off x="2188492" y="4437771"/>
-            <a:ext cx="670248" cy="303481"/>
-          </a:xfrm>
-          <a:prstGeom prst="rect">
-            <a:avLst/>
-          </a:prstGeom>
-          <a:noFill/>
-        </p:spPr>
-        <p:txBody>
-          <a:bodyPr wrap="none" rtlCol="0">
-            <a:spAutoFit/>
-          </a:bodyPr>
-          <a:lstStyle/>
-          <a:p>
-            <a:r>
-              <a:rPr lang="en-US" sz="1372" b="1" dirty="0">
-                <a:solidFill>
-                  <a:schemeClr val="accent6"/>
-                </a:solidFill>
-              </a:rPr>
-              <a:t>PROPS</a:t>
-            </a:r>
-          </a:p>
-        </p:txBody>
-      </p:sp>
-      <p:sp>
-        <p:nvSpPr>
-          <p:cNvPr id="64" name="TextBox 63">
-            <a:extLst>
-              <a:ext uri="{FF2B5EF4-FFF2-40B4-BE49-F238E27FC236}">
-                <a16:creationId xmlns:a16="http://schemas.microsoft.com/office/drawing/2014/main" id="{8B7E925B-0817-46BF-BD41-DE311C05365C}"/>
-              </a:ext>
-            </a:extLst>
-          </p:cNvPr>
-          <p:cNvSpPr txBox="1"/>
-          <p:nvPr/>
-        </p:nvSpPr>
-        <p:spPr>
-          <a:xfrm>
-            <a:off x="3316542" y="4457362"/>
-            <a:ext cx="1142044" cy="303481"/>
-          </a:xfrm>
-          <a:prstGeom prst="rect">
-            <a:avLst/>
-          </a:prstGeom>
-          <a:noFill/>
-        </p:spPr>
-        <p:txBody>
-          <a:bodyPr wrap="none" rtlCol="0">
-            <a:spAutoFit/>
-          </a:bodyPr>
-          <a:lstStyle/>
-          <a:p>
-            <a:r>
-              <a:rPr lang="en-US" sz="1372" b="1" i="1" dirty="0">
-                <a:solidFill>
-                  <a:srgbClr val="FF0000"/>
-                </a:solidFill>
-              </a:rPr>
-              <a:t>&lt;event-card&gt;</a:t>
-            </a:r>
-          </a:p>
-        </p:txBody>
-      </p:sp>
-      <p:sp>
-        <p:nvSpPr>
-          <p:cNvPr id="65" name="TextBox 64">
-            <a:extLst>
-              <a:ext uri="{FF2B5EF4-FFF2-40B4-BE49-F238E27FC236}">
-                <a16:creationId xmlns:a16="http://schemas.microsoft.com/office/drawing/2014/main" id="{000D0BD1-520C-4A6D-B250-8391266EDC71}"/>
-              </a:ext>
-            </a:extLst>
-          </p:cNvPr>
-          <p:cNvSpPr txBox="1"/>
-          <p:nvPr/>
-        </p:nvSpPr>
-        <p:spPr>
-          <a:xfrm>
-            <a:off x="877724" y="4310677"/>
-            <a:ext cx="639919" cy="303481"/>
-          </a:xfrm>
-          <a:prstGeom prst="rect">
-            <a:avLst/>
-          </a:prstGeom>
-          <a:noFill/>
-        </p:spPr>
-        <p:txBody>
-          <a:bodyPr wrap="none" rtlCol="0">
-            <a:spAutoFit/>
-          </a:bodyPr>
-          <a:lstStyle/>
-          <a:p>
-            <a:r>
-              <a:rPr lang="en-US" sz="1372" b="1" i="1" dirty="0">
-                <a:solidFill>
-                  <a:srgbClr val="FF0000"/>
-                </a:solidFill>
-              </a:rPr>
-              <a:t>&lt;app&gt;</a:t>
-            </a:r>
-          </a:p>
-        </p:txBody>
-      </p:sp>
-      <p:sp>
-        <p:nvSpPr>
-          <p:cNvPr id="66" name="Rounded Rectangle 4">
-            <a:extLst>
-              <a:ext uri="{FF2B5EF4-FFF2-40B4-BE49-F238E27FC236}">
-                <a16:creationId xmlns:a16="http://schemas.microsoft.com/office/drawing/2014/main" id="{699EFFE4-7B17-42F6-BA75-97C594A34669}"/>
-              </a:ext>
-            </a:extLst>
-          </p:cNvPr>
-          <p:cNvSpPr/>
-          <p:nvPr/>
-        </p:nvSpPr>
-        <p:spPr>
-          <a:xfrm>
-            <a:off x="391667" y="4140096"/>
-            <a:ext cx="1650319" cy="1318222"/>
-          </a:xfrm>
-          <a:prstGeom prst="roundRect">
-            <a:avLst/>
-          </a:prstGeom>
-          <a:noFill/>
-          <a:ln>
-            <a:solidFill>
-              <a:srgbClr val="FF0000"/>
-            </a:solidFill>
-            <a:prstDash val="lgDash"/>
-          </a:ln>
-        </p:spPr>
-        <p:style>
-          <a:lnRef idx="2">
-            <a:schemeClr val="accent1">
-              <a:shade val="50000"/>
-            </a:schemeClr>
-          </a:lnRef>
-          <a:fillRef idx="1">
-            <a:schemeClr val="accent1"/>
-          </a:fillRef>
-          <a:effectRef idx="0">
-            <a:schemeClr val="accent1"/>
-          </a:effectRef>
-          <a:fontRef idx="minor">
-            <a:schemeClr val="lt1"/>
-          </a:fontRef>
-        </p:style>
-        <p:txBody>
-          <a:bodyPr rtlCol="0" anchor="ctr"/>
-          <a:lstStyle/>
-          <a:p>
-            <a:pPr algn="ctr"/>
-            <a:endParaRPr lang="en-US" sz="1372"/>
-          </a:p>
-        </p:txBody>
-      </p:sp>
-      <p:sp>
-        <p:nvSpPr>
-          <p:cNvPr id="67" name="TextBox 66">
-            <a:extLst>
-              <a:ext uri="{FF2B5EF4-FFF2-40B4-BE49-F238E27FC236}">
-                <a16:creationId xmlns:a16="http://schemas.microsoft.com/office/drawing/2014/main" id="{F9794AC7-2B76-4ACF-9A23-9D86AF3D59D9}"/>
-              </a:ext>
-            </a:extLst>
-          </p:cNvPr>
-          <p:cNvSpPr txBox="1"/>
-          <p:nvPr/>
-        </p:nvSpPr>
-        <p:spPr>
-          <a:xfrm>
-            <a:off x="866649" y="4586565"/>
-            <a:ext cx="623889" cy="303481"/>
-          </a:xfrm>
-          <a:prstGeom prst="rect">
-            <a:avLst/>
-          </a:prstGeom>
-          <a:noFill/>
-        </p:spPr>
-        <p:txBody>
-          <a:bodyPr wrap="none" rtlCol="0">
-            <a:spAutoFit/>
-          </a:bodyPr>
-          <a:lstStyle/>
-          <a:p>
-            <a:r>
-              <a:rPr lang="en-US" sz="1372" dirty="0"/>
-              <a:t>User[]</a:t>
-            </a:r>
-          </a:p>
-        </p:txBody>
-      </p:sp>
-      <p:sp>
-        <p:nvSpPr>
-          <p:cNvPr id="68" name="TextBox 67">
-            <a:extLst>
-              <a:ext uri="{FF2B5EF4-FFF2-40B4-BE49-F238E27FC236}">
-                <a16:creationId xmlns:a16="http://schemas.microsoft.com/office/drawing/2014/main" id="{CF70E6DC-9345-4DAA-BD80-A6369660A1E7}"/>
-              </a:ext>
-            </a:extLst>
-          </p:cNvPr>
-          <p:cNvSpPr txBox="1"/>
-          <p:nvPr/>
-        </p:nvSpPr>
-        <p:spPr>
-          <a:xfrm>
-            <a:off x="831895" y="4779223"/>
-            <a:ext cx="693395" cy="303481"/>
-          </a:xfrm>
-          <a:prstGeom prst="rect">
-            <a:avLst/>
-          </a:prstGeom>
-          <a:noFill/>
-        </p:spPr>
-        <p:txBody>
-          <a:bodyPr wrap="none" rtlCol="0">
-            <a:spAutoFit/>
-          </a:bodyPr>
-          <a:lstStyle/>
-          <a:p>
-            <a:r>
-              <a:rPr lang="en-US" sz="1372" dirty="0"/>
-              <a:t>Event[]</a:t>
-            </a:r>
-          </a:p>
-        </p:txBody>
-      </p:sp>
-      <p:sp>
-        <p:nvSpPr>
-          <p:cNvPr id="69" name="TextBox 68">
-            <a:extLst>
-              <a:ext uri="{FF2B5EF4-FFF2-40B4-BE49-F238E27FC236}">
-                <a16:creationId xmlns:a16="http://schemas.microsoft.com/office/drawing/2014/main" id="{741216D8-776A-46E6-9502-D89901C88DEE}"/>
-              </a:ext>
-            </a:extLst>
-          </p:cNvPr>
-          <p:cNvSpPr txBox="1"/>
-          <p:nvPr/>
-        </p:nvSpPr>
-        <p:spPr>
-          <a:xfrm>
-            <a:off x="746023" y="4946659"/>
-            <a:ext cx="934230" cy="303481"/>
-          </a:xfrm>
-          <a:prstGeom prst="rect">
-            <a:avLst/>
-          </a:prstGeom>
-          <a:noFill/>
-        </p:spPr>
-        <p:txBody>
-          <a:bodyPr wrap="none" rtlCol="0">
-            <a:spAutoFit/>
-          </a:bodyPr>
-          <a:lstStyle/>
-          <a:p>
-            <a:r>
-              <a:rPr lang="en-US" sz="1372" dirty="0"/>
-              <a:t>Category[]</a:t>
-            </a:r>
-          </a:p>
-        </p:txBody>
-      </p:sp>
-      <p:sp>
-        <p:nvSpPr>
-          <p:cNvPr id="70" name="TextBox 69">
-            <a:extLst>
-              <a:ext uri="{FF2B5EF4-FFF2-40B4-BE49-F238E27FC236}">
-                <a16:creationId xmlns:a16="http://schemas.microsoft.com/office/drawing/2014/main" id="{5F2D3498-5DF4-45AB-91D4-2879F2AAD7BA}"/>
-              </a:ext>
-            </a:extLst>
-          </p:cNvPr>
-          <p:cNvSpPr txBox="1"/>
-          <p:nvPr/>
-        </p:nvSpPr>
-        <p:spPr>
-          <a:xfrm>
-            <a:off x="2198911" y="3090190"/>
-            <a:ext cx="623889" cy="303481"/>
-          </a:xfrm>
-          <a:prstGeom prst="rect">
-            <a:avLst/>
-          </a:prstGeom>
-          <a:noFill/>
-        </p:spPr>
-        <p:txBody>
-          <a:bodyPr wrap="none" rtlCol="0">
-            <a:spAutoFit/>
-          </a:bodyPr>
-          <a:lstStyle/>
-          <a:p>
-            <a:r>
-              <a:rPr lang="en-US" sz="1372" dirty="0"/>
-              <a:t>User[]</a:t>
-            </a:r>
-          </a:p>
-        </p:txBody>
-      </p:sp>
-      <p:sp>
-        <p:nvSpPr>
-          <p:cNvPr id="71" name="TextBox 70">
-            <a:extLst>
-              <a:ext uri="{FF2B5EF4-FFF2-40B4-BE49-F238E27FC236}">
-                <a16:creationId xmlns:a16="http://schemas.microsoft.com/office/drawing/2014/main" id="{BBC26A2C-D82C-4A7F-A54F-E59C7EA7CAE1}"/>
-              </a:ext>
-            </a:extLst>
-          </p:cNvPr>
-          <p:cNvSpPr txBox="1"/>
-          <p:nvPr/>
-        </p:nvSpPr>
-        <p:spPr>
-          <a:xfrm>
-            <a:off x="464251" y="5570090"/>
-            <a:ext cx="2658548" cy="303481"/>
-          </a:xfrm>
-          <a:prstGeom prst="rect">
-            <a:avLst/>
-          </a:prstGeom>
-          <a:noFill/>
-        </p:spPr>
-        <p:txBody>
-          <a:bodyPr wrap="none" rtlCol="0">
-            <a:spAutoFit/>
-          </a:bodyPr>
-          <a:lstStyle/>
-          <a:p>
-            <a:r>
-              <a:rPr lang="en-US" sz="1372" dirty="0"/>
-              <a:t>// </a:t>
-            </a:r>
-            <a:r>
-              <a:rPr lang="en-US" sz="1372" dirty="0">
-                <a:solidFill>
-                  <a:srgbClr val="FF0000"/>
-                </a:solidFill>
-              </a:rPr>
-              <a:t>app</a:t>
-            </a:r>
-            <a:r>
-              <a:rPr lang="en-US" sz="1372" dirty="0"/>
-              <a:t> send events to </a:t>
-            </a:r>
-            <a:r>
-              <a:rPr lang="en-US" sz="1372" dirty="0">
-                <a:solidFill>
-                  <a:srgbClr val="FF0000"/>
-                </a:solidFill>
-              </a:rPr>
-              <a:t>event-card </a:t>
-            </a:r>
-          </a:p>
-        </p:txBody>
-      </p:sp>
-      <p:sp>
-        <p:nvSpPr>
-          <p:cNvPr id="72" name="TextBox 71">
-            <a:extLst>
-              <a:ext uri="{FF2B5EF4-FFF2-40B4-BE49-F238E27FC236}">
-                <a16:creationId xmlns:a16="http://schemas.microsoft.com/office/drawing/2014/main" id="{FAD5F31B-19BB-48E4-B5BF-0B260CC2B098}"/>
-              </a:ext>
-            </a:extLst>
-          </p:cNvPr>
-          <p:cNvSpPr txBox="1"/>
-          <p:nvPr/>
-        </p:nvSpPr>
-        <p:spPr>
-          <a:xfrm>
-            <a:off x="2193579" y="4940855"/>
-            <a:ext cx="693395" cy="303481"/>
-          </a:xfrm>
-          <a:prstGeom prst="rect">
-            <a:avLst/>
-          </a:prstGeom>
-          <a:noFill/>
-        </p:spPr>
-        <p:txBody>
-          <a:bodyPr wrap="none" rtlCol="0">
-            <a:spAutoFit/>
-          </a:bodyPr>
-          <a:lstStyle/>
-          <a:p>
-            <a:r>
-              <a:rPr lang="en-US" sz="1372" dirty="0"/>
-              <a:t>Event[]</a:t>
-            </a:r>
-          </a:p>
-        </p:txBody>
-      </p:sp>
-      <p:sp>
-        <p:nvSpPr>
-          <p:cNvPr id="73" name="Rounded Rectangle 16">
-            <a:extLst>
-              <a:ext uri="{FF2B5EF4-FFF2-40B4-BE49-F238E27FC236}">
-                <a16:creationId xmlns:a16="http://schemas.microsoft.com/office/drawing/2014/main" id="{6A58527D-1AD1-4ACB-9BDE-3BCD052C7917}"/>
-              </a:ext>
-            </a:extLst>
-          </p:cNvPr>
-          <p:cNvSpPr/>
-          <p:nvPr/>
-        </p:nvSpPr>
-        <p:spPr>
-          <a:xfrm>
-            <a:off x="9180655" y="583513"/>
-            <a:ext cx="1650319" cy="1166483"/>
-          </a:xfrm>
-          <a:prstGeom prst="roundRect">
-            <a:avLst/>
-          </a:prstGeom>
-          <a:noFill/>
-          <a:ln>
-            <a:solidFill>
-              <a:srgbClr val="FF0000"/>
-            </a:solidFill>
-            <a:prstDash val="lgDash"/>
-          </a:ln>
-        </p:spPr>
-        <p:style>
-          <a:lnRef idx="2">
-            <a:schemeClr val="accent1">
-              <a:shade val="50000"/>
-            </a:schemeClr>
-          </a:lnRef>
-          <a:fillRef idx="1">
-            <a:schemeClr val="accent1"/>
-          </a:fillRef>
-          <a:effectRef idx="0">
-            <a:schemeClr val="accent1"/>
-          </a:effectRef>
-          <a:fontRef idx="minor">
-            <a:schemeClr val="lt1"/>
-          </a:fontRef>
-        </p:style>
-        <p:txBody>
-          <a:bodyPr rtlCol="0" anchor="ctr"/>
-          <a:lstStyle/>
-          <a:p>
-            <a:pPr algn="ctr"/>
-            <a:endParaRPr lang="en-US" sz="1372"/>
-          </a:p>
-        </p:txBody>
-      </p:sp>
-      <p:sp>
-        <p:nvSpPr>
-          <p:cNvPr id="74" name="TextBox 73">
-            <a:extLst>
-              <a:ext uri="{FF2B5EF4-FFF2-40B4-BE49-F238E27FC236}">
-                <a16:creationId xmlns:a16="http://schemas.microsoft.com/office/drawing/2014/main" id="{BECDF5FD-2E9B-4C2E-A482-473D53195E16}"/>
-              </a:ext>
-            </a:extLst>
-          </p:cNvPr>
-          <p:cNvSpPr txBox="1"/>
-          <p:nvPr/>
-        </p:nvSpPr>
-        <p:spPr>
-          <a:xfrm>
-            <a:off x="9491762" y="1109935"/>
-            <a:ext cx="1028102" cy="303481"/>
-          </a:xfrm>
-          <a:prstGeom prst="rect">
-            <a:avLst/>
-          </a:prstGeom>
-          <a:noFill/>
-        </p:spPr>
-        <p:txBody>
-          <a:bodyPr wrap="none" rtlCol="0">
-            <a:spAutoFit/>
-          </a:bodyPr>
-          <a:lstStyle/>
-          <a:p>
-            <a:r>
-              <a:rPr lang="en-US" sz="1372" dirty="0"/>
-              <a:t>categories[]</a:t>
-            </a:r>
-          </a:p>
-        </p:txBody>
-      </p:sp>
-      <p:sp>
-        <p:nvSpPr>
-          <p:cNvPr id="75" name="Right Arrow 21">
-            <a:extLst>
-              <a:ext uri="{FF2B5EF4-FFF2-40B4-BE49-F238E27FC236}">
-                <a16:creationId xmlns:a16="http://schemas.microsoft.com/office/drawing/2014/main" id="{794AA94B-CA82-45CB-AF21-E5BEA10E805B}"/>
-              </a:ext>
-            </a:extLst>
-          </p:cNvPr>
-          <p:cNvSpPr/>
-          <p:nvPr/>
-        </p:nvSpPr>
-        <p:spPr>
-          <a:xfrm>
-            <a:off x="8321233" y="943094"/>
-            <a:ext cx="696809" cy="333683"/>
-          </a:xfrm>
-          <a:prstGeom prst="rightArrow">
-            <a:avLst/>
-          </a:prstGeom>
-          <a:solidFill>
-            <a:schemeClr val="accent6"/>
-          </a:solidFill>
-        </p:spPr>
-        <p:style>
-          <a:lnRef idx="2">
-            <a:schemeClr val="accent1">
-              <a:shade val="50000"/>
-            </a:schemeClr>
-          </a:lnRef>
-          <a:fillRef idx="1">
-            <a:schemeClr val="accent1"/>
-          </a:fillRef>
-          <a:effectRef idx="0">
-            <a:schemeClr val="accent1"/>
-          </a:effectRef>
-          <a:fontRef idx="minor">
-            <a:schemeClr val="lt1"/>
-          </a:fontRef>
-        </p:style>
-        <p:txBody>
-          <a:bodyPr rot="0" spcFirstLastPara="0" vertOverflow="overflow" horzOverflow="overflow" vert="horz" wrap="square" lIns="69681" tIns="34840" rIns="69681" bIns="34840" numCol="1" spcCol="0" rtlCol="0" fromWordArt="0" anchor="ctr" anchorCtr="0" forceAA="0" compatLnSpc="1">
-            <a:prstTxWarp prst="textNoShape">
-              <a:avLst/>
-            </a:prstTxWarp>
-            <a:noAutofit/>
-          </a:bodyPr>
-          <a:lstStyle/>
-          <a:p>
-            <a:pPr algn="ctr"/>
-            <a:endParaRPr lang="en-US" sz="1372"/>
-          </a:p>
-        </p:txBody>
-      </p:sp>
-      <p:sp>
-        <p:nvSpPr>
-          <p:cNvPr id="76" name="TextBox 75">
-            <a:extLst>
-              <a:ext uri="{FF2B5EF4-FFF2-40B4-BE49-F238E27FC236}">
-                <a16:creationId xmlns:a16="http://schemas.microsoft.com/office/drawing/2014/main" id="{4AD924D0-94A4-4538-90DC-C7887482A905}"/>
-              </a:ext>
-            </a:extLst>
-          </p:cNvPr>
-          <p:cNvSpPr txBox="1"/>
-          <p:nvPr/>
-        </p:nvSpPr>
-        <p:spPr>
-          <a:xfrm>
-            <a:off x="8312174" y="724995"/>
-            <a:ext cx="670248" cy="303481"/>
-          </a:xfrm>
-          <a:prstGeom prst="rect">
-            <a:avLst/>
-          </a:prstGeom>
-          <a:noFill/>
-        </p:spPr>
-        <p:txBody>
-          <a:bodyPr wrap="none" rtlCol="0">
-            <a:spAutoFit/>
-          </a:bodyPr>
-          <a:lstStyle/>
-          <a:p>
-            <a:r>
-              <a:rPr lang="en-US" sz="1372" b="1" dirty="0">
-                <a:solidFill>
-                  <a:schemeClr val="accent6"/>
-                </a:solidFill>
-              </a:rPr>
-              <a:t>PROPS</a:t>
-            </a:r>
-          </a:p>
-        </p:txBody>
-      </p:sp>
-      <p:sp>
-        <p:nvSpPr>
-          <p:cNvPr id="77" name="TextBox 76">
-            <a:extLst>
-              <a:ext uri="{FF2B5EF4-FFF2-40B4-BE49-F238E27FC236}">
-                <a16:creationId xmlns:a16="http://schemas.microsoft.com/office/drawing/2014/main" id="{12D4B328-4B3A-4443-9ECC-1A93A6EBD293}"/>
-              </a:ext>
-            </a:extLst>
-          </p:cNvPr>
-          <p:cNvSpPr txBox="1"/>
-          <p:nvPr/>
-        </p:nvSpPr>
-        <p:spPr>
-          <a:xfrm>
-            <a:off x="9317131" y="722048"/>
-            <a:ext cx="1377365" cy="303481"/>
-          </a:xfrm>
-          <a:prstGeom prst="rect">
-            <a:avLst/>
-          </a:prstGeom>
-          <a:noFill/>
-        </p:spPr>
-        <p:txBody>
-          <a:bodyPr wrap="none" rtlCol="0">
-            <a:spAutoFit/>
-          </a:bodyPr>
-          <a:lstStyle/>
-          <a:p>
-            <a:r>
-              <a:rPr lang="en-US" sz="1372" b="1" i="1" dirty="0">
-                <a:solidFill>
-                  <a:srgbClr val="FF0000"/>
-                </a:solidFill>
-              </a:rPr>
-              <a:t>&lt;category-card&gt;</a:t>
-            </a:r>
-          </a:p>
-        </p:txBody>
-      </p:sp>
-      <p:sp>
-        <p:nvSpPr>
-          <p:cNvPr id="78" name="TextBox 77">
-            <a:extLst>
-              <a:ext uri="{FF2B5EF4-FFF2-40B4-BE49-F238E27FC236}">
-                <a16:creationId xmlns:a16="http://schemas.microsoft.com/office/drawing/2014/main" id="{EBD8A6D8-8AB4-4DA3-B51D-EEEEEFA5779E}"/>
-              </a:ext>
-            </a:extLst>
-          </p:cNvPr>
-          <p:cNvSpPr txBox="1"/>
-          <p:nvPr/>
-        </p:nvSpPr>
-        <p:spPr>
-          <a:xfrm>
-            <a:off x="7001406" y="597901"/>
-            <a:ext cx="639919" cy="303481"/>
-          </a:xfrm>
-          <a:prstGeom prst="rect">
-            <a:avLst/>
-          </a:prstGeom>
-          <a:noFill/>
-        </p:spPr>
-        <p:txBody>
-          <a:bodyPr wrap="none" rtlCol="0">
-            <a:spAutoFit/>
-          </a:bodyPr>
-          <a:lstStyle/>
-          <a:p>
-            <a:r>
-              <a:rPr lang="en-US" sz="1372" b="1" i="1" dirty="0">
-                <a:solidFill>
-                  <a:srgbClr val="FF0000"/>
-                </a:solidFill>
-              </a:rPr>
-              <a:t>&lt;app&gt;</a:t>
-            </a:r>
-          </a:p>
-        </p:txBody>
-      </p:sp>
-      <p:sp>
-        <p:nvSpPr>
-          <p:cNvPr id="79" name="Rounded Rectangle 4">
-            <a:extLst>
-              <a:ext uri="{FF2B5EF4-FFF2-40B4-BE49-F238E27FC236}">
-                <a16:creationId xmlns:a16="http://schemas.microsoft.com/office/drawing/2014/main" id="{574BAD8E-A114-4B35-B3CB-3A77064DFE80}"/>
-              </a:ext>
-            </a:extLst>
-          </p:cNvPr>
-          <p:cNvSpPr/>
-          <p:nvPr/>
-        </p:nvSpPr>
-        <p:spPr>
-          <a:xfrm>
-            <a:off x="6515349" y="427320"/>
-            <a:ext cx="1650319" cy="1318222"/>
-          </a:xfrm>
-          <a:prstGeom prst="roundRect">
-            <a:avLst/>
-          </a:prstGeom>
-          <a:noFill/>
-          <a:ln>
-            <a:solidFill>
-              <a:srgbClr val="FF0000"/>
-            </a:solidFill>
-            <a:prstDash val="lgDash"/>
-          </a:ln>
-        </p:spPr>
-        <p:style>
-          <a:lnRef idx="2">
-            <a:schemeClr val="accent1">
-              <a:shade val="50000"/>
-            </a:schemeClr>
-          </a:lnRef>
-          <a:fillRef idx="1">
-            <a:schemeClr val="accent1"/>
-          </a:fillRef>
-          <a:effectRef idx="0">
-            <a:schemeClr val="accent1"/>
-          </a:effectRef>
-          <a:fontRef idx="minor">
-            <a:schemeClr val="lt1"/>
-          </a:fontRef>
-        </p:style>
-        <p:txBody>
-          <a:bodyPr rtlCol="0" anchor="ctr"/>
-          <a:lstStyle/>
-          <a:p>
-            <a:pPr algn="ctr"/>
-            <a:endParaRPr lang="en-US" sz="1372"/>
-          </a:p>
-        </p:txBody>
-      </p:sp>
-      <p:sp>
-        <p:nvSpPr>
-          <p:cNvPr id="80" name="TextBox 79">
-            <a:extLst>
-              <a:ext uri="{FF2B5EF4-FFF2-40B4-BE49-F238E27FC236}">
-                <a16:creationId xmlns:a16="http://schemas.microsoft.com/office/drawing/2014/main" id="{2AD28055-7544-4FAE-88F3-D5C3C2DCEB29}"/>
-              </a:ext>
-            </a:extLst>
-          </p:cNvPr>
-          <p:cNvSpPr txBox="1"/>
-          <p:nvPr/>
-        </p:nvSpPr>
-        <p:spPr>
-          <a:xfrm>
-            <a:off x="6990331" y="873789"/>
-            <a:ext cx="623889" cy="303481"/>
-          </a:xfrm>
-          <a:prstGeom prst="rect">
-            <a:avLst/>
-          </a:prstGeom>
-          <a:noFill/>
-        </p:spPr>
-        <p:txBody>
-          <a:bodyPr wrap="none" rtlCol="0">
-            <a:spAutoFit/>
-          </a:bodyPr>
-          <a:lstStyle/>
-          <a:p>
-            <a:r>
-              <a:rPr lang="en-US" sz="1372" dirty="0"/>
-              <a:t>User[]</a:t>
-            </a:r>
-          </a:p>
-        </p:txBody>
-      </p:sp>
-      <p:sp>
-        <p:nvSpPr>
-          <p:cNvPr id="81" name="TextBox 80">
-            <a:extLst>
-              <a:ext uri="{FF2B5EF4-FFF2-40B4-BE49-F238E27FC236}">
-                <a16:creationId xmlns:a16="http://schemas.microsoft.com/office/drawing/2014/main" id="{4A936106-E69A-4E83-A83D-6B568CCD51CD}"/>
-              </a:ext>
-            </a:extLst>
-          </p:cNvPr>
-          <p:cNvSpPr txBox="1"/>
-          <p:nvPr/>
-        </p:nvSpPr>
-        <p:spPr>
-          <a:xfrm>
-            <a:off x="6955577" y="1066447"/>
-            <a:ext cx="693395" cy="303481"/>
-          </a:xfrm>
-          <a:prstGeom prst="rect">
-            <a:avLst/>
-          </a:prstGeom>
-          <a:noFill/>
-        </p:spPr>
-        <p:txBody>
-          <a:bodyPr wrap="none" rtlCol="0">
-            <a:spAutoFit/>
-          </a:bodyPr>
-          <a:lstStyle/>
-          <a:p>
-            <a:r>
-              <a:rPr lang="en-US" sz="1372" dirty="0"/>
-              <a:t>Event[]</a:t>
-            </a:r>
-          </a:p>
-        </p:txBody>
-      </p:sp>
-      <p:sp>
-        <p:nvSpPr>
-          <p:cNvPr id="82" name="TextBox 81">
-            <a:extLst>
-              <a:ext uri="{FF2B5EF4-FFF2-40B4-BE49-F238E27FC236}">
-                <a16:creationId xmlns:a16="http://schemas.microsoft.com/office/drawing/2014/main" id="{C6019D0A-8279-4928-B87D-5BFFA8E361B8}"/>
-              </a:ext>
-            </a:extLst>
-          </p:cNvPr>
-          <p:cNvSpPr txBox="1"/>
-          <p:nvPr/>
-        </p:nvSpPr>
-        <p:spPr>
-          <a:xfrm>
-            <a:off x="6869705" y="1233883"/>
-            <a:ext cx="934230" cy="303481"/>
-          </a:xfrm>
-          <a:prstGeom prst="rect">
-            <a:avLst/>
-          </a:prstGeom>
-          <a:noFill/>
-        </p:spPr>
-        <p:txBody>
-          <a:bodyPr wrap="none" rtlCol="0">
-            <a:spAutoFit/>
-          </a:bodyPr>
-          <a:lstStyle/>
-          <a:p>
-            <a:r>
-              <a:rPr lang="en-US" sz="1372" dirty="0"/>
-              <a:t>Category[]</a:t>
-            </a:r>
-          </a:p>
-        </p:txBody>
-      </p:sp>
-      <p:sp>
-        <p:nvSpPr>
-          <p:cNvPr id="83" name="TextBox 82">
-            <a:extLst>
-              <a:ext uri="{FF2B5EF4-FFF2-40B4-BE49-F238E27FC236}">
-                <a16:creationId xmlns:a16="http://schemas.microsoft.com/office/drawing/2014/main" id="{8BAE370C-2B37-466C-9A6D-88307434B32E}"/>
-              </a:ext>
-            </a:extLst>
-          </p:cNvPr>
-          <p:cNvSpPr txBox="1"/>
-          <p:nvPr/>
-        </p:nvSpPr>
-        <p:spPr>
-          <a:xfrm>
-            <a:off x="6587933" y="1857314"/>
-            <a:ext cx="3012107" cy="303481"/>
-          </a:xfrm>
-          <a:prstGeom prst="rect">
-            <a:avLst/>
-          </a:prstGeom>
-          <a:noFill/>
-        </p:spPr>
-        <p:txBody>
-          <a:bodyPr wrap="none" rtlCol="0">
-            <a:spAutoFit/>
-          </a:bodyPr>
-          <a:lstStyle/>
-          <a:p>
-            <a:r>
-              <a:rPr lang="en-US" sz="1372" dirty="0"/>
-              <a:t>// </a:t>
-            </a:r>
-            <a:r>
-              <a:rPr lang="en-US" sz="1372" dirty="0">
-                <a:solidFill>
-                  <a:srgbClr val="FF0000"/>
-                </a:solidFill>
-              </a:rPr>
-              <a:t>app</a:t>
-            </a:r>
-            <a:r>
-              <a:rPr lang="en-US" sz="1372" dirty="0"/>
-              <a:t> send category to </a:t>
-            </a:r>
-            <a:r>
-              <a:rPr lang="en-US" sz="1372" dirty="0">
-                <a:solidFill>
-                  <a:srgbClr val="FF0000"/>
-                </a:solidFill>
-              </a:rPr>
-              <a:t>category-card </a:t>
-            </a:r>
-          </a:p>
-        </p:txBody>
-      </p:sp>
-      <p:sp>
-        <p:nvSpPr>
-          <p:cNvPr id="84" name="TextBox 83">
-            <a:extLst>
-              <a:ext uri="{FF2B5EF4-FFF2-40B4-BE49-F238E27FC236}">
-                <a16:creationId xmlns:a16="http://schemas.microsoft.com/office/drawing/2014/main" id="{13C7B99E-FF2D-439A-842F-E3074FFACA30}"/>
-              </a:ext>
-            </a:extLst>
-          </p:cNvPr>
-          <p:cNvSpPr txBox="1"/>
-          <p:nvPr/>
-        </p:nvSpPr>
-        <p:spPr>
-          <a:xfrm>
-            <a:off x="8156490" y="1261675"/>
-            <a:ext cx="934230" cy="303481"/>
-          </a:xfrm>
-          <a:prstGeom prst="rect">
-            <a:avLst/>
-          </a:prstGeom>
-          <a:noFill/>
-        </p:spPr>
-        <p:txBody>
-          <a:bodyPr wrap="none" rtlCol="0">
-            <a:spAutoFit/>
-          </a:bodyPr>
-          <a:lstStyle/>
-          <a:p>
-            <a:r>
-              <a:rPr lang="en-US" sz="1372" dirty="0"/>
-              <a:t>Category[]</a:t>
+              <a:rPr lang="en-US" sz="4000" b="1" dirty="0"/>
+              <a:t>Sign in component</a:t>
             </a:r>
           </a:p>
         </p:txBody>
       </p:sp>
     </p:spTree>
-    <p:extLst>
-      <p:ext uri="{BB962C8B-B14F-4D97-AF65-F5344CB8AC3E}">
-        <p14:creationId xmlns:p14="http://schemas.microsoft.com/office/powerpoint/2010/main" val="2189550760"/>
-      </p:ext>
-    </p:extLst>
-  </p:cSld>
-  <p:clrMapOvr>
-    <a:masterClrMapping/>
-  </p:clrMapOvr>
-</p:sld>
-</file>
-
-<file path=ppt/slides/slide3.xml><?xml version="1.0" encoding="utf-8"?>
-<p:sld xmlns:a="http://schemas.openxmlformats.org/drawingml/2006/main" xmlns:r="http://schemas.openxmlformats.org/officeDocument/2006/relationships" xmlns:p="http://schemas.openxmlformats.org/presentationml/2006/main">
-  <p:cSld>
-    <p:spTree>
-      <p:nvGrpSpPr>
-        <p:cNvPr id="1" name=""/>
-        <p:cNvGrpSpPr/>
-        <p:nvPr/>
-      </p:nvGrpSpPr>
-      <p:grpSpPr>
-        <a:xfrm>
-          <a:off x="0" y="0"/>
-          <a:ext cx="0" cy="0"/>
-          <a:chOff x="0" y="0"/>
-          <a:chExt cx="0" cy="0"/>
-        </a:xfrm>
-      </p:grpSpPr>
-      <p:sp>
-        <p:nvSpPr>
-          <p:cNvPr id="58" name="TextBox 57">
-            <a:extLst>
-              <a:ext uri="{FF2B5EF4-FFF2-40B4-BE49-F238E27FC236}">
-                <a16:creationId xmlns:a16="http://schemas.microsoft.com/office/drawing/2014/main" id="{F14ED354-18E4-453A-A78C-2E11F30487EF}"/>
-              </a:ext>
-            </a:extLst>
-          </p:cNvPr>
-          <p:cNvSpPr txBox="1"/>
-          <p:nvPr/>
-        </p:nvSpPr>
-        <p:spPr>
-          <a:xfrm>
-            <a:off x="2875865" y="557616"/>
-            <a:ext cx="639919" cy="303481"/>
-          </a:xfrm>
-          <a:prstGeom prst="rect">
-            <a:avLst/>
-          </a:prstGeom>
-          <a:noFill/>
-        </p:spPr>
-        <p:txBody>
-          <a:bodyPr wrap="none" rtlCol="0">
-            <a:spAutoFit/>
-          </a:bodyPr>
-          <a:lstStyle/>
-          <a:p>
-            <a:r>
-              <a:rPr lang="en-US" sz="1372" b="1" i="1" dirty="0">
-                <a:solidFill>
-                  <a:srgbClr val="FF0000"/>
-                </a:solidFill>
-              </a:rPr>
-              <a:t>&lt;app&gt;</a:t>
-            </a:r>
-          </a:p>
-        </p:txBody>
-      </p:sp>
-      <p:sp>
-        <p:nvSpPr>
-          <p:cNvPr id="59" name="Rounded Rectangle 31">
-            <a:extLst>
-              <a:ext uri="{FF2B5EF4-FFF2-40B4-BE49-F238E27FC236}">
-                <a16:creationId xmlns:a16="http://schemas.microsoft.com/office/drawing/2014/main" id="{267B1346-1FB9-4882-B18F-AEDE5657AA96}"/>
-              </a:ext>
-            </a:extLst>
-          </p:cNvPr>
-          <p:cNvSpPr/>
-          <p:nvPr/>
-        </p:nvSpPr>
-        <p:spPr>
-          <a:xfrm>
-            <a:off x="2389808" y="387035"/>
-            <a:ext cx="1650319" cy="1166483"/>
-          </a:xfrm>
-          <a:prstGeom prst="roundRect">
-            <a:avLst/>
-          </a:prstGeom>
-          <a:noFill/>
-          <a:ln>
-            <a:solidFill>
-              <a:srgbClr val="FF0000"/>
-            </a:solidFill>
-            <a:prstDash val="lgDash"/>
-          </a:ln>
-        </p:spPr>
-        <p:style>
-          <a:lnRef idx="2">
-            <a:schemeClr val="accent1">
-              <a:shade val="50000"/>
-            </a:schemeClr>
-          </a:lnRef>
-          <a:fillRef idx="1">
-            <a:schemeClr val="accent1"/>
-          </a:fillRef>
-          <a:effectRef idx="0">
-            <a:schemeClr val="accent1"/>
-          </a:effectRef>
-          <a:fontRef idx="minor">
-            <a:schemeClr val="lt1"/>
-          </a:fontRef>
-        </p:style>
-        <p:txBody>
-          <a:bodyPr rtlCol="0" anchor="ctr"/>
-          <a:lstStyle/>
-          <a:p>
-            <a:pPr algn="ctr"/>
-            <a:endParaRPr lang="en-US" sz="1372"/>
-          </a:p>
-        </p:txBody>
-      </p:sp>
-      <p:sp>
-        <p:nvSpPr>
-          <p:cNvPr id="61" name="TextBox 60">
-            <a:extLst>
-              <a:ext uri="{FF2B5EF4-FFF2-40B4-BE49-F238E27FC236}">
-                <a16:creationId xmlns:a16="http://schemas.microsoft.com/office/drawing/2014/main" id="{27C5E57E-B22F-4CF1-A055-131A3C3E838B}"/>
-              </a:ext>
-            </a:extLst>
-          </p:cNvPr>
-          <p:cNvSpPr txBox="1"/>
-          <p:nvPr/>
-        </p:nvSpPr>
-        <p:spPr>
-          <a:xfrm>
-            <a:off x="2389808" y="1755258"/>
-            <a:ext cx="2754087" cy="303481"/>
-          </a:xfrm>
-          <a:prstGeom prst="rect">
-            <a:avLst/>
-          </a:prstGeom>
-          <a:noFill/>
-        </p:spPr>
-        <p:txBody>
-          <a:bodyPr wrap="none" rtlCol="0">
-            <a:spAutoFit/>
-          </a:bodyPr>
-          <a:lstStyle/>
-          <a:p>
-            <a:r>
-              <a:rPr lang="en-US" sz="1372" dirty="0"/>
-              <a:t>// </a:t>
-            </a:r>
-            <a:r>
-              <a:rPr lang="en-US" sz="1372" dirty="0">
-                <a:solidFill>
-                  <a:srgbClr val="FF0000"/>
-                </a:solidFill>
-              </a:rPr>
-              <a:t>app</a:t>
-            </a:r>
-            <a:r>
-              <a:rPr lang="en-US" sz="1372" dirty="0"/>
-              <a:t>  provides all data to anymore</a:t>
-            </a:r>
-            <a:endParaRPr lang="en-US" sz="1372" dirty="0">
-              <a:solidFill>
-                <a:srgbClr val="FF0000"/>
-              </a:solidFill>
-            </a:endParaRPr>
-          </a:p>
-        </p:txBody>
-      </p:sp>
-      <p:sp>
-        <p:nvSpPr>
-          <p:cNvPr id="62" name="Rounded Rectangle 34">
-            <a:extLst>
-              <a:ext uri="{FF2B5EF4-FFF2-40B4-BE49-F238E27FC236}">
-                <a16:creationId xmlns:a16="http://schemas.microsoft.com/office/drawing/2014/main" id="{5CF4DAF4-61A8-4A13-8830-AEC59FFF15BB}"/>
-              </a:ext>
-            </a:extLst>
-          </p:cNvPr>
-          <p:cNvSpPr/>
-          <p:nvPr/>
-        </p:nvSpPr>
-        <p:spPr>
-          <a:xfrm>
-            <a:off x="7215988" y="434660"/>
-            <a:ext cx="1650319" cy="1166483"/>
-          </a:xfrm>
-          <a:prstGeom prst="roundRect">
-            <a:avLst/>
-          </a:prstGeom>
-          <a:noFill/>
-          <a:ln>
-            <a:solidFill>
-              <a:srgbClr val="FF0000"/>
-            </a:solidFill>
-            <a:prstDash val="lgDash"/>
-          </a:ln>
-        </p:spPr>
-        <p:style>
-          <a:lnRef idx="2">
-            <a:schemeClr val="accent1">
-              <a:shade val="50000"/>
-            </a:schemeClr>
-          </a:lnRef>
-          <a:fillRef idx="1">
-            <a:schemeClr val="accent1"/>
-          </a:fillRef>
-          <a:effectRef idx="0">
-            <a:schemeClr val="accent1"/>
-          </a:effectRef>
-          <a:fontRef idx="minor">
-            <a:schemeClr val="lt1"/>
-          </a:fontRef>
-        </p:style>
-        <p:txBody>
-          <a:bodyPr rtlCol="0" anchor="ctr"/>
-          <a:lstStyle/>
-          <a:p>
-            <a:pPr algn="ctr"/>
-            <a:endParaRPr lang="en-US" sz="1372"/>
-          </a:p>
-        </p:txBody>
-      </p:sp>
-      <p:sp>
-        <p:nvSpPr>
-          <p:cNvPr id="63" name="TextBox 62">
-            <a:extLst>
-              <a:ext uri="{FF2B5EF4-FFF2-40B4-BE49-F238E27FC236}">
-                <a16:creationId xmlns:a16="http://schemas.microsoft.com/office/drawing/2014/main" id="{E8C44226-130E-4B09-998C-38D02BC26C20}"/>
-              </a:ext>
-            </a:extLst>
-          </p:cNvPr>
-          <p:cNvSpPr txBox="1"/>
-          <p:nvPr/>
-        </p:nvSpPr>
-        <p:spPr>
-          <a:xfrm>
-            <a:off x="7577718" y="1017901"/>
-            <a:ext cx="670568" cy="303481"/>
-          </a:xfrm>
-          <a:prstGeom prst="rect">
-            <a:avLst/>
-          </a:prstGeom>
-          <a:noFill/>
-        </p:spPr>
-        <p:txBody>
-          <a:bodyPr wrap="none" rtlCol="0">
-            <a:spAutoFit/>
-          </a:bodyPr>
-          <a:lstStyle/>
-          <a:p>
-            <a:r>
-              <a:rPr lang="en-US" sz="1372" dirty="0"/>
-              <a:t>users[]</a:t>
-            </a:r>
-          </a:p>
-        </p:txBody>
-      </p:sp>
-      <p:sp>
-        <p:nvSpPr>
-          <p:cNvPr id="64" name="TextBox 63">
-            <a:extLst>
-              <a:ext uri="{FF2B5EF4-FFF2-40B4-BE49-F238E27FC236}">
-                <a16:creationId xmlns:a16="http://schemas.microsoft.com/office/drawing/2014/main" id="{35C2F441-6C02-4C79-82A6-29F1BF811015}"/>
-              </a:ext>
-            </a:extLst>
-          </p:cNvPr>
-          <p:cNvSpPr txBox="1"/>
-          <p:nvPr/>
-        </p:nvSpPr>
-        <p:spPr>
-          <a:xfrm>
-            <a:off x="7597671" y="611911"/>
-            <a:ext cx="819455" cy="303481"/>
-          </a:xfrm>
-          <a:prstGeom prst="rect">
-            <a:avLst/>
-          </a:prstGeom>
-          <a:noFill/>
-        </p:spPr>
-        <p:txBody>
-          <a:bodyPr wrap="none" rtlCol="0">
-            <a:spAutoFit/>
-          </a:bodyPr>
-          <a:lstStyle/>
-          <a:p>
-            <a:r>
-              <a:rPr lang="en-US" sz="1372" b="1" i="1" dirty="0">
-                <a:solidFill>
-                  <a:srgbClr val="FF0000"/>
-                </a:solidFill>
-              </a:rPr>
-              <a:t>&lt;dialog&gt;</a:t>
-            </a:r>
-          </a:p>
-        </p:txBody>
-      </p:sp>
-      <p:sp>
-        <p:nvSpPr>
-          <p:cNvPr id="65" name="Right Arrow 40">
-            <a:extLst>
-              <a:ext uri="{FF2B5EF4-FFF2-40B4-BE49-F238E27FC236}">
-                <a16:creationId xmlns:a16="http://schemas.microsoft.com/office/drawing/2014/main" id="{25AF5B81-0BD3-4CC8-A1F1-4DE7334F449A}"/>
-              </a:ext>
-            </a:extLst>
-          </p:cNvPr>
-          <p:cNvSpPr/>
-          <p:nvPr/>
-        </p:nvSpPr>
-        <p:spPr>
-          <a:xfrm>
-            <a:off x="4001841" y="804151"/>
-            <a:ext cx="696809" cy="333683"/>
-          </a:xfrm>
-          <a:prstGeom prst="rightArrow">
-            <a:avLst/>
-          </a:prstGeom>
-          <a:solidFill>
-            <a:srgbClr val="FFFF00"/>
-          </a:solidFill>
-        </p:spPr>
-        <p:style>
-          <a:lnRef idx="2">
-            <a:schemeClr val="accent1">
-              <a:shade val="50000"/>
-            </a:schemeClr>
-          </a:lnRef>
-          <a:fillRef idx="1">
-            <a:schemeClr val="accent1"/>
-          </a:fillRef>
-          <a:effectRef idx="0">
-            <a:schemeClr val="accent1"/>
-          </a:effectRef>
-          <a:fontRef idx="minor">
-            <a:schemeClr val="lt1"/>
-          </a:fontRef>
-        </p:style>
-        <p:txBody>
-          <a:bodyPr rot="0" spcFirstLastPara="0" vertOverflow="overflow" horzOverflow="overflow" vert="horz" wrap="square" lIns="69681" tIns="34840" rIns="69681" bIns="34840" numCol="1" spcCol="0" rtlCol="0" fromWordArt="0" anchor="ctr" anchorCtr="0" forceAA="0" compatLnSpc="1">
-            <a:prstTxWarp prst="textNoShape">
-              <a:avLst/>
-            </a:prstTxWarp>
-            <a:noAutofit/>
-          </a:bodyPr>
-          <a:lstStyle/>
-          <a:p>
-            <a:pPr algn="ctr"/>
-            <a:endParaRPr lang="en-US" sz="1372"/>
-          </a:p>
-        </p:txBody>
-      </p:sp>
-      <p:sp>
-        <p:nvSpPr>
-          <p:cNvPr id="66" name="TextBox 65">
-            <a:extLst>
-              <a:ext uri="{FF2B5EF4-FFF2-40B4-BE49-F238E27FC236}">
-                <a16:creationId xmlns:a16="http://schemas.microsoft.com/office/drawing/2014/main" id="{CC1EDA09-5710-4784-A59A-77262E4C56AD}"/>
-              </a:ext>
-            </a:extLst>
-          </p:cNvPr>
-          <p:cNvSpPr txBox="1"/>
-          <p:nvPr/>
-        </p:nvSpPr>
-        <p:spPr>
-          <a:xfrm>
-            <a:off x="3992782" y="586052"/>
-            <a:ext cx="838756" cy="303481"/>
-          </a:xfrm>
-          <a:prstGeom prst="rect">
-            <a:avLst/>
-          </a:prstGeom>
-          <a:noFill/>
-        </p:spPr>
-        <p:txBody>
-          <a:bodyPr wrap="none" rtlCol="0">
-            <a:spAutoFit/>
-          </a:bodyPr>
-          <a:lstStyle/>
-          <a:p>
-            <a:r>
-              <a:rPr lang="en-US" sz="1372" b="1" dirty="0">
-                <a:solidFill>
-                  <a:schemeClr val="accent4"/>
-                </a:solidFill>
-              </a:rPr>
-              <a:t>PROVIDE</a:t>
-            </a:r>
-          </a:p>
-        </p:txBody>
-      </p:sp>
-      <p:sp>
-        <p:nvSpPr>
-          <p:cNvPr id="68" name="Right Arrow 43">
-            <a:extLst>
-              <a:ext uri="{FF2B5EF4-FFF2-40B4-BE49-F238E27FC236}">
-                <a16:creationId xmlns:a16="http://schemas.microsoft.com/office/drawing/2014/main" id="{436820B9-2C25-4FB7-A3B5-7DD305AC701E}"/>
-              </a:ext>
-            </a:extLst>
-          </p:cNvPr>
-          <p:cNvSpPr/>
-          <p:nvPr/>
-        </p:nvSpPr>
-        <p:spPr>
-          <a:xfrm>
-            <a:off x="6443571" y="876249"/>
-            <a:ext cx="696809" cy="333683"/>
-          </a:xfrm>
-          <a:prstGeom prst="rightArrow">
-            <a:avLst/>
-          </a:prstGeom>
-          <a:solidFill>
-            <a:schemeClr val="accent6"/>
-          </a:solidFill>
-        </p:spPr>
-        <p:style>
-          <a:lnRef idx="2">
-            <a:schemeClr val="accent1">
-              <a:shade val="50000"/>
-            </a:schemeClr>
-          </a:lnRef>
-          <a:fillRef idx="1">
-            <a:schemeClr val="accent1"/>
-          </a:fillRef>
-          <a:effectRef idx="0">
-            <a:schemeClr val="accent1"/>
-          </a:effectRef>
-          <a:fontRef idx="minor">
-            <a:schemeClr val="lt1"/>
-          </a:fontRef>
-        </p:style>
-        <p:txBody>
-          <a:bodyPr rot="0" spcFirstLastPara="0" vertOverflow="overflow" horzOverflow="overflow" vert="horz" wrap="square" lIns="69681" tIns="34840" rIns="69681" bIns="34840" numCol="1" spcCol="0" rtlCol="0" fromWordArt="0" anchor="ctr" anchorCtr="0" forceAA="0" compatLnSpc="1">
-            <a:prstTxWarp prst="textNoShape">
-              <a:avLst/>
-            </a:prstTxWarp>
-            <a:noAutofit/>
-          </a:bodyPr>
-          <a:lstStyle/>
-          <a:p>
-            <a:pPr algn="ctr"/>
-            <a:endParaRPr lang="en-US" sz="1372"/>
-          </a:p>
-        </p:txBody>
-      </p:sp>
-      <p:sp>
-        <p:nvSpPr>
-          <p:cNvPr id="69" name="TextBox 68">
-            <a:extLst>
-              <a:ext uri="{FF2B5EF4-FFF2-40B4-BE49-F238E27FC236}">
-                <a16:creationId xmlns:a16="http://schemas.microsoft.com/office/drawing/2014/main" id="{E076AF72-A902-4726-8A9F-0EB2935181ED}"/>
-              </a:ext>
-            </a:extLst>
-          </p:cNvPr>
-          <p:cNvSpPr txBox="1"/>
-          <p:nvPr/>
-        </p:nvSpPr>
-        <p:spPr>
-          <a:xfrm>
-            <a:off x="6341626" y="636778"/>
-            <a:ext cx="668645" cy="303481"/>
-          </a:xfrm>
-          <a:prstGeom prst="rect">
-            <a:avLst/>
-          </a:prstGeom>
-          <a:noFill/>
-        </p:spPr>
-        <p:txBody>
-          <a:bodyPr wrap="none" rtlCol="0">
-            <a:spAutoFit/>
-          </a:bodyPr>
-          <a:lstStyle/>
-          <a:p>
-            <a:r>
-              <a:rPr lang="en-US" sz="1372" b="1" dirty="0">
-                <a:solidFill>
-                  <a:schemeClr val="accent4"/>
-                </a:solidFill>
-              </a:rPr>
-              <a:t>INJECT</a:t>
-            </a:r>
-          </a:p>
-        </p:txBody>
-      </p:sp>
-      <p:sp>
-        <p:nvSpPr>
-          <p:cNvPr id="70" name="TextBox 69">
-            <a:extLst>
-              <a:ext uri="{FF2B5EF4-FFF2-40B4-BE49-F238E27FC236}">
-                <a16:creationId xmlns:a16="http://schemas.microsoft.com/office/drawing/2014/main" id="{6ED85A69-7037-4F0D-AB03-56BF41FCBF68}"/>
-              </a:ext>
-            </a:extLst>
-          </p:cNvPr>
-          <p:cNvSpPr txBox="1"/>
-          <p:nvPr/>
-        </p:nvSpPr>
-        <p:spPr>
-          <a:xfrm>
-            <a:off x="6348108" y="1209932"/>
-            <a:ext cx="623889" cy="303481"/>
-          </a:xfrm>
-          <a:prstGeom prst="rect">
-            <a:avLst/>
-          </a:prstGeom>
-          <a:noFill/>
-        </p:spPr>
-        <p:txBody>
-          <a:bodyPr wrap="none" rtlCol="0">
-            <a:spAutoFit/>
-          </a:bodyPr>
-          <a:lstStyle/>
-          <a:p>
-            <a:r>
-              <a:rPr lang="en-US" sz="1372" dirty="0"/>
-              <a:t>User[]</a:t>
-            </a:r>
-          </a:p>
-        </p:txBody>
-      </p:sp>
-      <p:sp>
-        <p:nvSpPr>
-          <p:cNvPr id="71" name="TextBox 70">
-            <a:extLst>
-              <a:ext uri="{FF2B5EF4-FFF2-40B4-BE49-F238E27FC236}">
-                <a16:creationId xmlns:a16="http://schemas.microsoft.com/office/drawing/2014/main" id="{57F28D1F-532B-4868-B199-B37B14C0C311}"/>
-              </a:ext>
-            </a:extLst>
-          </p:cNvPr>
-          <p:cNvSpPr txBox="1"/>
-          <p:nvPr/>
-        </p:nvSpPr>
-        <p:spPr>
-          <a:xfrm>
-            <a:off x="6341626" y="1729163"/>
-            <a:ext cx="2987100" cy="303481"/>
-          </a:xfrm>
-          <a:prstGeom prst="rect">
-            <a:avLst/>
-          </a:prstGeom>
-          <a:noFill/>
-        </p:spPr>
-        <p:txBody>
-          <a:bodyPr wrap="none" rtlCol="0">
-            <a:spAutoFit/>
-          </a:bodyPr>
-          <a:lstStyle/>
-          <a:p>
-            <a:r>
-              <a:rPr lang="en-US" sz="1372" dirty="0"/>
-              <a:t>// </a:t>
-            </a:r>
-            <a:r>
-              <a:rPr lang="en-US" sz="1372" dirty="0">
-                <a:solidFill>
-                  <a:srgbClr val="FF0000"/>
-                </a:solidFill>
-              </a:rPr>
-              <a:t>dialog </a:t>
-            </a:r>
-            <a:r>
-              <a:rPr lang="en-US" sz="1372" dirty="0"/>
-              <a:t> gets students from a provider</a:t>
-            </a:r>
-            <a:endParaRPr lang="en-US" sz="1372" dirty="0">
-              <a:solidFill>
-                <a:srgbClr val="FF0000"/>
-              </a:solidFill>
-            </a:endParaRPr>
-          </a:p>
-        </p:txBody>
-      </p:sp>
-      <p:sp>
-        <p:nvSpPr>
-          <p:cNvPr id="72" name="TextBox 71">
-            <a:extLst>
-              <a:ext uri="{FF2B5EF4-FFF2-40B4-BE49-F238E27FC236}">
-                <a16:creationId xmlns:a16="http://schemas.microsoft.com/office/drawing/2014/main" id="{203E9FFA-149A-4A7C-83DD-408DFC10026A}"/>
-              </a:ext>
-            </a:extLst>
-          </p:cNvPr>
-          <p:cNvSpPr txBox="1"/>
-          <p:nvPr/>
-        </p:nvSpPr>
-        <p:spPr>
-          <a:xfrm>
-            <a:off x="2733442" y="5290668"/>
-            <a:ext cx="1215717" cy="303481"/>
-          </a:xfrm>
-          <a:prstGeom prst="rect">
-            <a:avLst/>
-          </a:prstGeom>
-          <a:noFill/>
-        </p:spPr>
-        <p:txBody>
-          <a:bodyPr wrap="none" rtlCol="0">
-            <a:spAutoFit/>
-          </a:bodyPr>
-          <a:lstStyle/>
-          <a:p>
-            <a:r>
-              <a:rPr lang="en-US" sz="1372" b="1" i="1" dirty="0">
-                <a:solidFill>
-                  <a:srgbClr val="7030A0"/>
-                </a:solidFill>
-              </a:rPr>
-              <a:t>&lt;router-view&gt;</a:t>
-            </a:r>
-          </a:p>
-        </p:txBody>
-      </p:sp>
-      <p:sp>
-        <p:nvSpPr>
-          <p:cNvPr id="73" name="Rounded Rectangle 48">
-            <a:extLst>
-              <a:ext uri="{FF2B5EF4-FFF2-40B4-BE49-F238E27FC236}">
-                <a16:creationId xmlns:a16="http://schemas.microsoft.com/office/drawing/2014/main" id="{A2719B1E-26BF-4954-B5B1-9C90A9961038}"/>
-              </a:ext>
-            </a:extLst>
-          </p:cNvPr>
-          <p:cNvSpPr/>
-          <p:nvPr/>
-        </p:nvSpPr>
-        <p:spPr>
-          <a:xfrm>
-            <a:off x="2389808" y="5155445"/>
-            <a:ext cx="1866945" cy="584334"/>
-          </a:xfrm>
-          <a:prstGeom prst="roundRect">
-            <a:avLst/>
-          </a:prstGeom>
-          <a:noFill/>
-          <a:ln>
-            <a:solidFill>
-              <a:srgbClr val="7030A0"/>
-            </a:solidFill>
-            <a:prstDash val="lgDash"/>
-          </a:ln>
-        </p:spPr>
-        <p:style>
-          <a:lnRef idx="2">
-            <a:schemeClr val="accent1">
-              <a:shade val="50000"/>
-            </a:schemeClr>
-          </a:lnRef>
-          <a:fillRef idx="1">
-            <a:schemeClr val="accent1"/>
-          </a:fillRef>
-          <a:effectRef idx="0">
-            <a:schemeClr val="accent1"/>
-          </a:effectRef>
-          <a:fontRef idx="minor">
-            <a:schemeClr val="lt1"/>
-          </a:fontRef>
-        </p:style>
-        <p:txBody>
-          <a:bodyPr rtlCol="0" anchor="ctr"/>
-          <a:lstStyle/>
-          <a:p>
-            <a:pPr algn="ctr"/>
-            <a:endParaRPr lang="en-US" sz="1372"/>
-          </a:p>
-        </p:txBody>
-      </p:sp>
-      <p:sp>
-        <p:nvSpPr>
-          <p:cNvPr id="74" name="TextBox 73">
-            <a:extLst>
-              <a:ext uri="{FF2B5EF4-FFF2-40B4-BE49-F238E27FC236}">
-                <a16:creationId xmlns:a16="http://schemas.microsoft.com/office/drawing/2014/main" id="{CB673038-2E97-46B8-B41C-1C73B1DED99E}"/>
-              </a:ext>
-            </a:extLst>
-          </p:cNvPr>
-          <p:cNvSpPr txBox="1"/>
-          <p:nvPr/>
-        </p:nvSpPr>
-        <p:spPr>
-          <a:xfrm>
-            <a:off x="4428682" y="5303093"/>
-            <a:ext cx="2229136" cy="303481"/>
-          </a:xfrm>
-          <a:prstGeom prst="rect">
-            <a:avLst/>
-          </a:prstGeom>
-          <a:noFill/>
-        </p:spPr>
-        <p:txBody>
-          <a:bodyPr wrap="none" rtlCol="0">
-            <a:spAutoFit/>
-          </a:bodyPr>
-          <a:lstStyle/>
-          <a:p>
-            <a:r>
-              <a:rPr lang="en-US" sz="1372" dirty="0"/>
-              <a:t>// </a:t>
-            </a:r>
-            <a:r>
-              <a:rPr lang="en-US" sz="1372" dirty="0" err="1"/>
-              <a:t>Vue</a:t>
-            </a:r>
-            <a:r>
-              <a:rPr lang="en-US" sz="1372" dirty="0"/>
-              <a:t> JS built-in component</a:t>
-            </a:r>
-            <a:endParaRPr lang="en-US" sz="1372" dirty="0">
-              <a:solidFill>
-                <a:srgbClr val="FF0000"/>
-              </a:solidFill>
-            </a:endParaRPr>
-          </a:p>
-        </p:txBody>
-      </p:sp>
-      <p:sp>
-        <p:nvSpPr>
-          <p:cNvPr id="75" name="TextBox 74">
-            <a:extLst>
-              <a:ext uri="{FF2B5EF4-FFF2-40B4-BE49-F238E27FC236}">
-                <a16:creationId xmlns:a16="http://schemas.microsoft.com/office/drawing/2014/main" id="{2F24872B-9DBE-44C1-9108-9EEB715FE2B3}"/>
-              </a:ext>
-            </a:extLst>
-          </p:cNvPr>
-          <p:cNvSpPr txBox="1"/>
-          <p:nvPr/>
-        </p:nvSpPr>
-        <p:spPr>
-          <a:xfrm>
-            <a:off x="4061077" y="1118221"/>
-            <a:ext cx="623889" cy="303481"/>
-          </a:xfrm>
-          <a:prstGeom prst="rect">
-            <a:avLst/>
-          </a:prstGeom>
-          <a:noFill/>
-        </p:spPr>
-        <p:txBody>
-          <a:bodyPr wrap="none" rtlCol="0">
-            <a:spAutoFit/>
-          </a:bodyPr>
-          <a:lstStyle/>
-          <a:p>
-            <a:r>
-              <a:rPr lang="en-US" sz="1372" dirty="0"/>
-              <a:t>User[]</a:t>
-            </a:r>
-          </a:p>
-        </p:txBody>
-      </p:sp>
-      <p:sp>
-        <p:nvSpPr>
-          <p:cNvPr id="76" name="TextBox 75">
-            <a:extLst>
-              <a:ext uri="{FF2B5EF4-FFF2-40B4-BE49-F238E27FC236}">
-                <a16:creationId xmlns:a16="http://schemas.microsoft.com/office/drawing/2014/main" id="{ED239F71-6B5C-4C2D-878B-E5BE84021DB8}"/>
-              </a:ext>
-            </a:extLst>
-          </p:cNvPr>
-          <p:cNvSpPr txBox="1"/>
-          <p:nvPr/>
-        </p:nvSpPr>
-        <p:spPr>
-          <a:xfrm>
-            <a:off x="4050548" y="1285597"/>
-            <a:ext cx="693395" cy="303481"/>
-          </a:xfrm>
-          <a:prstGeom prst="rect">
-            <a:avLst/>
-          </a:prstGeom>
-          <a:noFill/>
-        </p:spPr>
-        <p:txBody>
-          <a:bodyPr wrap="none" rtlCol="0">
-            <a:spAutoFit/>
-          </a:bodyPr>
-          <a:lstStyle/>
-          <a:p>
-            <a:r>
-              <a:rPr lang="en-US" sz="1372" dirty="0"/>
-              <a:t>Event[]</a:t>
-            </a:r>
-          </a:p>
-        </p:txBody>
-      </p:sp>
-      <p:sp>
-        <p:nvSpPr>
-          <p:cNvPr id="77" name="TextBox 76">
-            <a:extLst>
-              <a:ext uri="{FF2B5EF4-FFF2-40B4-BE49-F238E27FC236}">
-                <a16:creationId xmlns:a16="http://schemas.microsoft.com/office/drawing/2014/main" id="{136B58F8-5734-4B0D-ACA1-D5889AFC46B6}"/>
-              </a:ext>
-            </a:extLst>
-          </p:cNvPr>
-          <p:cNvSpPr txBox="1"/>
-          <p:nvPr/>
-        </p:nvSpPr>
-        <p:spPr>
-          <a:xfrm>
-            <a:off x="4032784" y="1457878"/>
-            <a:ext cx="934230" cy="303481"/>
-          </a:xfrm>
-          <a:prstGeom prst="rect">
-            <a:avLst/>
-          </a:prstGeom>
-          <a:noFill/>
-        </p:spPr>
-        <p:txBody>
-          <a:bodyPr wrap="none" rtlCol="0">
-            <a:spAutoFit/>
-          </a:bodyPr>
-          <a:lstStyle/>
-          <a:p>
-            <a:r>
-              <a:rPr lang="en-US" sz="1372" dirty="0"/>
-              <a:t>Category[]</a:t>
-            </a:r>
-          </a:p>
-        </p:txBody>
-      </p:sp>
-    </p:spTree>
-    <p:extLst>
-      <p:ext uri="{BB962C8B-B14F-4D97-AF65-F5344CB8AC3E}">
-        <p14:creationId xmlns:p14="http://schemas.microsoft.com/office/powerpoint/2010/main" val="3109588190"/>
-      </p:ext>
-    </p:extLst>
   </p:cSld>
   <p:clrMapOvr>
     <a:masterClrMapping/>
@@ -6019,4 +4436,299 @@
     </a:ext>
   </a:extLst>
 </a:theme>
+</file>
+
+<file path=ppt/theme/theme2.xml><?xml version="1.0" encoding="utf-8"?>
+<a:theme xmlns:a="http://schemas.openxmlformats.org/drawingml/2006/main" name="Office Theme">
+  <a:themeElements>
+    <a:clrScheme name="Office">
+      <a:dk1>
+        <a:sysClr val="windowText" lastClr="000000"/>
+      </a:dk1>
+      <a:lt1>
+        <a:sysClr val="window" lastClr="FFFFFF"/>
+      </a:lt1>
+      <a:dk2>
+        <a:srgbClr val="44546A"/>
+      </a:dk2>
+      <a:lt2>
+        <a:srgbClr val="E7E6E6"/>
+      </a:lt2>
+      <a:accent1>
+        <a:srgbClr val="4472C4"/>
+      </a:accent1>
+      <a:accent2>
+        <a:srgbClr val="ED7D31"/>
+      </a:accent2>
+      <a:accent3>
+        <a:srgbClr val="A5A5A5"/>
+      </a:accent3>
+      <a:accent4>
+        <a:srgbClr val="FFC000"/>
+      </a:accent4>
+      <a:accent5>
+        <a:srgbClr val="5B9BD5"/>
+      </a:accent5>
+      <a:accent6>
+        <a:srgbClr val="70AD47"/>
+      </a:accent6>
+      <a:hlink>
+        <a:srgbClr val="0563C1"/>
+      </a:hlink>
+      <a:folHlink>
+        <a:srgbClr val="954F72"/>
+      </a:folHlink>
+    </a:clrScheme>
+    <a:fontScheme name="Office">
+      <a:majorFont>
+        <a:latin typeface="Calibri Light" panose="020F0302020204030204"/>
+        <a:ea typeface=""/>
+        <a:cs typeface=""/>
+        <a:font script="Jpan" typeface="游ゴシック Light"/>
+        <a:font script="Hang" typeface="맑은 고딕"/>
+        <a:font script="Hans" typeface="等线 Light"/>
+        <a:font script="Hant" typeface="新細明體"/>
+        <a:font script="Arab" typeface="Times New Roman"/>
+        <a:font script="Hebr" typeface="Times New Roman"/>
+        <a:font script="Thai" typeface="Angsana New"/>
+        <a:font script="Ethi" typeface="Nyala"/>
+        <a:font script="Beng" typeface="Vrinda"/>
+        <a:font script="Gujr" typeface="Shruti"/>
+        <a:font script="Khmr" typeface="MoolBoran"/>
+        <a:font script="Knda" typeface="Tunga"/>
+        <a:font script="Guru" typeface="Raavi"/>
+        <a:font script="Cans" typeface="Euphemia"/>
+        <a:font script="Cher" typeface="Plantagenet Cherokee"/>
+        <a:font script="Yiii" typeface="Microsoft Yi Baiti"/>
+        <a:font script="Tibt" typeface="Microsoft Himalaya"/>
+        <a:font script="Thaa" typeface="MV Boli"/>
+        <a:font script="Deva" typeface="Mangal"/>
+        <a:font script="Telu" typeface="Gautami"/>
+        <a:font script="Taml" typeface="Latha"/>
+        <a:font script="Syrc" typeface="Estrangelo Edessa"/>
+        <a:font script="Orya" typeface="Kalinga"/>
+        <a:font script="Mlym" typeface="Kartika"/>
+        <a:font script="Laoo" typeface="DokChampa"/>
+        <a:font script="Sinh" typeface="Iskoola Pota"/>
+        <a:font script="Mong" typeface="Mongolian Baiti"/>
+        <a:font script="Viet" typeface="Times New Roman"/>
+        <a:font script="Uigh" typeface="Microsoft Uighur"/>
+        <a:font script="Geor" typeface="Sylfaen"/>
+        <a:font script="Armn" typeface="Arial"/>
+        <a:font script="Bugi" typeface="Leelawadee UI"/>
+        <a:font script="Bopo" typeface="Microsoft JhengHei"/>
+        <a:font script="Java" typeface="Javanese Text"/>
+        <a:font script="Lisu" typeface="Segoe UI"/>
+        <a:font script="Mymr" typeface="Myanmar Text"/>
+        <a:font script="Nkoo" typeface="Ebrima"/>
+        <a:font script="Olck" typeface="Nirmala UI"/>
+        <a:font script="Osma" typeface="Ebrima"/>
+        <a:font script="Phag" typeface="Phagspa"/>
+        <a:font script="Syrn" typeface="Estrangelo Edessa"/>
+        <a:font script="Syrj" typeface="Estrangelo Edessa"/>
+        <a:font script="Syre" typeface="Estrangelo Edessa"/>
+        <a:font script="Sora" typeface="Nirmala UI"/>
+        <a:font script="Tale" typeface="Microsoft Tai Le"/>
+        <a:font script="Talu" typeface="Microsoft New Tai Lue"/>
+        <a:font script="Tfng" typeface="Ebrima"/>
+      </a:majorFont>
+      <a:minorFont>
+        <a:latin typeface="Calibri" panose="020F0502020204030204"/>
+        <a:ea typeface=""/>
+        <a:cs typeface=""/>
+        <a:font script="Jpan" typeface="游ゴシック"/>
+        <a:font script="Hang" typeface="맑은 고딕"/>
+        <a:font script="Hans" typeface="等线"/>
+        <a:font script="Hant" typeface="新細明體"/>
+        <a:font script="Arab" typeface="Arial"/>
+        <a:font script="Hebr" typeface="Arial"/>
+        <a:font script="Thai" typeface="Cordia New"/>
+        <a:font script="Ethi" typeface="Nyala"/>
+        <a:font script="Beng" typeface="Vrinda"/>
+        <a:font script="Gujr" typeface="Shruti"/>
+        <a:font script="Khmr" typeface="DaunPenh"/>
+        <a:font script="Knda" typeface="Tunga"/>
+        <a:font script="Guru" typeface="Raavi"/>
+        <a:font script="Cans" typeface="Euphemia"/>
+        <a:font script="Cher" typeface="Plantagenet Cherokee"/>
+        <a:font script="Yiii" typeface="Microsoft Yi Baiti"/>
+        <a:font script="Tibt" typeface="Microsoft Himalaya"/>
+        <a:font script="Thaa" typeface="MV Boli"/>
+        <a:font script="Deva" typeface="Mangal"/>
+        <a:font script="Telu" typeface="Gautami"/>
+        <a:font script="Taml" typeface="Latha"/>
+        <a:font script="Syrc" typeface="Estrangelo Edessa"/>
+        <a:font script="Orya" typeface="Kalinga"/>
+        <a:font script="Mlym" typeface="Kartika"/>
+        <a:font script="Laoo" typeface="DokChampa"/>
+        <a:font script="Sinh" typeface="Iskoola Pota"/>
+        <a:font script="Mong" typeface="Mongolian Baiti"/>
+        <a:font script="Viet" typeface="Arial"/>
+        <a:font script="Uigh" typeface="Microsoft Uighur"/>
+        <a:font script="Geor" typeface="Sylfaen"/>
+        <a:font script="Armn" typeface="Arial"/>
+        <a:font script="Bugi" typeface="Leelawadee UI"/>
+        <a:font script="Bopo" typeface="Microsoft JhengHei"/>
+        <a:font script="Java" typeface="Javanese Text"/>
+        <a:font script="Lisu" typeface="Segoe UI"/>
+        <a:font script="Mymr" typeface="Myanmar Text"/>
+        <a:font script="Nkoo" typeface="Ebrima"/>
+        <a:font script="Olck" typeface="Nirmala UI"/>
+        <a:font script="Osma" typeface="Ebrima"/>
+        <a:font script="Phag" typeface="Phagspa"/>
+        <a:font script="Syrn" typeface="Estrangelo Edessa"/>
+        <a:font script="Syrj" typeface="Estrangelo Edessa"/>
+        <a:font script="Syre" typeface="Estrangelo Edessa"/>
+        <a:font script="Sora" typeface="Nirmala UI"/>
+        <a:font script="Tale" typeface="Microsoft Tai Le"/>
+        <a:font script="Talu" typeface="Microsoft New Tai Lue"/>
+        <a:font script="Tfng" typeface="Ebrima"/>
+      </a:minorFont>
+    </a:fontScheme>
+    <a:fmtScheme name="Office">
+      <a:fillStyleLst>
+        <a:solidFill>
+          <a:schemeClr val="phClr"/>
+        </a:solidFill>
+        <a:gradFill rotWithShape="1">
+          <a:gsLst>
+            <a:gs pos="0">
+              <a:schemeClr val="phClr">
+                <a:lumMod val="110000"/>
+                <a:satMod val="105000"/>
+                <a:tint val="67000"/>
+              </a:schemeClr>
+            </a:gs>
+            <a:gs pos="50000">
+              <a:schemeClr val="phClr">
+                <a:lumMod val="105000"/>
+                <a:satMod val="103000"/>
+                <a:tint val="73000"/>
+              </a:schemeClr>
+            </a:gs>
+            <a:gs pos="100000">
+              <a:schemeClr val="phClr">
+                <a:lumMod val="105000"/>
+                <a:satMod val="109000"/>
+                <a:tint val="81000"/>
+              </a:schemeClr>
+            </a:gs>
+          </a:gsLst>
+          <a:lin ang="5400000" scaled="0"/>
+        </a:gradFill>
+        <a:gradFill rotWithShape="1">
+          <a:gsLst>
+            <a:gs pos="0">
+              <a:schemeClr val="phClr">
+                <a:satMod val="103000"/>
+                <a:lumMod val="102000"/>
+                <a:tint val="94000"/>
+              </a:schemeClr>
+            </a:gs>
+            <a:gs pos="50000">
+              <a:schemeClr val="phClr">
+                <a:satMod val="110000"/>
+                <a:lumMod val="100000"/>
+                <a:shade val="100000"/>
+              </a:schemeClr>
+            </a:gs>
+            <a:gs pos="100000">
+              <a:schemeClr val="phClr">
+                <a:lumMod val="99000"/>
+                <a:satMod val="120000"/>
+                <a:shade val="78000"/>
+              </a:schemeClr>
+            </a:gs>
+          </a:gsLst>
+          <a:lin ang="5400000" scaled="0"/>
+        </a:gradFill>
+      </a:fillStyleLst>
+      <a:lnStyleLst>
+        <a:ln w="6350" cap="flat" cmpd="sng" algn="ctr">
+          <a:solidFill>
+            <a:schemeClr val="phClr"/>
+          </a:solidFill>
+          <a:prstDash val="solid"/>
+          <a:miter lim="800000"/>
+        </a:ln>
+        <a:ln w="12700" cap="flat" cmpd="sng" algn="ctr">
+          <a:solidFill>
+            <a:schemeClr val="phClr"/>
+          </a:solidFill>
+          <a:prstDash val="solid"/>
+          <a:miter lim="800000"/>
+        </a:ln>
+        <a:ln w="19050" cap="flat" cmpd="sng" algn="ctr">
+          <a:solidFill>
+            <a:schemeClr val="phClr"/>
+          </a:solidFill>
+          <a:prstDash val="solid"/>
+          <a:miter lim="800000"/>
+        </a:ln>
+      </a:lnStyleLst>
+      <a:effectStyleLst>
+        <a:effectStyle>
+          <a:effectLst/>
+        </a:effectStyle>
+        <a:effectStyle>
+          <a:effectLst/>
+        </a:effectStyle>
+        <a:effectStyle>
+          <a:effectLst>
+            <a:outerShdw blurRad="57150" dist="19050" dir="5400000" algn="ctr" rotWithShape="0">
+              <a:srgbClr val="000000">
+                <a:alpha val="63000"/>
+              </a:srgbClr>
+            </a:outerShdw>
+          </a:effectLst>
+        </a:effectStyle>
+      </a:effectStyleLst>
+      <a:bgFillStyleLst>
+        <a:solidFill>
+          <a:schemeClr val="phClr"/>
+        </a:solidFill>
+        <a:solidFill>
+          <a:schemeClr val="phClr">
+            <a:tint val="95000"/>
+            <a:satMod val="170000"/>
+          </a:schemeClr>
+        </a:solidFill>
+        <a:gradFill rotWithShape="1">
+          <a:gsLst>
+            <a:gs pos="0">
+              <a:schemeClr val="phClr">
+                <a:tint val="93000"/>
+                <a:satMod val="150000"/>
+                <a:shade val="98000"/>
+                <a:lumMod val="102000"/>
+              </a:schemeClr>
+            </a:gs>
+            <a:gs pos="50000">
+              <a:schemeClr val="phClr">
+                <a:tint val="98000"/>
+                <a:satMod val="130000"/>
+                <a:shade val="90000"/>
+                <a:lumMod val="103000"/>
+              </a:schemeClr>
+            </a:gs>
+            <a:gs pos="100000">
+              <a:schemeClr val="phClr">
+                <a:shade val="63000"/>
+                <a:satMod val="120000"/>
+              </a:schemeClr>
+            </a:gs>
+          </a:gsLst>
+          <a:lin ang="5400000" scaled="0"/>
+        </a:gradFill>
+      </a:bgFillStyleLst>
+    </a:fmtScheme>
+  </a:themeElements>
+  <a:objectDefaults/>
+  <a:extraClrSchemeLst/>
+  <a:extLst>
+    <a:ext uri="{05A4C25C-085E-4340-85A3-A5531E510DB2}">
+      <thm15:themeFamily xmlns:thm15="http://schemas.microsoft.com/office/thememl/2012/main" name="Office Theme" id="{62F939B6-93AF-4DB8-9C6B-D6C7DFDC589F}" vid="{4A3C46E8-61CC-4603-A589-7422A47A8E4A}"/>
+    </a:ext>
+  </a:extLst>
+</a:theme>
 </file>
</xml_diff>

<commit_message>
#22 completed update CD sign in
</commit_message>
<xml_diff>
--- a/docs/COMPONENT-DIAGRAM.pptx
+++ b/docs/COMPONENT-DIAGRAM.pptx
@@ -514,6 +514,11 @@
         </p:txBody>
       </p:sp>
     </p:spTree>
+    <p:extLst>
+      <p:ext uri="{BB962C8B-B14F-4D97-AF65-F5344CB8AC3E}">
+        <p14:creationId xmlns:p14="http://schemas.microsoft.com/office/powerpoint/2010/main" val="2956431796"/>
+      </p:ext>
+    </p:extLst>
   </p:cSld>
   <p:clrMapOvr>
     <a:masterClrMapping/>
@@ -4170,6 +4175,11 @@
         </p:txBody>
       </p:sp>
     </p:spTree>
+    <p:extLst>
+      <p:ext uri="{BB962C8B-B14F-4D97-AF65-F5344CB8AC3E}">
+        <p14:creationId xmlns:p14="http://schemas.microsoft.com/office/powerpoint/2010/main" val="3418930463"/>
+      </p:ext>
+    </p:extLst>
   </p:cSld>
   <p:clrMapOvr>
     <a:masterClrMapping/>

</xml_diff>

<commit_message>
#8 updated sign up component diagram
</commit_message>
<xml_diff>
--- a/docs/COMPONENT-DIAGRAM.pptx
+++ b/docs/COMPONENT-DIAGRAM.pptx
@@ -5,11 +5,12 @@
     <p:sldMasterId id="2147483648" r:id="rId1"/>
   </p:sldMasterIdLst>
   <p:notesMasterIdLst>
-    <p:notesMasterId r:id="rId4"/>
+    <p:notesMasterId r:id="rId5"/>
   </p:notesMasterIdLst>
   <p:sldIdLst>
     <p:sldId id="256" r:id="rId2"/>
     <p:sldId id="260" r:id="rId3"/>
+    <p:sldId id="261" r:id="rId4"/>
   </p:sldIdLst>
   <p:sldSz cx="12192000" cy="6858000"/>
   <p:notesSz cx="6858000" cy="9144000"/>
@@ -116,6 +117,170 @@
 </p:presentation>
 </file>
 
+<file path=ppt/changesInfos/changesInfo1.xml><?xml version="1.0" encoding="utf-8"?>
+<pc:chgInfo xmlns:a="http://schemas.openxmlformats.org/drawingml/2006/main" xmlns:r="http://schemas.openxmlformats.org/officeDocument/2006/relationships" xmlns:ac="http://schemas.microsoft.com/office/drawing/2013/main/command" xmlns:pc="http://schemas.microsoft.com/office/powerpoint/2013/main/command">
+  <pc:docChgLst>
+    <pc:chgData name="Thon" userId="c34ad737e009e65c" providerId="LiveId" clId="{B3C0D570-4446-4391-A134-FB9AD44B54F7}"/>
+    <pc:docChg chg="custSel addSld modSld">
+      <pc:chgData name="Thon" userId="c34ad737e009e65c" providerId="LiveId" clId="{B3C0D570-4446-4391-A134-FB9AD44B54F7}" dt="2021-11-28T03:10:25.313" v="6" actId="20577"/>
+      <pc:docMkLst>
+        <pc:docMk/>
+      </pc:docMkLst>
+      <pc:sldChg chg="modSp mod">
+        <pc:chgData name="Thon" userId="c34ad737e009e65c" providerId="LiveId" clId="{B3C0D570-4446-4391-A134-FB9AD44B54F7}" dt="2021-11-28T03:10:25.313" v="6" actId="20577"/>
+        <pc:sldMkLst>
+          <pc:docMk/>
+          <pc:sldMk cId="3418930463" sldId="260"/>
+        </pc:sldMkLst>
+        <pc:spChg chg="mod">
+          <ac:chgData name="Thon" userId="c34ad737e009e65c" providerId="LiveId" clId="{B3C0D570-4446-4391-A134-FB9AD44B54F7}" dt="2021-11-28T03:10:25.313" v="6" actId="20577"/>
+          <ac:spMkLst>
+            <pc:docMk/>
+            <pc:sldMk cId="3418930463" sldId="260"/>
+            <ac:spMk id="11" creationId="{00000000-0000-0000-0000-000000000000}"/>
+          </ac:spMkLst>
+        </pc:spChg>
+      </pc:sldChg>
+      <pc:sldChg chg="addSp delSp modSp new mod">
+        <pc:chgData name="Thon" userId="c34ad737e009e65c" providerId="LiveId" clId="{B3C0D570-4446-4391-A134-FB9AD44B54F7}" dt="2021-11-28T03:10:14.900" v="2"/>
+        <pc:sldMkLst>
+          <pc:docMk/>
+          <pc:sldMk cId="766946960" sldId="261"/>
+        </pc:sldMkLst>
+        <pc:spChg chg="del">
+          <ac:chgData name="Thon" userId="c34ad737e009e65c" providerId="LiveId" clId="{B3C0D570-4446-4391-A134-FB9AD44B54F7}" dt="2021-11-28T03:10:13.967" v="1" actId="478"/>
+          <ac:spMkLst>
+            <pc:docMk/>
+            <pc:sldMk cId="766946960" sldId="261"/>
+            <ac:spMk id="2" creationId="{F138C882-DEE5-497B-86CA-95434635E238}"/>
+          </ac:spMkLst>
+        </pc:spChg>
+        <pc:spChg chg="del">
+          <ac:chgData name="Thon" userId="c34ad737e009e65c" providerId="LiveId" clId="{B3C0D570-4446-4391-A134-FB9AD44B54F7}" dt="2021-11-28T03:10:13.967" v="1" actId="478"/>
+          <ac:spMkLst>
+            <pc:docMk/>
+            <pc:sldMk cId="766946960" sldId="261"/>
+            <ac:spMk id="3" creationId="{32F21201-73A2-49A8-89F6-04DC8F6B2FFB}"/>
+          </ac:spMkLst>
+        </pc:spChg>
+        <pc:spChg chg="add mod">
+          <ac:chgData name="Thon" userId="c34ad737e009e65c" providerId="LiveId" clId="{B3C0D570-4446-4391-A134-FB9AD44B54F7}" dt="2021-11-28T03:10:14.900" v="2"/>
+          <ac:spMkLst>
+            <pc:docMk/>
+            <pc:sldMk cId="766946960" sldId="261"/>
+            <ac:spMk id="4" creationId="{6BFA73C3-0F1C-4754-A86F-EE98D4400CD6}"/>
+          </ac:spMkLst>
+        </pc:spChg>
+        <pc:spChg chg="add mod">
+          <ac:chgData name="Thon" userId="c34ad737e009e65c" providerId="LiveId" clId="{B3C0D570-4446-4391-A134-FB9AD44B54F7}" dt="2021-11-28T03:10:14.900" v="2"/>
+          <ac:spMkLst>
+            <pc:docMk/>
+            <pc:sldMk cId="766946960" sldId="261"/>
+            <ac:spMk id="5" creationId="{DBE95B66-0209-4E9C-B022-3176FB2C205D}"/>
+          </ac:spMkLst>
+        </pc:spChg>
+        <pc:spChg chg="add mod">
+          <ac:chgData name="Thon" userId="c34ad737e009e65c" providerId="LiveId" clId="{B3C0D570-4446-4391-A134-FB9AD44B54F7}" dt="2021-11-28T03:10:14.900" v="2"/>
+          <ac:spMkLst>
+            <pc:docMk/>
+            <pc:sldMk cId="766946960" sldId="261"/>
+            <ac:spMk id="6" creationId="{C63E61CF-CC73-407B-B1F4-C0CE62EAEA40}"/>
+          </ac:spMkLst>
+        </pc:spChg>
+        <pc:spChg chg="add mod">
+          <ac:chgData name="Thon" userId="c34ad737e009e65c" providerId="LiveId" clId="{B3C0D570-4446-4391-A134-FB9AD44B54F7}" dt="2021-11-28T03:10:14.900" v="2"/>
+          <ac:spMkLst>
+            <pc:docMk/>
+            <pc:sldMk cId="766946960" sldId="261"/>
+            <ac:spMk id="7" creationId="{F065A682-178B-4C56-A848-5FDE088A034C}"/>
+          </ac:spMkLst>
+        </pc:spChg>
+        <pc:spChg chg="add mod">
+          <ac:chgData name="Thon" userId="c34ad737e009e65c" providerId="LiveId" clId="{B3C0D570-4446-4391-A134-FB9AD44B54F7}" dt="2021-11-28T03:10:14.900" v="2"/>
+          <ac:spMkLst>
+            <pc:docMk/>
+            <pc:sldMk cId="766946960" sldId="261"/>
+            <ac:spMk id="8" creationId="{38635E96-4FCB-49A4-BC82-82CE1E1A0C56}"/>
+          </ac:spMkLst>
+        </pc:spChg>
+        <pc:spChg chg="add mod">
+          <ac:chgData name="Thon" userId="c34ad737e009e65c" providerId="LiveId" clId="{B3C0D570-4446-4391-A134-FB9AD44B54F7}" dt="2021-11-28T03:10:14.900" v="2"/>
+          <ac:spMkLst>
+            <pc:docMk/>
+            <pc:sldMk cId="766946960" sldId="261"/>
+            <ac:spMk id="9" creationId="{737BCB55-A79D-4A56-B47C-971E4A1DEE63}"/>
+          </ac:spMkLst>
+        </pc:spChg>
+        <pc:spChg chg="add mod">
+          <ac:chgData name="Thon" userId="c34ad737e009e65c" providerId="LiveId" clId="{B3C0D570-4446-4391-A134-FB9AD44B54F7}" dt="2021-11-28T03:10:14.900" v="2"/>
+          <ac:spMkLst>
+            <pc:docMk/>
+            <pc:sldMk cId="766946960" sldId="261"/>
+            <ac:spMk id="10" creationId="{726AC62D-3F6D-4372-9C38-9FF88201CDF0}"/>
+          </ac:spMkLst>
+        </pc:spChg>
+        <pc:spChg chg="add mod">
+          <ac:chgData name="Thon" userId="c34ad737e009e65c" providerId="LiveId" clId="{B3C0D570-4446-4391-A134-FB9AD44B54F7}" dt="2021-11-28T03:10:14.900" v="2"/>
+          <ac:spMkLst>
+            <pc:docMk/>
+            <pc:sldMk cId="766946960" sldId="261"/>
+            <ac:spMk id="11" creationId="{CC64710C-7612-4D44-9D9A-FBF9AB76D9D2}"/>
+          </ac:spMkLst>
+        </pc:spChg>
+        <pc:spChg chg="add mod">
+          <ac:chgData name="Thon" userId="c34ad737e009e65c" providerId="LiveId" clId="{B3C0D570-4446-4391-A134-FB9AD44B54F7}" dt="2021-11-28T03:10:14.900" v="2"/>
+          <ac:spMkLst>
+            <pc:docMk/>
+            <pc:sldMk cId="766946960" sldId="261"/>
+            <ac:spMk id="13" creationId="{5EC9520D-617F-4AD0-B31C-5E658A696844}"/>
+          </ac:spMkLst>
+        </pc:spChg>
+        <pc:spChg chg="add mod">
+          <ac:chgData name="Thon" userId="c34ad737e009e65c" providerId="LiveId" clId="{B3C0D570-4446-4391-A134-FB9AD44B54F7}" dt="2021-11-28T03:10:14.900" v="2"/>
+          <ac:spMkLst>
+            <pc:docMk/>
+            <pc:sldMk cId="766946960" sldId="261"/>
+            <ac:spMk id="14" creationId="{0993311E-2EF8-45FD-A282-5492E99D89BF}"/>
+          </ac:spMkLst>
+        </pc:spChg>
+        <pc:spChg chg="add mod">
+          <ac:chgData name="Thon" userId="c34ad737e009e65c" providerId="LiveId" clId="{B3C0D570-4446-4391-A134-FB9AD44B54F7}" dt="2021-11-28T03:10:14.900" v="2"/>
+          <ac:spMkLst>
+            <pc:docMk/>
+            <pc:sldMk cId="766946960" sldId="261"/>
+            <ac:spMk id="15" creationId="{71EFE8B6-51C5-4394-A3D4-534519339558}"/>
+          </ac:spMkLst>
+        </pc:spChg>
+        <pc:spChg chg="add mod">
+          <ac:chgData name="Thon" userId="c34ad737e009e65c" providerId="LiveId" clId="{B3C0D570-4446-4391-A134-FB9AD44B54F7}" dt="2021-11-28T03:10:14.900" v="2"/>
+          <ac:spMkLst>
+            <pc:docMk/>
+            <pc:sldMk cId="766946960" sldId="261"/>
+            <ac:spMk id="16" creationId="{6192A149-695D-432B-8E57-26B32CADAA3B}"/>
+          </ac:spMkLst>
+        </pc:spChg>
+        <pc:spChg chg="add mod">
+          <ac:chgData name="Thon" userId="c34ad737e009e65c" providerId="LiveId" clId="{B3C0D570-4446-4391-A134-FB9AD44B54F7}" dt="2021-11-28T03:10:14.900" v="2"/>
+          <ac:spMkLst>
+            <pc:docMk/>
+            <pc:sldMk cId="766946960" sldId="261"/>
+            <ac:spMk id="17" creationId="{9C95469D-631B-4EAD-9862-B48643237597}"/>
+          </ac:spMkLst>
+        </pc:spChg>
+        <pc:picChg chg="add mod">
+          <ac:chgData name="Thon" userId="c34ad737e009e65c" providerId="LiveId" clId="{B3C0D570-4446-4391-A134-FB9AD44B54F7}" dt="2021-11-28T03:10:14.900" v="2"/>
+          <ac:picMkLst>
+            <pc:docMk/>
+            <pc:sldMk cId="766946960" sldId="261"/>
+            <ac:picMk id="12" creationId="{3525CFA0-5B24-4351-9021-5DDB2EB35014}"/>
+          </ac:picMkLst>
+        </pc:picChg>
+      </pc:sldChg>
+    </pc:docChg>
+  </pc:docChgLst>
+</pc:chgInfo>
+</file>
+
 <file path=ppt/notesMasters/notesMaster1.xml><?xml version="1.0" encoding="utf-8"?>
 <p:notesMaster xmlns:a="http://schemas.openxmlformats.org/drawingml/2006/main" xmlns:r="http://schemas.openxmlformats.org/officeDocument/2006/relationships" xmlns:p="http://schemas.openxmlformats.org/presentationml/2006/main">
   <p:cSld>
@@ -198,7 +363,7 @@
           <a:p>
             <a:fld id="{E88365C0-BE66-4276-A4A8-B9C86C352910}" type="datetimeFigureOut">
               <a:rPr lang="en-US" smtClean="0"/>
-              <a:t>11/27/2021</a:t>
+              <a:t>11/28/2021</a:t>
             </a:fld>
             <a:endParaRPr lang="en-US"/>
           </a:p>
@@ -655,7 +820,7 @@
           <a:p>
             <a:fld id="{28BE630F-C39C-4DB9-8258-0B48CA067079}" type="datetimeFigureOut">
               <a:rPr lang="en-US" smtClean="0"/>
-              <a:t>11/27/2021</a:t>
+              <a:t>11/28/2021</a:t>
             </a:fld>
             <a:endParaRPr lang="en-US"/>
           </a:p>
@@ -823,7 +988,7 @@
           <a:p>
             <a:fld id="{28BE630F-C39C-4DB9-8258-0B48CA067079}" type="datetimeFigureOut">
               <a:rPr lang="en-US" smtClean="0"/>
-              <a:t>11/27/2021</a:t>
+              <a:t>11/28/2021</a:t>
             </a:fld>
             <a:endParaRPr lang="en-US"/>
           </a:p>
@@ -1001,7 +1166,7 @@
           <a:p>
             <a:fld id="{28BE630F-C39C-4DB9-8258-0B48CA067079}" type="datetimeFigureOut">
               <a:rPr lang="en-US" smtClean="0"/>
-              <a:t>11/27/2021</a:t>
+              <a:t>11/28/2021</a:t>
             </a:fld>
             <a:endParaRPr lang="en-US"/>
           </a:p>
@@ -1169,7 +1334,7 @@
           <a:p>
             <a:fld id="{28BE630F-C39C-4DB9-8258-0B48CA067079}" type="datetimeFigureOut">
               <a:rPr lang="en-US" smtClean="0"/>
-              <a:t>11/27/2021</a:t>
+              <a:t>11/28/2021</a:t>
             </a:fld>
             <a:endParaRPr lang="en-US"/>
           </a:p>
@@ -1414,7 +1579,7 @@
           <a:p>
             <a:fld id="{28BE630F-C39C-4DB9-8258-0B48CA067079}" type="datetimeFigureOut">
               <a:rPr lang="en-US" smtClean="0"/>
-              <a:t>11/27/2021</a:t>
+              <a:t>11/28/2021</a:t>
             </a:fld>
             <a:endParaRPr lang="en-US"/>
           </a:p>
@@ -1643,7 +1808,7 @@
           <a:p>
             <a:fld id="{28BE630F-C39C-4DB9-8258-0B48CA067079}" type="datetimeFigureOut">
               <a:rPr lang="en-US" smtClean="0"/>
-              <a:t>11/27/2021</a:t>
+              <a:t>11/28/2021</a:t>
             </a:fld>
             <a:endParaRPr lang="en-US"/>
           </a:p>
@@ -2007,7 +2172,7 @@
           <a:p>
             <a:fld id="{28BE630F-C39C-4DB9-8258-0B48CA067079}" type="datetimeFigureOut">
               <a:rPr lang="en-US" smtClean="0"/>
-              <a:t>11/27/2021</a:t>
+              <a:t>11/28/2021</a:t>
             </a:fld>
             <a:endParaRPr lang="en-US"/>
           </a:p>
@@ -2124,7 +2289,7 @@
           <a:p>
             <a:fld id="{28BE630F-C39C-4DB9-8258-0B48CA067079}" type="datetimeFigureOut">
               <a:rPr lang="en-US" smtClean="0"/>
-              <a:t>11/27/2021</a:t>
+              <a:t>11/28/2021</a:t>
             </a:fld>
             <a:endParaRPr lang="en-US"/>
           </a:p>
@@ -2219,7 +2384,7 @@
           <a:p>
             <a:fld id="{28BE630F-C39C-4DB9-8258-0B48CA067079}" type="datetimeFigureOut">
               <a:rPr lang="en-US" smtClean="0"/>
-              <a:t>11/27/2021</a:t>
+              <a:t>11/28/2021</a:t>
             </a:fld>
             <a:endParaRPr lang="en-US"/>
           </a:p>
@@ -2494,7 +2659,7 @@
           <a:p>
             <a:fld id="{28BE630F-C39C-4DB9-8258-0B48CA067079}" type="datetimeFigureOut">
               <a:rPr lang="en-US" smtClean="0"/>
-              <a:t>11/27/2021</a:t>
+              <a:t>11/28/2021</a:t>
             </a:fld>
             <a:endParaRPr lang="en-US"/>
           </a:p>
@@ -2746,7 +2911,7 @@
           <a:p>
             <a:fld id="{28BE630F-C39C-4DB9-8258-0B48CA067079}" type="datetimeFigureOut">
               <a:rPr lang="en-US" smtClean="0"/>
-              <a:t>11/27/2021</a:t>
+              <a:t>11/28/2021</a:t>
             </a:fld>
             <a:endParaRPr lang="en-US"/>
           </a:p>
@@ -2957,7 +3122,7 @@
           <a:p>
             <a:fld id="{28BE630F-C39C-4DB9-8258-0B48CA067079}" type="datetimeFigureOut">
               <a:rPr lang="en-US" smtClean="0"/>
-              <a:t>11/27/2021</a:t>
+              <a:t>11/28/2021</a:t>
             </a:fld>
             <a:endParaRPr lang="en-US"/>
           </a:p>
@@ -3888,7 +4053,7 @@
         <p:spPr>
           <a:xfrm>
             <a:off x="5610225" y="5847080"/>
-            <a:ext cx="881380" cy="368300"/>
+            <a:ext cx="591829" cy="369332"/>
           </a:xfrm>
           <a:prstGeom prst="rect">
             <a:avLst/>
@@ -3902,12 +4067,12 @@
           <a:lstStyle/>
           <a:p>
             <a:r>
-              <a:rPr lang="" altLang="en-US">
+              <a:rPr lang="" altLang="en-US" dirty="0">
                 <a:solidFill>
                   <a:srgbClr val="00B050"/>
                 </a:solidFill>
               </a:rPr>
-              <a:t>user [ ]</a:t>
+              <a:t>user</a:t>
             </a:r>
           </a:p>
         </p:txBody>
@@ -4178,6 +4343,665 @@
     <p:extLst>
       <p:ext uri="{BB962C8B-B14F-4D97-AF65-F5344CB8AC3E}">
         <p14:creationId xmlns:p14="http://schemas.microsoft.com/office/powerpoint/2010/main" val="3418930463"/>
+      </p:ext>
+    </p:extLst>
+  </p:cSld>
+  <p:clrMapOvr>
+    <a:masterClrMapping/>
+  </p:clrMapOvr>
+</p:sld>
+</file>
+
+<file path=ppt/slides/slide3.xml><?xml version="1.0" encoding="utf-8"?>
+<p:sld xmlns:a="http://schemas.openxmlformats.org/drawingml/2006/main" xmlns:r="http://schemas.openxmlformats.org/officeDocument/2006/relationships" xmlns:p="http://schemas.openxmlformats.org/presentationml/2006/main">
+  <p:cSld>
+    <p:spTree>
+      <p:nvGrpSpPr>
+        <p:cNvPr id="1" name=""/>
+        <p:cNvGrpSpPr/>
+        <p:nvPr/>
+      </p:nvGrpSpPr>
+      <p:grpSpPr>
+        <a:xfrm>
+          <a:off x="0" y="0"/>
+          <a:ext cx="0" cy="0"/>
+          <a:chOff x="0" y="0"/>
+          <a:chExt cx="0" cy="0"/>
+        </a:xfrm>
+      </p:grpSpPr>
+      <p:sp>
+        <p:nvSpPr>
+          <p:cNvPr id="4" name="Rectangle 3">
+            <a:extLst>
+              <a:ext uri="{FF2B5EF4-FFF2-40B4-BE49-F238E27FC236}">
+                <a16:creationId xmlns:a16="http://schemas.microsoft.com/office/drawing/2014/main" id="{6BFA73C3-0F1C-4754-A86F-EE98D4400CD6}"/>
+              </a:ext>
+            </a:extLst>
+          </p:cNvPr>
+          <p:cNvSpPr/>
+          <p:nvPr/>
+        </p:nvSpPr>
+        <p:spPr>
+          <a:xfrm>
+            <a:off x="5229860" y="5342890"/>
+            <a:ext cx="1578610" cy="953770"/>
+          </a:xfrm>
+          <a:prstGeom prst="rect">
+            <a:avLst/>
+          </a:prstGeom>
+          <a:noFill/>
+          <a:ln>
+            <a:solidFill>
+              <a:schemeClr val="accent1"/>
+            </a:solidFill>
+            <a:prstDash val="sysDash"/>
+          </a:ln>
+        </p:spPr>
+        <p:style>
+          <a:lnRef idx="2">
+            <a:schemeClr val="accent1">
+              <a:shade val="50000"/>
+            </a:schemeClr>
+          </a:lnRef>
+          <a:fillRef idx="1">
+            <a:schemeClr val="accent1"/>
+          </a:fillRef>
+          <a:effectRef idx="0">
+            <a:schemeClr val="accent1"/>
+          </a:effectRef>
+          <a:fontRef idx="minor">
+            <a:schemeClr val="lt1"/>
+          </a:fontRef>
+        </p:style>
+        <p:txBody>
+          <a:bodyPr rtlCol="0" anchor="ctr"/>
+          <a:lstStyle/>
+          <a:p>
+            <a:pPr algn="ctr"/>
+            <a:endParaRPr lang="en-US"/>
+          </a:p>
+        </p:txBody>
+      </p:sp>
+      <p:sp>
+        <p:nvSpPr>
+          <p:cNvPr id="5" name="Text Box 4">
+            <a:extLst>
+              <a:ext uri="{FF2B5EF4-FFF2-40B4-BE49-F238E27FC236}">
+                <a16:creationId xmlns:a16="http://schemas.microsoft.com/office/drawing/2014/main" id="{DBE95B66-0209-4E9C-B022-3176FB2C205D}"/>
+              </a:ext>
+            </a:extLst>
+          </p:cNvPr>
+          <p:cNvSpPr txBox="1"/>
+          <p:nvPr/>
+        </p:nvSpPr>
+        <p:spPr>
+          <a:xfrm>
+            <a:off x="5560695" y="5443855"/>
+            <a:ext cx="1003300" cy="368300"/>
+          </a:xfrm>
+          <a:prstGeom prst="rect">
+            <a:avLst/>
+          </a:prstGeom>
+          <a:noFill/>
+        </p:spPr>
+        <p:txBody>
+          <a:bodyPr wrap="square" rtlCol="0">
+            <a:spAutoFit/>
+          </a:bodyPr>
+          <a:lstStyle/>
+          <a:p>
+            <a:r>
+              <a:rPr lang="" altLang="en-US"/>
+              <a:t>&lt;app&gt; </a:t>
+            </a:r>
+          </a:p>
+        </p:txBody>
+      </p:sp>
+      <p:sp>
+        <p:nvSpPr>
+          <p:cNvPr id="6" name="Rectangle 5">
+            <a:extLst>
+              <a:ext uri="{FF2B5EF4-FFF2-40B4-BE49-F238E27FC236}">
+                <a16:creationId xmlns:a16="http://schemas.microsoft.com/office/drawing/2014/main" id="{C63E61CF-CC73-407B-B1F4-C0CE62EAEA40}"/>
+              </a:ext>
+            </a:extLst>
+          </p:cNvPr>
+          <p:cNvSpPr/>
+          <p:nvPr/>
+        </p:nvSpPr>
+        <p:spPr>
+          <a:xfrm>
+            <a:off x="8699500" y="5342255"/>
+            <a:ext cx="1628775" cy="570230"/>
+          </a:xfrm>
+          <a:prstGeom prst="rect">
+            <a:avLst/>
+          </a:prstGeom>
+          <a:noFill/>
+          <a:ln w="12700" cmpd="sng">
+            <a:solidFill>
+              <a:schemeClr val="accent1">
+                <a:shade val="50000"/>
+              </a:schemeClr>
+            </a:solidFill>
+            <a:prstDash val="sysDot"/>
+          </a:ln>
+        </p:spPr>
+        <p:style>
+          <a:lnRef idx="2">
+            <a:schemeClr val="accent1">
+              <a:shade val="50000"/>
+            </a:schemeClr>
+          </a:lnRef>
+          <a:fillRef idx="1">
+            <a:schemeClr val="accent1"/>
+          </a:fillRef>
+          <a:effectRef idx="0">
+            <a:schemeClr val="accent1"/>
+          </a:effectRef>
+          <a:fontRef idx="minor">
+            <a:schemeClr val="lt1"/>
+          </a:fontRef>
+        </p:style>
+        <p:txBody>
+          <a:bodyPr rtlCol="0" anchor="ctr"/>
+          <a:lstStyle/>
+          <a:p>
+            <a:pPr algn="ctr"/>
+            <a:endParaRPr lang="en-US"/>
+          </a:p>
+        </p:txBody>
+      </p:sp>
+      <p:sp>
+        <p:nvSpPr>
+          <p:cNvPr id="7" name="Text Box 6">
+            <a:extLst>
+              <a:ext uri="{FF2B5EF4-FFF2-40B4-BE49-F238E27FC236}">
+                <a16:creationId xmlns:a16="http://schemas.microsoft.com/office/drawing/2014/main" id="{F065A682-178B-4C56-A848-5FDE088A034C}"/>
+              </a:ext>
+            </a:extLst>
+          </p:cNvPr>
+          <p:cNvSpPr txBox="1"/>
+          <p:nvPr/>
+        </p:nvSpPr>
+        <p:spPr>
+          <a:xfrm>
+            <a:off x="8889365" y="5443855"/>
+            <a:ext cx="1306830" cy="368300"/>
+          </a:xfrm>
+          <a:prstGeom prst="rect">
+            <a:avLst/>
+          </a:prstGeom>
+          <a:noFill/>
+        </p:spPr>
+        <p:txBody>
+          <a:bodyPr wrap="square" rtlCol="0">
+            <a:spAutoFit/>
+          </a:bodyPr>
+          <a:lstStyle/>
+          <a:p>
+            <a:r>
+              <a:rPr lang="" altLang="en-US"/>
+              <a:t>&lt;sign-up&gt;</a:t>
+            </a:r>
+          </a:p>
+        </p:txBody>
+      </p:sp>
+      <p:sp>
+        <p:nvSpPr>
+          <p:cNvPr id="8" name="Left Arrow 7">
+            <a:extLst>
+              <a:ext uri="{FF2B5EF4-FFF2-40B4-BE49-F238E27FC236}">
+                <a16:creationId xmlns:a16="http://schemas.microsoft.com/office/drawing/2014/main" id="{38635E96-4FCB-49A4-BC82-82CE1E1A0C56}"/>
+              </a:ext>
+            </a:extLst>
+          </p:cNvPr>
+          <p:cNvSpPr/>
+          <p:nvPr/>
+        </p:nvSpPr>
+        <p:spPr>
+          <a:xfrm>
+            <a:off x="7391400" y="5710555"/>
+            <a:ext cx="733425" cy="180975"/>
+          </a:xfrm>
+          <a:prstGeom prst="leftArrow">
+            <a:avLst/>
+          </a:prstGeom>
+          <a:solidFill>
+            <a:srgbClr val="FF0000"/>
+          </a:solidFill>
+          <a:ln>
+            <a:noFill/>
+          </a:ln>
+        </p:spPr>
+        <p:style>
+          <a:lnRef idx="2">
+            <a:schemeClr val="accent1">
+              <a:shade val="50000"/>
+            </a:schemeClr>
+          </a:lnRef>
+          <a:fillRef idx="1">
+            <a:schemeClr val="accent1"/>
+          </a:fillRef>
+          <a:effectRef idx="0">
+            <a:schemeClr val="accent1"/>
+          </a:effectRef>
+          <a:fontRef idx="minor">
+            <a:schemeClr val="lt1"/>
+          </a:fontRef>
+        </p:style>
+        <p:txBody>
+          <a:bodyPr rtlCol="0" anchor="ctr"/>
+          <a:lstStyle/>
+          <a:p>
+            <a:pPr algn="ctr"/>
+            <a:endParaRPr lang="en-US"/>
+          </a:p>
+        </p:txBody>
+      </p:sp>
+      <p:sp>
+        <p:nvSpPr>
+          <p:cNvPr id="9" name="Text Box 8">
+            <a:extLst>
+              <a:ext uri="{FF2B5EF4-FFF2-40B4-BE49-F238E27FC236}">
+                <a16:creationId xmlns:a16="http://schemas.microsoft.com/office/drawing/2014/main" id="{737BCB55-A79D-4A56-B47C-971E4A1DEE63}"/>
+              </a:ext>
+            </a:extLst>
+          </p:cNvPr>
+          <p:cNvSpPr txBox="1"/>
+          <p:nvPr/>
+        </p:nvSpPr>
+        <p:spPr>
+          <a:xfrm>
+            <a:off x="7451090" y="5342255"/>
+            <a:ext cx="614680" cy="368300"/>
+          </a:xfrm>
+          <a:prstGeom prst="rect">
+            <a:avLst/>
+          </a:prstGeom>
+          <a:noFill/>
+        </p:spPr>
+        <p:txBody>
+          <a:bodyPr wrap="none" rtlCol="0">
+            <a:spAutoFit/>
+          </a:bodyPr>
+          <a:lstStyle/>
+          <a:p>
+            <a:r>
+              <a:rPr lang="" altLang="en-US">
+                <a:solidFill>
+                  <a:srgbClr val="FF0000"/>
+                </a:solidFill>
+              </a:rPr>
+              <a:t>emit</a:t>
+            </a:r>
+          </a:p>
+        </p:txBody>
+      </p:sp>
+      <p:sp>
+        <p:nvSpPr>
+          <p:cNvPr id="10" name="Text Box 9">
+            <a:extLst>
+              <a:ext uri="{FF2B5EF4-FFF2-40B4-BE49-F238E27FC236}">
+                <a16:creationId xmlns:a16="http://schemas.microsoft.com/office/drawing/2014/main" id="{726AC62D-3F6D-4372-9C38-9FF88201CDF0}"/>
+              </a:ext>
+            </a:extLst>
+          </p:cNvPr>
+          <p:cNvSpPr txBox="1"/>
+          <p:nvPr/>
+        </p:nvSpPr>
+        <p:spPr>
+          <a:xfrm>
+            <a:off x="7331075" y="5913755"/>
+            <a:ext cx="1035685" cy="306705"/>
+          </a:xfrm>
+          <a:prstGeom prst="rect">
+            <a:avLst/>
+          </a:prstGeom>
+          <a:noFill/>
+        </p:spPr>
+        <p:txBody>
+          <a:bodyPr wrap="none" rtlCol="0">
+            <a:spAutoFit/>
+          </a:bodyPr>
+          <a:lstStyle/>
+          <a:p>
+            <a:r>
+              <a:rPr lang="" altLang="en-US" sz="1400"/>
+              <a:t>@addUser</a:t>
+            </a:r>
+          </a:p>
+        </p:txBody>
+      </p:sp>
+      <p:sp>
+        <p:nvSpPr>
+          <p:cNvPr id="11" name="Text Box 10">
+            <a:extLst>
+              <a:ext uri="{FF2B5EF4-FFF2-40B4-BE49-F238E27FC236}">
+                <a16:creationId xmlns:a16="http://schemas.microsoft.com/office/drawing/2014/main" id="{CC64710C-7612-4D44-9D9A-FBF9AB76D9D2}"/>
+              </a:ext>
+            </a:extLst>
+          </p:cNvPr>
+          <p:cNvSpPr txBox="1"/>
+          <p:nvPr/>
+        </p:nvSpPr>
+        <p:spPr>
+          <a:xfrm>
+            <a:off x="5679775" y="5746035"/>
+            <a:ext cx="633507" cy="369332"/>
+          </a:xfrm>
+          <a:prstGeom prst="rect">
+            <a:avLst/>
+          </a:prstGeom>
+          <a:noFill/>
+        </p:spPr>
+        <p:txBody>
+          <a:bodyPr wrap="none" rtlCol="0">
+            <a:spAutoFit/>
+          </a:bodyPr>
+          <a:lstStyle/>
+          <a:p>
+            <a:r>
+              <a:rPr lang="" altLang="en-US" dirty="0">
+                <a:solidFill>
+                  <a:srgbClr val="00B050"/>
+                </a:solidFill>
+              </a:rPr>
+              <a:t>user</a:t>
+            </a:r>
+          </a:p>
+        </p:txBody>
+      </p:sp>
+      <p:pic>
+        <p:nvPicPr>
+          <p:cNvPr id="12" name="Picture 11">
+            <a:extLst>
+              <a:ext uri="{FF2B5EF4-FFF2-40B4-BE49-F238E27FC236}">
+                <a16:creationId xmlns:a16="http://schemas.microsoft.com/office/drawing/2014/main" id="{3525CFA0-5B24-4351-9021-5DDB2EB35014}"/>
+              </a:ext>
+            </a:extLst>
+          </p:cNvPr>
+          <p:cNvPicPr>
+            <a:picLocks noChangeAspect="1"/>
+          </p:cNvPicPr>
+          <p:nvPr/>
+        </p:nvPicPr>
+        <p:blipFill>
+          <a:blip r:embed="rId2"/>
+          <a:stretch>
+            <a:fillRect/>
+          </a:stretch>
+        </p:blipFill>
+        <p:spPr>
+          <a:xfrm>
+            <a:off x="5456555" y="878205"/>
+            <a:ext cx="4648835" cy="3785235"/>
+          </a:xfrm>
+          <a:prstGeom prst="rect">
+            <a:avLst/>
+          </a:prstGeom>
+        </p:spPr>
+      </p:pic>
+      <p:sp>
+        <p:nvSpPr>
+          <p:cNvPr id="13" name="Left Brace 12">
+            <a:extLst>
+              <a:ext uri="{FF2B5EF4-FFF2-40B4-BE49-F238E27FC236}">
+                <a16:creationId xmlns:a16="http://schemas.microsoft.com/office/drawing/2014/main" id="{5EC9520D-617F-4AD0-B31C-5E658A696844}"/>
+              </a:ext>
+            </a:extLst>
+          </p:cNvPr>
+          <p:cNvSpPr/>
+          <p:nvPr/>
+        </p:nvSpPr>
+        <p:spPr>
+          <a:xfrm>
+            <a:off x="4869180" y="1623695"/>
+            <a:ext cx="360680" cy="2800350"/>
+          </a:xfrm>
+          <a:prstGeom prst="leftBrace">
+            <a:avLst/>
+          </a:prstGeom>
+        </p:spPr>
+        <p:style>
+          <a:lnRef idx="1">
+            <a:schemeClr val="accent2"/>
+          </a:lnRef>
+          <a:fillRef idx="0">
+            <a:schemeClr val="accent2"/>
+          </a:fillRef>
+          <a:effectRef idx="0">
+            <a:schemeClr val="accent2"/>
+          </a:effectRef>
+          <a:fontRef idx="minor">
+            <a:schemeClr val="tx1"/>
+          </a:fontRef>
+        </p:style>
+        <p:txBody>
+          <a:bodyPr rtlCol="0" anchor="ctr"/>
+          <a:lstStyle/>
+          <a:p>
+            <a:pPr algn="ctr"/>
+            <a:endParaRPr lang="en-US" sz="6600"/>
+          </a:p>
+        </p:txBody>
+      </p:sp>
+      <p:sp>
+        <p:nvSpPr>
+          <p:cNvPr id="14" name="Text Box 16">
+            <a:extLst>
+              <a:ext uri="{FF2B5EF4-FFF2-40B4-BE49-F238E27FC236}">
+                <a16:creationId xmlns:a16="http://schemas.microsoft.com/office/drawing/2014/main" id="{0993311E-2EF8-45FD-A282-5492E99D89BF}"/>
+              </a:ext>
+            </a:extLst>
+          </p:cNvPr>
+          <p:cNvSpPr txBox="1"/>
+          <p:nvPr/>
+        </p:nvSpPr>
+        <p:spPr>
+          <a:xfrm>
+            <a:off x="3303270" y="2839720"/>
+            <a:ext cx="1306195" cy="368300"/>
+          </a:xfrm>
+          <a:prstGeom prst="rect">
+            <a:avLst/>
+          </a:prstGeom>
+          <a:noFill/>
+        </p:spPr>
+        <p:txBody>
+          <a:bodyPr wrap="square" rtlCol="0">
+            <a:spAutoFit/>
+          </a:bodyPr>
+          <a:lstStyle/>
+          <a:p>
+            <a:r>
+              <a:rPr lang="en-US" altLang="en-US" b="1">
+                <a:solidFill>
+                  <a:srgbClr val="00B050"/>
+                </a:solidFill>
+              </a:rPr>
+              <a:t>&lt;</a:t>
+            </a:r>
+            <a:r>
+              <a:rPr lang="" altLang="en-US" b="1">
+                <a:solidFill>
+                  <a:srgbClr val="00B050"/>
+                </a:solidFill>
+              </a:rPr>
+              <a:t>sign-up</a:t>
+            </a:r>
+            <a:r>
+              <a:rPr lang="en-US" altLang="en-US" b="1">
+                <a:solidFill>
+                  <a:srgbClr val="00B050"/>
+                </a:solidFill>
+              </a:rPr>
+              <a:t>&gt;</a:t>
+            </a:r>
+            <a:r>
+              <a:rPr lang="en-US" altLang="en-US" b="1">
+                <a:solidFill>
+                  <a:schemeClr val="accent5">
+                    <a:lumMod val="75000"/>
+                  </a:schemeClr>
+                </a:solidFill>
+              </a:rPr>
+              <a:t> </a:t>
+            </a:r>
+          </a:p>
+        </p:txBody>
+      </p:sp>
+      <p:sp>
+        <p:nvSpPr>
+          <p:cNvPr id="15" name="Rounded Rectangle 17">
+            <a:extLst>
+              <a:ext uri="{FF2B5EF4-FFF2-40B4-BE49-F238E27FC236}">
+                <a16:creationId xmlns:a16="http://schemas.microsoft.com/office/drawing/2014/main" id="{71EFE8B6-51C5-4394-A3D4-534519339558}"/>
+              </a:ext>
+            </a:extLst>
+          </p:cNvPr>
+          <p:cNvSpPr/>
+          <p:nvPr/>
+        </p:nvSpPr>
+        <p:spPr>
+          <a:xfrm>
+            <a:off x="55880" y="5287645"/>
+            <a:ext cx="4387215" cy="1487170"/>
+          </a:xfrm>
+          <a:prstGeom prst="roundRect">
+            <a:avLst/>
+          </a:prstGeom>
+          <a:noFill/>
+          <a:ln w="28575" cmpd="sng">
+            <a:solidFill>
+              <a:srgbClr val="00B050"/>
+            </a:solidFill>
+            <a:prstDash val="sysDot"/>
+          </a:ln>
+        </p:spPr>
+        <p:style>
+          <a:lnRef idx="2">
+            <a:schemeClr val="accent1">
+              <a:shade val="50000"/>
+            </a:schemeClr>
+          </a:lnRef>
+          <a:fillRef idx="1">
+            <a:schemeClr val="accent1"/>
+          </a:fillRef>
+          <a:effectRef idx="0">
+            <a:schemeClr val="accent1"/>
+          </a:effectRef>
+          <a:fontRef idx="minor">
+            <a:schemeClr val="lt1"/>
+          </a:fontRef>
+        </p:style>
+        <p:txBody>
+          <a:bodyPr rtlCol="0" anchor="ctr"/>
+          <a:lstStyle/>
+          <a:p>
+            <a:pPr algn="ctr"/>
+            <a:endParaRPr lang="en-US"/>
+          </a:p>
+        </p:txBody>
+      </p:sp>
+      <p:sp>
+        <p:nvSpPr>
+          <p:cNvPr id="16" name="Text Box 18">
+            <a:extLst>
+              <a:ext uri="{FF2B5EF4-FFF2-40B4-BE49-F238E27FC236}">
+                <a16:creationId xmlns:a16="http://schemas.microsoft.com/office/drawing/2014/main" id="{6192A149-695D-432B-8E57-26B32CADAA3B}"/>
+              </a:ext>
+            </a:extLst>
+          </p:cNvPr>
+          <p:cNvSpPr txBox="1"/>
+          <p:nvPr/>
+        </p:nvSpPr>
+        <p:spPr>
+          <a:xfrm>
+            <a:off x="294640" y="5570220"/>
+            <a:ext cx="4314825" cy="922020"/>
+          </a:xfrm>
+          <a:prstGeom prst="rect">
+            <a:avLst/>
+          </a:prstGeom>
+          <a:noFill/>
+        </p:spPr>
+        <p:txBody>
+          <a:bodyPr wrap="square" rtlCol="0">
+            <a:spAutoFit/>
+          </a:bodyPr>
+          <a:lstStyle/>
+          <a:p>
+            <a:r>
+              <a:rPr lang="" altLang="en-US" b="1" dirty="0">
+                <a:solidFill>
+                  <a:srgbClr val="FF0000"/>
+                </a:solidFill>
+              </a:rPr>
+              <a:t>- Password must be greater than 8</a:t>
+            </a:r>
+          </a:p>
+          <a:p>
+            <a:r>
+              <a:rPr lang="" altLang="en-US" b="1" dirty="0">
+                <a:solidFill>
+                  <a:srgbClr val="FF0000"/>
+                </a:solidFill>
+              </a:rPr>
+              <a:t>- Password must be validated</a:t>
+            </a:r>
+          </a:p>
+          <a:p>
+            <a:r>
+              <a:rPr lang="" altLang="en-US" b="1" dirty="0">
+                <a:solidFill>
+                  <a:srgbClr val="FF0000"/>
+                </a:solidFill>
+              </a:rPr>
+              <a:t>- Email must be availible </a:t>
+            </a:r>
+          </a:p>
+        </p:txBody>
+      </p:sp>
+      <p:sp>
+        <p:nvSpPr>
+          <p:cNvPr id="17" name="TextBox 16">
+            <a:extLst>
+              <a:ext uri="{FF2B5EF4-FFF2-40B4-BE49-F238E27FC236}">
+                <a16:creationId xmlns:a16="http://schemas.microsoft.com/office/drawing/2014/main" id="{9C95469D-631B-4EAD-9862-B48643237597}"/>
+              </a:ext>
+            </a:extLst>
+          </p:cNvPr>
+          <p:cNvSpPr txBox="1"/>
+          <p:nvPr/>
+        </p:nvSpPr>
+        <p:spPr>
+          <a:xfrm>
+            <a:off x="392112" y="519400"/>
+            <a:ext cx="3714750" cy="584775"/>
+          </a:xfrm>
+          <a:prstGeom prst="rect">
+            <a:avLst/>
+          </a:prstGeom>
+          <a:noFill/>
+        </p:spPr>
+        <p:txBody>
+          <a:bodyPr wrap="square" rtlCol="0">
+            <a:spAutoFit/>
+          </a:bodyPr>
+          <a:lstStyle/>
+          <a:p>
+            <a:r>
+              <a:rPr lang="en-US" sz="3200" dirty="0"/>
+              <a:t>Sign up component</a:t>
+            </a:r>
+          </a:p>
+        </p:txBody>
+      </p:sp>
+    </p:spTree>
+    <p:extLst>
+      <p:ext uri="{BB962C8B-B14F-4D97-AF65-F5344CB8AC3E}">
+        <p14:creationId xmlns:p14="http://schemas.microsoft.com/office/powerpoint/2010/main" val="766946960"/>
       </p:ext>
     </p:extLst>
   </p:cSld>

</xml_diff>

<commit_message>
#15 completed menu component document
</commit_message>
<xml_diff>
--- a/docs/COMPONENT-DIAGRAM.pptx
+++ b/docs/COMPONENT-DIAGRAM.pptx
@@ -6,7 +6,7 @@
   </p:sldMasterIdLst>
   <p:sldIdLst>
     <p:sldId id="256" r:id="rId2"/>
-    <p:sldId id="258" r:id="rId3"/>
+    <p:sldId id="261" r:id="rId3"/>
   </p:sldIdLst>
   <p:sldSz cx="12192000" cy="6858000"/>
   <p:notesSz cx="6858000" cy="9144000"/>
@@ -105,6 +105,11 @@
       </a:defRPr>
     </a:lvl9pPr>
   </p:defaultTextStyle>
+  <p:extLst>
+    <p:ext uri="{EFAFB233-063F-42B5-8137-9DF3F51BA10A}">
+      <p15:sldGuideLst xmlns:p15="http://schemas.microsoft.com/office/powerpoint/2012/main"/>
+    </p:ext>
+  </p:extLst>
 </p:presentation>
 </file>
 
@@ -150,10 +155,9 @@
           </a:lstStyle>
           <a:p>
             <a:r>
-              <a:rPr lang="en-US" smtClean="0"/>
+              <a:rPr lang="en-US"/>
               <a:t>Click to edit Master title style</a:t>
             </a:r>
-            <a:endParaRPr lang="en-US"/>
           </a:p>
         </p:txBody>
       </p:sp>
@@ -215,10 +219,9 @@
           </a:lstStyle>
           <a:p>
             <a:r>
-              <a:rPr lang="en-US" smtClean="0"/>
+              <a:rPr lang="en-US"/>
               <a:t>Click to edit Master subtitle style</a:t>
             </a:r>
-            <a:endParaRPr lang="en-US"/>
           </a:p>
         </p:txBody>
       </p:sp>
@@ -239,7 +242,7 @@
           <a:p>
             <a:fld id="{28BE630F-C39C-4DB9-8258-0B48CA067079}" type="datetimeFigureOut">
               <a:rPr lang="en-US" smtClean="0"/>
-              <a:t>11/25/2021</a:t>
+              <a:t>11/29/2021</a:t>
             </a:fld>
             <a:endParaRPr lang="en-US"/>
           </a:p>
@@ -333,10 +336,9 @@
           <a:lstStyle/>
           <a:p>
             <a:r>
-              <a:rPr lang="en-US" smtClean="0"/>
+              <a:rPr lang="en-US"/>
               <a:t>Click to edit Master title style</a:t>
             </a:r>
-            <a:endParaRPr lang="en-US"/>
           </a:p>
         </p:txBody>
       </p:sp>
@@ -357,38 +359,37 @@
           <a:p>
             <a:pPr lvl="0"/>
             <a:r>
-              <a:rPr lang="en-US" smtClean="0"/>
+              <a:rPr lang="en-US"/>
               <a:t>Click to edit Master text styles</a:t>
             </a:r>
           </a:p>
           <a:p>
             <a:pPr lvl="1"/>
             <a:r>
-              <a:rPr lang="en-US" smtClean="0"/>
+              <a:rPr lang="en-US"/>
               <a:t>Second level</a:t>
             </a:r>
           </a:p>
           <a:p>
             <a:pPr lvl="2"/>
             <a:r>
-              <a:rPr lang="en-US" smtClean="0"/>
+              <a:rPr lang="en-US"/>
               <a:t>Third level</a:t>
             </a:r>
           </a:p>
           <a:p>
             <a:pPr lvl="3"/>
             <a:r>
-              <a:rPr lang="en-US" smtClean="0"/>
+              <a:rPr lang="en-US"/>
               <a:t>Fourth level</a:t>
             </a:r>
           </a:p>
           <a:p>
             <a:pPr lvl="4"/>
             <a:r>
-              <a:rPr lang="en-US" smtClean="0"/>
+              <a:rPr lang="en-US"/>
               <a:t>Fifth level</a:t>
             </a:r>
-            <a:endParaRPr lang="en-US"/>
           </a:p>
         </p:txBody>
       </p:sp>
@@ -409,7 +410,7 @@
           <a:p>
             <a:fld id="{28BE630F-C39C-4DB9-8258-0B48CA067079}" type="datetimeFigureOut">
               <a:rPr lang="en-US" smtClean="0"/>
-              <a:t>11/25/2021</a:t>
+              <a:t>11/29/2021</a:t>
             </a:fld>
             <a:endParaRPr lang="en-US"/>
           </a:p>
@@ -508,10 +509,9 @@
           <a:lstStyle/>
           <a:p>
             <a:r>
-              <a:rPr lang="en-US" smtClean="0"/>
+              <a:rPr lang="en-US"/>
               <a:t>Click to edit Master title style</a:t>
             </a:r>
-            <a:endParaRPr lang="en-US"/>
           </a:p>
         </p:txBody>
       </p:sp>
@@ -537,38 +537,37 @@
           <a:p>
             <a:pPr lvl="0"/>
             <a:r>
-              <a:rPr lang="en-US" smtClean="0"/>
+              <a:rPr lang="en-US"/>
               <a:t>Click to edit Master text styles</a:t>
             </a:r>
           </a:p>
           <a:p>
             <a:pPr lvl="1"/>
             <a:r>
-              <a:rPr lang="en-US" smtClean="0"/>
+              <a:rPr lang="en-US"/>
               <a:t>Second level</a:t>
             </a:r>
           </a:p>
           <a:p>
             <a:pPr lvl="2"/>
             <a:r>
-              <a:rPr lang="en-US" smtClean="0"/>
+              <a:rPr lang="en-US"/>
               <a:t>Third level</a:t>
             </a:r>
           </a:p>
           <a:p>
             <a:pPr lvl="3"/>
             <a:r>
-              <a:rPr lang="en-US" smtClean="0"/>
+              <a:rPr lang="en-US"/>
               <a:t>Fourth level</a:t>
             </a:r>
           </a:p>
           <a:p>
             <a:pPr lvl="4"/>
             <a:r>
-              <a:rPr lang="en-US" smtClean="0"/>
+              <a:rPr lang="en-US"/>
               <a:t>Fifth level</a:t>
             </a:r>
-            <a:endParaRPr lang="en-US"/>
           </a:p>
         </p:txBody>
       </p:sp>
@@ -589,7 +588,7 @@
           <a:p>
             <a:fld id="{28BE630F-C39C-4DB9-8258-0B48CA067079}" type="datetimeFigureOut">
               <a:rPr lang="en-US" smtClean="0"/>
-              <a:t>11/25/2021</a:t>
+              <a:t>11/29/2021</a:t>
             </a:fld>
             <a:endParaRPr lang="en-US"/>
           </a:p>
@@ -683,10 +682,9 @@
           <a:lstStyle/>
           <a:p>
             <a:r>
-              <a:rPr lang="en-US" smtClean="0"/>
+              <a:rPr lang="en-US"/>
               <a:t>Click to edit Master title style</a:t>
             </a:r>
-            <a:endParaRPr lang="en-US"/>
           </a:p>
         </p:txBody>
       </p:sp>
@@ -707,38 +705,37 @@
           <a:p>
             <a:pPr lvl="0"/>
             <a:r>
-              <a:rPr lang="en-US" smtClean="0"/>
+              <a:rPr lang="en-US"/>
               <a:t>Click to edit Master text styles</a:t>
             </a:r>
           </a:p>
           <a:p>
             <a:pPr lvl="1"/>
             <a:r>
-              <a:rPr lang="en-US" smtClean="0"/>
+              <a:rPr lang="en-US"/>
               <a:t>Second level</a:t>
             </a:r>
           </a:p>
           <a:p>
             <a:pPr lvl="2"/>
             <a:r>
-              <a:rPr lang="en-US" smtClean="0"/>
+              <a:rPr lang="en-US"/>
               <a:t>Third level</a:t>
             </a:r>
           </a:p>
           <a:p>
             <a:pPr lvl="3"/>
             <a:r>
-              <a:rPr lang="en-US" smtClean="0"/>
+              <a:rPr lang="en-US"/>
               <a:t>Fourth level</a:t>
             </a:r>
           </a:p>
           <a:p>
             <a:pPr lvl="4"/>
             <a:r>
-              <a:rPr lang="en-US" smtClean="0"/>
+              <a:rPr lang="en-US"/>
               <a:t>Fifth level</a:t>
             </a:r>
-            <a:endParaRPr lang="en-US"/>
           </a:p>
         </p:txBody>
       </p:sp>
@@ -759,7 +756,7 @@
           <a:p>
             <a:fld id="{28BE630F-C39C-4DB9-8258-0B48CA067079}" type="datetimeFigureOut">
               <a:rPr lang="en-US" smtClean="0"/>
-              <a:t>11/25/2021</a:t>
+              <a:t>11/29/2021</a:t>
             </a:fld>
             <a:endParaRPr lang="en-US"/>
           </a:p>
@@ -862,10 +859,9 @@
           </a:lstStyle>
           <a:p>
             <a:r>
-              <a:rPr lang="en-US" smtClean="0"/>
+              <a:rPr lang="en-US"/>
               <a:t>Click to edit Master title style</a:t>
             </a:r>
-            <a:endParaRPr lang="en-US"/>
           </a:p>
         </p:txBody>
       </p:sp>
@@ -982,7 +978,7 @@
           <a:p>
             <a:pPr lvl="0"/>
             <a:r>
-              <a:rPr lang="en-US" smtClean="0"/>
+              <a:rPr lang="en-US"/>
               <a:t>Click to edit Master text styles</a:t>
             </a:r>
           </a:p>
@@ -1005,7 +1001,7 @@
           <a:p>
             <a:fld id="{28BE630F-C39C-4DB9-8258-0B48CA067079}" type="datetimeFigureOut">
               <a:rPr lang="en-US" smtClean="0"/>
-              <a:t>11/25/2021</a:t>
+              <a:t>11/29/2021</a:t>
             </a:fld>
             <a:endParaRPr lang="en-US"/>
           </a:p>
@@ -1099,10 +1095,9 @@
           <a:lstStyle/>
           <a:p>
             <a:r>
-              <a:rPr lang="en-US" smtClean="0"/>
+              <a:rPr lang="en-US"/>
               <a:t>Click to edit Master title style</a:t>
             </a:r>
-            <a:endParaRPr lang="en-US"/>
           </a:p>
         </p:txBody>
       </p:sp>
@@ -1128,38 +1123,37 @@
           <a:p>
             <a:pPr lvl="0"/>
             <a:r>
-              <a:rPr lang="en-US" smtClean="0"/>
+              <a:rPr lang="en-US"/>
               <a:t>Click to edit Master text styles</a:t>
             </a:r>
           </a:p>
           <a:p>
             <a:pPr lvl="1"/>
             <a:r>
-              <a:rPr lang="en-US" smtClean="0"/>
+              <a:rPr lang="en-US"/>
               <a:t>Second level</a:t>
             </a:r>
           </a:p>
           <a:p>
             <a:pPr lvl="2"/>
             <a:r>
-              <a:rPr lang="en-US" smtClean="0"/>
+              <a:rPr lang="en-US"/>
               <a:t>Third level</a:t>
             </a:r>
           </a:p>
           <a:p>
             <a:pPr lvl="3"/>
             <a:r>
-              <a:rPr lang="en-US" smtClean="0"/>
+              <a:rPr lang="en-US"/>
               <a:t>Fourth level</a:t>
             </a:r>
           </a:p>
           <a:p>
             <a:pPr lvl="4"/>
             <a:r>
-              <a:rPr lang="en-US" smtClean="0"/>
+              <a:rPr lang="en-US"/>
               <a:t>Fifth level</a:t>
             </a:r>
-            <a:endParaRPr lang="en-US"/>
           </a:p>
         </p:txBody>
       </p:sp>
@@ -1185,38 +1179,37 @@
           <a:p>
             <a:pPr lvl="0"/>
             <a:r>
-              <a:rPr lang="en-US" smtClean="0"/>
+              <a:rPr lang="en-US"/>
               <a:t>Click to edit Master text styles</a:t>
             </a:r>
           </a:p>
           <a:p>
             <a:pPr lvl="1"/>
             <a:r>
-              <a:rPr lang="en-US" smtClean="0"/>
+              <a:rPr lang="en-US"/>
               <a:t>Second level</a:t>
             </a:r>
           </a:p>
           <a:p>
             <a:pPr lvl="2"/>
             <a:r>
-              <a:rPr lang="en-US" smtClean="0"/>
+              <a:rPr lang="en-US"/>
               <a:t>Third level</a:t>
             </a:r>
           </a:p>
           <a:p>
             <a:pPr lvl="3"/>
             <a:r>
-              <a:rPr lang="en-US" smtClean="0"/>
+              <a:rPr lang="en-US"/>
               <a:t>Fourth level</a:t>
             </a:r>
           </a:p>
           <a:p>
             <a:pPr lvl="4"/>
             <a:r>
-              <a:rPr lang="en-US" smtClean="0"/>
+              <a:rPr lang="en-US"/>
               <a:t>Fifth level</a:t>
             </a:r>
-            <a:endParaRPr lang="en-US"/>
           </a:p>
         </p:txBody>
       </p:sp>
@@ -1237,7 +1230,7 @@
           <a:p>
             <a:fld id="{28BE630F-C39C-4DB9-8258-0B48CA067079}" type="datetimeFigureOut">
               <a:rPr lang="en-US" smtClean="0"/>
-              <a:t>11/25/2021</a:t>
+              <a:t>11/29/2021</a:t>
             </a:fld>
             <a:endParaRPr lang="en-US"/>
           </a:p>
@@ -1336,10 +1329,9 @@
           <a:lstStyle/>
           <a:p>
             <a:r>
-              <a:rPr lang="en-US" smtClean="0"/>
+              <a:rPr lang="en-US"/>
               <a:t>Click to edit Master title style</a:t>
             </a:r>
-            <a:endParaRPr lang="en-US"/>
           </a:p>
         </p:txBody>
       </p:sp>
@@ -1402,7 +1394,7 @@
           <a:p>
             <a:pPr lvl="0"/>
             <a:r>
-              <a:rPr lang="en-US" smtClean="0"/>
+              <a:rPr lang="en-US"/>
               <a:t>Click to edit Master text styles</a:t>
             </a:r>
           </a:p>
@@ -1430,38 +1422,37 @@
           <a:p>
             <a:pPr lvl="0"/>
             <a:r>
-              <a:rPr lang="en-US" smtClean="0"/>
+              <a:rPr lang="en-US"/>
               <a:t>Click to edit Master text styles</a:t>
             </a:r>
           </a:p>
           <a:p>
             <a:pPr lvl="1"/>
             <a:r>
-              <a:rPr lang="en-US" smtClean="0"/>
+              <a:rPr lang="en-US"/>
               <a:t>Second level</a:t>
             </a:r>
           </a:p>
           <a:p>
             <a:pPr lvl="2"/>
             <a:r>
-              <a:rPr lang="en-US" smtClean="0"/>
+              <a:rPr lang="en-US"/>
               <a:t>Third level</a:t>
             </a:r>
           </a:p>
           <a:p>
             <a:pPr lvl="3"/>
             <a:r>
-              <a:rPr lang="en-US" smtClean="0"/>
+              <a:rPr lang="en-US"/>
               <a:t>Fourth level</a:t>
             </a:r>
           </a:p>
           <a:p>
             <a:pPr lvl="4"/>
             <a:r>
-              <a:rPr lang="en-US" smtClean="0"/>
+              <a:rPr lang="en-US"/>
               <a:t>Fifth level</a:t>
             </a:r>
-            <a:endParaRPr lang="en-US"/>
           </a:p>
         </p:txBody>
       </p:sp>
@@ -1524,7 +1515,7 @@
           <a:p>
             <a:pPr lvl="0"/>
             <a:r>
-              <a:rPr lang="en-US" smtClean="0"/>
+              <a:rPr lang="en-US"/>
               <a:t>Click to edit Master text styles</a:t>
             </a:r>
           </a:p>
@@ -1552,38 +1543,37 @@
           <a:p>
             <a:pPr lvl="0"/>
             <a:r>
-              <a:rPr lang="en-US" smtClean="0"/>
+              <a:rPr lang="en-US"/>
               <a:t>Click to edit Master text styles</a:t>
             </a:r>
           </a:p>
           <a:p>
             <a:pPr lvl="1"/>
             <a:r>
-              <a:rPr lang="en-US" smtClean="0"/>
+              <a:rPr lang="en-US"/>
               <a:t>Second level</a:t>
             </a:r>
           </a:p>
           <a:p>
             <a:pPr lvl="2"/>
             <a:r>
-              <a:rPr lang="en-US" smtClean="0"/>
+              <a:rPr lang="en-US"/>
               <a:t>Third level</a:t>
             </a:r>
           </a:p>
           <a:p>
             <a:pPr lvl="3"/>
             <a:r>
-              <a:rPr lang="en-US" smtClean="0"/>
+              <a:rPr lang="en-US"/>
               <a:t>Fourth level</a:t>
             </a:r>
           </a:p>
           <a:p>
             <a:pPr lvl="4"/>
             <a:r>
-              <a:rPr lang="en-US" smtClean="0"/>
+              <a:rPr lang="en-US"/>
               <a:t>Fifth level</a:t>
             </a:r>
-            <a:endParaRPr lang="en-US"/>
           </a:p>
         </p:txBody>
       </p:sp>
@@ -1604,7 +1594,7 @@
           <a:p>
             <a:fld id="{28BE630F-C39C-4DB9-8258-0B48CA067079}" type="datetimeFigureOut">
               <a:rPr lang="en-US" smtClean="0"/>
-              <a:t>11/25/2021</a:t>
+              <a:t>11/29/2021</a:t>
             </a:fld>
             <a:endParaRPr lang="en-US"/>
           </a:p>
@@ -1698,10 +1688,9 @@
           <a:lstStyle/>
           <a:p>
             <a:r>
-              <a:rPr lang="en-US" smtClean="0"/>
+              <a:rPr lang="en-US"/>
               <a:t>Click to edit Master title style</a:t>
             </a:r>
-            <a:endParaRPr lang="en-US"/>
           </a:p>
         </p:txBody>
       </p:sp>
@@ -1722,7 +1711,7 @@
           <a:p>
             <a:fld id="{28BE630F-C39C-4DB9-8258-0B48CA067079}" type="datetimeFigureOut">
               <a:rPr lang="en-US" smtClean="0"/>
-              <a:t>11/25/2021</a:t>
+              <a:t>11/29/2021</a:t>
             </a:fld>
             <a:endParaRPr lang="en-US"/>
           </a:p>
@@ -1817,7 +1806,7 @@
           <a:p>
             <a:fld id="{28BE630F-C39C-4DB9-8258-0B48CA067079}" type="datetimeFigureOut">
               <a:rPr lang="en-US" smtClean="0"/>
-              <a:t>11/25/2021</a:t>
+              <a:t>11/29/2021</a:t>
             </a:fld>
             <a:endParaRPr lang="en-US"/>
           </a:p>
@@ -1920,10 +1909,9 @@
           </a:lstStyle>
           <a:p>
             <a:r>
-              <a:rPr lang="en-US" smtClean="0"/>
+              <a:rPr lang="en-US"/>
               <a:t>Click to edit Master title style</a:t>
             </a:r>
-            <a:endParaRPr lang="en-US"/>
           </a:p>
         </p:txBody>
       </p:sp>
@@ -1977,38 +1965,37 @@
           <a:p>
             <a:pPr lvl="0"/>
             <a:r>
-              <a:rPr lang="en-US" smtClean="0"/>
+              <a:rPr lang="en-US"/>
               <a:t>Click to edit Master text styles</a:t>
             </a:r>
           </a:p>
           <a:p>
             <a:pPr lvl="1"/>
             <a:r>
-              <a:rPr lang="en-US" smtClean="0"/>
+              <a:rPr lang="en-US"/>
               <a:t>Second level</a:t>
             </a:r>
           </a:p>
           <a:p>
             <a:pPr lvl="2"/>
             <a:r>
-              <a:rPr lang="en-US" smtClean="0"/>
+              <a:rPr lang="en-US"/>
               <a:t>Third level</a:t>
             </a:r>
           </a:p>
           <a:p>
             <a:pPr lvl="3"/>
             <a:r>
-              <a:rPr lang="en-US" smtClean="0"/>
+              <a:rPr lang="en-US"/>
               <a:t>Fourth level</a:t>
             </a:r>
           </a:p>
           <a:p>
             <a:pPr lvl="4"/>
             <a:r>
-              <a:rPr lang="en-US" smtClean="0"/>
+              <a:rPr lang="en-US"/>
               <a:t>Fifth level</a:t>
             </a:r>
-            <a:endParaRPr lang="en-US"/>
           </a:p>
         </p:txBody>
       </p:sp>
@@ -2071,7 +2058,7 @@
           <a:p>
             <a:pPr lvl="0"/>
             <a:r>
-              <a:rPr lang="en-US" smtClean="0"/>
+              <a:rPr lang="en-US"/>
               <a:t>Click to edit Master text styles</a:t>
             </a:r>
           </a:p>
@@ -2094,7 +2081,7 @@
           <a:p>
             <a:fld id="{28BE630F-C39C-4DB9-8258-0B48CA067079}" type="datetimeFigureOut">
               <a:rPr lang="en-US" smtClean="0"/>
-              <a:t>11/25/2021</a:t>
+              <a:t>11/29/2021</a:t>
             </a:fld>
             <a:endParaRPr lang="en-US"/>
           </a:p>
@@ -2197,10 +2184,9 @@
           </a:lstStyle>
           <a:p>
             <a:r>
-              <a:rPr lang="en-US" smtClean="0"/>
+              <a:rPr lang="en-US"/>
               <a:t>Click to edit Master title style</a:t>
             </a:r>
-            <a:endParaRPr lang="en-US"/>
           </a:p>
         </p:txBody>
       </p:sp>
@@ -2324,7 +2310,7 @@
           <a:p>
             <a:pPr lvl="0"/>
             <a:r>
-              <a:rPr lang="en-US" smtClean="0"/>
+              <a:rPr lang="en-US"/>
               <a:t>Click to edit Master text styles</a:t>
             </a:r>
           </a:p>
@@ -2347,7 +2333,7 @@
           <a:p>
             <a:fld id="{28BE630F-C39C-4DB9-8258-0B48CA067079}" type="datetimeFigureOut">
               <a:rPr lang="en-US" smtClean="0"/>
-              <a:t>11/25/2021</a:t>
+              <a:t>11/29/2021</a:t>
             </a:fld>
             <a:endParaRPr lang="en-US"/>
           </a:p>
@@ -2456,10 +2442,9 @@
           <a:lstStyle/>
           <a:p>
             <a:r>
-              <a:rPr lang="en-US" smtClean="0"/>
+              <a:rPr lang="en-US"/>
               <a:t>Click to edit Master title style</a:t>
             </a:r>
-            <a:endParaRPr lang="en-US"/>
           </a:p>
         </p:txBody>
       </p:sp>
@@ -2490,38 +2475,37 @@
           <a:p>
             <a:pPr lvl="0"/>
             <a:r>
-              <a:rPr lang="en-US" smtClean="0"/>
+              <a:rPr lang="en-US"/>
               <a:t>Click to edit Master text styles</a:t>
             </a:r>
           </a:p>
           <a:p>
             <a:pPr lvl="1"/>
             <a:r>
-              <a:rPr lang="en-US" smtClean="0"/>
+              <a:rPr lang="en-US"/>
               <a:t>Second level</a:t>
             </a:r>
           </a:p>
           <a:p>
             <a:pPr lvl="2"/>
             <a:r>
-              <a:rPr lang="en-US" smtClean="0"/>
+              <a:rPr lang="en-US"/>
               <a:t>Third level</a:t>
             </a:r>
           </a:p>
           <a:p>
             <a:pPr lvl="3"/>
             <a:r>
-              <a:rPr lang="en-US" smtClean="0"/>
+              <a:rPr lang="en-US"/>
               <a:t>Fourth level</a:t>
             </a:r>
           </a:p>
           <a:p>
             <a:pPr lvl="4"/>
             <a:r>
-              <a:rPr lang="en-US" smtClean="0"/>
+              <a:rPr lang="en-US"/>
               <a:t>Fifth level</a:t>
             </a:r>
-            <a:endParaRPr lang="en-US"/>
           </a:p>
         </p:txBody>
       </p:sp>
@@ -2560,7 +2544,7 @@
           <a:p>
             <a:fld id="{28BE630F-C39C-4DB9-8258-0B48CA067079}" type="datetimeFigureOut">
               <a:rPr lang="en-US" smtClean="0"/>
-              <a:t>11/25/2021</a:t>
+              <a:t>11/29/2021</a:t>
             </a:fld>
             <a:endParaRPr lang="en-US"/>
           </a:p>
@@ -3222,73 +3206,37 @@
       </p:grpSpPr>
       <p:sp>
         <p:nvSpPr>
-          <p:cNvPr id="4" name="TextBox 3"/>
-          <p:cNvSpPr txBox="1"/>
+          <p:cNvPr id="8" name="Left Brace 7">
+            <a:extLst>
+              <a:ext uri="{FF2B5EF4-FFF2-40B4-BE49-F238E27FC236}">
+                <a16:creationId xmlns:a16="http://schemas.microsoft.com/office/drawing/2014/main" id="{BB7969B1-156E-42B3-894B-6FB44635FE8E}"/>
+              </a:ext>
+            </a:extLst>
+          </p:cNvPr>
+          <p:cNvSpPr/>
           <p:nvPr/>
         </p:nvSpPr>
         <p:spPr>
           <a:xfrm>
-            <a:off x="1009380" y="479624"/>
-            <a:ext cx="639919" cy="303481"/>
-          </a:xfrm>
-          <a:prstGeom prst="rect">
+            <a:off x="2781529" y="1850431"/>
+            <a:ext cx="237917" cy="581648"/>
+          </a:xfrm>
+          <a:prstGeom prst="leftBrace">
             <a:avLst/>
           </a:prstGeom>
-          <a:noFill/>
-        </p:spPr>
-        <p:txBody>
-          <a:bodyPr wrap="none" rtlCol="0">
-            <a:spAutoFit/>
-          </a:bodyPr>
-          <a:lstStyle/>
-          <a:p>
-            <a:r>
-              <a:rPr lang="en-US" sz="1372" b="1" i="1" dirty="0">
-                <a:solidFill>
-                  <a:srgbClr val="FF0000"/>
-                </a:solidFill>
-              </a:rPr>
-              <a:t>&lt;app&gt;</a:t>
-            </a:r>
-          </a:p>
-        </p:txBody>
-      </p:sp>
-      <p:sp>
-        <p:nvSpPr>
-          <p:cNvPr id="5" name="Rounded Rectangle 4"/>
-          <p:cNvSpPr/>
-          <p:nvPr/>
-        </p:nvSpPr>
-        <p:spPr>
-          <a:xfrm>
-            <a:off x="523323" y="309043"/>
-            <a:ext cx="1650319" cy="1166483"/>
-          </a:xfrm>
-          <a:prstGeom prst="roundRect">
-            <a:avLst/>
-          </a:prstGeom>
-          <a:noFill/>
-          <a:ln>
-            <a:solidFill>
-              <a:srgbClr val="FF0000"/>
-            </a:solidFill>
-            <a:prstDash val="lgDash"/>
-          </a:ln>
         </p:spPr>
         <p:style>
-          <a:lnRef idx="2">
-            <a:schemeClr val="accent1">
-              <a:shade val="50000"/>
-            </a:schemeClr>
+          <a:lnRef idx="1">
+            <a:schemeClr val="accent1"/>
           </a:lnRef>
-          <a:fillRef idx="1">
+          <a:fillRef idx="0">
             <a:schemeClr val="accent1"/>
           </a:fillRef>
           <a:effectRef idx="0">
             <a:schemeClr val="accent1"/>
           </a:effectRef>
           <a:fontRef idx="minor">
-            <a:schemeClr val="lt1"/>
+            <a:schemeClr val="tx1"/>
           </a:fontRef>
         </p:style>
         <p:txBody>
@@ -3296,20 +3244,26 @@
           <a:lstStyle/>
           <a:p>
             <a:pPr algn="ctr"/>
-            <a:endParaRPr lang="en-US" sz="1372"/>
-          </a:p>
-        </p:txBody>
-      </p:sp>
-      <p:sp>
-        <p:nvSpPr>
-          <p:cNvPr id="6" name="TextBox 5"/>
+            <a:endParaRPr lang="en-US" dirty="0"/>
+          </a:p>
+        </p:txBody>
+      </p:sp>
+      <p:sp>
+        <p:nvSpPr>
+          <p:cNvPr id="11" name="Text Box 16">
+            <a:extLst>
+              <a:ext uri="{FF2B5EF4-FFF2-40B4-BE49-F238E27FC236}">
+                <a16:creationId xmlns:a16="http://schemas.microsoft.com/office/drawing/2014/main" id="{BA6F2334-B5F9-4DE2-9815-D6116B4382FA}"/>
+              </a:ext>
+            </a:extLst>
+          </p:cNvPr>
           <p:cNvSpPr txBox="1"/>
           <p:nvPr/>
         </p:nvSpPr>
         <p:spPr>
           <a:xfrm>
-            <a:off x="885053" y="892284"/>
-            <a:ext cx="926857" cy="303481"/>
+            <a:off x="1414325" y="1956589"/>
+            <a:ext cx="1367204" cy="369332"/>
           </a:xfrm>
           <a:prstGeom prst="rect">
             <a:avLst/>
@@ -3317,29 +3271,64 @@
           <a:noFill/>
         </p:spPr>
         <p:txBody>
-          <a:bodyPr wrap="none" rtlCol="0">
+          <a:bodyPr wrap="square" rtlCol="0">
             <a:spAutoFit/>
           </a:bodyPr>
           <a:lstStyle/>
           <a:p>
             <a:r>
-              <a:rPr lang="en-US" sz="1372" dirty="0" smtClean="0"/>
-              <a:t>Students[]</a:t>
-            </a:r>
-            <a:endParaRPr lang="en-US" sz="1372" dirty="0"/>
-          </a:p>
-        </p:txBody>
-      </p:sp>
-      <p:sp>
-        <p:nvSpPr>
-          <p:cNvPr id="7" name="TextBox 6"/>
+              <a:rPr lang="en-US" altLang="en-US" b="1" dirty="0">
+                <a:solidFill>
+                  <a:srgbClr val="00B050"/>
+                </a:solidFill>
+              </a:rPr>
+              <a:t>&lt;</a:t>
+            </a:r>
+            <a:r>
+              <a:rPr lang="" altLang="en-US" b="1" dirty="0">
+                <a:solidFill>
+                  <a:srgbClr val="00B050"/>
+                </a:solidFill>
+              </a:rPr>
+              <a:t>menu-bar</a:t>
+            </a:r>
+            <a:r>
+              <a:rPr lang="en-US" altLang="en-US" b="1" dirty="0">
+                <a:solidFill>
+                  <a:srgbClr val="00B050"/>
+                </a:solidFill>
+              </a:rPr>
+              <a:t>&gt;</a:t>
+            </a:r>
+            <a:r>
+              <a:rPr lang="en-US" altLang="en-US" b="1" dirty="0">
+                <a:solidFill>
+                  <a:schemeClr val="accent5">
+                    <a:lumMod val="75000"/>
+                  </a:schemeClr>
+                </a:solidFill>
+              </a:rPr>
+              <a:t> </a:t>
+            </a:r>
+          </a:p>
+        </p:txBody>
+      </p:sp>
+      <p:sp>
+        <p:nvSpPr>
+          <p:cNvPr id="16" name="Text Box 16">
+            <a:extLst>
+              <a:ext uri="{FF2B5EF4-FFF2-40B4-BE49-F238E27FC236}">
+                <a16:creationId xmlns:a16="http://schemas.microsoft.com/office/drawing/2014/main" id="{233ED0B8-AF0F-4A76-8DB8-4DBFCC467107}"/>
+              </a:ext>
+            </a:extLst>
+          </p:cNvPr>
           <p:cNvSpPr txBox="1"/>
           <p:nvPr/>
         </p:nvSpPr>
         <p:spPr>
           <a:xfrm>
-            <a:off x="119555" y="1627265"/>
-            <a:ext cx="3384709" cy="303481"/>
+            <a:off x="8687325" y="1381420"/>
+            <a:ext cx="1367204" cy="369332"/>
           </a:xfrm>
           <a:prstGeom prst="rect">
             <a:avLst/>
@@ -3347,29 +3336,164 @@
           <a:noFill/>
         </p:spPr>
         <p:txBody>
-          <a:bodyPr wrap="none" rtlCol="0">
+          <a:bodyPr wrap="square" rtlCol="0">
             <a:spAutoFit/>
           </a:bodyPr>
           <a:lstStyle/>
           <a:p>
             <a:r>
-              <a:rPr lang="en-US" sz="1372" dirty="0" smtClean="0"/>
-              <a:t>// A component with a list of student as data</a:t>
-            </a:r>
-            <a:endParaRPr lang="en-US" sz="1372" dirty="0"/>
-          </a:p>
-        </p:txBody>
-      </p:sp>
-      <p:sp>
-        <p:nvSpPr>
-          <p:cNvPr id="8" name="TextBox 7"/>
+              <a:rPr lang="en-US" altLang="en-US" b="1" dirty="0">
+                <a:solidFill>
+                  <a:srgbClr val="00B050"/>
+                </a:solidFill>
+              </a:rPr>
+              <a:t>@signOut</a:t>
+            </a:r>
+            <a:r>
+              <a:rPr lang="en-US" altLang="en-US" b="1" dirty="0">
+                <a:solidFill>
+                  <a:schemeClr val="accent5">
+                    <a:lumMod val="75000"/>
+                  </a:schemeClr>
+                </a:solidFill>
+              </a:rPr>
+              <a:t> </a:t>
+            </a:r>
+          </a:p>
+        </p:txBody>
+      </p:sp>
+      <p:grpSp>
+        <p:nvGrpSpPr>
+          <p:cNvPr id="4" name="Group 3">
+            <a:extLst>
+              <a:ext uri="{FF2B5EF4-FFF2-40B4-BE49-F238E27FC236}">
+                <a16:creationId xmlns:a16="http://schemas.microsoft.com/office/drawing/2014/main" id="{C6FB87CD-B921-4E6C-84ED-B431F819392E}"/>
+              </a:ext>
+            </a:extLst>
+          </p:cNvPr>
+          <p:cNvGrpSpPr/>
+          <p:nvPr/>
+        </p:nvGrpSpPr>
+        <p:grpSpPr>
+          <a:xfrm>
+            <a:off x="3019446" y="3710609"/>
+            <a:ext cx="7235680" cy="781878"/>
+            <a:chOff x="2385391" y="2875722"/>
+            <a:chExt cx="7235680" cy="781878"/>
+          </a:xfrm>
+        </p:grpSpPr>
+        <p:sp>
+          <p:nvSpPr>
+            <p:cNvPr id="2" name="Rectangle: Rounded Corners 1">
+              <a:extLst>
+                <a:ext uri="{FF2B5EF4-FFF2-40B4-BE49-F238E27FC236}">
+                  <a16:creationId xmlns:a16="http://schemas.microsoft.com/office/drawing/2014/main" id="{223D0911-1A32-4004-AB48-D4416DC88E62}"/>
+                </a:ext>
+              </a:extLst>
+            </p:cNvPr>
+            <p:cNvSpPr/>
+            <p:nvPr/>
+          </p:nvSpPr>
+          <p:spPr>
+            <a:xfrm>
+              <a:off x="2385391" y="2875722"/>
+              <a:ext cx="7235680" cy="781878"/>
+            </a:xfrm>
+            <a:prstGeom prst="roundRect">
+              <a:avLst/>
+            </a:prstGeom>
+            <a:noFill/>
+          </p:spPr>
+          <p:style>
+            <a:lnRef idx="2">
+              <a:schemeClr val="accent1">
+                <a:shade val="50000"/>
+              </a:schemeClr>
+            </a:lnRef>
+            <a:fillRef idx="1">
+              <a:schemeClr val="accent1"/>
+            </a:fillRef>
+            <a:effectRef idx="0">
+              <a:schemeClr val="accent1"/>
+            </a:effectRef>
+            <a:fontRef idx="minor">
+              <a:schemeClr val="lt1"/>
+            </a:fontRef>
+          </p:style>
+          <p:txBody>
+            <a:bodyPr rtlCol="0" anchor="ctr"/>
+            <a:lstStyle/>
+            <a:p>
+              <a:pPr algn="ctr"/>
+              <a:endParaRPr lang="en-US"/>
+            </a:p>
+          </p:txBody>
+        </p:sp>
+        <p:sp>
+          <p:nvSpPr>
+            <p:cNvPr id="3" name="TextBox 2">
+              <a:extLst>
+                <a:ext uri="{FF2B5EF4-FFF2-40B4-BE49-F238E27FC236}">
+                  <a16:creationId xmlns:a16="http://schemas.microsoft.com/office/drawing/2014/main" id="{2B86501F-71F3-4C0A-BC2D-ADCE632DDC9E}"/>
+                </a:ext>
+              </a:extLst>
+            </p:cNvPr>
+            <p:cNvSpPr txBox="1"/>
+            <p:nvPr/>
+          </p:nvSpPr>
+          <p:spPr>
+            <a:xfrm>
+              <a:off x="5150209" y="3025823"/>
+              <a:ext cx="1706044" cy="461665"/>
+            </a:xfrm>
+            <a:prstGeom prst="rect">
+              <a:avLst/>
+            </a:prstGeom>
+            <a:noFill/>
+          </p:spPr>
+          <p:txBody>
+            <a:bodyPr wrap="none" rtlCol="0">
+              <a:spAutoFit/>
+            </a:bodyPr>
+            <a:lstStyle/>
+            <a:p>
+              <a:r>
+                <a:rPr lang="en-US" sz="2400" dirty="0">
+                  <a:solidFill>
+                    <a:schemeClr val="accent1">
+                      <a:lumMod val="50000"/>
+                    </a:schemeClr>
+                  </a:solidFill>
+                </a:rPr>
+                <a:t>Router-view</a:t>
+              </a:r>
+              <a:endParaRPr lang="en-US" dirty="0">
+                <a:solidFill>
+                  <a:schemeClr val="accent1">
+                    <a:lumMod val="50000"/>
+                  </a:schemeClr>
+                </a:solidFill>
+              </a:endParaRPr>
+            </a:p>
+          </p:txBody>
+        </p:sp>
+      </p:grpSp>
+      <p:sp>
+        <p:nvSpPr>
+          <p:cNvPr id="12" name="Text Box 16">
+            <a:extLst>
+              <a:ext uri="{FF2B5EF4-FFF2-40B4-BE49-F238E27FC236}">
+                <a16:creationId xmlns:a16="http://schemas.microsoft.com/office/drawing/2014/main" id="{4EF80BB7-1CD2-4F2F-B1CD-0F573661E684}"/>
+              </a:ext>
+            </a:extLst>
+          </p:cNvPr>
           <p:cNvSpPr txBox="1"/>
           <p:nvPr/>
         </p:nvSpPr>
         <p:spPr>
           <a:xfrm>
-            <a:off x="1009380" y="2556074"/>
-            <a:ext cx="639919" cy="303481"/>
+            <a:off x="6545939" y="2614491"/>
+            <a:ext cx="1367204" cy="369332"/>
           </a:xfrm>
           <a:prstGeom prst="rect">
             <a:avLst/>
@@ -3377,79 +3501,48 @@
           <a:noFill/>
         </p:spPr>
         <p:txBody>
-          <a:bodyPr wrap="none" rtlCol="0">
+          <a:bodyPr wrap="square" rtlCol="0">
             <a:spAutoFit/>
           </a:bodyPr>
           <a:lstStyle/>
           <a:p>
             <a:r>
-              <a:rPr lang="en-US" sz="1372" b="1" i="1" dirty="0">
+              <a:rPr lang="en-US" altLang="en-US" b="1" dirty="0">
                 <a:solidFill>
-                  <a:srgbClr val="FF0000"/>
+                  <a:srgbClr val="00B050"/>
                 </a:solidFill>
               </a:rPr>
-              <a:t>&lt;app&gt;</a:t>
-            </a:r>
-          </a:p>
-        </p:txBody>
-      </p:sp>
-      <p:sp>
-        <p:nvSpPr>
-          <p:cNvPr id="9" name="Rounded Rectangle 8"/>
-          <p:cNvSpPr/>
-          <p:nvPr/>
-        </p:nvSpPr>
-        <p:spPr>
-          <a:xfrm>
-            <a:off x="523323" y="2385493"/>
-            <a:ext cx="1650319" cy="1166483"/>
-          </a:xfrm>
-          <a:prstGeom prst="roundRect">
-            <a:avLst/>
-          </a:prstGeom>
-          <a:noFill/>
-          <a:ln>
-            <a:solidFill>
-              <a:srgbClr val="FF0000"/>
-            </a:solidFill>
-            <a:prstDash val="lgDash"/>
-          </a:ln>
-        </p:spPr>
-        <p:style>
-          <a:lnRef idx="2">
-            <a:schemeClr val="accent1">
-              <a:shade val="50000"/>
-            </a:schemeClr>
-          </a:lnRef>
-          <a:fillRef idx="1">
-            <a:schemeClr val="accent1"/>
-          </a:fillRef>
-          <a:effectRef idx="0">
-            <a:schemeClr val="accent1"/>
-          </a:effectRef>
-          <a:fontRef idx="minor">
-            <a:schemeClr val="lt1"/>
-          </a:fontRef>
-        </p:style>
-        <p:txBody>
-          <a:bodyPr rtlCol="0" anchor="ctr"/>
-          <a:lstStyle/>
-          <a:p>
-            <a:pPr algn="ctr"/>
-            <a:endParaRPr lang="en-US" sz="1372"/>
-          </a:p>
-        </p:txBody>
-      </p:sp>
-      <p:sp>
-        <p:nvSpPr>
-          <p:cNvPr id="10" name="TextBox 9"/>
+              <a:t>&lt;category&gt;</a:t>
+            </a:r>
+            <a:r>
+              <a:rPr lang="en-US" altLang="en-US" b="1" dirty="0">
+                <a:solidFill>
+                  <a:schemeClr val="accent5">
+                    <a:lumMod val="75000"/>
+                  </a:schemeClr>
+                </a:solidFill>
+              </a:rPr>
+              <a:t> </a:t>
+            </a:r>
+          </a:p>
+        </p:txBody>
+      </p:sp>
+      <p:sp>
+        <p:nvSpPr>
+          <p:cNvPr id="13" name="Text Box 16">
+            <a:extLst>
+              <a:ext uri="{FF2B5EF4-FFF2-40B4-BE49-F238E27FC236}">
+                <a16:creationId xmlns:a16="http://schemas.microsoft.com/office/drawing/2014/main" id="{84D84EA3-5FD7-45AF-8E01-6946C0E31922}"/>
+              </a:ext>
+            </a:extLst>
+          </p:cNvPr>
           <p:cNvSpPr txBox="1"/>
           <p:nvPr/>
         </p:nvSpPr>
         <p:spPr>
           <a:xfrm>
-            <a:off x="885053" y="2968734"/>
-            <a:ext cx="926857" cy="303481"/>
+            <a:off x="5729815" y="1390192"/>
+            <a:ext cx="1367204" cy="369332"/>
           </a:xfrm>
           <a:prstGeom prst="rect">
             <a:avLst/>
@@ -3457,714 +3550,80 @@
           <a:noFill/>
         </p:spPr>
         <p:txBody>
-          <a:bodyPr wrap="none" rtlCol="0">
+          <a:bodyPr wrap="square" rtlCol="0">
             <a:spAutoFit/>
           </a:bodyPr>
           <a:lstStyle/>
           <a:p>
             <a:r>
-              <a:rPr lang="en-US" sz="1372" dirty="0" smtClean="0"/>
-              <a:t>Students[]</a:t>
-            </a:r>
-            <a:endParaRPr lang="en-US" sz="1372" dirty="0"/>
-          </a:p>
-        </p:txBody>
-      </p:sp>
-      <p:sp>
-        <p:nvSpPr>
-          <p:cNvPr id="11" name="TextBox 10"/>
-          <p:cNvSpPr txBox="1"/>
+              <a:rPr lang="en-US" altLang="en-US" b="1" dirty="0">
+                <a:solidFill>
+                  <a:srgbClr val="00B050"/>
+                </a:solidFill>
+              </a:rPr>
+              <a:t>&lt;my-event&gt;</a:t>
+            </a:r>
+            <a:r>
+              <a:rPr lang="en-US" altLang="en-US" b="1" dirty="0">
+                <a:solidFill>
+                  <a:schemeClr val="accent5">
+                    <a:lumMod val="75000"/>
+                  </a:schemeClr>
+                </a:solidFill>
+              </a:rPr>
+              <a:t> </a:t>
+            </a:r>
+          </a:p>
+        </p:txBody>
+      </p:sp>
+      <p:pic>
+        <p:nvPicPr>
+          <p:cNvPr id="10" name="Picture 9">
+            <a:extLst>
+              <a:ext uri="{FF2B5EF4-FFF2-40B4-BE49-F238E27FC236}">
+                <a16:creationId xmlns:a16="http://schemas.microsoft.com/office/drawing/2014/main" id="{88530523-CFB1-40C7-9161-A4A2F1C3D1CE}"/>
+              </a:ext>
+            </a:extLst>
+          </p:cNvPr>
+          <p:cNvPicPr>
+            <a:picLocks noChangeAspect="1"/>
+          </p:cNvPicPr>
           <p:nvPr/>
-        </p:nvSpPr>
-        <p:spPr>
-          <a:xfrm>
-            <a:off x="464251" y="3703715"/>
-            <a:ext cx="2183996" cy="303481"/>
+        </p:nvPicPr>
+        <p:blipFill>
+          <a:blip r:embed="rId2"/>
+          <a:stretch>
+            <a:fillRect/>
+          </a:stretch>
+        </p:blipFill>
+        <p:spPr>
+          <a:xfrm>
+            <a:off x="2990429" y="1899938"/>
+            <a:ext cx="6524625" cy="476250"/>
           </a:xfrm>
           <a:prstGeom prst="rect">
             <a:avLst/>
           </a:prstGeom>
-          <a:noFill/>
-        </p:spPr>
-        <p:txBody>
-          <a:bodyPr wrap="none" rtlCol="0">
-            <a:spAutoFit/>
-          </a:bodyPr>
-          <a:lstStyle/>
-          <a:p>
-            <a:r>
-              <a:rPr lang="en-US" sz="1372" dirty="0" smtClean="0"/>
-              <a:t>// </a:t>
-            </a:r>
-            <a:r>
-              <a:rPr lang="en-US" sz="1372" dirty="0" smtClean="0">
-                <a:solidFill>
-                  <a:srgbClr val="FF0000"/>
-                </a:solidFill>
-              </a:rPr>
-              <a:t>app</a:t>
-            </a:r>
-            <a:r>
-              <a:rPr lang="en-US" sz="1372" dirty="0" smtClean="0"/>
-              <a:t> send student to </a:t>
-            </a:r>
-            <a:r>
-              <a:rPr lang="en-US" sz="1372" dirty="0" smtClean="0">
-                <a:solidFill>
-                  <a:srgbClr val="FF0000"/>
-                </a:solidFill>
-              </a:rPr>
-              <a:t>card </a:t>
-            </a:r>
-            <a:endParaRPr lang="en-US" sz="1372" dirty="0">
-              <a:solidFill>
-                <a:srgbClr val="FF0000"/>
-              </a:solidFill>
-            </a:endParaRPr>
-          </a:p>
-        </p:txBody>
-      </p:sp>
-      <p:sp>
-        <p:nvSpPr>
-          <p:cNvPr id="12" name="TextBox 11"/>
-          <p:cNvSpPr txBox="1"/>
-          <p:nvPr/>
-        </p:nvSpPr>
-        <p:spPr>
-          <a:xfrm>
-            <a:off x="1009380" y="4803105"/>
-            <a:ext cx="848309" cy="303481"/>
-          </a:xfrm>
-          <a:prstGeom prst="rect">
-            <a:avLst/>
-          </a:prstGeom>
-          <a:noFill/>
-        </p:spPr>
-        <p:txBody>
-          <a:bodyPr wrap="none" rtlCol="0">
-            <a:spAutoFit/>
-          </a:bodyPr>
-          <a:lstStyle/>
-          <a:p>
-            <a:r>
-              <a:rPr lang="en-US" sz="1372" b="1" i="1" dirty="0" smtClean="0">
-                <a:solidFill>
-                  <a:srgbClr val="FF0000"/>
-                </a:solidFill>
-              </a:rPr>
-              <a:t>&lt;parent&gt;</a:t>
-            </a:r>
-            <a:endParaRPr lang="en-US" sz="1372" b="1" i="1" dirty="0">
-              <a:solidFill>
-                <a:srgbClr val="FF0000"/>
-              </a:solidFill>
-            </a:endParaRPr>
-          </a:p>
-        </p:txBody>
-      </p:sp>
-      <p:sp>
-        <p:nvSpPr>
-          <p:cNvPr id="13" name="Rounded Rectangle 12"/>
-          <p:cNvSpPr/>
-          <p:nvPr/>
-        </p:nvSpPr>
-        <p:spPr>
-          <a:xfrm>
-            <a:off x="523323" y="4632524"/>
-            <a:ext cx="1650319" cy="1166483"/>
-          </a:xfrm>
-          <a:prstGeom prst="roundRect">
-            <a:avLst/>
-          </a:prstGeom>
-          <a:noFill/>
-          <a:ln>
-            <a:solidFill>
-              <a:srgbClr val="FF0000"/>
-            </a:solidFill>
-            <a:prstDash val="lgDash"/>
-          </a:ln>
-        </p:spPr>
-        <p:style>
-          <a:lnRef idx="2">
-            <a:schemeClr val="accent1">
-              <a:shade val="50000"/>
-            </a:schemeClr>
-          </a:lnRef>
-          <a:fillRef idx="1">
-            <a:schemeClr val="accent1"/>
-          </a:fillRef>
-          <a:effectRef idx="0">
-            <a:schemeClr val="accent1"/>
-          </a:effectRef>
-          <a:fontRef idx="minor">
-            <a:schemeClr val="lt1"/>
-          </a:fontRef>
-        </p:style>
-        <p:txBody>
-          <a:bodyPr rtlCol="0" anchor="ctr"/>
-          <a:lstStyle/>
-          <a:p>
-            <a:pPr algn="ctr"/>
-            <a:endParaRPr lang="en-US" sz="1372"/>
-          </a:p>
-        </p:txBody>
-      </p:sp>
-      <p:sp>
-        <p:nvSpPr>
-          <p:cNvPr id="14" name="TextBox 13"/>
-          <p:cNvSpPr txBox="1"/>
-          <p:nvPr/>
-        </p:nvSpPr>
-        <p:spPr>
-          <a:xfrm>
-            <a:off x="885053" y="5215765"/>
-            <a:ext cx="926857" cy="303481"/>
-          </a:xfrm>
-          <a:prstGeom prst="rect">
-            <a:avLst/>
-          </a:prstGeom>
-          <a:noFill/>
-        </p:spPr>
-        <p:txBody>
-          <a:bodyPr wrap="none" rtlCol="0">
-            <a:spAutoFit/>
-          </a:bodyPr>
-          <a:lstStyle/>
-          <a:p>
-            <a:r>
-              <a:rPr lang="en-US" sz="1372" dirty="0" smtClean="0"/>
-              <a:t>Students[]</a:t>
-            </a:r>
-            <a:endParaRPr lang="en-US" sz="1372" dirty="0"/>
-          </a:p>
-        </p:txBody>
-      </p:sp>
-      <p:sp>
-        <p:nvSpPr>
-          <p:cNvPr id="15" name="TextBox 14"/>
-          <p:cNvSpPr txBox="1"/>
-          <p:nvPr/>
-        </p:nvSpPr>
-        <p:spPr>
-          <a:xfrm>
-            <a:off x="394083" y="6064417"/>
-            <a:ext cx="3216522" cy="303481"/>
-          </a:xfrm>
-          <a:prstGeom prst="rect">
-            <a:avLst/>
-          </a:prstGeom>
-          <a:noFill/>
-        </p:spPr>
-        <p:txBody>
-          <a:bodyPr wrap="none" rtlCol="0">
-            <a:spAutoFit/>
-          </a:bodyPr>
-          <a:lstStyle/>
-          <a:p>
-            <a:r>
-              <a:rPr lang="en-US" sz="1372" dirty="0" smtClean="0"/>
-              <a:t>// </a:t>
-            </a:r>
-            <a:r>
-              <a:rPr lang="en-US" sz="1372" dirty="0" smtClean="0">
-                <a:solidFill>
-                  <a:srgbClr val="FF0000"/>
-                </a:solidFill>
-              </a:rPr>
-              <a:t>from</a:t>
-            </a:r>
-            <a:r>
-              <a:rPr lang="en-US" sz="1372" dirty="0" smtClean="0"/>
-              <a:t> send the event validated to </a:t>
-            </a:r>
-            <a:r>
-              <a:rPr lang="en-US" sz="1372" dirty="0" smtClean="0">
-                <a:solidFill>
-                  <a:srgbClr val="FF0000"/>
-                </a:solidFill>
-              </a:rPr>
-              <a:t>parent</a:t>
-            </a:r>
-            <a:endParaRPr lang="en-US" sz="1372" dirty="0">
-              <a:solidFill>
-                <a:srgbClr val="FF0000"/>
-              </a:solidFill>
-            </a:endParaRPr>
-          </a:p>
-        </p:txBody>
-      </p:sp>
-      <p:sp>
-        <p:nvSpPr>
-          <p:cNvPr id="17" name="Rounded Rectangle 16"/>
-          <p:cNvSpPr/>
-          <p:nvPr/>
-        </p:nvSpPr>
-        <p:spPr>
-          <a:xfrm>
-            <a:off x="3056973" y="2408786"/>
-            <a:ext cx="1650319" cy="1166483"/>
-          </a:xfrm>
-          <a:prstGeom prst="roundRect">
-            <a:avLst/>
-          </a:prstGeom>
-          <a:noFill/>
-          <a:ln>
-            <a:solidFill>
-              <a:srgbClr val="FF0000"/>
-            </a:solidFill>
-            <a:prstDash val="lgDash"/>
-          </a:ln>
-        </p:spPr>
-        <p:style>
-          <a:lnRef idx="2">
-            <a:schemeClr val="accent1">
-              <a:shade val="50000"/>
-            </a:schemeClr>
-          </a:lnRef>
-          <a:fillRef idx="1">
-            <a:schemeClr val="accent1"/>
-          </a:fillRef>
-          <a:effectRef idx="0">
-            <a:schemeClr val="accent1"/>
-          </a:effectRef>
-          <a:fontRef idx="minor">
-            <a:schemeClr val="lt1"/>
-          </a:fontRef>
-        </p:style>
-        <p:txBody>
-          <a:bodyPr rtlCol="0" anchor="ctr"/>
-          <a:lstStyle/>
-          <a:p>
-            <a:pPr algn="ctr"/>
-            <a:endParaRPr lang="en-US" sz="1372"/>
-          </a:p>
-        </p:txBody>
-      </p:sp>
-      <p:sp>
-        <p:nvSpPr>
-          <p:cNvPr id="18" name="TextBox 17"/>
-          <p:cNvSpPr txBox="1"/>
-          <p:nvPr/>
-        </p:nvSpPr>
-        <p:spPr>
-          <a:xfrm>
-            <a:off x="3418703" y="2992027"/>
-            <a:ext cx="926857" cy="303481"/>
-          </a:xfrm>
-          <a:prstGeom prst="rect">
-            <a:avLst/>
-          </a:prstGeom>
-          <a:noFill/>
-        </p:spPr>
-        <p:txBody>
-          <a:bodyPr wrap="none" rtlCol="0">
-            <a:spAutoFit/>
-          </a:bodyPr>
-          <a:lstStyle/>
-          <a:p>
-            <a:r>
-              <a:rPr lang="en-US" sz="1372" dirty="0" smtClean="0"/>
-              <a:t>Students[]</a:t>
-            </a:r>
-            <a:endParaRPr lang="en-US" sz="1372" dirty="0"/>
-          </a:p>
-        </p:txBody>
-      </p:sp>
-      <p:sp>
-        <p:nvSpPr>
-          <p:cNvPr id="19" name="TextBox 18"/>
-          <p:cNvSpPr txBox="1"/>
-          <p:nvPr/>
-        </p:nvSpPr>
-        <p:spPr>
-          <a:xfrm>
-            <a:off x="3666083" y="4779442"/>
-            <a:ext cx="713657" cy="303481"/>
-          </a:xfrm>
-          <a:prstGeom prst="rect">
-            <a:avLst/>
-          </a:prstGeom>
-          <a:noFill/>
-        </p:spPr>
-        <p:txBody>
-          <a:bodyPr wrap="none" rtlCol="0">
-            <a:spAutoFit/>
-          </a:bodyPr>
-          <a:lstStyle/>
-          <a:p>
-            <a:r>
-              <a:rPr lang="en-US" sz="1372" b="1" i="1" dirty="0" smtClean="0">
-                <a:solidFill>
-                  <a:srgbClr val="FF0000"/>
-                </a:solidFill>
-              </a:rPr>
-              <a:t>&lt;from&gt;</a:t>
-            </a:r>
-            <a:endParaRPr lang="en-US" sz="1372" b="1" i="1" dirty="0">
-              <a:solidFill>
-                <a:srgbClr val="FF0000"/>
-              </a:solidFill>
-            </a:endParaRPr>
-          </a:p>
-        </p:txBody>
-      </p:sp>
-      <p:sp>
-        <p:nvSpPr>
-          <p:cNvPr id="20" name="Rounded Rectangle 19"/>
-          <p:cNvSpPr/>
-          <p:nvPr/>
-        </p:nvSpPr>
-        <p:spPr>
-          <a:xfrm>
-            <a:off x="3180026" y="4608861"/>
-            <a:ext cx="1650319" cy="1166483"/>
-          </a:xfrm>
-          <a:prstGeom prst="roundRect">
-            <a:avLst/>
-          </a:prstGeom>
-          <a:noFill/>
-          <a:ln>
-            <a:solidFill>
-              <a:srgbClr val="FF0000"/>
-            </a:solidFill>
-            <a:prstDash val="lgDash"/>
-          </a:ln>
-        </p:spPr>
-        <p:style>
-          <a:lnRef idx="2">
-            <a:schemeClr val="accent1">
-              <a:shade val="50000"/>
-            </a:schemeClr>
-          </a:lnRef>
-          <a:fillRef idx="1">
-            <a:schemeClr val="accent1"/>
-          </a:fillRef>
-          <a:effectRef idx="0">
-            <a:schemeClr val="accent1"/>
-          </a:effectRef>
-          <a:fontRef idx="minor">
-            <a:schemeClr val="lt1"/>
-          </a:fontRef>
-        </p:style>
-        <p:txBody>
-          <a:bodyPr rtlCol="0" anchor="ctr"/>
-          <a:lstStyle/>
-          <a:p>
-            <a:pPr algn="ctr"/>
-            <a:endParaRPr lang="en-US" sz="1372"/>
-          </a:p>
-        </p:txBody>
-      </p:sp>
-      <p:sp>
-        <p:nvSpPr>
-          <p:cNvPr id="21" name="TextBox 20"/>
-          <p:cNvSpPr txBox="1"/>
-          <p:nvPr/>
-        </p:nvSpPr>
-        <p:spPr>
-          <a:xfrm>
-            <a:off x="3541756" y="5192102"/>
-            <a:ext cx="926857" cy="303481"/>
-          </a:xfrm>
-          <a:prstGeom prst="rect">
-            <a:avLst/>
-          </a:prstGeom>
-          <a:noFill/>
-        </p:spPr>
-        <p:txBody>
-          <a:bodyPr wrap="none" rtlCol="0">
-            <a:spAutoFit/>
-          </a:bodyPr>
-          <a:lstStyle/>
-          <a:p>
-            <a:r>
-              <a:rPr lang="en-US" sz="1372" dirty="0" smtClean="0"/>
-              <a:t>Students[]</a:t>
-            </a:r>
-            <a:endParaRPr lang="en-US" sz="1372" dirty="0"/>
-          </a:p>
-        </p:txBody>
-      </p:sp>
-      <p:sp>
-        <p:nvSpPr>
-          <p:cNvPr id="22" name="Right Arrow 21"/>
-          <p:cNvSpPr/>
-          <p:nvPr/>
-        </p:nvSpPr>
-        <p:spPr>
-          <a:xfrm>
-            <a:off x="2197551" y="2768367"/>
-            <a:ext cx="696809" cy="333683"/>
-          </a:xfrm>
-          <a:prstGeom prst="rightArrow">
-            <a:avLst/>
-          </a:prstGeom>
-          <a:solidFill>
-            <a:schemeClr val="accent6"/>
-          </a:solidFill>
-        </p:spPr>
-        <p:style>
-          <a:lnRef idx="2">
-            <a:schemeClr val="accent1">
-              <a:shade val="50000"/>
-            </a:schemeClr>
-          </a:lnRef>
-          <a:fillRef idx="1">
-            <a:schemeClr val="accent1"/>
-          </a:fillRef>
-          <a:effectRef idx="0">
-            <a:schemeClr val="accent1"/>
-          </a:effectRef>
-          <a:fontRef idx="minor">
-            <a:schemeClr val="lt1"/>
-          </a:fontRef>
-        </p:style>
-        <p:txBody>
-          <a:bodyPr rot="0" spcFirstLastPara="0" vertOverflow="overflow" horzOverflow="overflow" vert="horz" wrap="square" lIns="69681" tIns="34840" rIns="69681" bIns="34840" numCol="1" spcCol="0" rtlCol="0" fromWordArt="0" anchor="ctr" anchorCtr="0" forceAA="0" compatLnSpc="1">
-            <a:prstTxWarp prst="textNoShape">
-              <a:avLst/>
-            </a:prstTxWarp>
-            <a:noAutofit/>
-          </a:bodyPr>
-          <a:lstStyle/>
-          <a:p>
-            <a:pPr algn="ctr"/>
-            <a:endParaRPr lang="en-US" sz="1372"/>
-          </a:p>
-        </p:txBody>
-      </p:sp>
-      <p:sp>
-        <p:nvSpPr>
-          <p:cNvPr id="23" name="TextBox 22"/>
-          <p:cNvSpPr txBox="1"/>
-          <p:nvPr/>
-        </p:nvSpPr>
-        <p:spPr>
-          <a:xfrm>
-            <a:off x="2156606" y="3120474"/>
-            <a:ext cx="735714" cy="303481"/>
-          </a:xfrm>
-          <a:prstGeom prst="rect">
-            <a:avLst/>
-          </a:prstGeom>
-          <a:noFill/>
-        </p:spPr>
-        <p:txBody>
-          <a:bodyPr wrap="none" rtlCol="0">
-            <a:spAutoFit/>
-          </a:bodyPr>
-          <a:lstStyle/>
-          <a:p>
-            <a:r>
-              <a:rPr lang="en-US" sz="1372" dirty="0" smtClean="0"/>
-              <a:t>student</a:t>
-            </a:r>
-            <a:endParaRPr lang="en-US" sz="1372" dirty="0"/>
-          </a:p>
-        </p:txBody>
-      </p:sp>
-      <p:sp>
-        <p:nvSpPr>
-          <p:cNvPr id="24" name="TextBox 23"/>
-          <p:cNvSpPr txBox="1"/>
-          <p:nvPr/>
-        </p:nvSpPr>
-        <p:spPr>
-          <a:xfrm>
-            <a:off x="2188492" y="2550268"/>
-            <a:ext cx="670248" cy="303481"/>
-          </a:xfrm>
-          <a:prstGeom prst="rect">
-            <a:avLst/>
-          </a:prstGeom>
-          <a:noFill/>
-        </p:spPr>
-        <p:txBody>
-          <a:bodyPr wrap="none" rtlCol="0">
-            <a:spAutoFit/>
-          </a:bodyPr>
-          <a:lstStyle/>
-          <a:p>
-            <a:r>
-              <a:rPr lang="en-US" sz="1372" b="1" dirty="0" smtClean="0">
-                <a:solidFill>
-                  <a:schemeClr val="accent6"/>
-                </a:solidFill>
-              </a:rPr>
-              <a:t>PROPS</a:t>
-            </a:r>
-            <a:endParaRPr lang="en-US" sz="1372" b="1" dirty="0">
-              <a:solidFill>
-                <a:schemeClr val="accent6"/>
-              </a:solidFill>
-            </a:endParaRPr>
-          </a:p>
-        </p:txBody>
-      </p:sp>
-      <p:sp>
-        <p:nvSpPr>
-          <p:cNvPr id="25" name="TextBox 24"/>
-          <p:cNvSpPr txBox="1"/>
-          <p:nvPr/>
-        </p:nvSpPr>
-        <p:spPr>
-          <a:xfrm>
-            <a:off x="3562171" y="2587817"/>
-            <a:ext cx="680251" cy="303481"/>
-          </a:xfrm>
-          <a:prstGeom prst="rect">
-            <a:avLst/>
-          </a:prstGeom>
-          <a:noFill/>
-        </p:spPr>
-        <p:txBody>
-          <a:bodyPr wrap="none" rtlCol="0">
-            <a:spAutoFit/>
-          </a:bodyPr>
-          <a:lstStyle/>
-          <a:p>
-            <a:r>
-              <a:rPr lang="en-US" sz="1372" b="1" i="1" dirty="0" smtClean="0">
-                <a:solidFill>
-                  <a:srgbClr val="FF0000"/>
-                </a:solidFill>
-              </a:rPr>
-              <a:t>&lt;card&gt;</a:t>
-            </a:r>
-            <a:endParaRPr lang="en-US" sz="1372" b="1" i="1" dirty="0">
-              <a:solidFill>
-                <a:srgbClr val="FF0000"/>
-              </a:solidFill>
-            </a:endParaRPr>
-          </a:p>
-        </p:txBody>
-      </p:sp>
-      <p:sp>
-        <p:nvSpPr>
-          <p:cNvPr id="26" name="Right Arrow 25"/>
-          <p:cNvSpPr/>
-          <p:nvPr/>
-        </p:nvSpPr>
-        <p:spPr>
-          <a:xfrm flipH="1">
-            <a:off x="2387600" y="5000637"/>
-            <a:ext cx="792424" cy="400041"/>
-          </a:xfrm>
-          <a:prstGeom prst="rightArrow">
-            <a:avLst/>
-          </a:prstGeom>
-          <a:solidFill>
-            <a:srgbClr val="FF0000"/>
-          </a:solidFill>
-        </p:spPr>
-        <p:style>
-          <a:lnRef idx="2">
-            <a:schemeClr val="accent1">
-              <a:shade val="50000"/>
-            </a:schemeClr>
-          </a:lnRef>
-          <a:fillRef idx="1">
-            <a:schemeClr val="accent1"/>
-          </a:fillRef>
-          <a:effectRef idx="0">
-            <a:schemeClr val="accent1"/>
-          </a:effectRef>
-          <a:fontRef idx="minor">
-            <a:schemeClr val="lt1"/>
-          </a:fontRef>
-        </p:style>
-        <p:txBody>
-          <a:bodyPr rot="0" spcFirstLastPara="0" vertOverflow="overflow" horzOverflow="overflow" vert="horz" wrap="square" lIns="69681" tIns="34840" rIns="69681" bIns="34840" numCol="1" spcCol="0" rtlCol="0" fromWordArt="0" anchor="ctr" anchorCtr="0" forceAA="0" compatLnSpc="1">
-            <a:prstTxWarp prst="textNoShape">
-              <a:avLst/>
-            </a:prstTxWarp>
-            <a:noAutofit/>
-          </a:bodyPr>
-          <a:lstStyle/>
-          <a:p>
-            <a:pPr algn="ctr"/>
-            <a:endParaRPr lang="en-US" sz="1372"/>
-          </a:p>
-        </p:txBody>
-      </p:sp>
-      <p:sp>
-        <p:nvSpPr>
-          <p:cNvPr id="27" name="TextBox 26"/>
-          <p:cNvSpPr txBox="1"/>
-          <p:nvPr/>
-        </p:nvSpPr>
-        <p:spPr>
-          <a:xfrm>
-            <a:off x="2523616" y="5336639"/>
-            <a:ext cx="701474" cy="303481"/>
-          </a:xfrm>
-          <a:prstGeom prst="rect">
-            <a:avLst/>
-          </a:prstGeom>
-          <a:noFill/>
-        </p:spPr>
-        <p:txBody>
-          <a:bodyPr wrap="none" rtlCol="0">
-            <a:spAutoFit/>
-          </a:bodyPr>
-          <a:lstStyle/>
-          <a:p>
-            <a:r>
-              <a:rPr lang="en-US" sz="1372" dirty="0" err="1" smtClean="0"/>
-              <a:t>valided</a:t>
-            </a:r>
-            <a:endParaRPr lang="en-US" sz="1372" dirty="0"/>
-          </a:p>
-        </p:txBody>
-      </p:sp>
-      <p:sp>
-        <p:nvSpPr>
-          <p:cNvPr id="28" name="TextBox 27"/>
-          <p:cNvSpPr txBox="1"/>
-          <p:nvPr/>
-        </p:nvSpPr>
-        <p:spPr>
-          <a:xfrm>
-            <a:off x="2574806" y="4621286"/>
-            <a:ext cx="558166" cy="303481"/>
-          </a:xfrm>
-          <a:prstGeom prst="rect">
-            <a:avLst/>
-          </a:prstGeom>
-          <a:noFill/>
-        </p:spPr>
-        <p:txBody>
-          <a:bodyPr wrap="none" rtlCol="0">
-            <a:spAutoFit/>
-          </a:bodyPr>
-          <a:lstStyle/>
-          <a:p>
-            <a:r>
-              <a:rPr lang="en-US" sz="1372" b="1" dirty="0" smtClean="0">
-                <a:solidFill>
-                  <a:srgbClr val="FF0000"/>
-                </a:solidFill>
-              </a:rPr>
-              <a:t>EMIT</a:t>
-            </a:r>
-            <a:endParaRPr lang="en-US" sz="1372" b="1" dirty="0">
-              <a:solidFill>
-                <a:srgbClr val="FF0000"/>
-              </a:solidFill>
-            </a:endParaRPr>
-          </a:p>
-        </p:txBody>
-      </p:sp>
+        </p:spPr>
+      </p:pic>
       <p:cxnSp>
         <p:nvCxnSpPr>
-          <p:cNvPr id="30" name="Straight Connector 29"/>
-          <p:cNvCxnSpPr/>
+          <p:cNvPr id="18" name="Straight Connector 17">
+            <a:extLst>
+              <a:ext uri="{FF2B5EF4-FFF2-40B4-BE49-F238E27FC236}">
+                <a16:creationId xmlns:a16="http://schemas.microsoft.com/office/drawing/2014/main" id="{DA652FAD-2A0B-4691-8E77-F406F345297D}"/>
+              </a:ext>
+            </a:extLst>
+          </p:cNvPr>
+          <p:cNvCxnSpPr>
+            <a:cxnSpLocks/>
+          </p:cNvCxnSpPr>
           <p:nvPr/>
         </p:nvCxnSpPr>
         <p:spPr>
           <a:xfrm>
-            <a:off x="5733143" y="0"/>
-            <a:ext cx="29028" cy="6858000"/>
+            <a:off x="5590132" y="2206518"/>
+            <a:ext cx="0" cy="1423780"/>
           </a:xfrm>
           <a:prstGeom prst="line">
             <a:avLst/>
@@ -4185,335 +3644,130 @@
           </a:fontRef>
         </p:style>
       </p:cxnSp>
-      <p:sp>
-        <p:nvSpPr>
-          <p:cNvPr id="31" name="TextBox 30"/>
-          <p:cNvSpPr txBox="1"/>
+      <p:cxnSp>
+        <p:nvCxnSpPr>
+          <p:cNvPr id="22" name="Straight Connector 21">
+            <a:extLst>
+              <a:ext uri="{FF2B5EF4-FFF2-40B4-BE49-F238E27FC236}">
+                <a16:creationId xmlns:a16="http://schemas.microsoft.com/office/drawing/2014/main" id="{3A05982D-8532-4E6C-8F2D-A03309F4ABF8}"/>
+              </a:ext>
+            </a:extLst>
+          </p:cNvPr>
+          <p:cNvCxnSpPr/>
           <p:nvPr/>
-        </p:nvSpPr>
-        <p:spPr>
-          <a:xfrm>
-            <a:off x="6720447" y="481416"/>
-            <a:ext cx="639919" cy="303481"/>
-          </a:xfrm>
-          <a:prstGeom prst="rect">
+        </p:nvCxnSpPr>
+        <p:spPr>
+          <a:xfrm>
+            <a:off x="9190863" y="1710338"/>
+            <a:ext cx="0" cy="379199"/>
+          </a:xfrm>
+          <a:prstGeom prst="line">
             <a:avLst/>
           </a:prstGeom>
-          <a:noFill/>
-        </p:spPr>
-        <p:txBody>
-          <a:bodyPr wrap="none" rtlCol="0">
-            <a:spAutoFit/>
-          </a:bodyPr>
-          <a:lstStyle/>
-          <a:p>
-            <a:r>
-              <a:rPr lang="en-US" sz="1372" b="1" i="1" dirty="0">
-                <a:solidFill>
-                  <a:srgbClr val="FF0000"/>
-                </a:solidFill>
-              </a:rPr>
-              <a:t>&lt;app&gt;</a:t>
-            </a:r>
-          </a:p>
-        </p:txBody>
-      </p:sp>
-      <p:sp>
-        <p:nvSpPr>
-          <p:cNvPr id="32" name="Rounded Rectangle 31"/>
-          <p:cNvSpPr/>
-          <p:nvPr/>
-        </p:nvSpPr>
-        <p:spPr>
-          <a:xfrm>
-            <a:off x="6234390" y="310835"/>
-            <a:ext cx="1650319" cy="1166483"/>
-          </a:xfrm>
-          <a:prstGeom prst="roundRect">
-            <a:avLst/>
-          </a:prstGeom>
-          <a:noFill/>
-          <a:ln>
-            <a:solidFill>
-              <a:srgbClr val="FF0000"/>
-            </a:solidFill>
-            <a:prstDash val="lgDash"/>
-          </a:ln>
         </p:spPr>
         <p:style>
-          <a:lnRef idx="2">
-            <a:schemeClr val="accent1">
-              <a:shade val="50000"/>
-            </a:schemeClr>
+          <a:lnRef idx="1">
+            <a:schemeClr val="accent1"/>
           </a:lnRef>
-          <a:fillRef idx="1">
+          <a:fillRef idx="0">
             <a:schemeClr val="accent1"/>
           </a:fillRef>
           <a:effectRef idx="0">
             <a:schemeClr val="accent1"/>
           </a:effectRef>
           <a:fontRef idx="minor">
-            <a:schemeClr val="lt1"/>
+            <a:schemeClr val="tx1"/>
           </a:fontRef>
         </p:style>
-        <p:txBody>
-          <a:bodyPr rtlCol="0" anchor="ctr"/>
-          <a:lstStyle/>
-          <a:p>
-            <a:pPr algn="ctr"/>
-            <a:endParaRPr lang="en-US" sz="1372"/>
-          </a:p>
-        </p:txBody>
-      </p:sp>
-      <p:sp>
-        <p:nvSpPr>
-          <p:cNvPr id="33" name="TextBox 32"/>
-          <p:cNvSpPr txBox="1"/>
+      </p:cxnSp>
+      <p:cxnSp>
+        <p:nvCxnSpPr>
+          <p:cNvPr id="23" name="Straight Connector 22">
+            <a:extLst>
+              <a:ext uri="{FF2B5EF4-FFF2-40B4-BE49-F238E27FC236}">
+                <a16:creationId xmlns:a16="http://schemas.microsoft.com/office/drawing/2014/main" id="{E08A30AB-7F34-46CC-AEF8-0B9F345162C4}"/>
+              </a:ext>
+            </a:extLst>
+          </p:cNvPr>
+          <p:cNvCxnSpPr/>
           <p:nvPr/>
-        </p:nvSpPr>
-        <p:spPr>
-          <a:xfrm>
-            <a:off x="6596120" y="894076"/>
-            <a:ext cx="926857" cy="303481"/>
-          </a:xfrm>
-          <a:prstGeom prst="rect">
+        </p:nvCxnSpPr>
+        <p:spPr>
+          <a:xfrm>
+            <a:off x="7097019" y="2325921"/>
+            <a:ext cx="0" cy="379199"/>
+          </a:xfrm>
+          <a:prstGeom prst="line">
             <a:avLst/>
           </a:prstGeom>
-          <a:noFill/>
-        </p:spPr>
-        <p:txBody>
-          <a:bodyPr wrap="none" rtlCol="0">
-            <a:spAutoFit/>
-          </a:bodyPr>
-          <a:lstStyle/>
-          <a:p>
-            <a:r>
-              <a:rPr lang="en-US" sz="1372" dirty="0" smtClean="0"/>
-              <a:t>Students[]</a:t>
-            </a:r>
-            <a:endParaRPr lang="en-US" sz="1372" dirty="0"/>
-          </a:p>
-        </p:txBody>
-      </p:sp>
-      <p:sp>
-        <p:nvSpPr>
-          <p:cNvPr id="34" name="TextBox 33"/>
-          <p:cNvSpPr txBox="1"/>
-          <p:nvPr/>
-        </p:nvSpPr>
-        <p:spPr>
-          <a:xfrm>
-            <a:off x="6234390" y="1613780"/>
-            <a:ext cx="2858411" cy="303481"/>
-          </a:xfrm>
-          <a:prstGeom prst="rect">
-            <a:avLst/>
-          </a:prstGeom>
-          <a:noFill/>
-        </p:spPr>
-        <p:txBody>
-          <a:bodyPr wrap="none" rtlCol="0">
-            <a:spAutoFit/>
-          </a:bodyPr>
-          <a:lstStyle/>
-          <a:p>
-            <a:r>
-              <a:rPr lang="en-US" sz="1372" dirty="0" smtClean="0"/>
-              <a:t>// </a:t>
-            </a:r>
-            <a:r>
-              <a:rPr lang="en-US" sz="1372" dirty="0" smtClean="0">
-                <a:solidFill>
-                  <a:srgbClr val="FF0000"/>
-                </a:solidFill>
-              </a:rPr>
-              <a:t>app</a:t>
-            </a:r>
-            <a:r>
-              <a:rPr lang="en-US" sz="1372" dirty="0" smtClean="0"/>
-              <a:t>  provides students to anymore</a:t>
-            </a:r>
-            <a:endParaRPr lang="en-US" sz="1372" dirty="0">
-              <a:solidFill>
-                <a:srgbClr val="FF0000"/>
-              </a:solidFill>
-            </a:endParaRPr>
-          </a:p>
-        </p:txBody>
-      </p:sp>
-      <p:sp>
-        <p:nvSpPr>
-          <p:cNvPr id="35" name="Rounded Rectangle 34"/>
-          <p:cNvSpPr/>
-          <p:nvPr/>
-        </p:nvSpPr>
-        <p:spPr>
-          <a:xfrm>
-            <a:off x="9792269" y="2129025"/>
-            <a:ext cx="1650319" cy="1166483"/>
-          </a:xfrm>
-          <a:prstGeom prst="roundRect">
-            <a:avLst/>
-          </a:prstGeom>
-          <a:noFill/>
-          <a:ln>
-            <a:solidFill>
-              <a:srgbClr val="FF0000"/>
-            </a:solidFill>
-            <a:prstDash val="lgDash"/>
-          </a:ln>
         </p:spPr>
         <p:style>
-          <a:lnRef idx="2">
-            <a:schemeClr val="accent1">
-              <a:shade val="50000"/>
-            </a:schemeClr>
+          <a:lnRef idx="1">
+            <a:schemeClr val="accent1"/>
           </a:lnRef>
-          <a:fillRef idx="1">
+          <a:fillRef idx="0">
             <a:schemeClr val="accent1"/>
           </a:fillRef>
           <a:effectRef idx="0">
             <a:schemeClr val="accent1"/>
           </a:effectRef>
           <a:fontRef idx="minor">
-            <a:schemeClr val="lt1"/>
+            <a:schemeClr val="tx1"/>
           </a:fontRef>
         </p:style>
-        <p:txBody>
-          <a:bodyPr rtlCol="0" anchor="ctr"/>
-          <a:lstStyle/>
-          <a:p>
-            <a:pPr algn="ctr"/>
-            <a:endParaRPr lang="en-US" sz="1372"/>
-          </a:p>
-        </p:txBody>
-      </p:sp>
-      <p:sp>
-        <p:nvSpPr>
-          <p:cNvPr id="36" name="TextBox 35"/>
-          <p:cNvSpPr txBox="1"/>
+      </p:cxnSp>
+      <p:cxnSp>
+        <p:nvCxnSpPr>
+          <p:cNvPr id="26" name="Straight Connector 25">
+            <a:extLst>
+              <a:ext uri="{FF2B5EF4-FFF2-40B4-BE49-F238E27FC236}">
+                <a16:creationId xmlns:a16="http://schemas.microsoft.com/office/drawing/2014/main" id="{B2426665-5234-4814-A25A-6F76324196CD}"/>
+              </a:ext>
+            </a:extLst>
+          </p:cNvPr>
+          <p:cNvCxnSpPr/>
           <p:nvPr/>
-        </p:nvSpPr>
-        <p:spPr>
-          <a:xfrm>
-            <a:off x="10153999" y="2712266"/>
-            <a:ext cx="926857" cy="303481"/>
-          </a:xfrm>
-          <a:prstGeom prst="rect">
+        </p:nvCxnSpPr>
+        <p:spPr>
+          <a:xfrm>
+            <a:off x="6397879" y="1710338"/>
+            <a:ext cx="0" cy="379199"/>
+          </a:xfrm>
+          <a:prstGeom prst="line">
             <a:avLst/>
           </a:prstGeom>
-          <a:noFill/>
-        </p:spPr>
-        <p:txBody>
-          <a:bodyPr wrap="none" rtlCol="0">
-            <a:spAutoFit/>
-          </a:bodyPr>
-          <a:lstStyle/>
-          <a:p>
-            <a:r>
-              <a:rPr lang="en-US" sz="1372" dirty="0" smtClean="0"/>
-              <a:t>Students[]</a:t>
-            </a:r>
-            <a:endParaRPr lang="en-US" sz="1372" dirty="0"/>
-          </a:p>
-        </p:txBody>
-      </p:sp>
-      <p:sp>
-        <p:nvSpPr>
-          <p:cNvPr id="40" name="TextBox 39"/>
-          <p:cNvSpPr txBox="1"/>
-          <p:nvPr/>
-        </p:nvSpPr>
-        <p:spPr>
-          <a:xfrm>
-            <a:off x="10297467" y="2308056"/>
-            <a:ext cx="819455" cy="303481"/>
-          </a:xfrm>
-          <a:prstGeom prst="rect">
-            <a:avLst/>
-          </a:prstGeom>
-          <a:noFill/>
-        </p:spPr>
-        <p:txBody>
-          <a:bodyPr wrap="none" rtlCol="0">
-            <a:spAutoFit/>
-          </a:bodyPr>
-          <a:lstStyle/>
-          <a:p>
-            <a:r>
-              <a:rPr lang="en-US" sz="1372" b="1" i="1" dirty="0" smtClean="0">
-                <a:solidFill>
-                  <a:srgbClr val="FF0000"/>
-                </a:solidFill>
-              </a:rPr>
-              <a:t>&lt;dialog&gt;</a:t>
-            </a:r>
-            <a:endParaRPr lang="en-US" sz="1372" b="1" i="1" dirty="0">
-              <a:solidFill>
-                <a:srgbClr val="FF0000"/>
-              </a:solidFill>
-            </a:endParaRPr>
-          </a:p>
-        </p:txBody>
-      </p:sp>
-      <p:sp>
-        <p:nvSpPr>
-          <p:cNvPr id="41" name="Right Arrow 40"/>
-          <p:cNvSpPr/>
-          <p:nvPr/>
-        </p:nvSpPr>
-        <p:spPr>
-          <a:xfrm>
-            <a:off x="7846423" y="727951"/>
-            <a:ext cx="696809" cy="333683"/>
-          </a:xfrm>
-          <a:prstGeom prst="rightArrow">
-            <a:avLst/>
-          </a:prstGeom>
-          <a:solidFill>
-            <a:srgbClr val="FFFF00"/>
-          </a:solidFill>
         </p:spPr>
         <p:style>
-          <a:lnRef idx="2">
-            <a:schemeClr val="accent1">
-              <a:shade val="50000"/>
-            </a:schemeClr>
+          <a:lnRef idx="1">
+            <a:schemeClr val="accent1"/>
           </a:lnRef>
-          <a:fillRef idx="1">
+          <a:fillRef idx="0">
             <a:schemeClr val="accent1"/>
           </a:fillRef>
           <a:effectRef idx="0">
             <a:schemeClr val="accent1"/>
           </a:effectRef>
           <a:fontRef idx="minor">
-            <a:schemeClr val="lt1"/>
+            <a:schemeClr val="tx1"/>
           </a:fontRef>
         </p:style>
-        <p:txBody>
-          <a:bodyPr rot="0" spcFirstLastPara="0" vertOverflow="overflow" horzOverflow="overflow" vert="horz" wrap="square" lIns="69681" tIns="34840" rIns="69681" bIns="34840" numCol="1" spcCol="0" rtlCol="0" fromWordArt="0" anchor="ctr" anchorCtr="0" forceAA="0" compatLnSpc="1">
-            <a:prstTxWarp prst="textNoShape">
-              <a:avLst/>
-            </a:prstTxWarp>
-            <a:noAutofit/>
-          </a:bodyPr>
-          <a:lstStyle/>
-          <a:p>
-            <a:pPr algn="ctr"/>
-            <a:endParaRPr lang="en-US" sz="1372"/>
-          </a:p>
-        </p:txBody>
-      </p:sp>
-      <p:sp>
-        <p:nvSpPr>
-          <p:cNvPr id="42" name="TextBox 41"/>
+      </p:cxnSp>
+      <p:sp>
+        <p:nvSpPr>
+          <p:cNvPr id="28" name="Text Box 16">
+            <a:extLst>
+              <a:ext uri="{FF2B5EF4-FFF2-40B4-BE49-F238E27FC236}">
+                <a16:creationId xmlns:a16="http://schemas.microsoft.com/office/drawing/2014/main" id="{F73F71DC-3BFE-4E4B-A05D-D059BBC5CC03}"/>
+              </a:ext>
+            </a:extLst>
+          </p:cNvPr>
           <p:cNvSpPr txBox="1"/>
           <p:nvPr/>
         </p:nvSpPr>
         <p:spPr>
           <a:xfrm>
-            <a:off x="7837364" y="509852"/>
-            <a:ext cx="838756" cy="303481"/>
+            <a:off x="3731956" y="3285386"/>
+            <a:ext cx="1286626" cy="369332"/>
           </a:xfrm>
           <a:prstGeom prst="rect">
             <a:avLst/>
@@ -4521,110 +3775,100 @@
           <a:noFill/>
         </p:spPr>
         <p:txBody>
-          <a:bodyPr wrap="none" rtlCol="0">
+          <a:bodyPr wrap="square" rtlCol="0">
             <a:spAutoFit/>
           </a:bodyPr>
           <a:lstStyle/>
           <a:p>
             <a:r>
-              <a:rPr lang="en-US" sz="1372" b="1" dirty="0">
+              <a:rPr lang="en-US" altLang="en-US" b="1" dirty="0">
                 <a:solidFill>
-                  <a:schemeClr val="accent4"/>
+                  <a:srgbClr val="00B050"/>
                 </a:solidFill>
               </a:rPr>
-              <a:t>PROVIDE</a:t>
-            </a:r>
-          </a:p>
-        </p:txBody>
-      </p:sp>
-      <p:sp>
-        <p:nvSpPr>
-          <p:cNvPr id="43" name="TextBox 42"/>
-          <p:cNvSpPr txBox="1"/>
+              <a:t>/</a:t>
+            </a:r>
+            <a:r>
+              <a:rPr lang="en-US" altLang="en-US" b="1" dirty="0" err="1">
+                <a:solidFill>
+                  <a:srgbClr val="00B050"/>
+                </a:solidFill>
+              </a:rPr>
+              <a:t>myevent</a:t>
+            </a:r>
+            <a:r>
+              <a:rPr lang="en-US" altLang="en-US" b="1" dirty="0">
+                <a:solidFill>
+                  <a:srgbClr val="00B050"/>
+                </a:solidFill>
+              </a:rPr>
+              <a:t> </a:t>
+            </a:r>
+            <a:r>
+              <a:rPr lang="en-US" altLang="en-US" b="1" dirty="0">
+                <a:solidFill>
+                  <a:schemeClr val="accent5">
+                    <a:lumMod val="75000"/>
+                  </a:schemeClr>
+                </a:solidFill>
+              </a:rPr>
+              <a:t> </a:t>
+            </a:r>
+          </a:p>
+        </p:txBody>
+      </p:sp>
+      <p:cxnSp>
+        <p:nvCxnSpPr>
+          <p:cNvPr id="20" name="Straight Connector 19">
+            <a:extLst>
+              <a:ext uri="{FF2B5EF4-FFF2-40B4-BE49-F238E27FC236}">
+                <a16:creationId xmlns:a16="http://schemas.microsoft.com/office/drawing/2014/main" id="{49670019-06E7-40D8-8B87-0EF8726D4916}"/>
+              </a:ext>
+            </a:extLst>
+          </p:cNvPr>
+          <p:cNvCxnSpPr/>
           <p:nvPr/>
-        </p:nvSpPr>
-        <p:spPr>
-          <a:xfrm>
-            <a:off x="7991050" y="1073307"/>
-            <a:ext cx="926857" cy="303481"/>
-          </a:xfrm>
-          <a:prstGeom prst="rect">
+        </p:nvCxnSpPr>
+        <p:spPr>
+          <a:xfrm>
+            <a:off x="3697357" y="2376188"/>
+            <a:ext cx="0" cy="1334421"/>
+          </a:xfrm>
+          <a:prstGeom prst="line">
             <a:avLst/>
           </a:prstGeom>
-          <a:noFill/>
-        </p:spPr>
-        <p:txBody>
-          <a:bodyPr wrap="none" rtlCol="0">
-            <a:spAutoFit/>
-          </a:bodyPr>
-          <a:lstStyle/>
-          <a:p>
-            <a:r>
-              <a:rPr lang="en-US" sz="1372" dirty="0" smtClean="0"/>
-              <a:t>Students[]</a:t>
-            </a:r>
-            <a:endParaRPr lang="en-US" sz="1372" dirty="0"/>
-          </a:p>
-        </p:txBody>
-      </p:sp>
-      <p:sp>
-        <p:nvSpPr>
-          <p:cNvPr id="44" name="Right Arrow 43"/>
-          <p:cNvSpPr/>
-          <p:nvPr/>
-        </p:nvSpPr>
-        <p:spPr>
-          <a:xfrm>
-            <a:off x="9135788" y="2542676"/>
-            <a:ext cx="696809" cy="333683"/>
-          </a:xfrm>
-          <a:prstGeom prst="rightArrow">
-            <a:avLst/>
-          </a:prstGeom>
-          <a:solidFill>
-            <a:srgbClr val="FFFF00"/>
-          </a:solidFill>
         </p:spPr>
         <p:style>
-          <a:lnRef idx="2">
-            <a:schemeClr val="accent1">
-              <a:shade val="50000"/>
-            </a:schemeClr>
+          <a:lnRef idx="1">
+            <a:schemeClr val="accent1"/>
           </a:lnRef>
-          <a:fillRef idx="1">
+          <a:fillRef idx="0">
             <a:schemeClr val="accent1"/>
           </a:fillRef>
           <a:effectRef idx="0">
             <a:schemeClr val="accent1"/>
           </a:effectRef>
           <a:fontRef idx="minor">
-            <a:schemeClr val="lt1"/>
+            <a:schemeClr val="tx1"/>
           </a:fontRef>
         </p:style>
-        <p:txBody>
-          <a:bodyPr rot="0" spcFirstLastPara="0" vertOverflow="overflow" horzOverflow="overflow" vert="horz" wrap="square" lIns="69681" tIns="34840" rIns="69681" bIns="34840" numCol="1" spcCol="0" rtlCol="0" fromWordArt="0" anchor="ctr" anchorCtr="0" forceAA="0" compatLnSpc="1">
-            <a:prstTxWarp prst="textNoShape">
-              <a:avLst/>
-            </a:prstTxWarp>
-            <a:noAutofit/>
-          </a:bodyPr>
-          <a:lstStyle/>
-          <a:p>
-            <a:pPr algn="ctr"/>
-            <a:endParaRPr lang="en-US" sz="1372"/>
-          </a:p>
-        </p:txBody>
-      </p:sp>
-      <p:sp>
-        <p:nvSpPr>
-          <p:cNvPr id="45" name="TextBox 44"/>
+      </p:cxnSp>
+      <p:sp>
+        <p:nvSpPr>
+          <p:cNvPr id="29" name="Text Box 16">
+            <a:extLst>
+              <a:ext uri="{FF2B5EF4-FFF2-40B4-BE49-F238E27FC236}">
+                <a16:creationId xmlns:a16="http://schemas.microsoft.com/office/drawing/2014/main" id="{8DFEA1DF-415B-4FEA-A11E-DCBC0D74E361}"/>
+              </a:ext>
+            </a:extLst>
+          </p:cNvPr>
           <p:cNvSpPr txBox="1"/>
           <p:nvPr/>
         </p:nvSpPr>
         <p:spPr>
           <a:xfrm>
-            <a:off x="9126729" y="2324577"/>
-            <a:ext cx="668645" cy="303481"/>
+            <a:off x="4713216" y="2316164"/>
+            <a:ext cx="1167190" cy="369332"/>
           </a:xfrm>
           <a:prstGeom prst="rect">
             <a:avLst/>
@@ -4632,37 +3876,48 @@
           <a:noFill/>
         </p:spPr>
         <p:txBody>
-          <a:bodyPr wrap="none" rtlCol="0">
+          <a:bodyPr wrap="square" rtlCol="0">
             <a:spAutoFit/>
           </a:bodyPr>
           <a:lstStyle/>
           <a:p>
             <a:r>
-              <a:rPr lang="en-US" sz="1372" b="1" dirty="0" smtClean="0">
+              <a:rPr lang="en-US" altLang="en-US" b="1" dirty="0">
                 <a:solidFill>
-                  <a:schemeClr val="accent4"/>
+                  <a:srgbClr val="00B050"/>
                 </a:solidFill>
               </a:rPr>
-              <a:t>INJECT</a:t>
-            </a:r>
-            <a:endParaRPr lang="en-US" sz="1372" b="1" dirty="0">
-              <a:solidFill>
-                <a:schemeClr val="accent4"/>
-              </a:solidFill>
-            </a:endParaRPr>
-          </a:p>
-        </p:txBody>
-      </p:sp>
-      <p:sp>
-        <p:nvSpPr>
-          <p:cNvPr id="46" name="TextBox 45"/>
+              <a:t>&lt;event&gt;</a:t>
+            </a:r>
+            <a:r>
+              <a:rPr lang="en-US" altLang="en-US" b="1" dirty="0">
+                <a:solidFill>
+                  <a:schemeClr val="accent5">
+                    <a:lumMod val="75000"/>
+                  </a:schemeClr>
+                </a:solidFill>
+              </a:rPr>
+              <a:t> </a:t>
+            </a:r>
+          </a:p>
+        </p:txBody>
+      </p:sp>
+      <p:sp>
+        <p:nvSpPr>
+          <p:cNvPr id="30" name="Text Box 16">
+            <a:extLst>
+              <a:ext uri="{FF2B5EF4-FFF2-40B4-BE49-F238E27FC236}">
+                <a16:creationId xmlns:a16="http://schemas.microsoft.com/office/drawing/2014/main" id="{0393F7EA-C576-40C6-96F6-3B8E52D1633B}"/>
+              </a:ext>
+            </a:extLst>
+          </p:cNvPr>
           <p:cNvSpPr txBox="1"/>
           <p:nvPr/>
         </p:nvSpPr>
         <p:spPr>
           <a:xfrm>
-            <a:off x="9280415" y="2888032"/>
-            <a:ext cx="926857" cy="303481"/>
+            <a:off x="5590132" y="3313332"/>
+            <a:ext cx="1286626" cy="369332"/>
           </a:xfrm>
           <a:prstGeom prst="rect">
             <a:avLst/>
@@ -4670,155 +3925,86 @@
           <a:noFill/>
         </p:spPr>
         <p:txBody>
-          <a:bodyPr wrap="none" rtlCol="0">
+          <a:bodyPr wrap="square" rtlCol="0">
             <a:spAutoFit/>
           </a:bodyPr>
           <a:lstStyle/>
           <a:p>
             <a:r>
-              <a:rPr lang="en-US" sz="1372" dirty="0" smtClean="0"/>
-              <a:t>Students[]</a:t>
-            </a:r>
-            <a:endParaRPr lang="en-US" sz="1372" dirty="0"/>
-          </a:p>
-        </p:txBody>
-      </p:sp>
-      <p:sp>
-        <p:nvSpPr>
-          <p:cNvPr id="47" name="TextBox 46"/>
-          <p:cNvSpPr txBox="1"/>
+              <a:rPr lang="en-US" altLang="en-US" b="1" dirty="0">
+                <a:solidFill>
+                  <a:srgbClr val="00B050"/>
+                </a:solidFill>
+              </a:rPr>
+              <a:t>/event </a:t>
+            </a:r>
+            <a:r>
+              <a:rPr lang="en-US" altLang="en-US" b="1" dirty="0">
+                <a:solidFill>
+                  <a:schemeClr val="accent5">
+                    <a:lumMod val="75000"/>
+                  </a:schemeClr>
+                </a:solidFill>
+              </a:rPr>
+              <a:t> </a:t>
+            </a:r>
+          </a:p>
+        </p:txBody>
+      </p:sp>
+      <p:cxnSp>
+        <p:nvCxnSpPr>
+          <p:cNvPr id="31" name="Straight Connector 30">
+            <a:extLst>
+              <a:ext uri="{FF2B5EF4-FFF2-40B4-BE49-F238E27FC236}">
+                <a16:creationId xmlns:a16="http://schemas.microsoft.com/office/drawing/2014/main" id="{6D17341D-2225-4256-8011-E1DBF9A8882F}"/>
+              </a:ext>
+            </a:extLst>
+          </p:cNvPr>
+          <p:cNvCxnSpPr>
+            <a:cxnSpLocks/>
+          </p:cNvCxnSpPr>
           <p:nvPr/>
-        </p:nvSpPr>
-        <p:spPr>
-          <a:xfrm>
-            <a:off x="8917907" y="3423528"/>
-            <a:ext cx="2987100" cy="303481"/>
-          </a:xfrm>
-          <a:prstGeom prst="rect">
+        </p:nvCxnSpPr>
+        <p:spPr>
+          <a:xfrm>
+            <a:off x="6437636" y="2230938"/>
+            <a:ext cx="0" cy="1423780"/>
+          </a:xfrm>
+          <a:prstGeom prst="line">
             <a:avLst/>
           </a:prstGeom>
-          <a:noFill/>
-        </p:spPr>
-        <p:txBody>
-          <a:bodyPr wrap="none" rtlCol="0">
-            <a:spAutoFit/>
-          </a:bodyPr>
-          <a:lstStyle/>
-          <a:p>
-            <a:r>
-              <a:rPr lang="en-US" sz="1372" dirty="0" smtClean="0"/>
-              <a:t>// </a:t>
-            </a:r>
-            <a:r>
-              <a:rPr lang="en-US" sz="1372" dirty="0" smtClean="0">
-                <a:solidFill>
-                  <a:srgbClr val="FF0000"/>
-                </a:solidFill>
-              </a:rPr>
-              <a:t>dialog </a:t>
-            </a:r>
-            <a:r>
-              <a:rPr lang="en-US" sz="1372" dirty="0" smtClean="0"/>
-              <a:t> gets students from a provider</a:t>
-            </a:r>
-            <a:endParaRPr lang="en-US" sz="1372" dirty="0">
-              <a:solidFill>
-                <a:srgbClr val="FF0000"/>
-              </a:solidFill>
-            </a:endParaRPr>
-          </a:p>
-        </p:txBody>
-      </p:sp>
-      <p:sp>
-        <p:nvSpPr>
-          <p:cNvPr id="48" name="TextBox 47"/>
-          <p:cNvSpPr txBox="1"/>
-          <p:nvPr/>
-        </p:nvSpPr>
-        <p:spPr>
-          <a:xfrm>
-            <a:off x="6561502" y="4305380"/>
-            <a:ext cx="1215717" cy="303481"/>
-          </a:xfrm>
-          <a:prstGeom prst="rect">
-            <a:avLst/>
-          </a:prstGeom>
-          <a:noFill/>
-        </p:spPr>
-        <p:txBody>
-          <a:bodyPr wrap="none" rtlCol="0">
-            <a:spAutoFit/>
-          </a:bodyPr>
-          <a:lstStyle/>
-          <a:p>
-            <a:r>
-              <a:rPr lang="en-US" sz="1372" b="1" i="1" dirty="0">
-                <a:solidFill>
-                  <a:srgbClr val="7030A0"/>
-                </a:solidFill>
-              </a:rPr>
-              <a:t>&lt;router-view&gt;</a:t>
-            </a:r>
-          </a:p>
-        </p:txBody>
-      </p:sp>
-      <p:sp>
-        <p:nvSpPr>
-          <p:cNvPr id="49" name="Rounded Rectangle 48"/>
-          <p:cNvSpPr/>
-          <p:nvPr/>
-        </p:nvSpPr>
-        <p:spPr>
-          <a:xfrm>
-            <a:off x="6217868" y="4170157"/>
-            <a:ext cx="1866945" cy="584334"/>
-          </a:xfrm>
-          <a:prstGeom prst="roundRect">
-            <a:avLst/>
-          </a:prstGeom>
-          <a:noFill/>
-          <a:ln>
-            <a:solidFill>
-              <a:srgbClr val="7030A0"/>
-            </a:solidFill>
-            <a:prstDash val="lgDash"/>
-          </a:ln>
         </p:spPr>
         <p:style>
-          <a:lnRef idx="2">
-            <a:schemeClr val="accent1">
-              <a:shade val="50000"/>
-            </a:schemeClr>
+          <a:lnRef idx="1">
+            <a:schemeClr val="accent1"/>
           </a:lnRef>
-          <a:fillRef idx="1">
+          <a:fillRef idx="0">
             <a:schemeClr val="accent1"/>
           </a:fillRef>
           <a:effectRef idx="0">
             <a:schemeClr val="accent1"/>
           </a:effectRef>
           <a:fontRef idx="minor">
-            <a:schemeClr val="lt1"/>
+            <a:schemeClr val="tx1"/>
           </a:fontRef>
         </p:style>
-        <p:txBody>
-          <a:bodyPr rtlCol="0" anchor="ctr"/>
-          <a:lstStyle/>
-          <a:p>
-            <a:pPr algn="ctr"/>
-            <a:endParaRPr lang="en-US" sz="1372"/>
-          </a:p>
-        </p:txBody>
-      </p:sp>
-      <p:sp>
-        <p:nvSpPr>
-          <p:cNvPr id="50" name="TextBox 49"/>
+      </p:cxnSp>
+      <p:sp>
+        <p:nvSpPr>
+          <p:cNvPr id="32" name="Text Box 16">
+            <a:extLst>
+              <a:ext uri="{FF2B5EF4-FFF2-40B4-BE49-F238E27FC236}">
+                <a16:creationId xmlns:a16="http://schemas.microsoft.com/office/drawing/2014/main" id="{A543D2DB-740D-46ED-9251-131941F915FE}"/>
+              </a:ext>
+            </a:extLst>
+          </p:cNvPr>
           <p:cNvSpPr txBox="1"/>
           <p:nvPr/>
         </p:nvSpPr>
         <p:spPr>
           <a:xfrm>
-            <a:off x="8256742" y="4317805"/>
-            <a:ext cx="2229136" cy="303481"/>
+            <a:off x="6506182" y="3313332"/>
+            <a:ext cx="1286626" cy="369332"/>
           </a:xfrm>
           <a:prstGeom prst="rect">
             <a:avLst/>
@@ -4826,35 +4012,175 @@
           <a:noFill/>
         </p:spPr>
         <p:txBody>
-          <a:bodyPr wrap="none" rtlCol="0">
+          <a:bodyPr wrap="square" rtlCol="0">
             <a:spAutoFit/>
           </a:bodyPr>
           <a:lstStyle/>
           <a:p>
             <a:r>
-              <a:rPr lang="en-US" sz="1372" dirty="0" smtClean="0"/>
-              <a:t>// </a:t>
-            </a:r>
-            <a:r>
-              <a:rPr lang="en-US" sz="1372" dirty="0" err="1" smtClean="0"/>
-              <a:t>Vue</a:t>
-            </a:r>
-            <a:r>
-              <a:rPr lang="en-US" sz="1372" dirty="0" smtClean="0"/>
-              <a:t> JS built-in component</a:t>
-            </a:r>
-            <a:endParaRPr lang="en-US" sz="1372" dirty="0">
-              <a:solidFill>
-                <a:srgbClr val="FF0000"/>
-              </a:solidFill>
-            </a:endParaRPr>
+              <a:rPr lang="en-US" altLang="en-US" b="1" dirty="0">
+                <a:solidFill>
+                  <a:srgbClr val="00B050"/>
+                </a:solidFill>
+              </a:rPr>
+              <a:t>/</a:t>
+            </a:r>
+            <a:r>
+              <a:rPr lang="en-US" altLang="en-US" b="1" dirty="0" err="1">
+                <a:solidFill>
+                  <a:srgbClr val="00B050"/>
+                </a:solidFill>
+              </a:rPr>
+              <a:t>myevent</a:t>
+            </a:r>
+            <a:r>
+              <a:rPr lang="en-US" altLang="en-US" b="1" dirty="0">
+                <a:solidFill>
+                  <a:srgbClr val="00B050"/>
+                </a:solidFill>
+              </a:rPr>
+              <a:t> </a:t>
+            </a:r>
+            <a:r>
+              <a:rPr lang="en-US" altLang="en-US" b="1" dirty="0">
+                <a:solidFill>
+                  <a:schemeClr val="accent5">
+                    <a:lumMod val="75000"/>
+                  </a:schemeClr>
+                </a:solidFill>
+              </a:rPr>
+              <a:t> </a:t>
+            </a:r>
+          </a:p>
+        </p:txBody>
+      </p:sp>
+      <p:cxnSp>
+        <p:nvCxnSpPr>
+          <p:cNvPr id="34" name="Straight Connector 33">
+            <a:extLst>
+              <a:ext uri="{FF2B5EF4-FFF2-40B4-BE49-F238E27FC236}">
+                <a16:creationId xmlns:a16="http://schemas.microsoft.com/office/drawing/2014/main" id="{4D838AA2-D2C0-42B6-8F82-C6A84CF98835}"/>
+              </a:ext>
+            </a:extLst>
+          </p:cNvPr>
+          <p:cNvCxnSpPr/>
+          <p:nvPr/>
+        </p:nvCxnSpPr>
+        <p:spPr>
+          <a:xfrm>
+            <a:off x="7792808" y="2799157"/>
+            <a:ext cx="1205418" cy="0"/>
+          </a:xfrm>
+          <a:prstGeom prst="line">
+            <a:avLst/>
+          </a:prstGeom>
+        </p:spPr>
+        <p:style>
+          <a:lnRef idx="1">
+            <a:schemeClr val="accent1"/>
+          </a:lnRef>
+          <a:fillRef idx="0">
+            <a:schemeClr val="accent1"/>
+          </a:fillRef>
+          <a:effectRef idx="0">
+            <a:schemeClr val="accent1"/>
+          </a:effectRef>
+          <a:fontRef idx="minor">
+            <a:schemeClr val="tx1"/>
+          </a:fontRef>
+        </p:style>
+      </p:cxnSp>
+      <p:cxnSp>
+        <p:nvCxnSpPr>
+          <p:cNvPr id="35" name="Straight Connector 34">
+            <a:extLst>
+              <a:ext uri="{FF2B5EF4-FFF2-40B4-BE49-F238E27FC236}">
+                <a16:creationId xmlns:a16="http://schemas.microsoft.com/office/drawing/2014/main" id="{4ACEE9FB-C53E-40CF-8FD2-102E79F012BE}"/>
+              </a:ext>
+            </a:extLst>
+          </p:cNvPr>
+          <p:cNvCxnSpPr>
+            <a:cxnSpLocks/>
+          </p:cNvCxnSpPr>
+          <p:nvPr/>
+        </p:nvCxnSpPr>
+        <p:spPr>
+          <a:xfrm flipH="1">
+            <a:off x="8986040" y="2802369"/>
+            <a:ext cx="12187" cy="878853"/>
+          </a:xfrm>
+          <a:prstGeom prst="line">
+            <a:avLst/>
+          </a:prstGeom>
+        </p:spPr>
+        <p:style>
+          <a:lnRef idx="1">
+            <a:schemeClr val="accent1"/>
+          </a:lnRef>
+          <a:fillRef idx="0">
+            <a:schemeClr val="accent1"/>
+          </a:fillRef>
+          <a:effectRef idx="0">
+            <a:schemeClr val="accent1"/>
+          </a:effectRef>
+          <a:fontRef idx="minor">
+            <a:schemeClr val="tx1"/>
+          </a:fontRef>
+        </p:style>
+      </p:cxnSp>
+      <p:sp>
+        <p:nvSpPr>
+          <p:cNvPr id="39" name="Text Box 16">
+            <a:extLst>
+              <a:ext uri="{FF2B5EF4-FFF2-40B4-BE49-F238E27FC236}">
+                <a16:creationId xmlns:a16="http://schemas.microsoft.com/office/drawing/2014/main" id="{0D2096F7-4DB0-4E3F-948A-A382F66B9E4D}"/>
+              </a:ext>
+            </a:extLst>
+          </p:cNvPr>
+          <p:cNvSpPr txBox="1"/>
+          <p:nvPr/>
+        </p:nvSpPr>
+        <p:spPr>
+          <a:xfrm>
+            <a:off x="8968500" y="3313332"/>
+            <a:ext cx="1286626" cy="369332"/>
+          </a:xfrm>
+          <a:prstGeom prst="rect">
+            <a:avLst/>
+          </a:prstGeom>
+          <a:noFill/>
+        </p:spPr>
+        <p:txBody>
+          <a:bodyPr wrap="square" rtlCol="0">
+            <a:spAutoFit/>
+          </a:bodyPr>
+          <a:lstStyle/>
+          <a:p>
+            <a:r>
+              <a:rPr lang="en-US" altLang="en-US" b="1" dirty="0">
+                <a:solidFill>
+                  <a:srgbClr val="00B050"/>
+                </a:solidFill>
+              </a:rPr>
+              <a:t>/category </a:t>
+            </a:r>
+            <a:r>
+              <a:rPr lang="en-US" altLang="en-US" b="1" dirty="0">
+                <a:solidFill>
+                  <a:schemeClr val="accent5">
+                    <a:lumMod val="75000"/>
+                  </a:schemeClr>
+                </a:solidFill>
+              </a:rPr>
+              <a:t> </a:t>
+            </a:r>
           </a:p>
         </p:txBody>
       </p:sp>
     </p:spTree>
     <p:extLst>
       <p:ext uri="{BB962C8B-B14F-4D97-AF65-F5344CB8AC3E}">
-        <p14:creationId xmlns:p14="http://schemas.microsoft.com/office/powerpoint/2010/main" val="3109588190"/>
+        <p14:creationId xmlns:p14="http://schemas.microsoft.com/office/powerpoint/2010/main" val="4129007327"/>
       </p:ext>
     </p:extLst>
   </p:cSld>

</xml_diff>

<commit_message>
#15 completed update component for menu bar
</commit_message>
<xml_diff>
--- a/docs/COMPONENT-DIAGRAM.pptx
+++ b/docs/COMPONENT-DIAGRAM.pptx
@@ -5,12 +5,13 @@
     <p:sldMasterId id="2147483648" r:id="rId1"/>
   </p:sldMasterIdLst>
   <p:notesMasterIdLst>
-    <p:notesMasterId r:id="rId5"/>
+    <p:notesMasterId r:id="rId6"/>
   </p:notesMasterIdLst>
   <p:sldIdLst>
     <p:sldId id="256" r:id="rId2"/>
     <p:sldId id="260" r:id="rId3"/>
     <p:sldId id="261" r:id="rId4"/>
+    <p:sldId id="262" r:id="rId5"/>
   </p:sldIdLst>
   <p:sldSz cx="12192000" cy="6858000"/>
   <p:notesSz cx="6858000" cy="9144000"/>
@@ -363,7 +364,7 @@
           <a:p>
             <a:fld id="{E88365C0-BE66-4276-A4A8-B9C86C352910}" type="datetimeFigureOut">
               <a:rPr lang="en-US" smtClean="0"/>
-              <a:t>11/28/2021</a:t>
+              <a:t>11/29/2021</a:t>
             </a:fld>
             <a:endParaRPr lang="en-US"/>
           </a:p>
@@ -820,7 +821,7 @@
           <a:p>
             <a:fld id="{28BE630F-C39C-4DB9-8258-0B48CA067079}" type="datetimeFigureOut">
               <a:rPr lang="en-US" smtClean="0"/>
-              <a:t>11/28/2021</a:t>
+              <a:t>11/29/2021</a:t>
             </a:fld>
             <a:endParaRPr lang="en-US"/>
           </a:p>
@@ -988,7 +989,7 @@
           <a:p>
             <a:fld id="{28BE630F-C39C-4DB9-8258-0B48CA067079}" type="datetimeFigureOut">
               <a:rPr lang="en-US" smtClean="0"/>
-              <a:t>11/28/2021</a:t>
+              <a:t>11/29/2021</a:t>
             </a:fld>
             <a:endParaRPr lang="en-US"/>
           </a:p>
@@ -1166,7 +1167,7 @@
           <a:p>
             <a:fld id="{28BE630F-C39C-4DB9-8258-0B48CA067079}" type="datetimeFigureOut">
               <a:rPr lang="en-US" smtClean="0"/>
-              <a:t>11/28/2021</a:t>
+              <a:t>11/29/2021</a:t>
             </a:fld>
             <a:endParaRPr lang="en-US"/>
           </a:p>
@@ -1334,7 +1335,7 @@
           <a:p>
             <a:fld id="{28BE630F-C39C-4DB9-8258-0B48CA067079}" type="datetimeFigureOut">
               <a:rPr lang="en-US" smtClean="0"/>
-              <a:t>11/28/2021</a:t>
+              <a:t>11/29/2021</a:t>
             </a:fld>
             <a:endParaRPr lang="en-US"/>
           </a:p>
@@ -1579,7 +1580,7 @@
           <a:p>
             <a:fld id="{28BE630F-C39C-4DB9-8258-0B48CA067079}" type="datetimeFigureOut">
               <a:rPr lang="en-US" smtClean="0"/>
-              <a:t>11/28/2021</a:t>
+              <a:t>11/29/2021</a:t>
             </a:fld>
             <a:endParaRPr lang="en-US"/>
           </a:p>
@@ -1808,7 +1809,7 @@
           <a:p>
             <a:fld id="{28BE630F-C39C-4DB9-8258-0B48CA067079}" type="datetimeFigureOut">
               <a:rPr lang="en-US" smtClean="0"/>
-              <a:t>11/28/2021</a:t>
+              <a:t>11/29/2021</a:t>
             </a:fld>
             <a:endParaRPr lang="en-US"/>
           </a:p>
@@ -2172,7 +2173,7 @@
           <a:p>
             <a:fld id="{28BE630F-C39C-4DB9-8258-0B48CA067079}" type="datetimeFigureOut">
               <a:rPr lang="en-US" smtClean="0"/>
-              <a:t>11/28/2021</a:t>
+              <a:t>11/29/2021</a:t>
             </a:fld>
             <a:endParaRPr lang="en-US"/>
           </a:p>
@@ -2289,7 +2290,7 @@
           <a:p>
             <a:fld id="{28BE630F-C39C-4DB9-8258-0B48CA067079}" type="datetimeFigureOut">
               <a:rPr lang="en-US" smtClean="0"/>
-              <a:t>11/28/2021</a:t>
+              <a:t>11/29/2021</a:t>
             </a:fld>
             <a:endParaRPr lang="en-US"/>
           </a:p>
@@ -2384,7 +2385,7 @@
           <a:p>
             <a:fld id="{28BE630F-C39C-4DB9-8258-0B48CA067079}" type="datetimeFigureOut">
               <a:rPr lang="en-US" smtClean="0"/>
-              <a:t>11/28/2021</a:t>
+              <a:t>11/29/2021</a:t>
             </a:fld>
             <a:endParaRPr lang="en-US"/>
           </a:p>
@@ -2659,7 +2660,7 @@
           <a:p>
             <a:fld id="{28BE630F-C39C-4DB9-8258-0B48CA067079}" type="datetimeFigureOut">
               <a:rPr lang="en-US" smtClean="0"/>
-              <a:t>11/28/2021</a:t>
+              <a:t>11/29/2021</a:t>
             </a:fld>
             <a:endParaRPr lang="en-US"/>
           </a:p>
@@ -2911,7 +2912,7 @@
           <a:p>
             <a:fld id="{28BE630F-C39C-4DB9-8258-0B48CA067079}" type="datetimeFigureOut">
               <a:rPr lang="en-US" smtClean="0"/>
-              <a:t>11/28/2021</a:t>
+              <a:t>11/29/2021</a:t>
             </a:fld>
             <a:endParaRPr lang="en-US"/>
           </a:p>
@@ -3122,7 +3123,7 @@
           <a:p>
             <a:fld id="{28BE630F-C39C-4DB9-8258-0B48CA067079}" type="datetimeFigureOut">
               <a:rPr lang="en-US" smtClean="0"/>
-              <a:t>11/28/2021</a:t>
+              <a:t>11/29/2021</a:t>
             </a:fld>
             <a:endParaRPr lang="en-US"/>
           </a:p>
@@ -5002,6 +5003,640 @@
     <p:extLst>
       <p:ext uri="{BB962C8B-B14F-4D97-AF65-F5344CB8AC3E}">
         <p14:creationId xmlns:p14="http://schemas.microsoft.com/office/powerpoint/2010/main" val="766946960"/>
+      </p:ext>
+    </p:extLst>
+  </p:cSld>
+  <p:clrMapOvr>
+    <a:masterClrMapping/>
+  </p:clrMapOvr>
+</p:sld>
+</file>
+
+<file path=ppt/slides/slide4.xml><?xml version="1.0" encoding="utf-8"?>
+<p:sld xmlns:a="http://schemas.openxmlformats.org/drawingml/2006/main" xmlns:r="http://schemas.openxmlformats.org/officeDocument/2006/relationships" xmlns:p="http://schemas.openxmlformats.org/presentationml/2006/main">
+  <p:cSld>
+    <p:spTree>
+      <p:nvGrpSpPr>
+        <p:cNvPr id="1" name=""/>
+        <p:cNvGrpSpPr/>
+        <p:nvPr/>
+      </p:nvGrpSpPr>
+      <p:grpSpPr>
+        <a:xfrm>
+          <a:off x="0" y="0"/>
+          <a:ext cx="0" cy="0"/>
+          <a:chOff x="0" y="0"/>
+          <a:chExt cx="0" cy="0"/>
+        </a:xfrm>
+      </p:grpSpPr>
+      <p:pic>
+        <p:nvPicPr>
+          <p:cNvPr id="4" name="Picture 3">
+            <a:extLst>
+              <a:ext uri="{FF2B5EF4-FFF2-40B4-BE49-F238E27FC236}">
+                <a16:creationId xmlns:a16="http://schemas.microsoft.com/office/drawing/2014/main" id="{8CD27720-DBC6-4829-8815-E66BAA6E0FDD}"/>
+              </a:ext>
+            </a:extLst>
+          </p:cNvPr>
+          <p:cNvPicPr>
+            <a:picLocks noChangeAspect="1"/>
+          </p:cNvPicPr>
+          <p:nvPr/>
+        </p:nvPicPr>
+        <p:blipFill>
+          <a:blip r:embed="rId2"/>
+          <a:stretch>
+            <a:fillRect/>
+          </a:stretch>
+        </p:blipFill>
+        <p:spPr>
+          <a:xfrm>
+            <a:off x="3642069" y="706951"/>
+            <a:ext cx="6524625" cy="476250"/>
+          </a:xfrm>
+          <a:prstGeom prst="rect">
+            <a:avLst/>
+          </a:prstGeom>
+        </p:spPr>
+      </p:pic>
+      <p:sp>
+        <p:nvSpPr>
+          <p:cNvPr id="5" name="Text Box 16">
+            <a:extLst>
+              <a:ext uri="{FF2B5EF4-FFF2-40B4-BE49-F238E27FC236}">
+                <a16:creationId xmlns:a16="http://schemas.microsoft.com/office/drawing/2014/main" id="{8D796387-6E6F-46A6-98DB-EFA280098CB3}"/>
+              </a:ext>
+            </a:extLst>
+          </p:cNvPr>
+          <p:cNvSpPr txBox="1"/>
+          <p:nvPr/>
+        </p:nvSpPr>
+        <p:spPr>
+          <a:xfrm>
+            <a:off x="1733914" y="706951"/>
+            <a:ext cx="1487903" cy="400110"/>
+          </a:xfrm>
+          <a:prstGeom prst="rect">
+            <a:avLst/>
+          </a:prstGeom>
+          <a:noFill/>
+        </p:spPr>
+        <p:txBody>
+          <a:bodyPr wrap="square" rtlCol="0">
+            <a:spAutoFit/>
+          </a:bodyPr>
+          <a:lstStyle/>
+          <a:p>
+            <a:r>
+              <a:rPr lang="en-US" altLang="en-US" sz="2000" b="1" dirty="0"/>
+              <a:t>&lt;</a:t>
+            </a:r>
+            <a:r>
+              <a:rPr lang="" altLang="en-US" sz="2000" b="1" dirty="0"/>
+              <a:t>menu-bar</a:t>
+            </a:r>
+            <a:r>
+              <a:rPr lang="en-US" altLang="en-US" sz="2000" b="1" dirty="0"/>
+              <a:t>&gt; </a:t>
+            </a:r>
+          </a:p>
+        </p:txBody>
+      </p:sp>
+      <p:sp>
+        <p:nvSpPr>
+          <p:cNvPr id="6" name="Left Brace 5">
+            <a:extLst>
+              <a:ext uri="{FF2B5EF4-FFF2-40B4-BE49-F238E27FC236}">
+                <a16:creationId xmlns:a16="http://schemas.microsoft.com/office/drawing/2014/main" id="{A5623FFD-B53A-4464-AC81-81D0DCBC5A40}"/>
+              </a:ext>
+            </a:extLst>
+          </p:cNvPr>
+          <p:cNvSpPr/>
+          <p:nvPr/>
+        </p:nvSpPr>
+        <p:spPr>
+          <a:xfrm>
+            <a:off x="3285110" y="641000"/>
+            <a:ext cx="237917" cy="581648"/>
+          </a:xfrm>
+          <a:prstGeom prst="leftBrace">
+            <a:avLst/>
+          </a:prstGeom>
+        </p:spPr>
+        <p:style>
+          <a:lnRef idx="1">
+            <a:schemeClr val="accent1"/>
+          </a:lnRef>
+          <a:fillRef idx="0">
+            <a:schemeClr val="accent1"/>
+          </a:fillRef>
+          <a:effectRef idx="0">
+            <a:schemeClr val="accent1"/>
+          </a:effectRef>
+          <a:fontRef idx="minor">
+            <a:schemeClr val="tx1"/>
+          </a:fontRef>
+        </p:style>
+        <p:txBody>
+          <a:bodyPr rtlCol="0" anchor="ctr"/>
+          <a:lstStyle/>
+          <a:p>
+            <a:pPr algn="ctr"/>
+            <a:endParaRPr lang="en-US" dirty="0"/>
+          </a:p>
+        </p:txBody>
+      </p:sp>
+      <p:sp>
+        <p:nvSpPr>
+          <p:cNvPr id="7" name="Rectangle: Rounded Corners 6">
+            <a:extLst>
+              <a:ext uri="{FF2B5EF4-FFF2-40B4-BE49-F238E27FC236}">
+                <a16:creationId xmlns:a16="http://schemas.microsoft.com/office/drawing/2014/main" id="{84B990DA-DFED-4139-B714-A3F0310AF6C3}"/>
+              </a:ext>
+            </a:extLst>
+          </p:cNvPr>
+          <p:cNvSpPr/>
+          <p:nvPr/>
+        </p:nvSpPr>
+        <p:spPr>
+          <a:xfrm>
+            <a:off x="7733729" y="2398640"/>
+            <a:ext cx="2894513" cy="2358888"/>
+          </a:xfrm>
+          <a:prstGeom prst="roundRect">
+            <a:avLst/>
+          </a:prstGeom>
+          <a:noFill/>
+        </p:spPr>
+        <p:style>
+          <a:lnRef idx="2">
+            <a:schemeClr val="accent1">
+              <a:shade val="50000"/>
+            </a:schemeClr>
+          </a:lnRef>
+          <a:fillRef idx="1">
+            <a:schemeClr val="accent1"/>
+          </a:fillRef>
+          <a:effectRef idx="0">
+            <a:schemeClr val="accent1"/>
+          </a:effectRef>
+          <a:fontRef idx="minor">
+            <a:schemeClr val="lt1"/>
+          </a:fontRef>
+        </p:style>
+        <p:txBody>
+          <a:bodyPr rtlCol="0" anchor="ctr"/>
+          <a:lstStyle/>
+          <a:p>
+            <a:pPr algn="ctr"/>
+            <a:endParaRPr lang="en-US"/>
+          </a:p>
+        </p:txBody>
+      </p:sp>
+      <p:sp>
+        <p:nvSpPr>
+          <p:cNvPr id="9" name="TextBox 8">
+            <a:extLst>
+              <a:ext uri="{FF2B5EF4-FFF2-40B4-BE49-F238E27FC236}">
+                <a16:creationId xmlns:a16="http://schemas.microsoft.com/office/drawing/2014/main" id="{1525628D-A159-41EB-8A74-AB98D453268C}"/>
+              </a:ext>
+            </a:extLst>
+          </p:cNvPr>
+          <p:cNvSpPr txBox="1"/>
+          <p:nvPr/>
+        </p:nvSpPr>
+        <p:spPr>
+          <a:xfrm>
+            <a:off x="8399361" y="3477905"/>
+            <a:ext cx="1563248" cy="400110"/>
+          </a:xfrm>
+          <a:prstGeom prst="rect">
+            <a:avLst/>
+          </a:prstGeom>
+          <a:noFill/>
+        </p:spPr>
+        <p:txBody>
+          <a:bodyPr wrap="none" rtlCol="0">
+            <a:spAutoFit/>
+          </a:bodyPr>
+          <a:lstStyle/>
+          <a:p>
+            <a:r>
+              <a:rPr lang="en-US" sz="2000" b="1" dirty="0"/>
+              <a:t>&lt;Menu-bar&gt;</a:t>
+            </a:r>
+          </a:p>
+        </p:txBody>
+      </p:sp>
+      <p:sp>
+        <p:nvSpPr>
+          <p:cNvPr id="10" name="Rectangle: Rounded Corners 9">
+            <a:extLst>
+              <a:ext uri="{FF2B5EF4-FFF2-40B4-BE49-F238E27FC236}">
+                <a16:creationId xmlns:a16="http://schemas.microsoft.com/office/drawing/2014/main" id="{06AF3B0F-9D93-41E1-9D13-79423FB2558E}"/>
+              </a:ext>
+            </a:extLst>
+          </p:cNvPr>
+          <p:cNvSpPr/>
+          <p:nvPr/>
+        </p:nvSpPr>
+        <p:spPr>
+          <a:xfrm>
+            <a:off x="2072988" y="2398639"/>
+            <a:ext cx="1683028" cy="2676931"/>
+          </a:xfrm>
+          <a:prstGeom prst="roundRect">
+            <a:avLst/>
+          </a:prstGeom>
+          <a:noFill/>
+        </p:spPr>
+        <p:style>
+          <a:lnRef idx="2">
+            <a:schemeClr val="accent1">
+              <a:shade val="50000"/>
+            </a:schemeClr>
+          </a:lnRef>
+          <a:fillRef idx="1">
+            <a:schemeClr val="accent1"/>
+          </a:fillRef>
+          <a:effectRef idx="0">
+            <a:schemeClr val="accent1"/>
+          </a:effectRef>
+          <a:fontRef idx="minor">
+            <a:schemeClr val="lt1"/>
+          </a:fontRef>
+        </p:style>
+        <p:txBody>
+          <a:bodyPr rtlCol="0" anchor="ctr"/>
+          <a:lstStyle/>
+          <a:p>
+            <a:pPr algn="ctr"/>
+            <a:endParaRPr lang="en-US"/>
+          </a:p>
+        </p:txBody>
+      </p:sp>
+      <p:sp>
+        <p:nvSpPr>
+          <p:cNvPr id="11" name="TextBox 10">
+            <a:extLst>
+              <a:ext uri="{FF2B5EF4-FFF2-40B4-BE49-F238E27FC236}">
+                <a16:creationId xmlns:a16="http://schemas.microsoft.com/office/drawing/2014/main" id="{0C17F76D-B89C-43A1-93A3-20BDDF2458AF}"/>
+              </a:ext>
+            </a:extLst>
+          </p:cNvPr>
+          <p:cNvSpPr txBox="1"/>
+          <p:nvPr/>
+        </p:nvSpPr>
+        <p:spPr>
+          <a:xfrm>
+            <a:off x="2478324" y="2526145"/>
+            <a:ext cx="872355" cy="400110"/>
+          </a:xfrm>
+          <a:prstGeom prst="rect">
+            <a:avLst/>
+          </a:prstGeom>
+          <a:noFill/>
+        </p:spPr>
+        <p:txBody>
+          <a:bodyPr wrap="none" rtlCol="0">
+            <a:spAutoFit/>
+          </a:bodyPr>
+          <a:lstStyle/>
+          <a:p>
+            <a:r>
+              <a:rPr lang="en-US" sz="2000" b="1" dirty="0"/>
+              <a:t>&lt;App&gt;</a:t>
+            </a:r>
+          </a:p>
+        </p:txBody>
+      </p:sp>
+      <p:sp>
+        <p:nvSpPr>
+          <p:cNvPr id="14" name="TextBox 13">
+            <a:extLst>
+              <a:ext uri="{FF2B5EF4-FFF2-40B4-BE49-F238E27FC236}">
+                <a16:creationId xmlns:a16="http://schemas.microsoft.com/office/drawing/2014/main" id="{D56AF67B-047B-450C-8FA2-B3A36011A0C6}"/>
+              </a:ext>
+            </a:extLst>
+          </p:cNvPr>
+          <p:cNvSpPr txBox="1"/>
+          <p:nvPr/>
+        </p:nvSpPr>
+        <p:spPr>
+          <a:xfrm>
+            <a:off x="6522174" y="4017100"/>
+            <a:ext cx="838691" cy="461665"/>
+          </a:xfrm>
+          <a:prstGeom prst="rect">
+            <a:avLst/>
+          </a:prstGeom>
+          <a:noFill/>
+        </p:spPr>
+        <p:txBody>
+          <a:bodyPr wrap="none" rtlCol="0">
+            <a:spAutoFit/>
+          </a:bodyPr>
+          <a:lstStyle/>
+          <a:p>
+            <a:r>
+              <a:rPr lang="en-US" sz="2400" b="1" dirty="0">
+                <a:solidFill>
+                  <a:srgbClr val="FF0000"/>
+                </a:solidFill>
+              </a:rPr>
+              <a:t>EMIT</a:t>
+            </a:r>
+          </a:p>
+        </p:txBody>
+      </p:sp>
+      <p:sp>
+        <p:nvSpPr>
+          <p:cNvPr id="15" name="Arrow: Right 14">
+            <a:extLst>
+              <a:ext uri="{FF2B5EF4-FFF2-40B4-BE49-F238E27FC236}">
+                <a16:creationId xmlns:a16="http://schemas.microsoft.com/office/drawing/2014/main" id="{70FAB011-D358-4CC1-AE14-97F02BAE247A}"/>
+              </a:ext>
+            </a:extLst>
+          </p:cNvPr>
+          <p:cNvSpPr/>
+          <p:nvPr/>
+        </p:nvSpPr>
+        <p:spPr>
+          <a:xfrm>
+            <a:off x="3701331" y="3657880"/>
+            <a:ext cx="1362361" cy="478371"/>
+          </a:xfrm>
+          <a:prstGeom prst="rightArrow">
+            <a:avLst/>
+          </a:prstGeom>
+          <a:solidFill>
+            <a:srgbClr val="00B050"/>
+          </a:solidFill>
+          <a:ln>
+            <a:solidFill>
+              <a:srgbClr val="00B050"/>
+            </a:solidFill>
+          </a:ln>
+        </p:spPr>
+        <p:style>
+          <a:lnRef idx="2">
+            <a:schemeClr val="accent1">
+              <a:shade val="50000"/>
+            </a:schemeClr>
+          </a:lnRef>
+          <a:fillRef idx="1">
+            <a:schemeClr val="accent1"/>
+          </a:fillRef>
+          <a:effectRef idx="0">
+            <a:schemeClr val="accent1"/>
+          </a:effectRef>
+          <a:fontRef idx="minor">
+            <a:schemeClr val="lt1"/>
+          </a:fontRef>
+        </p:style>
+        <p:txBody>
+          <a:bodyPr rtlCol="0" anchor="ctr"/>
+          <a:lstStyle/>
+          <a:p>
+            <a:pPr algn="ctr"/>
+            <a:endParaRPr lang="en-US"/>
+          </a:p>
+        </p:txBody>
+      </p:sp>
+      <p:sp>
+        <p:nvSpPr>
+          <p:cNvPr id="18" name="TextBox 17">
+            <a:extLst>
+              <a:ext uri="{FF2B5EF4-FFF2-40B4-BE49-F238E27FC236}">
+                <a16:creationId xmlns:a16="http://schemas.microsoft.com/office/drawing/2014/main" id="{EE5E5777-F052-4DAA-BFD1-80C31A6849C5}"/>
+              </a:ext>
+            </a:extLst>
+          </p:cNvPr>
+          <p:cNvSpPr txBox="1"/>
+          <p:nvPr/>
+        </p:nvSpPr>
+        <p:spPr>
+          <a:xfrm>
+            <a:off x="3739835" y="4470787"/>
+            <a:ext cx="1362361" cy="369332"/>
+          </a:xfrm>
+          <a:prstGeom prst="rect">
+            <a:avLst/>
+          </a:prstGeom>
+          <a:noFill/>
+        </p:spPr>
+        <p:txBody>
+          <a:bodyPr wrap="none" rtlCol="0">
+            <a:spAutoFit/>
+          </a:bodyPr>
+          <a:lstStyle/>
+          <a:p>
+            <a:r>
+              <a:rPr lang="en-US" b="1" dirty="0">
+                <a:solidFill>
+                  <a:srgbClr val="00B050"/>
+                </a:solidFill>
+              </a:rPr>
+              <a:t>categories</a:t>
+            </a:r>
+            <a:r>
+              <a:rPr lang="en-US" b="1" dirty="0"/>
+              <a:t>[ ]</a:t>
+            </a:r>
+          </a:p>
+        </p:txBody>
+      </p:sp>
+      <p:sp>
+        <p:nvSpPr>
+          <p:cNvPr id="19" name="TextBox 18">
+            <a:extLst>
+              <a:ext uri="{FF2B5EF4-FFF2-40B4-BE49-F238E27FC236}">
+                <a16:creationId xmlns:a16="http://schemas.microsoft.com/office/drawing/2014/main" id="{951A2D66-9160-4E32-BEE6-7DFCB1331C84}"/>
+              </a:ext>
+            </a:extLst>
+          </p:cNvPr>
+          <p:cNvSpPr txBox="1"/>
+          <p:nvPr/>
+        </p:nvSpPr>
+        <p:spPr>
+          <a:xfrm>
+            <a:off x="3857103" y="4136251"/>
+            <a:ext cx="1070549" cy="369332"/>
+          </a:xfrm>
+          <a:prstGeom prst="rect">
+            <a:avLst/>
+          </a:prstGeom>
+          <a:noFill/>
+        </p:spPr>
+        <p:txBody>
+          <a:bodyPr wrap="none" rtlCol="0">
+            <a:spAutoFit/>
+          </a:bodyPr>
+          <a:lstStyle/>
+          <a:p>
+            <a:r>
+              <a:rPr lang="en-US" b="1" dirty="0">
+                <a:solidFill>
+                  <a:srgbClr val="00B050"/>
+                </a:solidFill>
+              </a:rPr>
+              <a:t>Events </a:t>
+            </a:r>
+            <a:r>
+              <a:rPr lang="en-US" b="1" dirty="0"/>
+              <a:t>[ ]</a:t>
+            </a:r>
+          </a:p>
+        </p:txBody>
+      </p:sp>
+      <p:sp>
+        <p:nvSpPr>
+          <p:cNvPr id="24" name="TextBox 23">
+            <a:extLst>
+              <a:ext uri="{FF2B5EF4-FFF2-40B4-BE49-F238E27FC236}">
+                <a16:creationId xmlns:a16="http://schemas.microsoft.com/office/drawing/2014/main" id="{7A2CD14C-C141-482A-BDCC-5BC57D81787B}"/>
+              </a:ext>
+            </a:extLst>
+          </p:cNvPr>
+          <p:cNvSpPr txBox="1"/>
+          <p:nvPr/>
+        </p:nvSpPr>
+        <p:spPr>
+          <a:xfrm>
+            <a:off x="6448377" y="5075570"/>
+            <a:ext cx="1285352" cy="369332"/>
+          </a:xfrm>
+          <a:prstGeom prst="rect">
+            <a:avLst/>
+          </a:prstGeom>
+          <a:noFill/>
+        </p:spPr>
+        <p:txBody>
+          <a:bodyPr wrap="none" rtlCol="0">
+            <a:spAutoFit/>
+          </a:bodyPr>
+          <a:lstStyle/>
+          <a:p>
+            <a:r>
+              <a:rPr lang="en-US" b="1" dirty="0" err="1">
+                <a:solidFill>
+                  <a:srgbClr val="00B050"/>
+                </a:solidFill>
+              </a:rPr>
+              <a:t>loggedOut</a:t>
+            </a:r>
+            <a:r>
+              <a:rPr lang="en-US" b="1" dirty="0">
+                <a:solidFill>
+                  <a:srgbClr val="00B050"/>
+                </a:solidFill>
+              </a:rPr>
+              <a:t>  </a:t>
+            </a:r>
+          </a:p>
+        </p:txBody>
+      </p:sp>
+      <p:sp>
+        <p:nvSpPr>
+          <p:cNvPr id="20" name="Arrow: Right 19">
+            <a:extLst>
+              <a:ext uri="{FF2B5EF4-FFF2-40B4-BE49-F238E27FC236}">
+                <a16:creationId xmlns:a16="http://schemas.microsoft.com/office/drawing/2014/main" id="{28994F6C-AEBE-44A5-BF64-7B17A56ADCF8}"/>
+              </a:ext>
+            </a:extLst>
+          </p:cNvPr>
+          <p:cNvSpPr/>
+          <p:nvPr/>
+        </p:nvSpPr>
+        <p:spPr>
+          <a:xfrm flipH="1">
+            <a:off x="6262671" y="4471578"/>
+            <a:ext cx="1283420" cy="478371"/>
+          </a:xfrm>
+          <a:prstGeom prst="rightArrow">
+            <a:avLst/>
+          </a:prstGeom>
+          <a:solidFill>
+            <a:srgbClr val="FF0000"/>
+          </a:solidFill>
+          <a:ln>
+            <a:solidFill>
+              <a:srgbClr val="FF0000"/>
+            </a:solidFill>
+          </a:ln>
+        </p:spPr>
+        <p:style>
+          <a:lnRef idx="2">
+            <a:schemeClr val="accent1">
+              <a:shade val="50000"/>
+            </a:schemeClr>
+          </a:lnRef>
+          <a:fillRef idx="1">
+            <a:schemeClr val="accent1"/>
+          </a:fillRef>
+          <a:effectRef idx="0">
+            <a:schemeClr val="accent1"/>
+          </a:effectRef>
+          <a:fontRef idx="minor">
+            <a:schemeClr val="lt1"/>
+          </a:fontRef>
+        </p:style>
+        <p:txBody>
+          <a:bodyPr rtlCol="0" anchor="ctr"/>
+          <a:lstStyle/>
+          <a:p>
+            <a:pPr algn="ctr"/>
+            <a:endParaRPr lang="en-US">
+              <a:solidFill>
+                <a:srgbClr val="FF0000"/>
+              </a:solidFill>
+            </a:endParaRPr>
+          </a:p>
+        </p:txBody>
+      </p:sp>
+      <p:sp>
+        <p:nvSpPr>
+          <p:cNvPr id="21" name="TextBox 20">
+            <a:extLst>
+              <a:ext uri="{FF2B5EF4-FFF2-40B4-BE49-F238E27FC236}">
+                <a16:creationId xmlns:a16="http://schemas.microsoft.com/office/drawing/2014/main" id="{FC5130D8-F99A-446B-B2B1-8578AEE222DD}"/>
+              </a:ext>
+            </a:extLst>
+          </p:cNvPr>
+          <p:cNvSpPr txBox="1"/>
+          <p:nvPr/>
+        </p:nvSpPr>
+        <p:spPr>
+          <a:xfrm>
+            <a:off x="3931518" y="3169831"/>
+            <a:ext cx="1036053" cy="461665"/>
+          </a:xfrm>
+          <a:prstGeom prst="rect">
+            <a:avLst/>
+          </a:prstGeom>
+          <a:noFill/>
+        </p:spPr>
+        <p:txBody>
+          <a:bodyPr wrap="none" rtlCol="0">
+            <a:spAutoFit/>
+          </a:bodyPr>
+          <a:lstStyle/>
+          <a:p>
+            <a:r>
+              <a:rPr lang="en-US" sz="2400" b="1" dirty="0">
+                <a:solidFill>
+                  <a:srgbClr val="00B050"/>
+                </a:solidFill>
+              </a:rPr>
+              <a:t>PROPS</a:t>
+            </a:r>
+          </a:p>
+        </p:txBody>
+      </p:sp>
+    </p:spTree>
+    <p:extLst>
+      <p:ext uri="{BB962C8B-B14F-4D97-AF65-F5344CB8AC3E}">
+        <p14:creationId xmlns:p14="http://schemas.microsoft.com/office/powerpoint/2010/main" val="1387352246"/>
       </p:ext>
     </p:extLst>
   </p:cSld>

</xml_diff>

<commit_message>
#33 updated category component diagram
</commit_message>
<xml_diff>
--- a/docs/COMPONENT-DIAGRAM.pptx
+++ b/docs/COMPONENT-DIAGRAM.pptx
@@ -5,13 +5,14 @@
     <p:sldMasterId id="2147483648" r:id="rId1"/>
   </p:sldMasterIdLst>
   <p:notesMasterIdLst>
-    <p:notesMasterId r:id="rId6"/>
+    <p:notesMasterId r:id="rId7"/>
   </p:notesMasterIdLst>
   <p:sldIdLst>
     <p:sldId id="256" r:id="rId2"/>
     <p:sldId id="260" r:id="rId3"/>
     <p:sldId id="261" r:id="rId4"/>
     <p:sldId id="262" r:id="rId5"/>
+    <p:sldId id="263" r:id="rId6"/>
   </p:sldIdLst>
   <p:sldSz cx="12192000" cy="6858000"/>
   <p:notesSz cx="6858000" cy="9144000"/>
@@ -364,7 +365,7 @@
           <a:p>
             <a:fld id="{E88365C0-BE66-4276-A4A8-B9C86C352910}" type="datetimeFigureOut">
               <a:rPr lang="en-US" smtClean="0"/>
-              <a:t>11/29/2021</a:t>
+              <a:t>11/30/2021</a:t>
             </a:fld>
             <a:endParaRPr lang="en-US"/>
           </a:p>
@@ -821,7 +822,7 @@
           <a:p>
             <a:fld id="{28BE630F-C39C-4DB9-8258-0B48CA067079}" type="datetimeFigureOut">
               <a:rPr lang="en-US" smtClean="0"/>
-              <a:t>11/29/2021</a:t>
+              <a:t>11/30/2021</a:t>
             </a:fld>
             <a:endParaRPr lang="en-US"/>
           </a:p>
@@ -989,7 +990,7 @@
           <a:p>
             <a:fld id="{28BE630F-C39C-4DB9-8258-0B48CA067079}" type="datetimeFigureOut">
               <a:rPr lang="en-US" smtClean="0"/>
-              <a:t>11/29/2021</a:t>
+              <a:t>11/30/2021</a:t>
             </a:fld>
             <a:endParaRPr lang="en-US"/>
           </a:p>
@@ -1167,7 +1168,7 @@
           <a:p>
             <a:fld id="{28BE630F-C39C-4DB9-8258-0B48CA067079}" type="datetimeFigureOut">
               <a:rPr lang="en-US" smtClean="0"/>
-              <a:t>11/29/2021</a:t>
+              <a:t>11/30/2021</a:t>
             </a:fld>
             <a:endParaRPr lang="en-US"/>
           </a:p>
@@ -1335,7 +1336,7 @@
           <a:p>
             <a:fld id="{28BE630F-C39C-4DB9-8258-0B48CA067079}" type="datetimeFigureOut">
               <a:rPr lang="en-US" smtClean="0"/>
-              <a:t>11/29/2021</a:t>
+              <a:t>11/30/2021</a:t>
             </a:fld>
             <a:endParaRPr lang="en-US"/>
           </a:p>
@@ -1580,7 +1581,7 @@
           <a:p>
             <a:fld id="{28BE630F-C39C-4DB9-8258-0B48CA067079}" type="datetimeFigureOut">
               <a:rPr lang="en-US" smtClean="0"/>
-              <a:t>11/29/2021</a:t>
+              <a:t>11/30/2021</a:t>
             </a:fld>
             <a:endParaRPr lang="en-US"/>
           </a:p>
@@ -1809,7 +1810,7 @@
           <a:p>
             <a:fld id="{28BE630F-C39C-4DB9-8258-0B48CA067079}" type="datetimeFigureOut">
               <a:rPr lang="en-US" smtClean="0"/>
-              <a:t>11/29/2021</a:t>
+              <a:t>11/30/2021</a:t>
             </a:fld>
             <a:endParaRPr lang="en-US"/>
           </a:p>
@@ -2173,7 +2174,7 @@
           <a:p>
             <a:fld id="{28BE630F-C39C-4DB9-8258-0B48CA067079}" type="datetimeFigureOut">
               <a:rPr lang="en-US" smtClean="0"/>
-              <a:t>11/29/2021</a:t>
+              <a:t>11/30/2021</a:t>
             </a:fld>
             <a:endParaRPr lang="en-US"/>
           </a:p>
@@ -2290,7 +2291,7 @@
           <a:p>
             <a:fld id="{28BE630F-C39C-4DB9-8258-0B48CA067079}" type="datetimeFigureOut">
               <a:rPr lang="en-US" smtClean="0"/>
-              <a:t>11/29/2021</a:t>
+              <a:t>11/30/2021</a:t>
             </a:fld>
             <a:endParaRPr lang="en-US"/>
           </a:p>
@@ -2385,7 +2386,7 @@
           <a:p>
             <a:fld id="{28BE630F-C39C-4DB9-8258-0B48CA067079}" type="datetimeFigureOut">
               <a:rPr lang="en-US" smtClean="0"/>
-              <a:t>11/29/2021</a:t>
+              <a:t>11/30/2021</a:t>
             </a:fld>
             <a:endParaRPr lang="en-US"/>
           </a:p>
@@ -2660,7 +2661,7 @@
           <a:p>
             <a:fld id="{28BE630F-C39C-4DB9-8258-0B48CA067079}" type="datetimeFigureOut">
               <a:rPr lang="en-US" smtClean="0"/>
-              <a:t>11/29/2021</a:t>
+              <a:t>11/30/2021</a:t>
             </a:fld>
             <a:endParaRPr lang="en-US"/>
           </a:p>
@@ -2912,7 +2913,7 @@
           <a:p>
             <a:fld id="{28BE630F-C39C-4DB9-8258-0B48CA067079}" type="datetimeFigureOut">
               <a:rPr lang="en-US" smtClean="0"/>
-              <a:t>11/29/2021</a:t>
+              <a:t>11/30/2021</a:t>
             </a:fld>
             <a:endParaRPr lang="en-US"/>
           </a:p>
@@ -3123,7 +3124,7 @@
           <a:p>
             <a:fld id="{28BE630F-C39C-4DB9-8258-0B48CA067079}" type="datetimeFigureOut">
               <a:rPr lang="en-US" smtClean="0"/>
-              <a:t>11/29/2021</a:t>
+              <a:t>11/30/2021</a:t>
             </a:fld>
             <a:endParaRPr lang="en-US"/>
           </a:p>
@@ -5405,49 +5406,6 @@
       </p:sp>
       <p:sp>
         <p:nvSpPr>
-          <p:cNvPr id="18" name="TextBox 17">
-            <a:extLst>
-              <a:ext uri="{FF2B5EF4-FFF2-40B4-BE49-F238E27FC236}">
-                <a16:creationId xmlns:a16="http://schemas.microsoft.com/office/drawing/2014/main" id="{EE5E5777-F052-4DAA-BFD1-80C31A6849C5}"/>
-              </a:ext>
-            </a:extLst>
-          </p:cNvPr>
-          <p:cNvSpPr txBox="1"/>
-          <p:nvPr/>
-        </p:nvSpPr>
-        <p:spPr>
-          <a:xfrm>
-            <a:off x="3739835" y="4470787"/>
-            <a:ext cx="1362361" cy="369332"/>
-          </a:xfrm>
-          <a:prstGeom prst="rect">
-            <a:avLst/>
-          </a:prstGeom>
-          <a:noFill/>
-        </p:spPr>
-        <p:txBody>
-          <a:bodyPr wrap="none" rtlCol="0">
-            <a:spAutoFit/>
-          </a:bodyPr>
-          <a:lstStyle/>
-          <a:p>
-            <a:r>
-              <a:rPr lang="en-US" b="1" dirty="0">
-                <a:solidFill>
-                  <a:srgbClr val="00B050"/>
-                </a:solidFill>
-              </a:rPr>
-              <a:t>categories</a:t>
-            </a:r>
-            <a:r>
-              <a:rPr lang="en-US" b="1" dirty="0"/>
-              <a:t>[ ]</a:t>
-            </a:r>
-          </a:p>
-        </p:txBody>
-      </p:sp>
-      <p:sp>
-        <p:nvSpPr>
           <p:cNvPr id="19" name="TextBox 18">
             <a:extLst>
               <a:ext uri="{FF2B5EF4-FFF2-40B4-BE49-F238E27FC236}">
@@ -5461,7 +5419,7 @@
         <p:spPr>
           <a:xfrm>
             <a:off x="3857103" y="4136251"/>
-            <a:ext cx="1070549" cy="369332"/>
+            <a:ext cx="623889" cy="369332"/>
           </a:xfrm>
           <a:prstGeom prst="rect">
             <a:avLst/>
@@ -5480,12 +5438,9 @@
                   <a:srgbClr val="00B050"/>
                 </a:solidFill>
               </a:rPr>
-              <a:t>Events </a:t>
-            </a:r>
-            <a:r>
-              <a:rPr lang="en-US" b="1" dirty="0"/>
-              <a:t>[ ]</a:t>
-            </a:r>
+              <a:t>User</a:t>
+            </a:r>
+            <a:endParaRPr lang="en-US" b="1" dirty="0"/>
           </a:p>
         </p:txBody>
       </p:sp>
@@ -5637,6 +5592,508 @@
     <p:extLst>
       <p:ext uri="{BB962C8B-B14F-4D97-AF65-F5344CB8AC3E}">
         <p14:creationId xmlns:p14="http://schemas.microsoft.com/office/powerpoint/2010/main" val="1387352246"/>
+      </p:ext>
+    </p:extLst>
+  </p:cSld>
+  <p:clrMapOvr>
+    <a:masterClrMapping/>
+  </p:clrMapOvr>
+</p:sld>
+</file>
+
+<file path=ppt/slides/slide5.xml><?xml version="1.0" encoding="utf-8"?>
+<p:sld xmlns:a="http://schemas.openxmlformats.org/drawingml/2006/main" xmlns:r="http://schemas.openxmlformats.org/officeDocument/2006/relationships" xmlns:p="http://schemas.openxmlformats.org/presentationml/2006/main">
+  <p:cSld>
+    <p:spTree>
+      <p:nvGrpSpPr>
+        <p:cNvPr id="1" name=""/>
+        <p:cNvGrpSpPr/>
+        <p:nvPr/>
+      </p:nvGrpSpPr>
+      <p:grpSpPr>
+        <a:xfrm>
+          <a:off x="0" y="0"/>
+          <a:ext cx="0" cy="0"/>
+          <a:chOff x="0" y="0"/>
+          <a:chExt cx="0" cy="0"/>
+        </a:xfrm>
+      </p:grpSpPr>
+      <p:sp>
+        <p:nvSpPr>
+          <p:cNvPr id="2" name="Rectangle: Rounded Corners 1">
+            <a:extLst>
+              <a:ext uri="{FF2B5EF4-FFF2-40B4-BE49-F238E27FC236}">
+                <a16:creationId xmlns:a16="http://schemas.microsoft.com/office/drawing/2014/main" id="{D00F3D06-C8CF-491B-B15D-5A8CE9D7D01E}"/>
+              </a:ext>
+            </a:extLst>
+          </p:cNvPr>
+          <p:cNvSpPr/>
+          <p:nvPr/>
+        </p:nvSpPr>
+        <p:spPr>
+          <a:xfrm>
+            <a:off x="2072988" y="2398639"/>
+            <a:ext cx="1683028" cy="2676931"/>
+          </a:xfrm>
+          <a:prstGeom prst="roundRect">
+            <a:avLst/>
+          </a:prstGeom>
+          <a:noFill/>
+        </p:spPr>
+        <p:style>
+          <a:lnRef idx="2">
+            <a:schemeClr val="accent1">
+              <a:shade val="50000"/>
+            </a:schemeClr>
+          </a:lnRef>
+          <a:fillRef idx="1">
+            <a:schemeClr val="accent1"/>
+          </a:fillRef>
+          <a:effectRef idx="0">
+            <a:schemeClr val="accent1"/>
+          </a:effectRef>
+          <a:fontRef idx="minor">
+            <a:schemeClr val="lt1"/>
+          </a:fontRef>
+        </p:style>
+        <p:txBody>
+          <a:bodyPr rtlCol="0" anchor="ctr"/>
+          <a:lstStyle/>
+          <a:p>
+            <a:pPr algn="ctr"/>
+            <a:endParaRPr lang="en-US"/>
+          </a:p>
+        </p:txBody>
+      </p:sp>
+      <p:sp>
+        <p:nvSpPr>
+          <p:cNvPr id="3" name="TextBox 2">
+            <a:extLst>
+              <a:ext uri="{FF2B5EF4-FFF2-40B4-BE49-F238E27FC236}">
+                <a16:creationId xmlns:a16="http://schemas.microsoft.com/office/drawing/2014/main" id="{62128D14-806A-4CD9-9DF6-6922470ABE93}"/>
+              </a:ext>
+            </a:extLst>
+          </p:cNvPr>
+          <p:cNvSpPr txBox="1"/>
+          <p:nvPr/>
+        </p:nvSpPr>
+        <p:spPr>
+          <a:xfrm>
+            <a:off x="2478324" y="2569349"/>
+            <a:ext cx="872355" cy="400110"/>
+          </a:xfrm>
+          <a:prstGeom prst="rect">
+            <a:avLst/>
+          </a:prstGeom>
+          <a:noFill/>
+        </p:spPr>
+        <p:txBody>
+          <a:bodyPr wrap="none" rtlCol="0">
+            <a:spAutoFit/>
+          </a:bodyPr>
+          <a:lstStyle/>
+          <a:p>
+            <a:r>
+              <a:rPr lang="en-US" sz="2000" b="1" dirty="0"/>
+              <a:t>&lt;App&gt;</a:t>
+            </a:r>
+          </a:p>
+        </p:txBody>
+      </p:sp>
+      <p:sp>
+        <p:nvSpPr>
+          <p:cNvPr id="4" name="Rectangle: Rounded Corners 3">
+            <a:extLst>
+              <a:ext uri="{FF2B5EF4-FFF2-40B4-BE49-F238E27FC236}">
+                <a16:creationId xmlns:a16="http://schemas.microsoft.com/office/drawing/2014/main" id="{D1511BC5-D758-4FB0-9483-BF22515E6345}"/>
+              </a:ext>
+            </a:extLst>
+          </p:cNvPr>
+          <p:cNvSpPr/>
+          <p:nvPr/>
+        </p:nvSpPr>
+        <p:spPr>
+          <a:xfrm>
+            <a:off x="7733729" y="2398640"/>
+            <a:ext cx="2894513" cy="2358888"/>
+          </a:xfrm>
+          <a:prstGeom prst="roundRect">
+            <a:avLst/>
+          </a:prstGeom>
+          <a:noFill/>
+        </p:spPr>
+        <p:style>
+          <a:lnRef idx="2">
+            <a:schemeClr val="accent1">
+              <a:shade val="50000"/>
+            </a:schemeClr>
+          </a:lnRef>
+          <a:fillRef idx="1">
+            <a:schemeClr val="accent1"/>
+          </a:fillRef>
+          <a:effectRef idx="0">
+            <a:schemeClr val="accent1"/>
+          </a:effectRef>
+          <a:fontRef idx="minor">
+            <a:schemeClr val="lt1"/>
+          </a:fontRef>
+        </p:style>
+        <p:txBody>
+          <a:bodyPr rtlCol="0" anchor="ctr"/>
+          <a:lstStyle/>
+          <a:p>
+            <a:pPr algn="ctr"/>
+            <a:endParaRPr lang="en-US"/>
+          </a:p>
+        </p:txBody>
+      </p:sp>
+      <p:sp>
+        <p:nvSpPr>
+          <p:cNvPr id="5" name="TextBox 4">
+            <a:extLst>
+              <a:ext uri="{FF2B5EF4-FFF2-40B4-BE49-F238E27FC236}">
+                <a16:creationId xmlns:a16="http://schemas.microsoft.com/office/drawing/2014/main" id="{FE438AA2-6315-47A7-A645-8E7E6DF83C66}"/>
+              </a:ext>
+            </a:extLst>
+          </p:cNvPr>
+          <p:cNvSpPr txBox="1"/>
+          <p:nvPr/>
+        </p:nvSpPr>
+        <p:spPr>
+          <a:xfrm>
+            <a:off x="8399361" y="3477905"/>
+            <a:ext cx="1388072" cy="400110"/>
+          </a:xfrm>
+          <a:prstGeom prst="rect">
+            <a:avLst/>
+          </a:prstGeom>
+          <a:noFill/>
+        </p:spPr>
+        <p:txBody>
+          <a:bodyPr wrap="none" rtlCol="0">
+            <a:spAutoFit/>
+          </a:bodyPr>
+          <a:lstStyle/>
+          <a:p>
+            <a:r>
+              <a:rPr lang="en-US" sz="2000" b="1" dirty="0"/>
+              <a:t>&lt;Category&gt;</a:t>
+            </a:r>
+          </a:p>
+        </p:txBody>
+      </p:sp>
+      <p:sp>
+        <p:nvSpPr>
+          <p:cNvPr id="6" name="Arrow: Right 5">
+            <a:extLst>
+              <a:ext uri="{FF2B5EF4-FFF2-40B4-BE49-F238E27FC236}">
+                <a16:creationId xmlns:a16="http://schemas.microsoft.com/office/drawing/2014/main" id="{2EBBD514-6408-42E7-83C2-BBDF91AFCAED}"/>
+              </a:ext>
+            </a:extLst>
+          </p:cNvPr>
+          <p:cNvSpPr/>
+          <p:nvPr/>
+        </p:nvSpPr>
+        <p:spPr>
+          <a:xfrm>
+            <a:off x="3701331" y="3657880"/>
+            <a:ext cx="1362361" cy="478371"/>
+          </a:xfrm>
+          <a:prstGeom prst="rightArrow">
+            <a:avLst/>
+          </a:prstGeom>
+          <a:solidFill>
+            <a:srgbClr val="00B050"/>
+          </a:solidFill>
+          <a:ln>
+            <a:solidFill>
+              <a:srgbClr val="00B050"/>
+            </a:solidFill>
+          </a:ln>
+        </p:spPr>
+        <p:style>
+          <a:lnRef idx="2">
+            <a:schemeClr val="accent1">
+              <a:shade val="50000"/>
+            </a:schemeClr>
+          </a:lnRef>
+          <a:fillRef idx="1">
+            <a:schemeClr val="accent1"/>
+          </a:fillRef>
+          <a:effectRef idx="0">
+            <a:schemeClr val="accent1"/>
+          </a:effectRef>
+          <a:fontRef idx="minor">
+            <a:schemeClr val="lt1"/>
+          </a:fontRef>
+        </p:style>
+        <p:txBody>
+          <a:bodyPr rtlCol="0" anchor="ctr"/>
+          <a:lstStyle/>
+          <a:p>
+            <a:pPr algn="ctr"/>
+            <a:endParaRPr lang="en-US"/>
+          </a:p>
+        </p:txBody>
+      </p:sp>
+      <p:sp>
+        <p:nvSpPr>
+          <p:cNvPr id="7" name="TextBox 6">
+            <a:extLst>
+              <a:ext uri="{FF2B5EF4-FFF2-40B4-BE49-F238E27FC236}">
+                <a16:creationId xmlns:a16="http://schemas.microsoft.com/office/drawing/2014/main" id="{DB486C9A-844E-4EBF-8507-B1F4368E94F5}"/>
+              </a:ext>
+            </a:extLst>
+          </p:cNvPr>
+          <p:cNvSpPr txBox="1"/>
+          <p:nvPr/>
+        </p:nvSpPr>
+        <p:spPr>
+          <a:xfrm>
+            <a:off x="3931518" y="3169831"/>
+            <a:ext cx="1036053" cy="461665"/>
+          </a:xfrm>
+          <a:prstGeom prst="rect">
+            <a:avLst/>
+          </a:prstGeom>
+          <a:noFill/>
+        </p:spPr>
+        <p:txBody>
+          <a:bodyPr wrap="none" rtlCol="0">
+            <a:spAutoFit/>
+          </a:bodyPr>
+          <a:lstStyle/>
+          <a:p>
+            <a:r>
+              <a:rPr lang="en-US" sz="2400" b="1" dirty="0">
+                <a:solidFill>
+                  <a:srgbClr val="00B050"/>
+                </a:solidFill>
+              </a:rPr>
+              <a:t>PROPS</a:t>
+            </a:r>
+          </a:p>
+        </p:txBody>
+      </p:sp>
+      <p:sp>
+        <p:nvSpPr>
+          <p:cNvPr id="8" name="TextBox 7">
+            <a:extLst>
+              <a:ext uri="{FF2B5EF4-FFF2-40B4-BE49-F238E27FC236}">
+                <a16:creationId xmlns:a16="http://schemas.microsoft.com/office/drawing/2014/main" id="{490B685F-10FA-4CF7-8685-443D4DCA42EC}"/>
+              </a:ext>
+            </a:extLst>
+          </p:cNvPr>
+          <p:cNvSpPr txBox="1"/>
+          <p:nvPr/>
+        </p:nvSpPr>
+        <p:spPr>
+          <a:xfrm>
+            <a:off x="6522174" y="4017100"/>
+            <a:ext cx="838691" cy="461665"/>
+          </a:xfrm>
+          <a:prstGeom prst="rect">
+            <a:avLst/>
+          </a:prstGeom>
+          <a:noFill/>
+        </p:spPr>
+        <p:txBody>
+          <a:bodyPr wrap="none" rtlCol="0">
+            <a:spAutoFit/>
+          </a:bodyPr>
+          <a:lstStyle/>
+          <a:p>
+            <a:r>
+              <a:rPr lang="en-US" sz="2400" b="1" dirty="0">
+                <a:solidFill>
+                  <a:srgbClr val="FF0000"/>
+                </a:solidFill>
+              </a:rPr>
+              <a:t>EMIT</a:t>
+            </a:r>
+          </a:p>
+        </p:txBody>
+      </p:sp>
+      <p:sp>
+        <p:nvSpPr>
+          <p:cNvPr id="9" name="Arrow: Right 8">
+            <a:extLst>
+              <a:ext uri="{FF2B5EF4-FFF2-40B4-BE49-F238E27FC236}">
+                <a16:creationId xmlns:a16="http://schemas.microsoft.com/office/drawing/2014/main" id="{0E409D9A-0BFF-4850-A930-C33FBADB26F5}"/>
+              </a:ext>
+            </a:extLst>
+          </p:cNvPr>
+          <p:cNvSpPr/>
+          <p:nvPr/>
+        </p:nvSpPr>
+        <p:spPr>
+          <a:xfrm flipH="1">
+            <a:off x="6262671" y="4471578"/>
+            <a:ext cx="1283420" cy="478371"/>
+          </a:xfrm>
+          <a:prstGeom prst="rightArrow">
+            <a:avLst/>
+          </a:prstGeom>
+          <a:solidFill>
+            <a:srgbClr val="FF0000"/>
+          </a:solidFill>
+          <a:ln>
+            <a:solidFill>
+              <a:srgbClr val="FF0000"/>
+            </a:solidFill>
+          </a:ln>
+        </p:spPr>
+        <p:style>
+          <a:lnRef idx="2">
+            <a:schemeClr val="accent1">
+              <a:shade val="50000"/>
+            </a:schemeClr>
+          </a:lnRef>
+          <a:fillRef idx="1">
+            <a:schemeClr val="accent1"/>
+          </a:fillRef>
+          <a:effectRef idx="0">
+            <a:schemeClr val="accent1"/>
+          </a:effectRef>
+          <a:fontRef idx="minor">
+            <a:schemeClr val="lt1"/>
+          </a:fontRef>
+        </p:style>
+        <p:txBody>
+          <a:bodyPr rtlCol="0" anchor="ctr"/>
+          <a:lstStyle/>
+          <a:p>
+            <a:pPr algn="ctr"/>
+            <a:endParaRPr lang="en-US">
+              <a:solidFill>
+                <a:srgbClr val="FF0000"/>
+              </a:solidFill>
+            </a:endParaRPr>
+          </a:p>
+        </p:txBody>
+      </p:sp>
+      <p:sp>
+        <p:nvSpPr>
+          <p:cNvPr id="10" name="Text Box 16">
+            <a:extLst>
+              <a:ext uri="{FF2B5EF4-FFF2-40B4-BE49-F238E27FC236}">
+                <a16:creationId xmlns:a16="http://schemas.microsoft.com/office/drawing/2014/main" id="{15694AD7-32E2-48B4-809E-D2677F9C7027}"/>
+              </a:ext>
+            </a:extLst>
+          </p:cNvPr>
+          <p:cNvSpPr txBox="1"/>
+          <p:nvPr/>
+        </p:nvSpPr>
+        <p:spPr>
+          <a:xfrm>
+            <a:off x="1733914" y="706951"/>
+            <a:ext cx="2996130" cy="461665"/>
+          </a:xfrm>
+          <a:prstGeom prst="rect">
+            <a:avLst/>
+          </a:prstGeom>
+          <a:noFill/>
+        </p:spPr>
+        <p:txBody>
+          <a:bodyPr wrap="square" rtlCol="0">
+            <a:spAutoFit/>
+          </a:bodyPr>
+          <a:lstStyle/>
+          <a:p>
+            <a:r>
+              <a:rPr lang="en-US" altLang="en-US" sz="2400" b="1" dirty="0"/>
+              <a:t>Category Component </a:t>
+            </a:r>
+          </a:p>
+        </p:txBody>
+      </p:sp>
+      <p:sp>
+        <p:nvSpPr>
+          <p:cNvPr id="11" name="TextBox 10">
+            <a:extLst>
+              <a:ext uri="{FF2B5EF4-FFF2-40B4-BE49-F238E27FC236}">
+                <a16:creationId xmlns:a16="http://schemas.microsoft.com/office/drawing/2014/main" id="{7F980D71-7E83-46A1-874C-A9F8A4A28572}"/>
+              </a:ext>
+            </a:extLst>
+          </p:cNvPr>
+          <p:cNvSpPr txBox="1"/>
+          <p:nvPr/>
+        </p:nvSpPr>
+        <p:spPr>
+          <a:xfrm>
+            <a:off x="3749392" y="4162635"/>
+            <a:ext cx="1362361" cy="369332"/>
+          </a:xfrm>
+          <a:prstGeom prst="rect">
+            <a:avLst/>
+          </a:prstGeom>
+          <a:noFill/>
+        </p:spPr>
+        <p:txBody>
+          <a:bodyPr wrap="none" rtlCol="0">
+            <a:spAutoFit/>
+          </a:bodyPr>
+          <a:lstStyle/>
+          <a:p>
+            <a:r>
+              <a:rPr lang="en-US" b="1" dirty="0">
+                <a:solidFill>
+                  <a:srgbClr val="00B050"/>
+                </a:solidFill>
+              </a:rPr>
+              <a:t>categories</a:t>
+            </a:r>
+            <a:r>
+              <a:rPr lang="en-US" b="1" dirty="0"/>
+              <a:t>[ ]</a:t>
+            </a:r>
+          </a:p>
+        </p:txBody>
+      </p:sp>
+      <p:sp>
+        <p:nvSpPr>
+          <p:cNvPr id="45" name="TextBox 44">
+            <a:extLst>
+              <a:ext uri="{FF2B5EF4-FFF2-40B4-BE49-F238E27FC236}">
+                <a16:creationId xmlns:a16="http://schemas.microsoft.com/office/drawing/2014/main" id="{EE3CAFBF-22E3-49F3-80A5-80ADD67FF69A}"/>
+              </a:ext>
+            </a:extLst>
+          </p:cNvPr>
+          <p:cNvSpPr txBox="1"/>
+          <p:nvPr/>
+        </p:nvSpPr>
+        <p:spPr>
+          <a:xfrm>
+            <a:off x="6522174" y="4890904"/>
+            <a:ext cx="1158779" cy="369332"/>
+          </a:xfrm>
+          <a:prstGeom prst="rect">
+            <a:avLst/>
+          </a:prstGeom>
+          <a:noFill/>
+        </p:spPr>
+        <p:txBody>
+          <a:bodyPr wrap="none" rtlCol="0">
+            <a:spAutoFit/>
+          </a:bodyPr>
+          <a:lstStyle/>
+          <a:p>
+            <a:r>
+              <a:rPr lang="en-US" b="1" dirty="0">
+                <a:solidFill>
+                  <a:srgbClr val="00B050"/>
+                </a:solidFill>
+              </a:rPr>
+              <a:t>categories</a:t>
+            </a:r>
+            <a:endParaRPr lang="en-US" b="1" dirty="0"/>
+          </a:p>
+        </p:txBody>
+      </p:sp>
+    </p:spTree>
+    <p:extLst>
+      <p:ext uri="{BB962C8B-B14F-4D97-AF65-F5344CB8AC3E}">
+        <p14:creationId xmlns:p14="http://schemas.microsoft.com/office/powerpoint/2010/main" val="3599471506"/>
       </p:ext>
     </p:extLst>
   </p:cSld>

</xml_diff>

<commit_message>
#33 updated category CD daigram
</commit_message>
<xml_diff>
--- a/docs/COMPONENT-DIAGRAM.pptx
+++ b/docs/COMPONENT-DIAGRAM.pptx
@@ -365,7 +365,7 @@
           <a:p>
             <a:fld id="{E88365C0-BE66-4276-A4A8-B9C86C352910}" type="datetimeFigureOut">
               <a:rPr lang="en-US" smtClean="0"/>
-              <a:t>11/30/2021</a:t>
+              <a:t>12/1/2021</a:t>
             </a:fld>
             <a:endParaRPr lang="en-US"/>
           </a:p>
@@ -822,7 +822,7 @@
           <a:p>
             <a:fld id="{28BE630F-C39C-4DB9-8258-0B48CA067079}" type="datetimeFigureOut">
               <a:rPr lang="en-US" smtClean="0"/>
-              <a:t>11/30/2021</a:t>
+              <a:t>12/1/2021</a:t>
             </a:fld>
             <a:endParaRPr lang="en-US"/>
           </a:p>
@@ -990,7 +990,7 @@
           <a:p>
             <a:fld id="{28BE630F-C39C-4DB9-8258-0B48CA067079}" type="datetimeFigureOut">
               <a:rPr lang="en-US" smtClean="0"/>
-              <a:t>11/30/2021</a:t>
+              <a:t>12/1/2021</a:t>
             </a:fld>
             <a:endParaRPr lang="en-US"/>
           </a:p>
@@ -1168,7 +1168,7 @@
           <a:p>
             <a:fld id="{28BE630F-C39C-4DB9-8258-0B48CA067079}" type="datetimeFigureOut">
               <a:rPr lang="en-US" smtClean="0"/>
-              <a:t>11/30/2021</a:t>
+              <a:t>12/1/2021</a:t>
             </a:fld>
             <a:endParaRPr lang="en-US"/>
           </a:p>
@@ -1336,7 +1336,7 @@
           <a:p>
             <a:fld id="{28BE630F-C39C-4DB9-8258-0B48CA067079}" type="datetimeFigureOut">
               <a:rPr lang="en-US" smtClean="0"/>
-              <a:t>11/30/2021</a:t>
+              <a:t>12/1/2021</a:t>
             </a:fld>
             <a:endParaRPr lang="en-US"/>
           </a:p>
@@ -1581,7 +1581,7 @@
           <a:p>
             <a:fld id="{28BE630F-C39C-4DB9-8258-0B48CA067079}" type="datetimeFigureOut">
               <a:rPr lang="en-US" smtClean="0"/>
-              <a:t>11/30/2021</a:t>
+              <a:t>12/1/2021</a:t>
             </a:fld>
             <a:endParaRPr lang="en-US"/>
           </a:p>
@@ -1810,7 +1810,7 @@
           <a:p>
             <a:fld id="{28BE630F-C39C-4DB9-8258-0B48CA067079}" type="datetimeFigureOut">
               <a:rPr lang="en-US" smtClean="0"/>
-              <a:t>11/30/2021</a:t>
+              <a:t>12/1/2021</a:t>
             </a:fld>
             <a:endParaRPr lang="en-US"/>
           </a:p>
@@ -2174,7 +2174,7 @@
           <a:p>
             <a:fld id="{28BE630F-C39C-4DB9-8258-0B48CA067079}" type="datetimeFigureOut">
               <a:rPr lang="en-US" smtClean="0"/>
-              <a:t>11/30/2021</a:t>
+              <a:t>12/1/2021</a:t>
             </a:fld>
             <a:endParaRPr lang="en-US"/>
           </a:p>
@@ -2291,7 +2291,7 @@
           <a:p>
             <a:fld id="{28BE630F-C39C-4DB9-8258-0B48CA067079}" type="datetimeFigureOut">
               <a:rPr lang="en-US" smtClean="0"/>
-              <a:t>11/30/2021</a:t>
+              <a:t>12/1/2021</a:t>
             </a:fld>
             <a:endParaRPr lang="en-US"/>
           </a:p>
@@ -2386,7 +2386,7 @@
           <a:p>
             <a:fld id="{28BE630F-C39C-4DB9-8258-0B48CA067079}" type="datetimeFigureOut">
               <a:rPr lang="en-US" smtClean="0"/>
-              <a:t>11/30/2021</a:t>
+              <a:t>12/1/2021</a:t>
             </a:fld>
             <a:endParaRPr lang="en-US"/>
           </a:p>
@@ -2661,7 +2661,7 @@
           <a:p>
             <a:fld id="{28BE630F-C39C-4DB9-8258-0B48CA067079}" type="datetimeFigureOut">
               <a:rPr lang="en-US" smtClean="0"/>
-              <a:t>11/30/2021</a:t>
+              <a:t>12/1/2021</a:t>
             </a:fld>
             <a:endParaRPr lang="en-US"/>
           </a:p>
@@ -2913,7 +2913,7 @@
           <a:p>
             <a:fld id="{28BE630F-C39C-4DB9-8258-0B48CA067079}" type="datetimeFigureOut">
               <a:rPr lang="en-US" smtClean="0"/>
-              <a:t>11/30/2021</a:t>
+              <a:t>12/1/2021</a:t>
             </a:fld>
             <a:endParaRPr lang="en-US"/>
           </a:p>
@@ -3124,7 +3124,7 @@
           <a:p>
             <a:fld id="{28BE630F-C39C-4DB9-8258-0B48CA067079}" type="datetimeFigureOut">
               <a:rPr lang="en-US" smtClean="0"/>
-              <a:t>11/30/2021</a:t>
+              <a:t>12/1/2021</a:t>
             </a:fld>
             <a:endParaRPr lang="en-US"/>
           </a:p>
@@ -5632,8 +5632,8 @@
         </p:nvSpPr>
         <p:spPr>
           <a:xfrm>
-            <a:off x="2072988" y="2398639"/>
-            <a:ext cx="1683028" cy="2676931"/>
+            <a:off x="182406" y="2530542"/>
+            <a:ext cx="1683028" cy="1349277"/>
           </a:xfrm>
           <a:prstGeom prst="roundRect">
             <a:avLst/>
@@ -5679,7 +5679,7 @@
         </p:nvSpPr>
         <p:spPr>
           <a:xfrm>
-            <a:off x="2478324" y="2569349"/>
+            <a:off x="587742" y="2701252"/>
             <a:ext cx="872355" cy="400110"/>
           </a:xfrm>
           <a:prstGeom prst="rect">
@@ -5714,8 +5714,8 @@
         </p:nvSpPr>
         <p:spPr>
           <a:xfrm>
-            <a:off x="7733729" y="2398640"/>
-            <a:ext cx="2894513" cy="2358888"/>
+            <a:off x="3803589" y="2530542"/>
+            <a:ext cx="2112047" cy="1349276"/>
           </a:xfrm>
           <a:prstGeom prst="roundRect">
             <a:avLst/>
@@ -5761,8 +5761,8 @@
         </p:nvSpPr>
         <p:spPr>
           <a:xfrm>
-            <a:off x="8399361" y="3477905"/>
-            <a:ext cx="1388072" cy="400110"/>
+            <a:off x="3879111" y="2834130"/>
+            <a:ext cx="1939955" cy="400110"/>
           </a:xfrm>
           <a:prstGeom prst="rect">
             <a:avLst/>
@@ -5777,7 +5777,7 @@
           <a:p>
             <a:r>
               <a:rPr lang="en-US" sz="2000" b="1" dirty="0"/>
-              <a:t>&lt;Category&gt;</a:t>
+              <a:t>&lt;category-view&gt;</a:t>
             </a:r>
           </a:p>
         </p:txBody>
@@ -5796,7 +5796,7 @@
         </p:nvSpPr>
         <p:spPr>
           <a:xfrm>
-            <a:off x="3701331" y="3657880"/>
+            <a:off x="1810747" y="2934169"/>
             <a:ext cx="1362361" cy="478371"/>
           </a:xfrm>
           <a:prstGeom prst="rightArrow">
@@ -5850,7 +5850,7 @@
         </p:nvSpPr>
         <p:spPr>
           <a:xfrm>
-            <a:off x="3931518" y="3169831"/>
+            <a:off x="1973902" y="2651264"/>
             <a:ext cx="1036053" cy="461665"/>
           </a:xfrm>
           <a:prstGeom prst="rect">
@@ -5889,7 +5889,7 @@
         </p:nvSpPr>
         <p:spPr>
           <a:xfrm>
-            <a:off x="6522174" y="4017100"/>
+            <a:off x="7853586" y="3225176"/>
             <a:ext cx="838691" cy="461665"/>
           </a:xfrm>
           <a:prstGeom prst="rect">
@@ -5928,7 +5928,7 @@
         </p:nvSpPr>
         <p:spPr>
           <a:xfrm flipH="1">
-            <a:off x="6262671" y="4471578"/>
+            <a:off x="7553300" y="3601488"/>
             <a:ext cx="1283420" cy="478371"/>
           </a:xfrm>
           <a:prstGeom prst="rightArrow">
@@ -5986,7 +5986,7 @@
         </p:nvSpPr>
         <p:spPr>
           <a:xfrm>
-            <a:off x="1733914" y="706951"/>
+            <a:off x="648061" y="937416"/>
             <a:ext cx="2996130" cy="461665"/>
           </a:xfrm>
           <a:prstGeom prst="rect">
@@ -6021,7 +6021,7 @@
         </p:nvSpPr>
         <p:spPr>
           <a:xfrm>
-            <a:off x="3749392" y="4162635"/>
+            <a:off x="1838091" y="3389061"/>
             <a:ext cx="1362361" cy="369332"/>
           </a:xfrm>
           <a:prstGeom prst="rect">
@@ -6064,8 +6064,8 @@
         </p:nvSpPr>
         <p:spPr>
           <a:xfrm>
-            <a:off x="6522174" y="4890904"/>
-            <a:ext cx="1158779" cy="369332"/>
+            <a:off x="7577363" y="4030559"/>
+            <a:ext cx="1891415" cy="369332"/>
           </a:xfrm>
           <a:prstGeom prst="rect">
             <a:avLst/>
@@ -6084,7 +6084,962 @@
                   <a:srgbClr val="00B050"/>
                 </a:solidFill>
               </a:rPr>
-              <a:t>categories</a:t>
+              <a:t>newCategoryData</a:t>
+            </a:r>
+            <a:endParaRPr lang="en-US" b="1" dirty="0"/>
+          </a:p>
+        </p:txBody>
+      </p:sp>
+      <p:sp>
+        <p:nvSpPr>
+          <p:cNvPr id="15" name="Rectangle: Rounded Corners 14">
+            <a:extLst>
+              <a:ext uri="{FF2B5EF4-FFF2-40B4-BE49-F238E27FC236}">
+                <a16:creationId xmlns:a16="http://schemas.microsoft.com/office/drawing/2014/main" id="{B6D03331-41CD-4E49-8D24-F6ACBB8AB742}"/>
+              </a:ext>
+            </a:extLst>
+          </p:cNvPr>
+          <p:cNvSpPr/>
+          <p:nvPr/>
+        </p:nvSpPr>
+        <p:spPr>
+          <a:xfrm>
+            <a:off x="8711760" y="937416"/>
+            <a:ext cx="2573027" cy="1130766"/>
+          </a:xfrm>
+          <a:prstGeom prst="roundRect">
+            <a:avLst/>
+          </a:prstGeom>
+          <a:noFill/>
+        </p:spPr>
+        <p:style>
+          <a:lnRef idx="2">
+            <a:schemeClr val="accent1">
+              <a:shade val="50000"/>
+            </a:schemeClr>
+          </a:lnRef>
+          <a:fillRef idx="1">
+            <a:schemeClr val="accent1"/>
+          </a:fillRef>
+          <a:effectRef idx="0">
+            <a:schemeClr val="accent1"/>
+          </a:effectRef>
+          <a:fontRef idx="minor">
+            <a:schemeClr val="lt1"/>
+          </a:fontRef>
+        </p:style>
+        <p:txBody>
+          <a:bodyPr rtlCol="0" anchor="ctr"/>
+          <a:lstStyle/>
+          <a:p>
+            <a:pPr algn="ctr"/>
+            <a:endParaRPr lang="en-US"/>
+          </a:p>
+        </p:txBody>
+      </p:sp>
+      <p:sp>
+        <p:nvSpPr>
+          <p:cNvPr id="16" name="TextBox 15">
+            <a:extLst>
+              <a:ext uri="{FF2B5EF4-FFF2-40B4-BE49-F238E27FC236}">
+                <a16:creationId xmlns:a16="http://schemas.microsoft.com/office/drawing/2014/main" id="{08FDC1B9-8B7A-48BC-AC29-B5AE5D9556AD}"/>
+              </a:ext>
+            </a:extLst>
+          </p:cNvPr>
+          <p:cNvSpPr txBox="1"/>
+          <p:nvPr/>
+        </p:nvSpPr>
+        <p:spPr>
+          <a:xfrm>
+            <a:off x="9191224" y="1232833"/>
+            <a:ext cx="1614096" cy="400110"/>
+          </a:xfrm>
+          <a:prstGeom prst="rect">
+            <a:avLst/>
+          </a:prstGeom>
+          <a:noFill/>
+        </p:spPr>
+        <p:txBody>
+          <a:bodyPr wrap="none" rtlCol="0">
+            <a:spAutoFit/>
+          </a:bodyPr>
+          <a:lstStyle/>
+          <a:p>
+            <a:r>
+              <a:rPr lang="en-US" sz="2000" b="1" dirty="0"/>
+              <a:t>&lt;add-search&gt;</a:t>
+            </a:r>
+          </a:p>
+        </p:txBody>
+      </p:sp>
+      <p:sp>
+        <p:nvSpPr>
+          <p:cNvPr id="17" name="Rectangle: Rounded Corners 16">
+            <a:extLst>
+              <a:ext uri="{FF2B5EF4-FFF2-40B4-BE49-F238E27FC236}">
+                <a16:creationId xmlns:a16="http://schemas.microsoft.com/office/drawing/2014/main" id="{D643B8F4-9D19-4871-9F16-81BDC20E6653}"/>
+              </a:ext>
+            </a:extLst>
+          </p:cNvPr>
+          <p:cNvSpPr/>
+          <p:nvPr/>
+        </p:nvSpPr>
+        <p:spPr>
+          <a:xfrm>
+            <a:off x="8711760" y="3205053"/>
+            <a:ext cx="2573027" cy="1130766"/>
+          </a:xfrm>
+          <a:prstGeom prst="roundRect">
+            <a:avLst/>
+          </a:prstGeom>
+          <a:noFill/>
+        </p:spPr>
+        <p:style>
+          <a:lnRef idx="2">
+            <a:schemeClr val="accent1">
+              <a:shade val="50000"/>
+            </a:schemeClr>
+          </a:lnRef>
+          <a:fillRef idx="1">
+            <a:schemeClr val="accent1"/>
+          </a:fillRef>
+          <a:effectRef idx="0">
+            <a:schemeClr val="accent1"/>
+          </a:effectRef>
+          <a:fontRef idx="minor">
+            <a:schemeClr val="lt1"/>
+          </a:fontRef>
+        </p:style>
+        <p:txBody>
+          <a:bodyPr rtlCol="0" anchor="ctr"/>
+          <a:lstStyle/>
+          <a:p>
+            <a:pPr algn="ctr"/>
+            <a:endParaRPr lang="en-US"/>
+          </a:p>
+        </p:txBody>
+      </p:sp>
+      <p:sp>
+        <p:nvSpPr>
+          <p:cNvPr id="18" name="TextBox 17">
+            <a:extLst>
+              <a:ext uri="{FF2B5EF4-FFF2-40B4-BE49-F238E27FC236}">
+                <a16:creationId xmlns:a16="http://schemas.microsoft.com/office/drawing/2014/main" id="{01ABDD8A-BA10-470B-910D-39F7E60BC90D}"/>
+              </a:ext>
+            </a:extLst>
+          </p:cNvPr>
+          <p:cNvSpPr txBox="1"/>
+          <p:nvPr/>
+        </p:nvSpPr>
+        <p:spPr>
+          <a:xfrm>
+            <a:off x="9084877" y="3495624"/>
+            <a:ext cx="1951753" cy="400110"/>
+          </a:xfrm>
+          <a:prstGeom prst="rect">
+            <a:avLst/>
+          </a:prstGeom>
+          <a:noFill/>
+        </p:spPr>
+        <p:txBody>
+          <a:bodyPr wrap="none" rtlCol="0">
+            <a:spAutoFit/>
+          </a:bodyPr>
+          <a:lstStyle/>
+          <a:p>
+            <a:r>
+              <a:rPr lang="en-US" sz="2000" b="1" dirty="0"/>
+              <a:t>&lt;category-form&gt;</a:t>
+            </a:r>
+          </a:p>
+        </p:txBody>
+      </p:sp>
+      <p:sp>
+        <p:nvSpPr>
+          <p:cNvPr id="19" name="Rectangle: Rounded Corners 18">
+            <a:extLst>
+              <a:ext uri="{FF2B5EF4-FFF2-40B4-BE49-F238E27FC236}">
+                <a16:creationId xmlns:a16="http://schemas.microsoft.com/office/drawing/2014/main" id="{C4D910ED-90C3-4211-8538-7770D3A0DF8F}"/>
+              </a:ext>
+            </a:extLst>
+          </p:cNvPr>
+          <p:cNvSpPr/>
+          <p:nvPr/>
+        </p:nvSpPr>
+        <p:spPr>
+          <a:xfrm>
+            <a:off x="8989056" y="4948698"/>
+            <a:ext cx="2573027" cy="1130766"/>
+          </a:xfrm>
+          <a:prstGeom prst="roundRect">
+            <a:avLst/>
+          </a:prstGeom>
+          <a:noFill/>
+        </p:spPr>
+        <p:style>
+          <a:lnRef idx="2">
+            <a:schemeClr val="accent1">
+              <a:shade val="50000"/>
+            </a:schemeClr>
+          </a:lnRef>
+          <a:fillRef idx="1">
+            <a:schemeClr val="accent1"/>
+          </a:fillRef>
+          <a:effectRef idx="0">
+            <a:schemeClr val="accent1"/>
+          </a:effectRef>
+          <a:fontRef idx="minor">
+            <a:schemeClr val="lt1"/>
+          </a:fontRef>
+        </p:style>
+        <p:txBody>
+          <a:bodyPr rtlCol="0" anchor="ctr"/>
+          <a:lstStyle/>
+          <a:p>
+            <a:pPr algn="ctr"/>
+            <a:endParaRPr lang="en-US"/>
+          </a:p>
+        </p:txBody>
+      </p:sp>
+      <p:sp>
+        <p:nvSpPr>
+          <p:cNvPr id="20" name="TextBox 19">
+            <a:extLst>
+              <a:ext uri="{FF2B5EF4-FFF2-40B4-BE49-F238E27FC236}">
+                <a16:creationId xmlns:a16="http://schemas.microsoft.com/office/drawing/2014/main" id="{E5C54773-D013-4D8C-950D-1205FF0281CB}"/>
+              </a:ext>
+            </a:extLst>
+          </p:cNvPr>
+          <p:cNvSpPr txBox="1"/>
+          <p:nvPr/>
+        </p:nvSpPr>
+        <p:spPr>
+          <a:xfrm>
+            <a:off x="9362173" y="5239269"/>
+            <a:ext cx="1894942" cy="400110"/>
+          </a:xfrm>
+          <a:prstGeom prst="rect">
+            <a:avLst/>
+          </a:prstGeom>
+          <a:noFill/>
+        </p:spPr>
+        <p:txBody>
+          <a:bodyPr wrap="none" rtlCol="0">
+            <a:spAutoFit/>
+          </a:bodyPr>
+          <a:lstStyle/>
+          <a:p>
+            <a:r>
+              <a:rPr lang="en-US" sz="2000" b="1" dirty="0"/>
+              <a:t>&lt;category-card&gt;</a:t>
+            </a:r>
+          </a:p>
+        </p:txBody>
+      </p:sp>
+      <p:sp>
+        <p:nvSpPr>
+          <p:cNvPr id="21" name="TextBox 20">
+            <a:extLst>
+              <a:ext uri="{FF2B5EF4-FFF2-40B4-BE49-F238E27FC236}">
+                <a16:creationId xmlns:a16="http://schemas.microsoft.com/office/drawing/2014/main" id="{0CF67BF5-D282-4E79-89C1-EACEC9CAEA63}"/>
+              </a:ext>
+            </a:extLst>
+          </p:cNvPr>
+          <p:cNvSpPr txBox="1"/>
+          <p:nvPr/>
+        </p:nvSpPr>
+        <p:spPr>
+          <a:xfrm>
+            <a:off x="7709143" y="1173211"/>
+            <a:ext cx="838691" cy="461665"/>
+          </a:xfrm>
+          <a:prstGeom prst="rect">
+            <a:avLst/>
+          </a:prstGeom>
+          <a:noFill/>
+        </p:spPr>
+        <p:txBody>
+          <a:bodyPr wrap="none" rtlCol="0">
+            <a:spAutoFit/>
+          </a:bodyPr>
+          <a:lstStyle/>
+          <a:p>
+            <a:r>
+              <a:rPr lang="en-US" sz="2400" b="1" dirty="0">
+                <a:solidFill>
+                  <a:srgbClr val="FF0000"/>
+                </a:solidFill>
+              </a:rPr>
+              <a:t>EMIT</a:t>
+            </a:r>
+          </a:p>
+        </p:txBody>
+      </p:sp>
+      <p:sp>
+        <p:nvSpPr>
+          <p:cNvPr id="22" name="Arrow: Right 21">
+            <a:extLst>
+              <a:ext uri="{FF2B5EF4-FFF2-40B4-BE49-F238E27FC236}">
+                <a16:creationId xmlns:a16="http://schemas.microsoft.com/office/drawing/2014/main" id="{1C9302FA-AB17-4BD2-8B89-88D14559792D}"/>
+              </a:ext>
+            </a:extLst>
+          </p:cNvPr>
+          <p:cNvSpPr/>
+          <p:nvPr/>
+        </p:nvSpPr>
+        <p:spPr>
+          <a:xfrm flipH="1">
+            <a:off x="7408857" y="1549523"/>
+            <a:ext cx="1283420" cy="478371"/>
+          </a:xfrm>
+          <a:prstGeom prst="rightArrow">
+            <a:avLst/>
+          </a:prstGeom>
+          <a:solidFill>
+            <a:srgbClr val="FF0000"/>
+          </a:solidFill>
+          <a:ln>
+            <a:solidFill>
+              <a:srgbClr val="FF0000"/>
+            </a:solidFill>
+          </a:ln>
+        </p:spPr>
+        <p:style>
+          <a:lnRef idx="2">
+            <a:schemeClr val="accent1">
+              <a:shade val="50000"/>
+            </a:schemeClr>
+          </a:lnRef>
+          <a:fillRef idx="1">
+            <a:schemeClr val="accent1"/>
+          </a:fillRef>
+          <a:effectRef idx="0">
+            <a:schemeClr val="accent1"/>
+          </a:effectRef>
+          <a:fontRef idx="minor">
+            <a:schemeClr val="lt1"/>
+          </a:fontRef>
+        </p:style>
+        <p:txBody>
+          <a:bodyPr rtlCol="0" anchor="ctr"/>
+          <a:lstStyle/>
+          <a:p>
+            <a:pPr algn="ctr"/>
+            <a:endParaRPr lang="en-US">
+              <a:solidFill>
+                <a:srgbClr val="FF0000"/>
+              </a:solidFill>
+            </a:endParaRPr>
+          </a:p>
+        </p:txBody>
+      </p:sp>
+      <p:sp>
+        <p:nvSpPr>
+          <p:cNvPr id="23" name="TextBox 22">
+            <a:extLst>
+              <a:ext uri="{FF2B5EF4-FFF2-40B4-BE49-F238E27FC236}">
+                <a16:creationId xmlns:a16="http://schemas.microsoft.com/office/drawing/2014/main" id="{BC366F20-846F-49EF-A41E-E59905944DD2}"/>
+              </a:ext>
+            </a:extLst>
+          </p:cNvPr>
+          <p:cNvSpPr txBox="1"/>
+          <p:nvPr/>
+        </p:nvSpPr>
+        <p:spPr>
+          <a:xfrm>
+            <a:off x="7432920" y="1978594"/>
+            <a:ext cx="2037930" cy="369332"/>
+          </a:xfrm>
+          <a:prstGeom prst="rect">
+            <a:avLst/>
+          </a:prstGeom>
+          <a:noFill/>
+        </p:spPr>
+        <p:txBody>
+          <a:bodyPr wrap="none" rtlCol="0">
+            <a:spAutoFit/>
+          </a:bodyPr>
+          <a:lstStyle/>
+          <a:p>
+            <a:r>
+              <a:rPr lang="en-US" b="1" dirty="0">
+                <a:solidFill>
+                  <a:srgbClr val="00B050"/>
+                </a:solidFill>
+              </a:rPr>
+              <a:t>showCategoryFrom</a:t>
+            </a:r>
+            <a:endParaRPr lang="en-US" b="1" dirty="0"/>
+          </a:p>
+        </p:txBody>
+      </p:sp>
+      <p:sp>
+        <p:nvSpPr>
+          <p:cNvPr id="24" name="TextBox 23">
+            <a:extLst>
+              <a:ext uri="{FF2B5EF4-FFF2-40B4-BE49-F238E27FC236}">
+                <a16:creationId xmlns:a16="http://schemas.microsoft.com/office/drawing/2014/main" id="{1D1C391E-EAF2-4CDA-9B8E-B34499FC2652}"/>
+              </a:ext>
+            </a:extLst>
+          </p:cNvPr>
+          <p:cNvSpPr txBox="1"/>
+          <p:nvPr/>
+        </p:nvSpPr>
+        <p:spPr>
+          <a:xfrm>
+            <a:off x="7456983" y="2318465"/>
+            <a:ext cx="1574983" cy="369332"/>
+          </a:xfrm>
+          <a:prstGeom prst="rect">
+            <a:avLst/>
+          </a:prstGeom>
+          <a:noFill/>
+        </p:spPr>
+        <p:txBody>
+          <a:bodyPr wrap="none" rtlCol="0">
+            <a:spAutoFit/>
+          </a:bodyPr>
+          <a:lstStyle/>
+          <a:p>
+            <a:r>
+              <a:rPr lang="en-US" b="1" dirty="0">
+                <a:solidFill>
+                  <a:srgbClr val="00B050"/>
+                </a:solidFill>
+              </a:rPr>
+              <a:t>categoryName</a:t>
+            </a:r>
+            <a:endParaRPr lang="en-US" b="1" dirty="0"/>
+          </a:p>
+        </p:txBody>
+      </p:sp>
+      <p:sp>
+        <p:nvSpPr>
+          <p:cNvPr id="25" name="Arrow: Right 24">
+            <a:extLst>
+              <a:ext uri="{FF2B5EF4-FFF2-40B4-BE49-F238E27FC236}">
+                <a16:creationId xmlns:a16="http://schemas.microsoft.com/office/drawing/2014/main" id="{517C185A-273B-469F-9D88-5EA5278DCB17}"/>
+              </a:ext>
+            </a:extLst>
+          </p:cNvPr>
+          <p:cNvSpPr/>
+          <p:nvPr/>
+        </p:nvSpPr>
+        <p:spPr>
+          <a:xfrm>
+            <a:off x="5743366" y="2838937"/>
+            <a:ext cx="1362361" cy="478371"/>
+          </a:xfrm>
+          <a:prstGeom prst="rightArrow">
+            <a:avLst/>
+          </a:prstGeom>
+          <a:solidFill>
+            <a:srgbClr val="00B050"/>
+          </a:solidFill>
+          <a:ln>
+            <a:solidFill>
+              <a:srgbClr val="00B050"/>
+            </a:solidFill>
+          </a:ln>
+        </p:spPr>
+        <p:style>
+          <a:lnRef idx="2">
+            <a:schemeClr val="accent1">
+              <a:shade val="50000"/>
+            </a:schemeClr>
+          </a:lnRef>
+          <a:fillRef idx="1">
+            <a:schemeClr val="accent1"/>
+          </a:fillRef>
+          <a:effectRef idx="0">
+            <a:schemeClr val="accent1"/>
+          </a:effectRef>
+          <a:fontRef idx="minor">
+            <a:schemeClr val="lt1"/>
+          </a:fontRef>
+        </p:style>
+        <p:txBody>
+          <a:bodyPr rtlCol="0" anchor="ctr"/>
+          <a:lstStyle/>
+          <a:p>
+            <a:pPr algn="ctr"/>
+            <a:endParaRPr lang="en-US"/>
+          </a:p>
+        </p:txBody>
+      </p:sp>
+      <p:sp>
+        <p:nvSpPr>
+          <p:cNvPr id="26" name="TextBox 25">
+            <a:extLst>
+              <a:ext uri="{FF2B5EF4-FFF2-40B4-BE49-F238E27FC236}">
+                <a16:creationId xmlns:a16="http://schemas.microsoft.com/office/drawing/2014/main" id="{D2660A66-D548-4AF6-B291-99FD1DD83EE3}"/>
+              </a:ext>
+            </a:extLst>
+          </p:cNvPr>
+          <p:cNvSpPr txBox="1"/>
+          <p:nvPr/>
+        </p:nvSpPr>
+        <p:spPr>
+          <a:xfrm>
+            <a:off x="5906521" y="2556032"/>
+            <a:ext cx="1036053" cy="461665"/>
+          </a:xfrm>
+          <a:prstGeom prst="rect">
+            <a:avLst/>
+          </a:prstGeom>
+          <a:noFill/>
+        </p:spPr>
+        <p:txBody>
+          <a:bodyPr wrap="none" rtlCol="0">
+            <a:spAutoFit/>
+          </a:bodyPr>
+          <a:lstStyle/>
+          <a:p>
+            <a:r>
+              <a:rPr lang="en-US" sz="2400" b="1" dirty="0">
+                <a:solidFill>
+                  <a:srgbClr val="00B050"/>
+                </a:solidFill>
+              </a:rPr>
+              <a:t>PROPS</a:t>
+            </a:r>
+          </a:p>
+        </p:txBody>
+      </p:sp>
+      <p:sp>
+        <p:nvSpPr>
+          <p:cNvPr id="27" name="TextBox 26">
+            <a:extLst>
+              <a:ext uri="{FF2B5EF4-FFF2-40B4-BE49-F238E27FC236}">
+                <a16:creationId xmlns:a16="http://schemas.microsoft.com/office/drawing/2014/main" id="{56EE91F8-B1AB-41C4-9B98-5EB1E04959DA}"/>
+              </a:ext>
+            </a:extLst>
+          </p:cNvPr>
+          <p:cNvSpPr txBox="1"/>
+          <p:nvPr/>
+        </p:nvSpPr>
+        <p:spPr>
+          <a:xfrm>
+            <a:off x="5882880" y="3256371"/>
+            <a:ext cx="1455207" cy="369332"/>
+          </a:xfrm>
+          <a:prstGeom prst="rect">
+            <a:avLst/>
+          </a:prstGeom>
+          <a:noFill/>
+        </p:spPr>
+        <p:txBody>
+          <a:bodyPr wrap="none" rtlCol="0">
+            <a:spAutoFit/>
+          </a:bodyPr>
+          <a:lstStyle/>
+          <a:p>
+            <a:r>
+              <a:rPr lang="en-US" b="1" dirty="0">
+                <a:solidFill>
+                  <a:srgbClr val="00B050"/>
+                </a:solidFill>
+              </a:rPr>
+              <a:t>categoryData</a:t>
+            </a:r>
+            <a:endParaRPr lang="en-US" b="1" dirty="0"/>
+          </a:p>
+        </p:txBody>
+      </p:sp>
+      <p:sp>
+        <p:nvSpPr>
+          <p:cNvPr id="28" name="TextBox 27">
+            <a:extLst>
+              <a:ext uri="{FF2B5EF4-FFF2-40B4-BE49-F238E27FC236}">
+                <a16:creationId xmlns:a16="http://schemas.microsoft.com/office/drawing/2014/main" id="{E327E897-1451-4C84-872A-8CD00EECB718}"/>
+              </a:ext>
+            </a:extLst>
+          </p:cNvPr>
+          <p:cNvSpPr txBox="1"/>
+          <p:nvPr/>
+        </p:nvSpPr>
+        <p:spPr>
+          <a:xfrm>
+            <a:off x="5906428" y="3523264"/>
+            <a:ext cx="1354794" cy="369332"/>
+          </a:xfrm>
+          <a:prstGeom prst="rect">
+            <a:avLst/>
+          </a:prstGeom>
+          <a:noFill/>
+        </p:spPr>
+        <p:txBody>
+          <a:bodyPr wrap="none" rtlCol="0">
+            <a:spAutoFit/>
+          </a:bodyPr>
+          <a:lstStyle/>
+          <a:p>
+            <a:r>
+              <a:rPr lang="en-US" b="1" dirty="0">
+                <a:solidFill>
+                  <a:srgbClr val="00B050"/>
+                </a:solidFill>
+              </a:rPr>
+              <a:t>isShowForm</a:t>
+            </a:r>
+            <a:endParaRPr lang="en-US" b="1" dirty="0"/>
+          </a:p>
+        </p:txBody>
+      </p:sp>
+      <p:sp>
+        <p:nvSpPr>
+          <p:cNvPr id="29" name="TextBox 28">
+            <a:extLst>
+              <a:ext uri="{FF2B5EF4-FFF2-40B4-BE49-F238E27FC236}">
+                <a16:creationId xmlns:a16="http://schemas.microsoft.com/office/drawing/2014/main" id="{44376D2A-F1F8-4AD4-8D15-D79AACDD8CC2}"/>
+              </a:ext>
+            </a:extLst>
+          </p:cNvPr>
+          <p:cNvSpPr txBox="1"/>
+          <p:nvPr/>
+        </p:nvSpPr>
+        <p:spPr>
+          <a:xfrm>
+            <a:off x="7751819" y="4814643"/>
+            <a:ext cx="838691" cy="461665"/>
+          </a:xfrm>
+          <a:prstGeom prst="rect">
+            <a:avLst/>
+          </a:prstGeom>
+          <a:noFill/>
+        </p:spPr>
+        <p:txBody>
+          <a:bodyPr wrap="none" rtlCol="0">
+            <a:spAutoFit/>
+          </a:bodyPr>
+          <a:lstStyle/>
+          <a:p>
+            <a:r>
+              <a:rPr lang="en-US" sz="2400" b="1" dirty="0">
+                <a:solidFill>
+                  <a:srgbClr val="FF0000"/>
+                </a:solidFill>
+              </a:rPr>
+              <a:t>EMIT</a:t>
+            </a:r>
+          </a:p>
+        </p:txBody>
+      </p:sp>
+      <p:sp>
+        <p:nvSpPr>
+          <p:cNvPr id="30" name="Arrow: Right 29">
+            <a:extLst>
+              <a:ext uri="{FF2B5EF4-FFF2-40B4-BE49-F238E27FC236}">
+                <a16:creationId xmlns:a16="http://schemas.microsoft.com/office/drawing/2014/main" id="{9CB95AE0-F140-4635-BB19-4D2684FF1E16}"/>
+              </a:ext>
+            </a:extLst>
+          </p:cNvPr>
+          <p:cNvSpPr/>
+          <p:nvPr/>
+        </p:nvSpPr>
+        <p:spPr>
+          <a:xfrm flipH="1">
+            <a:off x="7451533" y="5190955"/>
+            <a:ext cx="1283420" cy="478371"/>
+          </a:xfrm>
+          <a:prstGeom prst="rightArrow">
+            <a:avLst/>
+          </a:prstGeom>
+          <a:solidFill>
+            <a:srgbClr val="FF0000"/>
+          </a:solidFill>
+          <a:ln>
+            <a:solidFill>
+              <a:srgbClr val="FF0000"/>
+            </a:solidFill>
+          </a:ln>
+        </p:spPr>
+        <p:style>
+          <a:lnRef idx="2">
+            <a:schemeClr val="accent1">
+              <a:shade val="50000"/>
+            </a:schemeClr>
+          </a:lnRef>
+          <a:fillRef idx="1">
+            <a:schemeClr val="accent1"/>
+          </a:fillRef>
+          <a:effectRef idx="0">
+            <a:schemeClr val="accent1"/>
+          </a:effectRef>
+          <a:fontRef idx="minor">
+            <a:schemeClr val="lt1"/>
+          </a:fontRef>
+        </p:style>
+        <p:txBody>
+          <a:bodyPr rtlCol="0" anchor="ctr"/>
+          <a:lstStyle/>
+          <a:p>
+            <a:pPr algn="ctr"/>
+            <a:endParaRPr lang="en-US">
+              <a:solidFill>
+                <a:srgbClr val="FF0000"/>
+              </a:solidFill>
+            </a:endParaRPr>
+          </a:p>
+        </p:txBody>
+      </p:sp>
+      <p:sp>
+        <p:nvSpPr>
+          <p:cNvPr id="31" name="TextBox 30">
+            <a:extLst>
+              <a:ext uri="{FF2B5EF4-FFF2-40B4-BE49-F238E27FC236}">
+                <a16:creationId xmlns:a16="http://schemas.microsoft.com/office/drawing/2014/main" id="{B260FA0F-07A6-4284-B12B-5C2E0153839F}"/>
+              </a:ext>
+            </a:extLst>
+          </p:cNvPr>
+          <p:cNvSpPr txBox="1"/>
+          <p:nvPr/>
+        </p:nvSpPr>
+        <p:spPr>
+          <a:xfrm>
+            <a:off x="7475596" y="5620026"/>
+            <a:ext cx="1190262" cy="369332"/>
+          </a:xfrm>
+          <a:prstGeom prst="rect">
+            <a:avLst/>
+          </a:prstGeom>
+          <a:noFill/>
+        </p:spPr>
+        <p:txBody>
+          <a:bodyPr wrap="none" rtlCol="0">
+            <a:spAutoFit/>
+          </a:bodyPr>
+          <a:lstStyle/>
+          <a:p>
+            <a:r>
+              <a:rPr lang="en-US" b="1" dirty="0">
+                <a:solidFill>
+                  <a:srgbClr val="00B050"/>
+                </a:solidFill>
+              </a:rPr>
+              <a:t>categoryId</a:t>
+            </a:r>
+            <a:endParaRPr lang="en-US" b="1" dirty="0"/>
+          </a:p>
+        </p:txBody>
+      </p:sp>
+      <p:sp>
+        <p:nvSpPr>
+          <p:cNvPr id="32" name="TextBox 31">
+            <a:extLst>
+              <a:ext uri="{FF2B5EF4-FFF2-40B4-BE49-F238E27FC236}">
+                <a16:creationId xmlns:a16="http://schemas.microsoft.com/office/drawing/2014/main" id="{44854AAD-0C48-4300-9CDE-7939C05A8904}"/>
+              </a:ext>
+            </a:extLst>
+          </p:cNvPr>
+          <p:cNvSpPr txBox="1"/>
+          <p:nvPr/>
+        </p:nvSpPr>
+        <p:spPr>
+          <a:xfrm>
+            <a:off x="5906428" y="3793391"/>
+            <a:ext cx="989182" cy="369332"/>
+          </a:xfrm>
+          <a:prstGeom prst="rect">
+            <a:avLst/>
+          </a:prstGeom>
+          <a:noFill/>
+        </p:spPr>
+        <p:txBody>
+          <a:bodyPr wrap="none" rtlCol="0">
+            <a:spAutoFit/>
+          </a:bodyPr>
+          <a:lstStyle/>
+          <a:p>
+            <a:r>
+              <a:rPr lang="en-US" b="1" dirty="0">
+                <a:solidFill>
+                  <a:srgbClr val="00B050"/>
+                </a:solidFill>
+              </a:rPr>
+              <a:t>isEditing</a:t>
+            </a:r>
+            <a:endParaRPr lang="en-US" b="1" dirty="0"/>
+          </a:p>
+        </p:txBody>
+      </p:sp>
+      <p:sp>
+        <p:nvSpPr>
+          <p:cNvPr id="33" name="TextBox 32">
+            <a:extLst>
+              <a:ext uri="{FF2B5EF4-FFF2-40B4-BE49-F238E27FC236}">
+                <a16:creationId xmlns:a16="http://schemas.microsoft.com/office/drawing/2014/main" id="{539DDD33-0D8E-4322-A6E2-DBCC838B7B4A}"/>
+              </a:ext>
+            </a:extLst>
+          </p:cNvPr>
+          <p:cNvSpPr txBox="1"/>
+          <p:nvPr/>
+        </p:nvSpPr>
+        <p:spPr>
+          <a:xfrm>
+            <a:off x="7483237" y="5894798"/>
+            <a:ext cx="993990" cy="369332"/>
+          </a:xfrm>
+          <a:prstGeom prst="rect">
+            <a:avLst/>
+          </a:prstGeom>
+          <a:noFill/>
+        </p:spPr>
+        <p:txBody>
+          <a:bodyPr wrap="none" rtlCol="0">
+            <a:spAutoFit/>
+          </a:bodyPr>
+          <a:lstStyle/>
+          <a:p>
+            <a:r>
+              <a:rPr lang="en-US" b="1" dirty="0">
+                <a:solidFill>
+                  <a:srgbClr val="00B050"/>
+                </a:solidFill>
+              </a:rPr>
+              <a:t>IsEditing</a:t>
+            </a:r>
+            <a:endParaRPr lang="en-US" b="1" dirty="0"/>
+          </a:p>
+        </p:txBody>
+      </p:sp>
+      <p:sp>
+        <p:nvSpPr>
+          <p:cNvPr id="34" name="Rounded Rectangle 17">
+            <a:extLst>
+              <a:ext uri="{FF2B5EF4-FFF2-40B4-BE49-F238E27FC236}">
+                <a16:creationId xmlns:a16="http://schemas.microsoft.com/office/drawing/2014/main" id="{FF28E4AB-A79A-46D8-9376-444D38944408}"/>
+              </a:ext>
+            </a:extLst>
+          </p:cNvPr>
+          <p:cNvSpPr/>
+          <p:nvPr/>
+        </p:nvSpPr>
+        <p:spPr>
+          <a:xfrm>
+            <a:off x="162820" y="5102909"/>
+            <a:ext cx="4387215" cy="1487170"/>
+          </a:xfrm>
+          <a:prstGeom prst="roundRect">
+            <a:avLst/>
+          </a:prstGeom>
+          <a:noFill/>
+          <a:ln w="28575" cmpd="sng">
+            <a:solidFill>
+              <a:srgbClr val="00B050"/>
+            </a:solidFill>
+            <a:prstDash val="sysDot"/>
+          </a:ln>
+        </p:spPr>
+        <p:style>
+          <a:lnRef idx="2">
+            <a:schemeClr val="accent1">
+              <a:shade val="50000"/>
+            </a:schemeClr>
+          </a:lnRef>
+          <a:fillRef idx="1">
+            <a:schemeClr val="accent1"/>
+          </a:fillRef>
+          <a:effectRef idx="0">
+            <a:schemeClr val="accent1"/>
+          </a:effectRef>
+          <a:fontRef idx="minor">
+            <a:schemeClr val="lt1"/>
+          </a:fontRef>
+        </p:style>
+        <p:txBody>
+          <a:bodyPr rtlCol="0" anchor="ctr"/>
+          <a:lstStyle/>
+          <a:p>
+            <a:pPr algn="ctr"/>
+            <a:endParaRPr lang="en-US"/>
+          </a:p>
+        </p:txBody>
+      </p:sp>
+      <p:sp>
+        <p:nvSpPr>
+          <p:cNvPr id="35" name="Text Box 18">
+            <a:extLst>
+              <a:ext uri="{FF2B5EF4-FFF2-40B4-BE49-F238E27FC236}">
+                <a16:creationId xmlns:a16="http://schemas.microsoft.com/office/drawing/2014/main" id="{48049348-C002-48A4-9B0A-CCA56818563C}"/>
+              </a:ext>
+            </a:extLst>
+          </p:cNvPr>
+          <p:cNvSpPr txBox="1"/>
+          <p:nvPr/>
+        </p:nvSpPr>
+        <p:spPr>
+          <a:xfrm>
+            <a:off x="338950" y="5320419"/>
+            <a:ext cx="4034953" cy="1200329"/>
+          </a:xfrm>
+          <a:prstGeom prst="rect">
+            <a:avLst/>
+          </a:prstGeom>
+          <a:noFill/>
+        </p:spPr>
+        <p:txBody>
+          <a:bodyPr wrap="square" rtlCol="0">
+            <a:spAutoFit/>
+          </a:bodyPr>
+          <a:lstStyle/>
+          <a:p>
+            <a:r>
+              <a:rPr lang="" altLang="en-US" b="1" dirty="0">
+                <a:solidFill>
+                  <a:srgbClr val="FF0000"/>
+                </a:solidFill>
+              </a:rPr>
+              <a:t>- &lt;add-search&gt; contain add+ button and search bar</a:t>
+            </a:r>
+          </a:p>
+          <a:p>
+            <a:r>
+              <a:rPr lang="" altLang="en-US" b="1" dirty="0">
+                <a:solidFill>
+                  <a:srgbClr val="FF0000"/>
+                </a:solidFill>
+              </a:rPr>
+              <a:t>- &lt;category-form&gt; is shown when we click add+</a:t>
+            </a:r>
+          </a:p>
+        </p:txBody>
+      </p:sp>
+      <p:sp>
+        <p:nvSpPr>
+          <p:cNvPr id="36" name="TextBox 35">
+            <a:extLst>
+              <a:ext uri="{FF2B5EF4-FFF2-40B4-BE49-F238E27FC236}">
+                <a16:creationId xmlns:a16="http://schemas.microsoft.com/office/drawing/2014/main" id="{BD9005A7-DAB2-4A84-A821-0B43538FFA62}"/>
+              </a:ext>
+            </a:extLst>
+          </p:cNvPr>
+          <p:cNvSpPr txBox="1"/>
+          <p:nvPr/>
+        </p:nvSpPr>
+        <p:spPr>
+          <a:xfrm>
+            <a:off x="7508682" y="6220747"/>
+            <a:ext cx="956096" cy="369332"/>
+          </a:xfrm>
+          <a:prstGeom prst="rect">
+            <a:avLst/>
+          </a:prstGeom>
+          <a:noFill/>
+        </p:spPr>
+        <p:txBody>
+          <a:bodyPr wrap="none" rtlCol="0">
+            <a:spAutoFit/>
+          </a:bodyPr>
+          <a:lstStyle/>
+          <a:p>
+            <a:r>
+              <a:rPr lang="en-US" b="1" dirty="0">
+                <a:solidFill>
+                  <a:srgbClr val="00B050"/>
+                </a:solidFill>
+              </a:rPr>
+              <a:t>isDelete</a:t>
             </a:r>
             <a:endParaRPr lang="en-US" b="1" dirty="0"/>
           </a:p>

</xml_diff>

<commit_message>
#47 update myevent CD daigram
</commit_message>
<xml_diff>
--- a/docs/COMPONENT-DIAGRAM.pptx
+++ b/docs/COMPONENT-DIAGRAM.pptx
@@ -5,7 +5,7 @@
     <p:sldMasterId id="2147483648" r:id="rId1"/>
   </p:sldMasterIdLst>
   <p:notesMasterIdLst>
-    <p:notesMasterId r:id="rId7"/>
+    <p:notesMasterId r:id="rId8"/>
   </p:notesMasterIdLst>
   <p:sldIdLst>
     <p:sldId id="256" r:id="rId2"/>
@@ -13,6 +13,7 @@
     <p:sldId id="261" r:id="rId4"/>
     <p:sldId id="262" r:id="rId5"/>
     <p:sldId id="263" r:id="rId6"/>
+    <p:sldId id="265" r:id="rId7"/>
   </p:sldIdLst>
   <p:sldSz cx="12192000" cy="6858000"/>
   <p:notesSz cx="6858000" cy="9144000"/>
@@ -365,7 +366,7 @@
           <a:p>
             <a:fld id="{E88365C0-BE66-4276-A4A8-B9C86C352910}" type="datetimeFigureOut">
               <a:rPr lang="en-US" smtClean="0"/>
-              <a:t>12/1/2021</a:t>
+              <a:t>12/2/2021</a:t>
             </a:fld>
             <a:endParaRPr lang="en-US"/>
           </a:p>
@@ -822,7 +823,7 @@
           <a:p>
             <a:fld id="{28BE630F-C39C-4DB9-8258-0B48CA067079}" type="datetimeFigureOut">
               <a:rPr lang="en-US" smtClean="0"/>
-              <a:t>12/1/2021</a:t>
+              <a:t>12/2/2021</a:t>
             </a:fld>
             <a:endParaRPr lang="en-US"/>
           </a:p>
@@ -990,7 +991,7 @@
           <a:p>
             <a:fld id="{28BE630F-C39C-4DB9-8258-0B48CA067079}" type="datetimeFigureOut">
               <a:rPr lang="en-US" smtClean="0"/>
-              <a:t>12/1/2021</a:t>
+              <a:t>12/2/2021</a:t>
             </a:fld>
             <a:endParaRPr lang="en-US"/>
           </a:p>
@@ -1168,7 +1169,7 @@
           <a:p>
             <a:fld id="{28BE630F-C39C-4DB9-8258-0B48CA067079}" type="datetimeFigureOut">
               <a:rPr lang="en-US" smtClean="0"/>
-              <a:t>12/1/2021</a:t>
+              <a:t>12/2/2021</a:t>
             </a:fld>
             <a:endParaRPr lang="en-US"/>
           </a:p>
@@ -1336,7 +1337,7 @@
           <a:p>
             <a:fld id="{28BE630F-C39C-4DB9-8258-0B48CA067079}" type="datetimeFigureOut">
               <a:rPr lang="en-US" smtClean="0"/>
-              <a:t>12/1/2021</a:t>
+              <a:t>12/2/2021</a:t>
             </a:fld>
             <a:endParaRPr lang="en-US"/>
           </a:p>
@@ -1581,7 +1582,7 @@
           <a:p>
             <a:fld id="{28BE630F-C39C-4DB9-8258-0B48CA067079}" type="datetimeFigureOut">
               <a:rPr lang="en-US" smtClean="0"/>
-              <a:t>12/1/2021</a:t>
+              <a:t>12/2/2021</a:t>
             </a:fld>
             <a:endParaRPr lang="en-US"/>
           </a:p>
@@ -1810,7 +1811,7 @@
           <a:p>
             <a:fld id="{28BE630F-C39C-4DB9-8258-0B48CA067079}" type="datetimeFigureOut">
               <a:rPr lang="en-US" smtClean="0"/>
-              <a:t>12/1/2021</a:t>
+              <a:t>12/2/2021</a:t>
             </a:fld>
             <a:endParaRPr lang="en-US"/>
           </a:p>
@@ -2174,7 +2175,7 @@
           <a:p>
             <a:fld id="{28BE630F-C39C-4DB9-8258-0B48CA067079}" type="datetimeFigureOut">
               <a:rPr lang="en-US" smtClean="0"/>
-              <a:t>12/1/2021</a:t>
+              <a:t>12/2/2021</a:t>
             </a:fld>
             <a:endParaRPr lang="en-US"/>
           </a:p>
@@ -2291,7 +2292,7 @@
           <a:p>
             <a:fld id="{28BE630F-C39C-4DB9-8258-0B48CA067079}" type="datetimeFigureOut">
               <a:rPr lang="en-US" smtClean="0"/>
-              <a:t>12/1/2021</a:t>
+              <a:t>12/2/2021</a:t>
             </a:fld>
             <a:endParaRPr lang="en-US"/>
           </a:p>
@@ -2386,7 +2387,7 @@
           <a:p>
             <a:fld id="{28BE630F-C39C-4DB9-8258-0B48CA067079}" type="datetimeFigureOut">
               <a:rPr lang="en-US" smtClean="0"/>
-              <a:t>12/1/2021</a:t>
+              <a:t>12/2/2021</a:t>
             </a:fld>
             <a:endParaRPr lang="en-US"/>
           </a:p>
@@ -2661,7 +2662,7 @@
           <a:p>
             <a:fld id="{28BE630F-C39C-4DB9-8258-0B48CA067079}" type="datetimeFigureOut">
               <a:rPr lang="en-US" smtClean="0"/>
-              <a:t>12/1/2021</a:t>
+              <a:t>12/2/2021</a:t>
             </a:fld>
             <a:endParaRPr lang="en-US"/>
           </a:p>
@@ -2913,7 +2914,7 @@
           <a:p>
             <a:fld id="{28BE630F-C39C-4DB9-8258-0B48CA067079}" type="datetimeFigureOut">
               <a:rPr lang="en-US" smtClean="0"/>
-              <a:t>12/1/2021</a:t>
+              <a:t>12/2/2021</a:t>
             </a:fld>
             <a:endParaRPr lang="en-US"/>
           </a:p>
@@ -3124,7 +3125,7 @@
           <a:p>
             <a:fld id="{28BE630F-C39C-4DB9-8258-0B48CA067079}" type="datetimeFigureOut">
               <a:rPr lang="en-US" smtClean="0"/>
-              <a:t>12/1/2021</a:t>
+              <a:t>12/2/2021</a:t>
             </a:fld>
             <a:endParaRPr lang="en-US"/>
           </a:p>
@@ -5632,7 +5633,7 @@
         </p:nvSpPr>
         <p:spPr>
           <a:xfrm>
-            <a:off x="182406" y="2530542"/>
+            <a:off x="174971" y="2744645"/>
             <a:ext cx="1683028" cy="1349277"/>
           </a:xfrm>
           <a:prstGeom prst="roundRect">
@@ -5679,7 +5680,7 @@
         </p:nvSpPr>
         <p:spPr>
           <a:xfrm>
-            <a:off x="587742" y="2701252"/>
+            <a:off x="580307" y="2915355"/>
             <a:ext cx="872355" cy="400110"/>
           </a:xfrm>
           <a:prstGeom prst="rect">
@@ -5714,7 +5715,7 @@
         </p:nvSpPr>
         <p:spPr>
           <a:xfrm>
-            <a:off x="3803589" y="2530542"/>
+            <a:off x="2991525" y="2687797"/>
             <a:ext cx="2112047" cy="1349276"/>
           </a:xfrm>
           <a:prstGeom prst="roundRect">
@@ -5761,7 +5762,7 @@
         </p:nvSpPr>
         <p:spPr>
           <a:xfrm>
-            <a:off x="3879111" y="2834130"/>
+            <a:off x="3067047" y="2991385"/>
             <a:ext cx="1939955" cy="400110"/>
           </a:xfrm>
           <a:prstGeom prst="rect">
@@ -5784,10 +5785,49 @@
       </p:sp>
       <p:sp>
         <p:nvSpPr>
-          <p:cNvPr id="6" name="Arrow: Right 5">
+          <p:cNvPr id="8" name="TextBox 7">
             <a:extLst>
               <a:ext uri="{FF2B5EF4-FFF2-40B4-BE49-F238E27FC236}">
-                <a16:creationId xmlns:a16="http://schemas.microsoft.com/office/drawing/2014/main" id="{2EBBD514-6408-42E7-83C2-BBDF91AFCAED}"/>
+                <a16:creationId xmlns:a16="http://schemas.microsoft.com/office/drawing/2014/main" id="{490B685F-10FA-4CF7-8685-443D4DCA42EC}"/>
+              </a:ext>
+            </a:extLst>
+          </p:cNvPr>
+          <p:cNvSpPr txBox="1"/>
+          <p:nvPr/>
+        </p:nvSpPr>
+        <p:spPr>
+          <a:xfrm>
+            <a:off x="7853586" y="3225176"/>
+            <a:ext cx="838691" cy="461665"/>
+          </a:xfrm>
+          <a:prstGeom prst="rect">
+            <a:avLst/>
+          </a:prstGeom>
+          <a:noFill/>
+        </p:spPr>
+        <p:txBody>
+          <a:bodyPr wrap="none" rtlCol="0">
+            <a:spAutoFit/>
+          </a:bodyPr>
+          <a:lstStyle/>
+          <a:p>
+            <a:r>
+              <a:rPr lang="en-US" sz="2400" b="1" dirty="0">
+                <a:solidFill>
+                  <a:srgbClr val="FF0000"/>
+                </a:solidFill>
+              </a:rPr>
+              <a:t>EMIT</a:t>
+            </a:r>
+          </a:p>
+        </p:txBody>
+      </p:sp>
+      <p:sp>
+        <p:nvSpPr>
+          <p:cNvPr id="9" name="Arrow: Right 8">
+            <a:extLst>
+              <a:ext uri="{FF2B5EF4-FFF2-40B4-BE49-F238E27FC236}">
+                <a16:creationId xmlns:a16="http://schemas.microsoft.com/office/drawing/2014/main" id="{0E409D9A-0BFF-4850-A930-C33FBADB26F5}"/>
               </a:ext>
             </a:extLst>
           </p:cNvPr>
@@ -5795,19 +5835,19 @@
           <p:nvPr/>
         </p:nvSpPr>
         <p:spPr>
-          <a:xfrm>
-            <a:off x="1810747" y="2934169"/>
-            <a:ext cx="1362361" cy="478371"/>
+          <a:xfrm flipH="1">
+            <a:off x="7553300" y="3601488"/>
+            <a:ext cx="1283420" cy="478371"/>
           </a:xfrm>
           <a:prstGeom prst="rightArrow">
             <a:avLst/>
           </a:prstGeom>
           <a:solidFill>
-            <a:srgbClr val="00B050"/>
+            <a:srgbClr val="FF0000"/>
           </a:solidFill>
           <a:ln>
             <a:solidFill>
-              <a:srgbClr val="00B050"/>
+              <a:srgbClr val="FF0000"/>
             </a:solidFill>
           </a:ln>
         </p:spPr>
@@ -5832,16 +5872,20 @@
           <a:lstStyle/>
           <a:p>
             <a:pPr algn="ctr"/>
-            <a:endParaRPr lang="en-US"/>
-          </a:p>
-        </p:txBody>
-      </p:sp>
-      <p:sp>
-        <p:nvSpPr>
-          <p:cNvPr id="7" name="TextBox 6">
+            <a:endParaRPr lang="en-US">
+              <a:solidFill>
+                <a:srgbClr val="FF0000"/>
+              </a:solidFill>
+            </a:endParaRPr>
+          </a:p>
+        </p:txBody>
+      </p:sp>
+      <p:sp>
+        <p:nvSpPr>
+          <p:cNvPr id="10" name="Text Box 16">
             <a:extLst>
               <a:ext uri="{FF2B5EF4-FFF2-40B4-BE49-F238E27FC236}">
-                <a16:creationId xmlns:a16="http://schemas.microsoft.com/office/drawing/2014/main" id="{DB486C9A-844E-4EBF-8507-B1F4368E94F5}"/>
+                <a16:creationId xmlns:a16="http://schemas.microsoft.com/office/drawing/2014/main" id="{15694AD7-32E2-48B4-809E-D2677F9C7027}"/>
               </a:ext>
             </a:extLst>
           </p:cNvPr>
@@ -5850,8 +5894,43 @@
         </p:nvSpPr>
         <p:spPr>
           <a:xfrm>
-            <a:off x="1973902" y="2651264"/>
-            <a:ext cx="1036053" cy="461665"/>
+            <a:off x="648061" y="937416"/>
+            <a:ext cx="2996130" cy="461665"/>
+          </a:xfrm>
+          <a:prstGeom prst="rect">
+            <a:avLst/>
+          </a:prstGeom>
+          <a:noFill/>
+        </p:spPr>
+        <p:txBody>
+          <a:bodyPr wrap="square" rtlCol="0">
+            <a:spAutoFit/>
+          </a:bodyPr>
+          <a:lstStyle/>
+          <a:p>
+            <a:r>
+              <a:rPr lang="en-US" altLang="en-US" sz="2400" b="1" dirty="0"/>
+              <a:t>Category Component </a:t>
+            </a:r>
+          </a:p>
+        </p:txBody>
+      </p:sp>
+      <p:sp>
+        <p:nvSpPr>
+          <p:cNvPr id="11" name="TextBox 10">
+            <a:extLst>
+              <a:ext uri="{FF2B5EF4-FFF2-40B4-BE49-F238E27FC236}">
+                <a16:creationId xmlns:a16="http://schemas.microsoft.com/office/drawing/2014/main" id="{7F980D71-7E83-46A1-874C-A9F8A4A28572}"/>
+              </a:ext>
+            </a:extLst>
+          </p:cNvPr>
+          <p:cNvSpPr txBox="1"/>
+          <p:nvPr/>
+        </p:nvSpPr>
+        <p:spPr>
+          <a:xfrm>
+            <a:off x="5052872" y="3474764"/>
+            <a:ext cx="1362361" cy="369332"/>
           </a:xfrm>
           <a:prstGeom prst="rect">
             <a:avLst/>
@@ -5865,22 +5944,26 @@
           <a:lstStyle/>
           <a:p>
             <a:r>
-              <a:rPr lang="en-US" sz="2400" b="1" dirty="0">
+              <a:rPr lang="en-US" b="1" dirty="0">
                 <a:solidFill>
                   <a:srgbClr val="00B050"/>
                 </a:solidFill>
               </a:rPr>
-              <a:t>PROPS</a:t>
-            </a:r>
-          </a:p>
-        </p:txBody>
-      </p:sp>
-      <p:sp>
-        <p:nvSpPr>
-          <p:cNvPr id="8" name="TextBox 7">
+              <a:t>categories</a:t>
+            </a:r>
+            <a:r>
+              <a:rPr lang="en-US" b="1" dirty="0"/>
+              <a:t>[ ]</a:t>
+            </a:r>
+          </a:p>
+        </p:txBody>
+      </p:sp>
+      <p:sp>
+        <p:nvSpPr>
+          <p:cNvPr id="45" name="TextBox 44">
             <a:extLst>
               <a:ext uri="{FF2B5EF4-FFF2-40B4-BE49-F238E27FC236}">
-                <a16:creationId xmlns:a16="http://schemas.microsoft.com/office/drawing/2014/main" id="{490B685F-10FA-4CF7-8685-443D4DCA42EC}"/>
+                <a16:creationId xmlns:a16="http://schemas.microsoft.com/office/drawing/2014/main" id="{EE3CAFBF-22E3-49F3-80A5-80ADD67FF69A}"/>
               </a:ext>
             </a:extLst>
           </p:cNvPr>
@@ -5889,8 +5972,8 @@
         </p:nvSpPr>
         <p:spPr>
           <a:xfrm>
-            <a:off x="7853586" y="3225176"/>
-            <a:ext cx="838691" cy="461665"/>
+            <a:off x="7577363" y="4030559"/>
+            <a:ext cx="1891415" cy="369332"/>
           </a:xfrm>
           <a:prstGeom prst="rect">
             <a:avLst/>
@@ -5904,22 +5987,23 @@
           <a:lstStyle/>
           <a:p>
             <a:r>
-              <a:rPr lang="en-US" sz="2400" b="1" dirty="0">
+              <a:rPr lang="en-US" b="1" dirty="0">
                 <a:solidFill>
-                  <a:srgbClr val="FF0000"/>
+                  <a:srgbClr val="00B050"/>
                 </a:solidFill>
               </a:rPr>
-              <a:t>EMIT</a:t>
-            </a:r>
-          </a:p>
-        </p:txBody>
-      </p:sp>
-      <p:sp>
-        <p:nvSpPr>
-          <p:cNvPr id="9" name="Arrow: Right 8">
+              <a:t>newCategoryData</a:t>
+            </a:r>
+            <a:endParaRPr lang="en-US" b="1" dirty="0"/>
+          </a:p>
+        </p:txBody>
+      </p:sp>
+      <p:sp>
+        <p:nvSpPr>
+          <p:cNvPr id="15" name="Rectangle: Rounded Corners 14">
             <a:extLst>
               <a:ext uri="{FF2B5EF4-FFF2-40B4-BE49-F238E27FC236}">
-                <a16:creationId xmlns:a16="http://schemas.microsoft.com/office/drawing/2014/main" id="{0E409D9A-0BFF-4850-A930-C33FBADB26F5}"/>
+                <a16:creationId xmlns:a16="http://schemas.microsoft.com/office/drawing/2014/main" id="{B6D03331-41CD-4E49-8D24-F6ACBB8AB742}"/>
               </a:ext>
             </a:extLst>
           </p:cNvPr>
@@ -5927,21 +6011,14 @@
           <p:nvPr/>
         </p:nvSpPr>
         <p:spPr>
-          <a:xfrm flipH="1">
-            <a:off x="7553300" y="3601488"/>
-            <a:ext cx="1283420" cy="478371"/>
-          </a:xfrm>
-          <a:prstGeom prst="rightArrow">
-            <a:avLst/>
-          </a:prstGeom>
-          <a:solidFill>
-            <a:srgbClr val="FF0000"/>
-          </a:solidFill>
-          <a:ln>
-            <a:solidFill>
-              <a:srgbClr val="FF0000"/>
-            </a:solidFill>
-          </a:ln>
+          <a:xfrm>
+            <a:off x="8711760" y="937416"/>
+            <a:ext cx="2573027" cy="1130766"/>
+          </a:xfrm>
+          <a:prstGeom prst="roundRect">
+            <a:avLst/>
+          </a:prstGeom>
+          <a:noFill/>
         </p:spPr>
         <p:style>
           <a:lnRef idx="2">
@@ -5964,20 +6041,16 @@
           <a:lstStyle/>
           <a:p>
             <a:pPr algn="ctr"/>
-            <a:endParaRPr lang="en-US">
-              <a:solidFill>
-                <a:srgbClr val="FF0000"/>
-              </a:solidFill>
-            </a:endParaRPr>
-          </a:p>
-        </p:txBody>
-      </p:sp>
-      <p:sp>
-        <p:nvSpPr>
-          <p:cNvPr id="10" name="Text Box 16">
+            <a:endParaRPr lang="en-US"/>
+          </a:p>
+        </p:txBody>
+      </p:sp>
+      <p:sp>
+        <p:nvSpPr>
+          <p:cNvPr id="16" name="TextBox 15">
             <a:extLst>
               <a:ext uri="{FF2B5EF4-FFF2-40B4-BE49-F238E27FC236}">
-                <a16:creationId xmlns:a16="http://schemas.microsoft.com/office/drawing/2014/main" id="{15694AD7-32E2-48B4-809E-D2677F9C7027}"/>
+                <a16:creationId xmlns:a16="http://schemas.microsoft.com/office/drawing/2014/main" id="{08FDC1B9-8B7A-48BC-AC29-B5AE5D9556AD}"/>
               </a:ext>
             </a:extLst>
           </p:cNvPr>
@@ -5986,43 +6059,8 @@
         </p:nvSpPr>
         <p:spPr>
           <a:xfrm>
-            <a:off x="648061" y="937416"/>
-            <a:ext cx="2996130" cy="461665"/>
-          </a:xfrm>
-          <a:prstGeom prst="rect">
-            <a:avLst/>
-          </a:prstGeom>
-          <a:noFill/>
-        </p:spPr>
-        <p:txBody>
-          <a:bodyPr wrap="square" rtlCol="0">
-            <a:spAutoFit/>
-          </a:bodyPr>
-          <a:lstStyle/>
-          <a:p>
-            <a:r>
-              <a:rPr lang="en-US" altLang="en-US" sz="2400" b="1" dirty="0"/>
-              <a:t>Category Component </a:t>
-            </a:r>
-          </a:p>
-        </p:txBody>
-      </p:sp>
-      <p:sp>
-        <p:nvSpPr>
-          <p:cNvPr id="11" name="TextBox 10">
-            <a:extLst>
-              <a:ext uri="{FF2B5EF4-FFF2-40B4-BE49-F238E27FC236}">
-                <a16:creationId xmlns:a16="http://schemas.microsoft.com/office/drawing/2014/main" id="{7F980D71-7E83-46A1-874C-A9F8A4A28572}"/>
-              </a:ext>
-            </a:extLst>
-          </p:cNvPr>
-          <p:cNvSpPr txBox="1"/>
-          <p:nvPr/>
-        </p:nvSpPr>
-        <p:spPr>
-          <a:xfrm>
-            <a:off x="1838091" y="3389061"/>
-            <a:ext cx="1362361" cy="369332"/>
+            <a:off x="9191224" y="1232833"/>
+            <a:ext cx="1614096" cy="400110"/>
           </a:xfrm>
           <a:prstGeom prst="rect">
             <a:avLst/>
@@ -6036,66 +6074,18 @@
           <a:lstStyle/>
           <a:p>
             <a:r>
-              <a:rPr lang="en-US" b="1" dirty="0">
-                <a:solidFill>
-                  <a:srgbClr val="00B050"/>
-                </a:solidFill>
-              </a:rPr>
-              <a:t>categories</a:t>
-            </a:r>
-            <a:r>
-              <a:rPr lang="en-US" b="1" dirty="0"/>
-              <a:t>[ ]</a:t>
-            </a:r>
-          </a:p>
-        </p:txBody>
-      </p:sp>
-      <p:sp>
-        <p:nvSpPr>
-          <p:cNvPr id="45" name="TextBox 44">
+              <a:rPr lang="en-US" sz="2000" b="1" dirty="0"/>
+              <a:t>&lt;add-search&gt;</a:t>
+            </a:r>
+          </a:p>
+        </p:txBody>
+      </p:sp>
+      <p:sp>
+        <p:nvSpPr>
+          <p:cNvPr id="17" name="Rectangle: Rounded Corners 16">
             <a:extLst>
               <a:ext uri="{FF2B5EF4-FFF2-40B4-BE49-F238E27FC236}">
-                <a16:creationId xmlns:a16="http://schemas.microsoft.com/office/drawing/2014/main" id="{EE3CAFBF-22E3-49F3-80A5-80ADD67FF69A}"/>
-              </a:ext>
-            </a:extLst>
-          </p:cNvPr>
-          <p:cNvSpPr txBox="1"/>
-          <p:nvPr/>
-        </p:nvSpPr>
-        <p:spPr>
-          <a:xfrm>
-            <a:off x="7577363" y="4030559"/>
-            <a:ext cx="1891415" cy="369332"/>
-          </a:xfrm>
-          <a:prstGeom prst="rect">
-            <a:avLst/>
-          </a:prstGeom>
-          <a:noFill/>
-        </p:spPr>
-        <p:txBody>
-          <a:bodyPr wrap="none" rtlCol="0">
-            <a:spAutoFit/>
-          </a:bodyPr>
-          <a:lstStyle/>
-          <a:p>
-            <a:r>
-              <a:rPr lang="en-US" b="1" dirty="0">
-                <a:solidFill>
-                  <a:srgbClr val="00B050"/>
-                </a:solidFill>
-              </a:rPr>
-              <a:t>newCategoryData</a:t>
-            </a:r>
-            <a:endParaRPr lang="en-US" b="1" dirty="0"/>
-          </a:p>
-        </p:txBody>
-      </p:sp>
-      <p:sp>
-        <p:nvSpPr>
-          <p:cNvPr id="15" name="Rectangle: Rounded Corners 14">
-            <a:extLst>
-              <a:ext uri="{FF2B5EF4-FFF2-40B4-BE49-F238E27FC236}">
-                <a16:creationId xmlns:a16="http://schemas.microsoft.com/office/drawing/2014/main" id="{B6D03331-41CD-4E49-8D24-F6ACBB8AB742}"/>
+                <a16:creationId xmlns:a16="http://schemas.microsoft.com/office/drawing/2014/main" id="{D643B8F4-9D19-4871-9F16-81BDC20E6653}"/>
               </a:ext>
             </a:extLst>
           </p:cNvPr>
@@ -6104,7 +6094,7 @@
         </p:nvSpPr>
         <p:spPr>
           <a:xfrm>
-            <a:off x="8711760" y="937416"/>
+            <a:off x="8711760" y="3205053"/>
             <a:ext cx="2573027" cy="1130766"/>
           </a:xfrm>
           <a:prstGeom prst="roundRect">
@@ -6139,10 +6129,10 @@
       </p:sp>
       <p:sp>
         <p:nvSpPr>
-          <p:cNvPr id="16" name="TextBox 15">
+          <p:cNvPr id="18" name="TextBox 17">
             <a:extLst>
               <a:ext uri="{FF2B5EF4-FFF2-40B4-BE49-F238E27FC236}">
-                <a16:creationId xmlns:a16="http://schemas.microsoft.com/office/drawing/2014/main" id="{08FDC1B9-8B7A-48BC-AC29-B5AE5D9556AD}"/>
+                <a16:creationId xmlns:a16="http://schemas.microsoft.com/office/drawing/2014/main" id="{01ABDD8A-BA10-470B-910D-39F7E60BC90D}"/>
               </a:ext>
             </a:extLst>
           </p:cNvPr>
@@ -6151,8 +6141,8 @@
         </p:nvSpPr>
         <p:spPr>
           <a:xfrm>
-            <a:off x="9191224" y="1232833"/>
-            <a:ext cx="1614096" cy="400110"/>
+            <a:off x="9084877" y="3495624"/>
+            <a:ext cx="1951753" cy="400110"/>
           </a:xfrm>
           <a:prstGeom prst="rect">
             <a:avLst/>
@@ -6167,17 +6157,17 @@
           <a:p>
             <a:r>
               <a:rPr lang="en-US" sz="2000" b="1" dirty="0"/>
-              <a:t>&lt;add-search&gt;</a:t>
-            </a:r>
-          </a:p>
-        </p:txBody>
-      </p:sp>
-      <p:sp>
-        <p:nvSpPr>
-          <p:cNvPr id="17" name="Rectangle: Rounded Corners 16">
+              <a:t>&lt;category-form&gt;</a:t>
+            </a:r>
+          </a:p>
+        </p:txBody>
+      </p:sp>
+      <p:sp>
+        <p:nvSpPr>
+          <p:cNvPr id="19" name="Rectangle: Rounded Corners 18">
             <a:extLst>
               <a:ext uri="{FF2B5EF4-FFF2-40B4-BE49-F238E27FC236}">
-                <a16:creationId xmlns:a16="http://schemas.microsoft.com/office/drawing/2014/main" id="{D643B8F4-9D19-4871-9F16-81BDC20E6653}"/>
+                <a16:creationId xmlns:a16="http://schemas.microsoft.com/office/drawing/2014/main" id="{C4D910ED-90C3-4211-8538-7770D3A0DF8F}"/>
               </a:ext>
             </a:extLst>
           </p:cNvPr>
@@ -6186,7 +6176,7 @@
         </p:nvSpPr>
         <p:spPr>
           <a:xfrm>
-            <a:off x="8711760" y="3205053"/>
+            <a:off x="8989056" y="4948698"/>
             <a:ext cx="2573027" cy="1130766"/>
           </a:xfrm>
           <a:prstGeom prst="roundRect">
@@ -6221,10 +6211,10 @@
       </p:sp>
       <p:sp>
         <p:nvSpPr>
-          <p:cNvPr id="18" name="TextBox 17">
+          <p:cNvPr id="20" name="TextBox 19">
             <a:extLst>
               <a:ext uri="{FF2B5EF4-FFF2-40B4-BE49-F238E27FC236}">
-                <a16:creationId xmlns:a16="http://schemas.microsoft.com/office/drawing/2014/main" id="{01ABDD8A-BA10-470B-910D-39F7E60BC90D}"/>
+                <a16:creationId xmlns:a16="http://schemas.microsoft.com/office/drawing/2014/main" id="{E5C54773-D013-4D8C-950D-1205FF0281CB}"/>
               </a:ext>
             </a:extLst>
           </p:cNvPr>
@@ -6233,8 +6223,8 @@
         </p:nvSpPr>
         <p:spPr>
           <a:xfrm>
-            <a:off x="9084877" y="3495624"/>
-            <a:ext cx="1951753" cy="400110"/>
+            <a:off x="9362173" y="5239269"/>
+            <a:ext cx="1894942" cy="400110"/>
           </a:xfrm>
           <a:prstGeom prst="rect">
             <a:avLst/>
@@ -6249,17 +6239,56 @@
           <a:p>
             <a:r>
               <a:rPr lang="en-US" sz="2000" b="1" dirty="0"/>
-              <a:t>&lt;category-form&gt;</a:t>
-            </a:r>
-          </a:p>
-        </p:txBody>
-      </p:sp>
-      <p:sp>
-        <p:nvSpPr>
-          <p:cNvPr id="19" name="Rectangle: Rounded Corners 18">
+              <a:t>&lt;category-card&gt;</a:t>
+            </a:r>
+          </a:p>
+        </p:txBody>
+      </p:sp>
+      <p:sp>
+        <p:nvSpPr>
+          <p:cNvPr id="21" name="TextBox 20">
             <a:extLst>
               <a:ext uri="{FF2B5EF4-FFF2-40B4-BE49-F238E27FC236}">
-                <a16:creationId xmlns:a16="http://schemas.microsoft.com/office/drawing/2014/main" id="{C4D910ED-90C3-4211-8538-7770D3A0DF8F}"/>
+                <a16:creationId xmlns:a16="http://schemas.microsoft.com/office/drawing/2014/main" id="{0CF67BF5-D282-4E79-89C1-EACEC9CAEA63}"/>
+              </a:ext>
+            </a:extLst>
+          </p:cNvPr>
+          <p:cNvSpPr txBox="1"/>
+          <p:nvPr/>
+        </p:nvSpPr>
+        <p:spPr>
+          <a:xfrm>
+            <a:off x="7709143" y="1173211"/>
+            <a:ext cx="838691" cy="461665"/>
+          </a:xfrm>
+          <a:prstGeom prst="rect">
+            <a:avLst/>
+          </a:prstGeom>
+          <a:noFill/>
+        </p:spPr>
+        <p:txBody>
+          <a:bodyPr wrap="none" rtlCol="0">
+            <a:spAutoFit/>
+          </a:bodyPr>
+          <a:lstStyle/>
+          <a:p>
+            <a:r>
+              <a:rPr lang="en-US" sz="2400" b="1" dirty="0">
+                <a:solidFill>
+                  <a:srgbClr val="FF0000"/>
+                </a:solidFill>
+              </a:rPr>
+              <a:t>EMIT</a:t>
+            </a:r>
+          </a:p>
+        </p:txBody>
+      </p:sp>
+      <p:sp>
+        <p:nvSpPr>
+          <p:cNvPr id="22" name="Arrow: Right 21">
+            <a:extLst>
+              <a:ext uri="{FF2B5EF4-FFF2-40B4-BE49-F238E27FC236}">
+                <a16:creationId xmlns:a16="http://schemas.microsoft.com/office/drawing/2014/main" id="{1C9302FA-AB17-4BD2-8B89-88D14559792D}"/>
               </a:ext>
             </a:extLst>
           </p:cNvPr>
@@ -6267,14 +6296,21 @@
           <p:nvPr/>
         </p:nvSpPr>
         <p:spPr>
-          <a:xfrm>
-            <a:off x="8989056" y="4948698"/>
-            <a:ext cx="2573027" cy="1130766"/>
-          </a:xfrm>
-          <a:prstGeom prst="roundRect">
-            <a:avLst/>
-          </a:prstGeom>
-          <a:noFill/>
+          <a:xfrm flipH="1">
+            <a:off x="7408857" y="1549523"/>
+            <a:ext cx="1283420" cy="478371"/>
+          </a:xfrm>
+          <a:prstGeom prst="rightArrow">
+            <a:avLst/>
+          </a:prstGeom>
+          <a:solidFill>
+            <a:srgbClr val="FF0000"/>
+          </a:solidFill>
+          <a:ln>
+            <a:solidFill>
+              <a:srgbClr val="FF0000"/>
+            </a:solidFill>
+          </a:ln>
         </p:spPr>
         <p:style>
           <a:lnRef idx="2">
@@ -6297,16 +6333,20 @@
           <a:lstStyle/>
           <a:p>
             <a:pPr algn="ctr"/>
-            <a:endParaRPr lang="en-US"/>
-          </a:p>
-        </p:txBody>
-      </p:sp>
-      <p:sp>
-        <p:nvSpPr>
-          <p:cNvPr id="20" name="TextBox 19">
+            <a:endParaRPr lang="en-US">
+              <a:solidFill>
+                <a:srgbClr val="FF0000"/>
+              </a:solidFill>
+            </a:endParaRPr>
+          </a:p>
+        </p:txBody>
+      </p:sp>
+      <p:sp>
+        <p:nvSpPr>
+          <p:cNvPr id="23" name="TextBox 22">
             <a:extLst>
               <a:ext uri="{FF2B5EF4-FFF2-40B4-BE49-F238E27FC236}">
-                <a16:creationId xmlns:a16="http://schemas.microsoft.com/office/drawing/2014/main" id="{E5C54773-D013-4D8C-950D-1205FF0281CB}"/>
+                <a16:creationId xmlns:a16="http://schemas.microsoft.com/office/drawing/2014/main" id="{BC366F20-846F-49EF-A41E-E59905944DD2}"/>
               </a:ext>
             </a:extLst>
           </p:cNvPr>
@@ -6315,8 +6355,8 @@
         </p:nvSpPr>
         <p:spPr>
           <a:xfrm>
-            <a:off x="9362173" y="5239269"/>
-            <a:ext cx="1894942" cy="400110"/>
+            <a:off x="7432920" y="1978594"/>
+            <a:ext cx="2037930" cy="369332"/>
           </a:xfrm>
           <a:prstGeom prst="rect">
             <a:avLst/>
@@ -6330,18 +6370,23 @@
           <a:lstStyle/>
           <a:p>
             <a:r>
-              <a:rPr lang="en-US" sz="2000" b="1" dirty="0"/>
-              <a:t>&lt;category-card&gt;</a:t>
-            </a:r>
-          </a:p>
-        </p:txBody>
-      </p:sp>
-      <p:sp>
-        <p:nvSpPr>
-          <p:cNvPr id="21" name="TextBox 20">
+              <a:rPr lang="en-US" b="1" dirty="0">
+                <a:solidFill>
+                  <a:srgbClr val="00B050"/>
+                </a:solidFill>
+              </a:rPr>
+              <a:t>showCategoryFrom</a:t>
+            </a:r>
+            <a:endParaRPr lang="en-US" b="1" dirty="0"/>
+          </a:p>
+        </p:txBody>
+      </p:sp>
+      <p:sp>
+        <p:nvSpPr>
+          <p:cNvPr id="24" name="TextBox 23">
             <a:extLst>
               <a:ext uri="{FF2B5EF4-FFF2-40B4-BE49-F238E27FC236}">
-                <a16:creationId xmlns:a16="http://schemas.microsoft.com/office/drawing/2014/main" id="{0CF67BF5-D282-4E79-89C1-EACEC9CAEA63}"/>
+                <a16:creationId xmlns:a16="http://schemas.microsoft.com/office/drawing/2014/main" id="{1D1C391E-EAF2-4CDA-9B8E-B34499FC2652}"/>
               </a:ext>
             </a:extLst>
           </p:cNvPr>
@@ -6350,8 +6395,8 @@
         </p:nvSpPr>
         <p:spPr>
           <a:xfrm>
-            <a:off x="7709143" y="1173211"/>
-            <a:ext cx="838691" cy="461665"/>
+            <a:off x="7456983" y="2318465"/>
+            <a:ext cx="1574983" cy="369332"/>
           </a:xfrm>
           <a:prstGeom prst="rect">
             <a:avLst/>
@@ -6365,22 +6410,23 @@
           <a:lstStyle/>
           <a:p>
             <a:r>
-              <a:rPr lang="en-US" sz="2400" b="1" dirty="0">
+              <a:rPr lang="en-US" b="1" dirty="0">
                 <a:solidFill>
-                  <a:srgbClr val="FF0000"/>
+                  <a:srgbClr val="00B050"/>
                 </a:solidFill>
               </a:rPr>
-              <a:t>EMIT</a:t>
-            </a:r>
-          </a:p>
-        </p:txBody>
-      </p:sp>
-      <p:sp>
-        <p:nvSpPr>
-          <p:cNvPr id="22" name="Arrow: Right 21">
+              <a:t>categoryName</a:t>
+            </a:r>
+            <a:endParaRPr lang="en-US" b="1" dirty="0"/>
+          </a:p>
+        </p:txBody>
+      </p:sp>
+      <p:sp>
+        <p:nvSpPr>
+          <p:cNvPr id="25" name="Arrow: Right 24">
             <a:extLst>
               <a:ext uri="{FF2B5EF4-FFF2-40B4-BE49-F238E27FC236}">
-                <a16:creationId xmlns:a16="http://schemas.microsoft.com/office/drawing/2014/main" id="{1C9302FA-AB17-4BD2-8B89-88D14559792D}"/>
+                <a16:creationId xmlns:a16="http://schemas.microsoft.com/office/drawing/2014/main" id="{517C185A-273B-469F-9D88-5EA5278DCB17}"/>
               </a:ext>
             </a:extLst>
           </p:cNvPr>
@@ -6388,19 +6434,19 @@
           <p:nvPr/>
         </p:nvSpPr>
         <p:spPr>
-          <a:xfrm flipH="1">
-            <a:off x="7408857" y="1549523"/>
-            <a:ext cx="1283420" cy="478371"/>
+          <a:xfrm>
+            <a:off x="4931302" y="2996192"/>
+            <a:ext cx="1362361" cy="478371"/>
           </a:xfrm>
           <a:prstGeom prst="rightArrow">
             <a:avLst/>
           </a:prstGeom>
           <a:solidFill>
-            <a:srgbClr val="FF0000"/>
+            <a:srgbClr val="00B050"/>
           </a:solidFill>
           <a:ln>
             <a:solidFill>
-              <a:srgbClr val="FF0000"/>
+              <a:srgbClr val="00B050"/>
             </a:solidFill>
           </a:ln>
         </p:spPr>
@@ -6425,20 +6471,16 @@
           <a:lstStyle/>
           <a:p>
             <a:pPr algn="ctr"/>
-            <a:endParaRPr lang="en-US">
-              <a:solidFill>
-                <a:srgbClr val="FF0000"/>
-              </a:solidFill>
-            </a:endParaRPr>
-          </a:p>
-        </p:txBody>
-      </p:sp>
-      <p:sp>
-        <p:nvSpPr>
-          <p:cNvPr id="23" name="TextBox 22">
+            <a:endParaRPr lang="en-US"/>
+          </a:p>
+        </p:txBody>
+      </p:sp>
+      <p:sp>
+        <p:nvSpPr>
+          <p:cNvPr id="26" name="TextBox 25">
             <a:extLst>
               <a:ext uri="{FF2B5EF4-FFF2-40B4-BE49-F238E27FC236}">
-                <a16:creationId xmlns:a16="http://schemas.microsoft.com/office/drawing/2014/main" id="{BC366F20-846F-49EF-A41E-E59905944DD2}"/>
+                <a16:creationId xmlns:a16="http://schemas.microsoft.com/office/drawing/2014/main" id="{D2660A66-D548-4AF6-B291-99FD1DD83EE3}"/>
               </a:ext>
             </a:extLst>
           </p:cNvPr>
@@ -6447,8 +6489,8 @@
         </p:nvSpPr>
         <p:spPr>
           <a:xfrm>
-            <a:off x="7432920" y="1978594"/>
-            <a:ext cx="2037930" cy="369332"/>
+            <a:off x="5094457" y="2713287"/>
+            <a:ext cx="1036053" cy="461665"/>
           </a:xfrm>
           <a:prstGeom prst="rect">
             <a:avLst/>
@@ -6462,23 +6504,22 @@
           <a:lstStyle/>
           <a:p>
             <a:r>
-              <a:rPr lang="en-US" b="1" dirty="0">
+              <a:rPr lang="en-US" sz="2400" b="1" dirty="0">
                 <a:solidFill>
                   <a:srgbClr val="00B050"/>
                 </a:solidFill>
               </a:rPr>
-              <a:t>showCategoryFrom</a:t>
-            </a:r>
-            <a:endParaRPr lang="en-US" b="1" dirty="0"/>
-          </a:p>
-        </p:txBody>
-      </p:sp>
-      <p:sp>
-        <p:nvSpPr>
-          <p:cNvPr id="24" name="TextBox 23">
+              <a:t>PROPS</a:t>
+            </a:r>
+          </a:p>
+        </p:txBody>
+      </p:sp>
+      <p:sp>
+        <p:nvSpPr>
+          <p:cNvPr id="29" name="TextBox 28">
             <a:extLst>
               <a:ext uri="{FF2B5EF4-FFF2-40B4-BE49-F238E27FC236}">
-                <a16:creationId xmlns:a16="http://schemas.microsoft.com/office/drawing/2014/main" id="{1D1C391E-EAF2-4CDA-9B8E-B34499FC2652}"/>
+                <a16:creationId xmlns:a16="http://schemas.microsoft.com/office/drawing/2014/main" id="{44376D2A-F1F8-4AD4-8D15-D79AACDD8CC2}"/>
               </a:ext>
             </a:extLst>
           </p:cNvPr>
@@ -6487,8 +6528,8 @@
         </p:nvSpPr>
         <p:spPr>
           <a:xfrm>
-            <a:off x="7456983" y="2318465"/>
-            <a:ext cx="1574983" cy="369332"/>
+            <a:off x="7751819" y="4814643"/>
+            <a:ext cx="838691" cy="461665"/>
           </a:xfrm>
           <a:prstGeom prst="rect">
             <a:avLst/>
@@ -6502,23 +6543,22 @@
           <a:lstStyle/>
           <a:p>
             <a:r>
-              <a:rPr lang="en-US" b="1" dirty="0">
+              <a:rPr lang="en-US" sz="2400" b="1" dirty="0">
                 <a:solidFill>
-                  <a:srgbClr val="00B050"/>
+                  <a:srgbClr val="FF0000"/>
                 </a:solidFill>
               </a:rPr>
-              <a:t>categoryName</a:t>
-            </a:r>
-            <a:endParaRPr lang="en-US" b="1" dirty="0"/>
-          </a:p>
-        </p:txBody>
-      </p:sp>
-      <p:sp>
-        <p:nvSpPr>
-          <p:cNvPr id="25" name="Arrow: Right 24">
+              <a:t>EMIT</a:t>
+            </a:r>
+          </a:p>
+        </p:txBody>
+      </p:sp>
+      <p:sp>
+        <p:nvSpPr>
+          <p:cNvPr id="30" name="Arrow: Right 29">
             <a:extLst>
               <a:ext uri="{FF2B5EF4-FFF2-40B4-BE49-F238E27FC236}">
-                <a16:creationId xmlns:a16="http://schemas.microsoft.com/office/drawing/2014/main" id="{517C185A-273B-469F-9D88-5EA5278DCB17}"/>
+                <a16:creationId xmlns:a16="http://schemas.microsoft.com/office/drawing/2014/main" id="{9CB95AE0-F140-4635-BB19-4D2684FF1E16}"/>
               </a:ext>
             </a:extLst>
           </p:cNvPr>
@@ -6526,19 +6566,19 @@
           <p:nvPr/>
         </p:nvSpPr>
         <p:spPr>
-          <a:xfrm>
-            <a:off x="5743366" y="2838937"/>
-            <a:ext cx="1362361" cy="478371"/>
+          <a:xfrm flipH="1">
+            <a:off x="7451533" y="5190955"/>
+            <a:ext cx="1283420" cy="478371"/>
           </a:xfrm>
           <a:prstGeom prst="rightArrow">
             <a:avLst/>
           </a:prstGeom>
           <a:solidFill>
-            <a:srgbClr val="00B050"/>
+            <a:srgbClr val="FF0000"/>
           </a:solidFill>
           <a:ln>
             <a:solidFill>
-              <a:srgbClr val="00B050"/>
+              <a:srgbClr val="FF0000"/>
             </a:solidFill>
           </a:ln>
         </p:spPr>
@@ -6563,16 +6603,20 @@
           <a:lstStyle/>
           <a:p>
             <a:pPr algn="ctr"/>
-            <a:endParaRPr lang="en-US"/>
-          </a:p>
-        </p:txBody>
-      </p:sp>
-      <p:sp>
-        <p:nvSpPr>
-          <p:cNvPr id="26" name="TextBox 25">
+            <a:endParaRPr lang="en-US">
+              <a:solidFill>
+                <a:srgbClr val="FF0000"/>
+              </a:solidFill>
+            </a:endParaRPr>
+          </a:p>
+        </p:txBody>
+      </p:sp>
+      <p:sp>
+        <p:nvSpPr>
+          <p:cNvPr id="31" name="TextBox 30">
             <a:extLst>
               <a:ext uri="{FF2B5EF4-FFF2-40B4-BE49-F238E27FC236}">
-                <a16:creationId xmlns:a16="http://schemas.microsoft.com/office/drawing/2014/main" id="{D2660A66-D548-4AF6-B291-99FD1DD83EE3}"/>
+                <a16:creationId xmlns:a16="http://schemas.microsoft.com/office/drawing/2014/main" id="{B260FA0F-07A6-4284-B12B-5C2E0153839F}"/>
               </a:ext>
             </a:extLst>
           </p:cNvPr>
@@ -6581,47 +6625,8 @@
         </p:nvSpPr>
         <p:spPr>
           <a:xfrm>
-            <a:off x="5906521" y="2556032"/>
-            <a:ext cx="1036053" cy="461665"/>
-          </a:xfrm>
-          <a:prstGeom prst="rect">
-            <a:avLst/>
-          </a:prstGeom>
-          <a:noFill/>
-        </p:spPr>
-        <p:txBody>
-          <a:bodyPr wrap="none" rtlCol="0">
-            <a:spAutoFit/>
-          </a:bodyPr>
-          <a:lstStyle/>
-          <a:p>
-            <a:r>
-              <a:rPr lang="en-US" sz="2400" b="1" dirty="0">
-                <a:solidFill>
-                  <a:srgbClr val="00B050"/>
-                </a:solidFill>
-              </a:rPr>
-              <a:t>PROPS</a:t>
-            </a:r>
-          </a:p>
-        </p:txBody>
-      </p:sp>
-      <p:sp>
-        <p:nvSpPr>
-          <p:cNvPr id="27" name="TextBox 26">
-            <a:extLst>
-              <a:ext uri="{FF2B5EF4-FFF2-40B4-BE49-F238E27FC236}">
-                <a16:creationId xmlns:a16="http://schemas.microsoft.com/office/drawing/2014/main" id="{56EE91F8-B1AB-41C4-9B98-5EB1E04959DA}"/>
-              </a:ext>
-            </a:extLst>
-          </p:cNvPr>
-          <p:cNvSpPr txBox="1"/>
-          <p:nvPr/>
-        </p:nvSpPr>
-        <p:spPr>
-          <a:xfrm>
-            <a:off x="5882880" y="3256371"/>
-            <a:ext cx="1455207" cy="369332"/>
+            <a:off x="7475596" y="5620026"/>
+            <a:ext cx="1190262" cy="369332"/>
           </a:xfrm>
           <a:prstGeom prst="rect">
             <a:avLst/>
@@ -6640,7 +6645,7 @@
                   <a:srgbClr val="00B050"/>
                 </a:solidFill>
               </a:rPr>
-              <a:t>categoryData</a:t>
+              <a:t>categoryId</a:t>
             </a:r>
             <a:endParaRPr lang="en-US" b="1" dirty="0"/>
           </a:p>
@@ -6648,10 +6653,10 @@
       </p:sp>
       <p:sp>
         <p:nvSpPr>
-          <p:cNvPr id="28" name="TextBox 27">
+          <p:cNvPr id="33" name="TextBox 32">
             <a:extLst>
               <a:ext uri="{FF2B5EF4-FFF2-40B4-BE49-F238E27FC236}">
-                <a16:creationId xmlns:a16="http://schemas.microsoft.com/office/drawing/2014/main" id="{E327E897-1451-4C84-872A-8CD00EECB718}"/>
+                <a16:creationId xmlns:a16="http://schemas.microsoft.com/office/drawing/2014/main" id="{539DDD33-0D8E-4322-A6E2-DBCC838B7B4A}"/>
               </a:ext>
             </a:extLst>
           </p:cNvPr>
@@ -6660,8 +6665,8 @@
         </p:nvSpPr>
         <p:spPr>
           <a:xfrm>
-            <a:off x="5906428" y="3523264"/>
-            <a:ext cx="1354794" cy="369332"/>
+            <a:off x="7483237" y="5894798"/>
+            <a:ext cx="993990" cy="369332"/>
           </a:xfrm>
           <a:prstGeom prst="rect">
             <a:avLst/>
@@ -6680,7 +6685,7 @@
                   <a:srgbClr val="00B050"/>
                 </a:solidFill>
               </a:rPr>
-              <a:t>isShowForm</a:t>
+              <a:t>IsEditing</a:t>
             </a:r>
             <a:endParaRPr lang="en-US" b="1" dirty="0"/>
           </a:p>
@@ -6688,49 +6693,10 @@
       </p:sp>
       <p:sp>
         <p:nvSpPr>
-          <p:cNvPr id="29" name="TextBox 28">
+          <p:cNvPr id="34" name="Rounded Rectangle 17">
             <a:extLst>
               <a:ext uri="{FF2B5EF4-FFF2-40B4-BE49-F238E27FC236}">
-                <a16:creationId xmlns:a16="http://schemas.microsoft.com/office/drawing/2014/main" id="{44376D2A-F1F8-4AD4-8D15-D79AACDD8CC2}"/>
-              </a:ext>
-            </a:extLst>
-          </p:cNvPr>
-          <p:cNvSpPr txBox="1"/>
-          <p:nvPr/>
-        </p:nvSpPr>
-        <p:spPr>
-          <a:xfrm>
-            <a:off x="7751819" y="4814643"/>
-            <a:ext cx="838691" cy="461665"/>
-          </a:xfrm>
-          <a:prstGeom prst="rect">
-            <a:avLst/>
-          </a:prstGeom>
-          <a:noFill/>
-        </p:spPr>
-        <p:txBody>
-          <a:bodyPr wrap="none" rtlCol="0">
-            <a:spAutoFit/>
-          </a:bodyPr>
-          <a:lstStyle/>
-          <a:p>
-            <a:r>
-              <a:rPr lang="en-US" sz="2400" b="1" dirty="0">
-                <a:solidFill>
-                  <a:srgbClr val="FF0000"/>
-                </a:solidFill>
-              </a:rPr>
-              <a:t>EMIT</a:t>
-            </a:r>
-          </a:p>
-        </p:txBody>
-      </p:sp>
-      <p:sp>
-        <p:nvSpPr>
-          <p:cNvPr id="30" name="Arrow: Right 29">
-            <a:extLst>
-              <a:ext uri="{FF2B5EF4-FFF2-40B4-BE49-F238E27FC236}">
-                <a16:creationId xmlns:a16="http://schemas.microsoft.com/office/drawing/2014/main" id="{9CB95AE0-F140-4635-BB19-4D2684FF1E16}"/>
+                <a16:creationId xmlns:a16="http://schemas.microsoft.com/office/drawing/2014/main" id="{FF28E4AB-A79A-46D8-9376-444D38944408}"/>
               </a:ext>
             </a:extLst>
           </p:cNvPr>
@@ -6738,20 +6704,19 @@
           <p:nvPr/>
         </p:nvSpPr>
         <p:spPr>
-          <a:xfrm flipH="1">
-            <a:off x="7451533" y="5190955"/>
-            <a:ext cx="1283420" cy="478371"/>
-          </a:xfrm>
-          <a:prstGeom prst="rightArrow">
-            <a:avLst/>
-          </a:prstGeom>
-          <a:solidFill>
-            <a:srgbClr val="FF0000"/>
-          </a:solidFill>
-          <a:ln>
+          <a:xfrm>
+            <a:off x="162820" y="5102909"/>
+            <a:ext cx="4387215" cy="1487170"/>
+          </a:xfrm>
+          <a:prstGeom prst="roundRect">
+            <a:avLst/>
+          </a:prstGeom>
+          <a:noFill/>
+          <a:ln w="28575" cmpd="sng">
             <a:solidFill>
-              <a:srgbClr val="FF0000"/>
+              <a:srgbClr val="00B050"/>
             </a:solidFill>
+            <a:prstDash val="sysDot"/>
           </a:ln>
         </p:spPr>
         <p:style>
@@ -6775,20 +6740,16 @@
           <a:lstStyle/>
           <a:p>
             <a:pPr algn="ctr"/>
-            <a:endParaRPr lang="en-US">
-              <a:solidFill>
-                <a:srgbClr val="FF0000"/>
-              </a:solidFill>
-            </a:endParaRPr>
-          </a:p>
-        </p:txBody>
-      </p:sp>
-      <p:sp>
-        <p:nvSpPr>
-          <p:cNvPr id="31" name="TextBox 30">
+            <a:endParaRPr lang="en-US"/>
+          </a:p>
+        </p:txBody>
+      </p:sp>
+      <p:sp>
+        <p:nvSpPr>
+          <p:cNvPr id="35" name="Text Box 18">
             <a:extLst>
               <a:ext uri="{FF2B5EF4-FFF2-40B4-BE49-F238E27FC236}">
-                <a16:creationId xmlns:a16="http://schemas.microsoft.com/office/drawing/2014/main" id="{B260FA0F-07A6-4284-B12B-5C2E0153839F}"/>
+                <a16:creationId xmlns:a16="http://schemas.microsoft.com/office/drawing/2014/main" id="{48049348-C002-48A4-9B0A-CCA56818563C}"/>
               </a:ext>
             </a:extLst>
           </p:cNvPr>
@@ -6797,8 +6758,57 @@
         </p:nvSpPr>
         <p:spPr>
           <a:xfrm>
-            <a:off x="7475596" y="5620026"/>
-            <a:ext cx="1190262" cy="369332"/>
+            <a:off x="338950" y="5320419"/>
+            <a:ext cx="4034953" cy="1200329"/>
+          </a:xfrm>
+          <a:prstGeom prst="rect">
+            <a:avLst/>
+          </a:prstGeom>
+          <a:noFill/>
+        </p:spPr>
+        <p:txBody>
+          <a:bodyPr wrap="square" rtlCol="0">
+            <a:spAutoFit/>
+          </a:bodyPr>
+          <a:lstStyle/>
+          <a:p>
+            <a:r>
+              <a:rPr lang="" altLang="en-US" b="1" dirty="0">
+                <a:solidFill>
+                  <a:srgbClr val="FF0000"/>
+                </a:solidFill>
+              </a:rPr>
+              <a:t>- &lt;add-search&gt; contain add+ button and search bar</a:t>
+            </a:r>
+          </a:p>
+          <a:p>
+            <a:r>
+              <a:rPr lang="" altLang="en-US" b="1" dirty="0">
+                <a:solidFill>
+                  <a:srgbClr val="FF0000"/>
+                </a:solidFill>
+              </a:rPr>
+              <a:t>- &lt;category-form&gt; is shown when we click add+</a:t>
+            </a:r>
+          </a:p>
+        </p:txBody>
+      </p:sp>
+      <p:sp>
+        <p:nvSpPr>
+          <p:cNvPr id="36" name="TextBox 35">
+            <a:extLst>
+              <a:ext uri="{FF2B5EF4-FFF2-40B4-BE49-F238E27FC236}">
+                <a16:creationId xmlns:a16="http://schemas.microsoft.com/office/drawing/2014/main" id="{BD9005A7-DAB2-4A84-A821-0B43538FFA62}"/>
+              </a:ext>
+            </a:extLst>
+          </p:cNvPr>
+          <p:cNvSpPr txBox="1"/>
+          <p:nvPr/>
+        </p:nvSpPr>
+        <p:spPr>
+          <a:xfrm>
+            <a:off x="7508682" y="6220747"/>
+            <a:ext cx="956096" cy="369332"/>
           </a:xfrm>
           <a:prstGeom prst="rect">
             <a:avLst/>
@@ -6817,98 +6827,48 @@
                   <a:srgbClr val="00B050"/>
                 </a:solidFill>
               </a:rPr>
-              <a:t>categoryId</a:t>
+              <a:t>isDelete</a:t>
             </a:r>
             <a:endParaRPr lang="en-US" b="1" dirty="0"/>
           </a:p>
         </p:txBody>
       </p:sp>
-      <p:sp>
-        <p:nvSpPr>
-          <p:cNvPr id="32" name="TextBox 31">
+    </p:spTree>
+    <p:extLst>
+      <p:ext uri="{BB962C8B-B14F-4D97-AF65-F5344CB8AC3E}">
+        <p14:creationId xmlns:p14="http://schemas.microsoft.com/office/powerpoint/2010/main" val="3599471506"/>
+      </p:ext>
+    </p:extLst>
+  </p:cSld>
+  <p:clrMapOvr>
+    <a:masterClrMapping/>
+  </p:clrMapOvr>
+</p:sld>
+</file>
+
+<file path=ppt/slides/slide6.xml><?xml version="1.0" encoding="utf-8"?>
+<p:sld xmlns:a="http://schemas.openxmlformats.org/drawingml/2006/main" xmlns:r="http://schemas.openxmlformats.org/officeDocument/2006/relationships" xmlns:p="http://schemas.openxmlformats.org/presentationml/2006/main">
+  <p:cSld>
+    <p:spTree>
+      <p:nvGrpSpPr>
+        <p:cNvPr id="1" name=""/>
+        <p:cNvGrpSpPr/>
+        <p:nvPr/>
+      </p:nvGrpSpPr>
+      <p:grpSpPr>
+        <a:xfrm>
+          <a:off x="0" y="0"/>
+          <a:ext cx="0" cy="0"/>
+          <a:chOff x="0" y="0"/>
+          <a:chExt cx="0" cy="0"/>
+        </a:xfrm>
+      </p:grpSpPr>
+      <p:sp>
+        <p:nvSpPr>
+          <p:cNvPr id="14" name="Rectangle: Rounded Corners 13">
             <a:extLst>
               <a:ext uri="{FF2B5EF4-FFF2-40B4-BE49-F238E27FC236}">
-                <a16:creationId xmlns:a16="http://schemas.microsoft.com/office/drawing/2014/main" id="{44854AAD-0C48-4300-9CDE-7939C05A8904}"/>
-              </a:ext>
-            </a:extLst>
-          </p:cNvPr>
-          <p:cNvSpPr txBox="1"/>
-          <p:nvPr/>
-        </p:nvSpPr>
-        <p:spPr>
-          <a:xfrm>
-            <a:off x="5906428" y="3793391"/>
-            <a:ext cx="989182" cy="369332"/>
-          </a:xfrm>
-          <a:prstGeom prst="rect">
-            <a:avLst/>
-          </a:prstGeom>
-          <a:noFill/>
-        </p:spPr>
-        <p:txBody>
-          <a:bodyPr wrap="none" rtlCol="0">
-            <a:spAutoFit/>
-          </a:bodyPr>
-          <a:lstStyle/>
-          <a:p>
-            <a:r>
-              <a:rPr lang="en-US" b="1" dirty="0">
-                <a:solidFill>
-                  <a:srgbClr val="00B050"/>
-                </a:solidFill>
-              </a:rPr>
-              <a:t>isEditing</a:t>
-            </a:r>
-            <a:endParaRPr lang="en-US" b="1" dirty="0"/>
-          </a:p>
-        </p:txBody>
-      </p:sp>
-      <p:sp>
-        <p:nvSpPr>
-          <p:cNvPr id="33" name="TextBox 32">
-            <a:extLst>
-              <a:ext uri="{FF2B5EF4-FFF2-40B4-BE49-F238E27FC236}">
-                <a16:creationId xmlns:a16="http://schemas.microsoft.com/office/drawing/2014/main" id="{539DDD33-0D8E-4322-A6E2-DBCC838B7B4A}"/>
-              </a:ext>
-            </a:extLst>
-          </p:cNvPr>
-          <p:cNvSpPr txBox="1"/>
-          <p:nvPr/>
-        </p:nvSpPr>
-        <p:spPr>
-          <a:xfrm>
-            <a:off x="7483237" y="5894798"/>
-            <a:ext cx="993990" cy="369332"/>
-          </a:xfrm>
-          <a:prstGeom prst="rect">
-            <a:avLst/>
-          </a:prstGeom>
-          <a:noFill/>
-        </p:spPr>
-        <p:txBody>
-          <a:bodyPr wrap="none" rtlCol="0">
-            <a:spAutoFit/>
-          </a:bodyPr>
-          <a:lstStyle/>
-          <a:p>
-            <a:r>
-              <a:rPr lang="en-US" b="1" dirty="0">
-                <a:solidFill>
-                  <a:srgbClr val="00B050"/>
-                </a:solidFill>
-              </a:rPr>
-              <a:t>IsEditing</a:t>
-            </a:r>
-            <a:endParaRPr lang="en-US" b="1" dirty="0"/>
-          </a:p>
-        </p:txBody>
-      </p:sp>
-      <p:sp>
-        <p:nvSpPr>
-          <p:cNvPr id="34" name="Rounded Rectangle 17">
-            <a:extLst>
-              <a:ext uri="{FF2B5EF4-FFF2-40B4-BE49-F238E27FC236}">
-                <a16:creationId xmlns:a16="http://schemas.microsoft.com/office/drawing/2014/main" id="{FF28E4AB-A79A-46D8-9376-444D38944408}"/>
+                <a16:creationId xmlns:a16="http://schemas.microsoft.com/office/drawing/2014/main" id="{509071B7-F367-4F82-97EE-FC373F10438D}"/>
               </a:ext>
             </a:extLst>
           </p:cNvPr>
@@ -6917,19 +6877,13 @@
         </p:nvSpPr>
         <p:spPr>
           <a:xfrm>
-            <a:off x="162820" y="5102909"/>
-            <a:ext cx="4387215" cy="1487170"/>
+            <a:off x="2539547" y="3087580"/>
+            <a:ext cx="2112047" cy="1349276"/>
           </a:xfrm>
           <a:prstGeom prst="roundRect">
             <a:avLst/>
           </a:prstGeom>
           <a:noFill/>
-          <a:ln w="28575" cmpd="sng">
-            <a:solidFill>
-              <a:srgbClr val="00B050"/>
-            </a:solidFill>
-            <a:prstDash val="sysDot"/>
-          </a:ln>
         </p:spPr>
         <p:style>
           <a:lnRef idx="2">
@@ -6958,10 +6912,1128 @@
       </p:sp>
       <p:sp>
         <p:nvSpPr>
-          <p:cNvPr id="35" name="Text Box 18">
+          <p:cNvPr id="15" name="TextBox 14">
             <a:extLst>
               <a:ext uri="{FF2B5EF4-FFF2-40B4-BE49-F238E27FC236}">
-                <a16:creationId xmlns:a16="http://schemas.microsoft.com/office/drawing/2014/main" id="{48049348-C002-48A4-9B0A-CCA56818563C}"/>
+                <a16:creationId xmlns:a16="http://schemas.microsoft.com/office/drawing/2014/main" id="{4EA7DCF7-B16F-4D2B-ADCC-DE85633242EA}"/>
+              </a:ext>
+            </a:extLst>
+          </p:cNvPr>
+          <p:cNvSpPr txBox="1"/>
+          <p:nvPr/>
+        </p:nvSpPr>
+        <p:spPr>
+          <a:xfrm>
+            <a:off x="2615069" y="3391168"/>
+            <a:ext cx="1624868" cy="400110"/>
+          </a:xfrm>
+          <a:prstGeom prst="rect">
+            <a:avLst/>
+          </a:prstGeom>
+          <a:noFill/>
+        </p:spPr>
+        <p:txBody>
+          <a:bodyPr wrap="none" rtlCol="0">
+            <a:spAutoFit/>
+          </a:bodyPr>
+          <a:lstStyle/>
+          <a:p>
+            <a:r>
+              <a:rPr lang="en-US" sz="2000" b="1" dirty="0"/>
+              <a:t>&lt;event-view&gt;</a:t>
+            </a:r>
+          </a:p>
+        </p:txBody>
+      </p:sp>
+      <p:sp>
+        <p:nvSpPr>
+          <p:cNvPr id="16" name="TextBox 15">
+            <a:extLst>
+              <a:ext uri="{FF2B5EF4-FFF2-40B4-BE49-F238E27FC236}">
+                <a16:creationId xmlns:a16="http://schemas.microsoft.com/office/drawing/2014/main" id="{56D989C1-7D4D-4A8B-8527-F2D3C83E5E41}"/>
+              </a:ext>
+            </a:extLst>
+          </p:cNvPr>
+          <p:cNvSpPr txBox="1"/>
+          <p:nvPr/>
+        </p:nvSpPr>
+        <p:spPr>
+          <a:xfrm>
+            <a:off x="6404929" y="3081338"/>
+            <a:ext cx="838691" cy="461665"/>
+          </a:xfrm>
+          <a:prstGeom prst="rect">
+            <a:avLst/>
+          </a:prstGeom>
+          <a:noFill/>
+        </p:spPr>
+        <p:txBody>
+          <a:bodyPr wrap="none" rtlCol="0">
+            <a:spAutoFit/>
+          </a:bodyPr>
+          <a:lstStyle/>
+          <a:p>
+            <a:r>
+              <a:rPr lang="en-US" sz="2400" b="1" dirty="0">
+                <a:solidFill>
+                  <a:srgbClr val="FF0000"/>
+                </a:solidFill>
+              </a:rPr>
+              <a:t>EMIT</a:t>
+            </a:r>
+          </a:p>
+        </p:txBody>
+      </p:sp>
+      <p:sp>
+        <p:nvSpPr>
+          <p:cNvPr id="17" name="Arrow: Right 16">
+            <a:extLst>
+              <a:ext uri="{FF2B5EF4-FFF2-40B4-BE49-F238E27FC236}">
+                <a16:creationId xmlns:a16="http://schemas.microsoft.com/office/drawing/2014/main" id="{0F3D2B4E-6AD9-4D00-80C2-7862EC63104F}"/>
+              </a:ext>
+            </a:extLst>
+          </p:cNvPr>
+          <p:cNvSpPr/>
+          <p:nvPr/>
+        </p:nvSpPr>
+        <p:spPr>
+          <a:xfrm flipH="1">
+            <a:off x="6104643" y="3457650"/>
+            <a:ext cx="1283420" cy="478371"/>
+          </a:xfrm>
+          <a:prstGeom prst="rightArrow">
+            <a:avLst/>
+          </a:prstGeom>
+          <a:solidFill>
+            <a:srgbClr val="FF0000"/>
+          </a:solidFill>
+          <a:ln>
+            <a:solidFill>
+              <a:srgbClr val="FF0000"/>
+            </a:solidFill>
+          </a:ln>
+        </p:spPr>
+        <p:style>
+          <a:lnRef idx="2">
+            <a:schemeClr val="accent1">
+              <a:shade val="50000"/>
+            </a:schemeClr>
+          </a:lnRef>
+          <a:fillRef idx="1">
+            <a:schemeClr val="accent1"/>
+          </a:fillRef>
+          <a:effectRef idx="0">
+            <a:schemeClr val="accent1"/>
+          </a:effectRef>
+          <a:fontRef idx="minor">
+            <a:schemeClr val="lt1"/>
+          </a:fontRef>
+        </p:style>
+        <p:txBody>
+          <a:bodyPr rtlCol="0" anchor="ctr"/>
+          <a:lstStyle/>
+          <a:p>
+            <a:pPr algn="ctr"/>
+            <a:endParaRPr lang="en-US">
+              <a:solidFill>
+                <a:srgbClr val="FF0000"/>
+              </a:solidFill>
+            </a:endParaRPr>
+          </a:p>
+        </p:txBody>
+      </p:sp>
+      <p:sp>
+        <p:nvSpPr>
+          <p:cNvPr id="18" name="TextBox 17">
+            <a:extLst>
+              <a:ext uri="{FF2B5EF4-FFF2-40B4-BE49-F238E27FC236}">
+                <a16:creationId xmlns:a16="http://schemas.microsoft.com/office/drawing/2014/main" id="{1211DC2F-28EF-4139-9332-1F4EB270B28B}"/>
+              </a:ext>
+            </a:extLst>
+          </p:cNvPr>
+          <p:cNvSpPr txBox="1"/>
+          <p:nvPr/>
+        </p:nvSpPr>
+        <p:spPr>
+          <a:xfrm>
+            <a:off x="4600894" y="3874547"/>
+            <a:ext cx="1017651" cy="369332"/>
+          </a:xfrm>
+          <a:prstGeom prst="rect">
+            <a:avLst/>
+          </a:prstGeom>
+          <a:noFill/>
+        </p:spPr>
+        <p:txBody>
+          <a:bodyPr wrap="none" rtlCol="0">
+            <a:spAutoFit/>
+          </a:bodyPr>
+          <a:lstStyle/>
+          <a:p>
+            <a:r>
+              <a:rPr lang="en-US" b="1" dirty="0">
+                <a:solidFill>
+                  <a:srgbClr val="00B050"/>
+                </a:solidFill>
+              </a:rPr>
+              <a:t>events</a:t>
+            </a:r>
+            <a:r>
+              <a:rPr lang="en-US" b="1" dirty="0"/>
+              <a:t>[ ]</a:t>
+            </a:r>
+          </a:p>
+        </p:txBody>
+      </p:sp>
+      <p:sp>
+        <p:nvSpPr>
+          <p:cNvPr id="19" name="TextBox 18">
+            <a:extLst>
+              <a:ext uri="{FF2B5EF4-FFF2-40B4-BE49-F238E27FC236}">
+                <a16:creationId xmlns:a16="http://schemas.microsoft.com/office/drawing/2014/main" id="{4F3814EB-78BB-4565-A979-31B478076D60}"/>
+              </a:ext>
+            </a:extLst>
+          </p:cNvPr>
+          <p:cNvSpPr txBox="1"/>
+          <p:nvPr/>
+        </p:nvSpPr>
+        <p:spPr>
+          <a:xfrm>
+            <a:off x="6128706" y="3886721"/>
+            <a:ext cx="1573188" cy="369332"/>
+          </a:xfrm>
+          <a:prstGeom prst="rect">
+            <a:avLst/>
+          </a:prstGeom>
+          <a:noFill/>
+        </p:spPr>
+        <p:txBody>
+          <a:bodyPr wrap="none" rtlCol="0">
+            <a:spAutoFit/>
+          </a:bodyPr>
+          <a:lstStyle/>
+          <a:p>
+            <a:r>
+              <a:rPr lang="en-US" b="1" dirty="0">
+                <a:solidFill>
+                  <a:srgbClr val="00B050"/>
+                </a:solidFill>
+              </a:rPr>
+              <a:t>newEventData</a:t>
+            </a:r>
+            <a:endParaRPr lang="en-US" b="1" dirty="0"/>
+          </a:p>
+        </p:txBody>
+      </p:sp>
+      <p:sp>
+        <p:nvSpPr>
+          <p:cNvPr id="20" name="Rectangle: Rounded Corners 19">
+            <a:extLst>
+              <a:ext uri="{FF2B5EF4-FFF2-40B4-BE49-F238E27FC236}">
+                <a16:creationId xmlns:a16="http://schemas.microsoft.com/office/drawing/2014/main" id="{849D6E0A-2AA8-409E-AECD-6CC2490EB442}"/>
+              </a:ext>
+            </a:extLst>
+          </p:cNvPr>
+          <p:cNvSpPr/>
+          <p:nvPr/>
+        </p:nvSpPr>
+        <p:spPr>
+          <a:xfrm>
+            <a:off x="7263103" y="793578"/>
+            <a:ext cx="2573027" cy="1130766"/>
+          </a:xfrm>
+          <a:prstGeom prst="roundRect">
+            <a:avLst/>
+          </a:prstGeom>
+          <a:noFill/>
+        </p:spPr>
+        <p:style>
+          <a:lnRef idx="2">
+            <a:schemeClr val="accent1">
+              <a:shade val="50000"/>
+            </a:schemeClr>
+          </a:lnRef>
+          <a:fillRef idx="1">
+            <a:schemeClr val="accent1"/>
+          </a:fillRef>
+          <a:effectRef idx="0">
+            <a:schemeClr val="accent1"/>
+          </a:effectRef>
+          <a:fontRef idx="minor">
+            <a:schemeClr val="lt1"/>
+          </a:fontRef>
+        </p:style>
+        <p:txBody>
+          <a:bodyPr rtlCol="0" anchor="ctr"/>
+          <a:lstStyle/>
+          <a:p>
+            <a:pPr algn="ctr"/>
+            <a:endParaRPr lang="en-US"/>
+          </a:p>
+        </p:txBody>
+      </p:sp>
+      <p:sp>
+        <p:nvSpPr>
+          <p:cNvPr id="21" name="TextBox 20">
+            <a:extLst>
+              <a:ext uri="{FF2B5EF4-FFF2-40B4-BE49-F238E27FC236}">
+                <a16:creationId xmlns:a16="http://schemas.microsoft.com/office/drawing/2014/main" id="{9D33FF50-2281-41E5-B17B-CF742417838A}"/>
+              </a:ext>
+            </a:extLst>
+          </p:cNvPr>
+          <p:cNvSpPr txBox="1"/>
+          <p:nvPr/>
+        </p:nvSpPr>
+        <p:spPr>
+          <a:xfrm>
+            <a:off x="7742567" y="1088995"/>
+            <a:ext cx="1614096" cy="400110"/>
+          </a:xfrm>
+          <a:prstGeom prst="rect">
+            <a:avLst/>
+          </a:prstGeom>
+          <a:noFill/>
+        </p:spPr>
+        <p:txBody>
+          <a:bodyPr wrap="none" rtlCol="0">
+            <a:spAutoFit/>
+          </a:bodyPr>
+          <a:lstStyle/>
+          <a:p>
+            <a:r>
+              <a:rPr lang="en-US" sz="2000" b="1" dirty="0"/>
+              <a:t>&lt;add-search&gt;</a:t>
+            </a:r>
+          </a:p>
+        </p:txBody>
+      </p:sp>
+      <p:sp>
+        <p:nvSpPr>
+          <p:cNvPr id="22" name="Rectangle: Rounded Corners 21">
+            <a:extLst>
+              <a:ext uri="{FF2B5EF4-FFF2-40B4-BE49-F238E27FC236}">
+                <a16:creationId xmlns:a16="http://schemas.microsoft.com/office/drawing/2014/main" id="{FA7420F0-1EC0-4D80-884B-284FA36DCDA8}"/>
+              </a:ext>
+            </a:extLst>
+          </p:cNvPr>
+          <p:cNvSpPr/>
+          <p:nvPr/>
+        </p:nvSpPr>
+        <p:spPr>
+          <a:xfrm>
+            <a:off x="7263103" y="3061215"/>
+            <a:ext cx="2573027" cy="1130766"/>
+          </a:xfrm>
+          <a:prstGeom prst="roundRect">
+            <a:avLst/>
+          </a:prstGeom>
+          <a:noFill/>
+        </p:spPr>
+        <p:style>
+          <a:lnRef idx="2">
+            <a:schemeClr val="accent1">
+              <a:shade val="50000"/>
+            </a:schemeClr>
+          </a:lnRef>
+          <a:fillRef idx="1">
+            <a:schemeClr val="accent1"/>
+          </a:fillRef>
+          <a:effectRef idx="0">
+            <a:schemeClr val="accent1"/>
+          </a:effectRef>
+          <a:fontRef idx="minor">
+            <a:schemeClr val="lt1"/>
+          </a:fontRef>
+        </p:style>
+        <p:txBody>
+          <a:bodyPr rtlCol="0" anchor="ctr"/>
+          <a:lstStyle/>
+          <a:p>
+            <a:pPr algn="ctr"/>
+            <a:endParaRPr lang="en-US"/>
+          </a:p>
+        </p:txBody>
+      </p:sp>
+      <p:sp>
+        <p:nvSpPr>
+          <p:cNvPr id="23" name="TextBox 22">
+            <a:extLst>
+              <a:ext uri="{FF2B5EF4-FFF2-40B4-BE49-F238E27FC236}">
+                <a16:creationId xmlns:a16="http://schemas.microsoft.com/office/drawing/2014/main" id="{72BFCE9A-604B-4223-B108-0D98844C186A}"/>
+              </a:ext>
+            </a:extLst>
+          </p:cNvPr>
+          <p:cNvSpPr txBox="1"/>
+          <p:nvPr/>
+        </p:nvSpPr>
+        <p:spPr>
+          <a:xfrm>
+            <a:off x="7636220" y="3351786"/>
+            <a:ext cx="1636666" cy="400110"/>
+          </a:xfrm>
+          <a:prstGeom prst="rect">
+            <a:avLst/>
+          </a:prstGeom>
+          <a:noFill/>
+        </p:spPr>
+        <p:txBody>
+          <a:bodyPr wrap="none" rtlCol="0">
+            <a:spAutoFit/>
+          </a:bodyPr>
+          <a:lstStyle/>
+          <a:p>
+            <a:r>
+              <a:rPr lang="en-US" sz="2000" b="1" dirty="0"/>
+              <a:t>&lt;event-form&gt;</a:t>
+            </a:r>
+          </a:p>
+        </p:txBody>
+      </p:sp>
+      <p:sp>
+        <p:nvSpPr>
+          <p:cNvPr id="24" name="TextBox 23">
+            <a:extLst>
+              <a:ext uri="{FF2B5EF4-FFF2-40B4-BE49-F238E27FC236}">
+                <a16:creationId xmlns:a16="http://schemas.microsoft.com/office/drawing/2014/main" id="{9A26E2D6-0322-4818-A13D-4D8F40BB9D7B}"/>
+              </a:ext>
+            </a:extLst>
+          </p:cNvPr>
+          <p:cNvSpPr txBox="1"/>
+          <p:nvPr/>
+        </p:nvSpPr>
+        <p:spPr>
+          <a:xfrm>
+            <a:off x="7731601" y="5047078"/>
+            <a:ext cx="1579856" cy="400110"/>
+          </a:xfrm>
+          <a:prstGeom prst="rect">
+            <a:avLst/>
+          </a:prstGeom>
+          <a:noFill/>
+        </p:spPr>
+        <p:txBody>
+          <a:bodyPr wrap="none" rtlCol="0">
+            <a:spAutoFit/>
+          </a:bodyPr>
+          <a:lstStyle/>
+          <a:p>
+            <a:r>
+              <a:rPr lang="en-US" sz="2000" b="1" dirty="0"/>
+              <a:t>&lt;event-card&gt;</a:t>
+            </a:r>
+          </a:p>
+        </p:txBody>
+      </p:sp>
+      <p:sp>
+        <p:nvSpPr>
+          <p:cNvPr id="25" name="TextBox 24">
+            <a:extLst>
+              <a:ext uri="{FF2B5EF4-FFF2-40B4-BE49-F238E27FC236}">
+                <a16:creationId xmlns:a16="http://schemas.microsoft.com/office/drawing/2014/main" id="{AFFC6E12-571B-479C-B098-0C873A86454D}"/>
+              </a:ext>
+            </a:extLst>
+          </p:cNvPr>
+          <p:cNvSpPr txBox="1"/>
+          <p:nvPr/>
+        </p:nvSpPr>
+        <p:spPr>
+          <a:xfrm>
+            <a:off x="6260486" y="1029373"/>
+            <a:ext cx="838691" cy="461665"/>
+          </a:xfrm>
+          <a:prstGeom prst="rect">
+            <a:avLst/>
+          </a:prstGeom>
+          <a:noFill/>
+        </p:spPr>
+        <p:txBody>
+          <a:bodyPr wrap="none" rtlCol="0">
+            <a:spAutoFit/>
+          </a:bodyPr>
+          <a:lstStyle/>
+          <a:p>
+            <a:r>
+              <a:rPr lang="en-US" sz="2400" b="1" dirty="0">
+                <a:solidFill>
+                  <a:srgbClr val="FF0000"/>
+                </a:solidFill>
+              </a:rPr>
+              <a:t>EMIT</a:t>
+            </a:r>
+          </a:p>
+        </p:txBody>
+      </p:sp>
+      <p:sp>
+        <p:nvSpPr>
+          <p:cNvPr id="26" name="Arrow: Right 25">
+            <a:extLst>
+              <a:ext uri="{FF2B5EF4-FFF2-40B4-BE49-F238E27FC236}">
+                <a16:creationId xmlns:a16="http://schemas.microsoft.com/office/drawing/2014/main" id="{147B98C3-2516-4D30-86AE-BFE994286DFA}"/>
+              </a:ext>
+            </a:extLst>
+          </p:cNvPr>
+          <p:cNvSpPr/>
+          <p:nvPr/>
+        </p:nvSpPr>
+        <p:spPr>
+          <a:xfrm flipH="1">
+            <a:off x="5960200" y="1405685"/>
+            <a:ext cx="1283420" cy="478371"/>
+          </a:xfrm>
+          <a:prstGeom prst="rightArrow">
+            <a:avLst/>
+          </a:prstGeom>
+          <a:solidFill>
+            <a:srgbClr val="FF0000"/>
+          </a:solidFill>
+          <a:ln>
+            <a:solidFill>
+              <a:srgbClr val="FF0000"/>
+            </a:solidFill>
+          </a:ln>
+        </p:spPr>
+        <p:style>
+          <a:lnRef idx="2">
+            <a:schemeClr val="accent1">
+              <a:shade val="50000"/>
+            </a:schemeClr>
+          </a:lnRef>
+          <a:fillRef idx="1">
+            <a:schemeClr val="accent1"/>
+          </a:fillRef>
+          <a:effectRef idx="0">
+            <a:schemeClr val="accent1"/>
+          </a:effectRef>
+          <a:fontRef idx="minor">
+            <a:schemeClr val="lt1"/>
+          </a:fontRef>
+        </p:style>
+        <p:txBody>
+          <a:bodyPr rtlCol="0" anchor="ctr"/>
+          <a:lstStyle/>
+          <a:p>
+            <a:pPr algn="ctr"/>
+            <a:endParaRPr lang="en-US">
+              <a:solidFill>
+                <a:srgbClr val="FF0000"/>
+              </a:solidFill>
+            </a:endParaRPr>
+          </a:p>
+        </p:txBody>
+      </p:sp>
+      <p:sp>
+        <p:nvSpPr>
+          <p:cNvPr id="27" name="TextBox 26">
+            <a:extLst>
+              <a:ext uri="{FF2B5EF4-FFF2-40B4-BE49-F238E27FC236}">
+                <a16:creationId xmlns:a16="http://schemas.microsoft.com/office/drawing/2014/main" id="{80D37595-2921-4C65-9C66-691D88D5B244}"/>
+              </a:ext>
+            </a:extLst>
+          </p:cNvPr>
+          <p:cNvSpPr txBox="1"/>
+          <p:nvPr/>
+        </p:nvSpPr>
+        <p:spPr>
+          <a:xfrm>
+            <a:off x="5984263" y="1834756"/>
+            <a:ext cx="1719702" cy="369332"/>
+          </a:xfrm>
+          <a:prstGeom prst="rect">
+            <a:avLst/>
+          </a:prstGeom>
+          <a:noFill/>
+        </p:spPr>
+        <p:txBody>
+          <a:bodyPr wrap="none" rtlCol="0">
+            <a:spAutoFit/>
+          </a:bodyPr>
+          <a:lstStyle/>
+          <a:p>
+            <a:r>
+              <a:rPr lang="en-US" b="1" dirty="0">
+                <a:solidFill>
+                  <a:srgbClr val="00B050"/>
+                </a:solidFill>
+              </a:rPr>
+              <a:t>showEventFrom</a:t>
+            </a:r>
+            <a:endParaRPr lang="en-US" b="1" dirty="0"/>
+          </a:p>
+        </p:txBody>
+      </p:sp>
+      <p:sp>
+        <p:nvSpPr>
+          <p:cNvPr id="28" name="TextBox 27">
+            <a:extLst>
+              <a:ext uri="{FF2B5EF4-FFF2-40B4-BE49-F238E27FC236}">
+                <a16:creationId xmlns:a16="http://schemas.microsoft.com/office/drawing/2014/main" id="{8BAA8566-E121-4F0A-930B-170155A57F7B}"/>
+              </a:ext>
+            </a:extLst>
+          </p:cNvPr>
+          <p:cNvSpPr txBox="1"/>
+          <p:nvPr/>
+        </p:nvSpPr>
+        <p:spPr>
+          <a:xfrm>
+            <a:off x="6008326" y="2174627"/>
+            <a:ext cx="1291764" cy="369332"/>
+          </a:xfrm>
+          <a:prstGeom prst="rect">
+            <a:avLst/>
+          </a:prstGeom>
+          <a:noFill/>
+        </p:spPr>
+        <p:txBody>
+          <a:bodyPr wrap="none" rtlCol="0">
+            <a:spAutoFit/>
+          </a:bodyPr>
+          <a:lstStyle/>
+          <a:p>
+            <a:r>
+              <a:rPr lang="en-US" b="1" dirty="0">
+                <a:solidFill>
+                  <a:srgbClr val="00B050"/>
+                </a:solidFill>
+              </a:rPr>
+              <a:t>eventName</a:t>
+            </a:r>
+            <a:endParaRPr lang="en-US" b="1" dirty="0"/>
+          </a:p>
+        </p:txBody>
+      </p:sp>
+      <p:sp>
+        <p:nvSpPr>
+          <p:cNvPr id="29" name="Arrow: Right 28">
+            <a:extLst>
+              <a:ext uri="{FF2B5EF4-FFF2-40B4-BE49-F238E27FC236}">
+                <a16:creationId xmlns:a16="http://schemas.microsoft.com/office/drawing/2014/main" id="{DFD8AFB9-AE17-473E-A468-D9A47C90AD52}"/>
+              </a:ext>
+            </a:extLst>
+          </p:cNvPr>
+          <p:cNvSpPr/>
+          <p:nvPr/>
+        </p:nvSpPr>
+        <p:spPr>
+          <a:xfrm>
+            <a:off x="4479324" y="3395975"/>
+            <a:ext cx="1362361" cy="478371"/>
+          </a:xfrm>
+          <a:prstGeom prst="rightArrow">
+            <a:avLst/>
+          </a:prstGeom>
+          <a:solidFill>
+            <a:srgbClr val="00B050"/>
+          </a:solidFill>
+          <a:ln>
+            <a:solidFill>
+              <a:srgbClr val="00B050"/>
+            </a:solidFill>
+          </a:ln>
+        </p:spPr>
+        <p:style>
+          <a:lnRef idx="2">
+            <a:schemeClr val="accent1">
+              <a:shade val="50000"/>
+            </a:schemeClr>
+          </a:lnRef>
+          <a:fillRef idx="1">
+            <a:schemeClr val="accent1"/>
+          </a:fillRef>
+          <a:effectRef idx="0">
+            <a:schemeClr val="accent1"/>
+          </a:effectRef>
+          <a:fontRef idx="minor">
+            <a:schemeClr val="lt1"/>
+          </a:fontRef>
+        </p:style>
+        <p:txBody>
+          <a:bodyPr rtlCol="0" anchor="ctr"/>
+          <a:lstStyle/>
+          <a:p>
+            <a:pPr algn="ctr"/>
+            <a:endParaRPr lang="en-US"/>
+          </a:p>
+        </p:txBody>
+      </p:sp>
+      <p:sp>
+        <p:nvSpPr>
+          <p:cNvPr id="30" name="TextBox 29">
+            <a:extLst>
+              <a:ext uri="{FF2B5EF4-FFF2-40B4-BE49-F238E27FC236}">
+                <a16:creationId xmlns:a16="http://schemas.microsoft.com/office/drawing/2014/main" id="{9BDAE91D-247E-452C-89FB-024F33FF5C03}"/>
+              </a:ext>
+            </a:extLst>
+          </p:cNvPr>
+          <p:cNvSpPr txBox="1"/>
+          <p:nvPr/>
+        </p:nvSpPr>
+        <p:spPr>
+          <a:xfrm>
+            <a:off x="4642479" y="3113070"/>
+            <a:ext cx="1036053" cy="461665"/>
+          </a:xfrm>
+          <a:prstGeom prst="rect">
+            <a:avLst/>
+          </a:prstGeom>
+          <a:noFill/>
+        </p:spPr>
+        <p:txBody>
+          <a:bodyPr wrap="none" rtlCol="0">
+            <a:spAutoFit/>
+          </a:bodyPr>
+          <a:lstStyle/>
+          <a:p>
+            <a:r>
+              <a:rPr lang="en-US" sz="2400" b="1" dirty="0">
+                <a:solidFill>
+                  <a:srgbClr val="00B050"/>
+                </a:solidFill>
+              </a:rPr>
+              <a:t>PROPS</a:t>
+            </a:r>
+          </a:p>
+        </p:txBody>
+      </p:sp>
+      <p:sp>
+        <p:nvSpPr>
+          <p:cNvPr id="31" name="TextBox 30">
+            <a:extLst>
+              <a:ext uri="{FF2B5EF4-FFF2-40B4-BE49-F238E27FC236}">
+                <a16:creationId xmlns:a16="http://schemas.microsoft.com/office/drawing/2014/main" id="{79330B4B-C6FA-4373-87AF-49551A591890}"/>
+              </a:ext>
+            </a:extLst>
+          </p:cNvPr>
+          <p:cNvSpPr txBox="1"/>
+          <p:nvPr/>
+        </p:nvSpPr>
+        <p:spPr>
+          <a:xfrm>
+            <a:off x="6409425" y="4631636"/>
+            <a:ext cx="838691" cy="461665"/>
+          </a:xfrm>
+          <a:prstGeom prst="rect">
+            <a:avLst/>
+          </a:prstGeom>
+          <a:noFill/>
+        </p:spPr>
+        <p:txBody>
+          <a:bodyPr wrap="none" rtlCol="0">
+            <a:spAutoFit/>
+          </a:bodyPr>
+          <a:lstStyle/>
+          <a:p>
+            <a:r>
+              <a:rPr lang="en-US" sz="2400" b="1" dirty="0">
+                <a:solidFill>
+                  <a:srgbClr val="FF0000"/>
+                </a:solidFill>
+              </a:rPr>
+              <a:t>EMIT</a:t>
+            </a:r>
+          </a:p>
+        </p:txBody>
+      </p:sp>
+      <p:sp>
+        <p:nvSpPr>
+          <p:cNvPr id="32" name="Arrow: Right 31">
+            <a:extLst>
+              <a:ext uri="{FF2B5EF4-FFF2-40B4-BE49-F238E27FC236}">
+                <a16:creationId xmlns:a16="http://schemas.microsoft.com/office/drawing/2014/main" id="{FE427EB0-31AD-4C95-809C-CBA09D4B6D69}"/>
+              </a:ext>
+            </a:extLst>
+          </p:cNvPr>
+          <p:cNvSpPr/>
+          <p:nvPr/>
+        </p:nvSpPr>
+        <p:spPr>
+          <a:xfrm flipH="1">
+            <a:off x="6109139" y="5007948"/>
+            <a:ext cx="1283420" cy="478371"/>
+          </a:xfrm>
+          <a:prstGeom prst="rightArrow">
+            <a:avLst/>
+          </a:prstGeom>
+          <a:solidFill>
+            <a:srgbClr val="FF0000"/>
+          </a:solidFill>
+          <a:ln>
+            <a:solidFill>
+              <a:srgbClr val="FF0000"/>
+            </a:solidFill>
+          </a:ln>
+        </p:spPr>
+        <p:style>
+          <a:lnRef idx="2">
+            <a:schemeClr val="accent1">
+              <a:shade val="50000"/>
+            </a:schemeClr>
+          </a:lnRef>
+          <a:fillRef idx="1">
+            <a:schemeClr val="accent1"/>
+          </a:fillRef>
+          <a:effectRef idx="0">
+            <a:schemeClr val="accent1"/>
+          </a:effectRef>
+          <a:fontRef idx="minor">
+            <a:schemeClr val="lt1"/>
+          </a:fontRef>
+        </p:style>
+        <p:txBody>
+          <a:bodyPr rtlCol="0" anchor="ctr"/>
+          <a:lstStyle/>
+          <a:p>
+            <a:pPr algn="ctr"/>
+            <a:endParaRPr lang="en-US">
+              <a:solidFill>
+                <a:srgbClr val="FF0000"/>
+              </a:solidFill>
+            </a:endParaRPr>
+          </a:p>
+        </p:txBody>
+      </p:sp>
+      <p:sp>
+        <p:nvSpPr>
+          <p:cNvPr id="33" name="TextBox 32">
+            <a:extLst>
+              <a:ext uri="{FF2B5EF4-FFF2-40B4-BE49-F238E27FC236}">
+                <a16:creationId xmlns:a16="http://schemas.microsoft.com/office/drawing/2014/main" id="{DDD742EA-2BC7-43E8-B02D-81DE61F861B1}"/>
+              </a:ext>
+            </a:extLst>
+          </p:cNvPr>
+          <p:cNvSpPr txBox="1"/>
+          <p:nvPr/>
+        </p:nvSpPr>
+        <p:spPr>
+          <a:xfrm>
+            <a:off x="6133202" y="5437019"/>
+            <a:ext cx="907043" cy="369332"/>
+          </a:xfrm>
+          <a:prstGeom prst="rect">
+            <a:avLst/>
+          </a:prstGeom>
+          <a:noFill/>
+        </p:spPr>
+        <p:txBody>
+          <a:bodyPr wrap="none" rtlCol="0">
+            <a:spAutoFit/>
+          </a:bodyPr>
+          <a:lstStyle/>
+          <a:p>
+            <a:r>
+              <a:rPr lang="en-US" b="1" dirty="0">
+                <a:solidFill>
+                  <a:srgbClr val="00B050"/>
+                </a:solidFill>
+              </a:rPr>
+              <a:t>eventId</a:t>
+            </a:r>
+            <a:endParaRPr lang="en-US" b="1" dirty="0"/>
+          </a:p>
+        </p:txBody>
+      </p:sp>
+      <p:sp>
+        <p:nvSpPr>
+          <p:cNvPr id="34" name="TextBox 33">
+            <a:extLst>
+              <a:ext uri="{FF2B5EF4-FFF2-40B4-BE49-F238E27FC236}">
+                <a16:creationId xmlns:a16="http://schemas.microsoft.com/office/drawing/2014/main" id="{8081AC17-B864-434C-B6D1-A2C2C960C779}"/>
+              </a:ext>
+            </a:extLst>
+          </p:cNvPr>
+          <p:cNvSpPr txBox="1"/>
+          <p:nvPr/>
+        </p:nvSpPr>
+        <p:spPr>
+          <a:xfrm>
+            <a:off x="6140843" y="5711791"/>
+            <a:ext cx="993990" cy="369332"/>
+          </a:xfrm>
+          <a:prstGeom prst="rect">
+            <a:avLst/>
+          </a:prstGeom>
+          <a:noFill/>
+        </p:spPr>
+        <p:txBody>
+          <a:bodyPr wrap="none" rtlCol="0">
+            <a:spAutoFit/>
+          </a:bodyPr>
+          <a:lstStyle/>
+          <a:p>
+            <a:r>
+              <a:rPr lang="en-US" b="1" dirty="0">
+                <a:solidFill>
+                  <a:srgbClr val="00B050"/>
+                </a:solidFill>
+              </a:rPr>
+              <a:t>IsEditing</a:t>
+            </a:r>
+            <a:endParaRPr lang="en-US" b="1" dirty="0"/>
+          </a:p>
+        </p:txBody>
+      </p:sp>
+      <p:sp>
+        <p:nvSpPr>
+          <p:cNvPr id="35" name="TextBox 34">
+            <a:extLst>
+              <a:ext uri="{FF2B5EF4-FFF2-40B4-BE49-F238E27FC236}">
+                <a16:creationId xmlns:a16="http://schemas.microsoft.com/office/drawing/2014/main" id="{281C488C-967D-4AF5-A9E4-78B8CD9A6984}"/>
+              </a:ext>
+            </a:extLst>
+          </p:cNvPr>
+          <p:cNvSpPr txBox="1"/>
+          <p:nvPr/>
+        </p:nvSpPr>
+        <p:spPr>
+          <a:xfrm>
+            <a:off x="6166288" y="6037740"/>
+            <a:ext cx="956096" cy="369332"/>
+          </a:xfrm>
+          <a:prstGeom prst="rect">
+            <a:avLst/>
+          </a:prstGeom>
+          <a:noFill/>
+        </p:spPr>
+        <p:txBody>
+          <a:bodyPr wrap="none" rtlCol="0">
+            <a:spAutoFit/>
+          </a:bodyPr>
+          <a:lstStyle/>
+          <a:p>
+            <a:r>
+              <a:rPr lang="en-US" b="1" dirty="0">
+                <a:solidFill>
+                  <a:srgbClr val="00B050"/>
+                </a:solidFill>
+              </a:rPr>
+              <a:t>isDelete</a:t>
+            </a:r>
+            <a:endParaRPr lang="en-US" b="1" dirty="0"/>
+          </a:p>
+        </p:txBody>
+      </p:sp>
+      <p:sp>
+        <p:nvSpPr>
+          <p:cNvPr id="36" name="Rectangle: Rounded Corners 35">
+            <a:extLst>
+              <a:ext uri="{FF2B5EF4-FFF2-40B4-BE49-F238E27FC236}">
+                <a16:creationId xmlns:a16="http://schemas.microsoft.com/office/drawing/2014/main" id="{20AC8CD3-B01F-4E84-9D89-81A847826DB5}"/>
+              </a:ext>
+            </a:extLst>
+          </p:cNvPr>
+          <p:cNvSpPr/>
+          <p:nvPr/>
+        </p:nvSpPr>
+        <p:spPr>
+          <a:xfrm>
+            <a:off x="7323464" y="4716153"/>
+            <a:ext cx="2573027" cy="1130766"/>
+          </a:xfrm>
+          <a:prstGeom prst="roundRect">
+            <a:avLst/>
+          </a:prstGeom>
+          <a:noFill/>
+        </p:spPr>
+        <p:style>
+          <a:lnRef idx="2">
+            <a:schemeClr val="accent1">
+              <a:shade val="50000"/>
+            </a:schemeClr>
+          </a:lnRef>
+          <a:fillRef idx="1">
+            <a:schemeClr val="accent1"/>
+          </a:fillRef>
+          <a:effectRef idx="0">
+            <a:schemeClr val="accent1"/>
+          </a:effectRef>
+          <a:fontRef idx="minor">
+            <a:schemeClr val="lt1"/>
+          </a:fontRef>
+        </p:style>
+        <p:txBody>
+          <a:bodyPr rtlCol="0" anchor="ctr"/>
+          <a:lstStyle/>
+          <a:p>
+            <a:pPr algn="ctr"/>
+            <a:endParaRPr lang="en-US"/>
+          </a:p>
+        </p:txBody>
+      </p:sp>
+      <p:sp>
+        <p:nvSpPr>
+          <p:cNvPr id="37" name="Text Box 16">
+            <a:extLst>
+              <a:ext uri="{FF2B5EF4-FFF2-40B4-BE49-F238E27FC236}">
+                <a16:creationId xmlns:a16="http://schemas.microsoft.com/office/drawing/2014/main" id="{869296E5-1AFF-482E-8FFF-9F15D8D720BC}"/>
+              </a:ext>
+            </a:extLst>
+          </p:cNvPr>
+          <p:cNvSpPr txBox="1"/>
+          <p:nvPr/>
+        </p:nvSpPr>
+        <p:spPr>
+          <a:xfrm>
+            <a:off x="648060" y="937416"/>
+            <a:ext cx="3266393" cy="461665"/>
+          </a:xfrm>
+          <a:prstGeom prst="rect">
+            <a:avLst/>
+          </a:prstGeom>
+          <a:noFill/>
+        </p:spPr>
+        <p:txBody>
+          <a:bodyPr wrap="square" rtlCol="0">
+            <a:spAutoFit/>
+          </a:bodyPr>
+          <a:lstStyle/>
+          <a:p>
+            <a:r>
+              <a:rPr lang="en-US" altLang="en-US" sz="2400" b="1" dirty="0"/>
+              <a:t>Event Component </a:t>
+            </a:r>
+          </a:p>
+        </p:txBody>
+      </p:sp>
+      <p:sp>
+        <p:nvSpPr>
+          <p:cNvPr id="38" name="Rectangle: Rounded Corners 37">
+            <a:extLst>
+              <a:ext uri="{FF2B5EF4-FFF2-40B4-BE49-F238E27FC236}">
+                <a16:creationId xmlns:a16="http://schemas.microsoft.com/office/drawing/2014/main" id="{75310A7C-E7D2-4ED6-AA26-692803341C4B}"/>
+              </a:ext>
+            </a:extLst>
+          </p:cNvPr>
+          <p:cNvSpPr/>
+          <p:nvPr/>
+        </p:nvSpPr>
+        <p:spPr>
+          <a:xfrm>
+            <a:off x="220921" y="3116639"/>
+            <a:ext cx="1683028" cy="1349277"/>
+          </a:xfrm>
+          <a:prstGeom prst="roundRect">
+            <a:avLst/>
+          </a:prstGeom>
+          <a:noFill/>
+        </p:spPr>
+        <p:style>
+          <a:lnRef idx="2">
+            <a:schemeClr val="accent1">
+              <a:shade val="50000"/>
+            </a:schemeClr>
+          </a:lnRef>
+          <a:fillRef idx="1">
+            <a:schemeClr val="accent1"/>
+          </a:fillRef>
+          <a:effectRef idx="0">
+            <a:schemeClr val="accent1"/>
+          </a:effectRef>
+          <a:fontRef idx="minor">
+            <a:schemeClr val="lt1"/>
+          </a:fontRef>
+        </p:style>
+        <p:txBody>
+          <a:bodyPr rtlCol="0" anchor="ctr"/>
+          <a:lstStyle/>
+          <a:p>
+            <a:pPr algn="ctr"/>
+            <a:endParaRPr lang="en-US"/>
+          </a:p>
+        </p:txBody>
+      </p:sp>
+      <p:sp>
+        <p:nvSpPr>
+          <p:cNvPr id="39" name="TextBox 38">
+            <a:extLst>
+              <a:ext uri="{FF2B5EF4-FFF2-40B4-BE49-F238E27FC236}">
+                <a16:creationId xmlns:a16="http://schemas.microsoft.com/office/drawing/2014/main" id="{61FAC964-8645-4A8F-B7D6-3FA6D5A32D28}"/>
+              </a:ext>
+            </a:extLst>
+          </p:cNvPr>
+          <p:cNvSpPr txBox="1"/>
+          <p:nvPr/>
+        </p:nvSpPr>
+        <p:spPr>
+          <a:xfrm>
+            <a:off x="626257" y="3287349"/>
+            <a:ext cx="872355" cy="400110"/>
+          </a:xfrm>
+          <a:prstGeom prst="rect">
+            <a:avLst/>
+          </a:prstGeom>
+          <a:noFill/>
+        </p:spPr>
+        <p:txBody>
+          <a:bodyPr wrap="none" rtlCol="0">
+            <a:spAutoFit/>
+          </a:bodyPr>
+          <a:lstStyle/>
+          <a:p>
+            <a:r>
+              <a:rPr lang="en-US" sz="2000" b="1" dirty="0"/>
+              <a:t>&lt;App&gt;</a:t>
+            </a:r>
+          </a:p>
+        </p:txBody>
+      </p:sp>
+      <p:sp>
+        <p:nvSpPr>
+          <p:cNvPr id="40" name="Rounded Rectangle 17">
+            <a:extLst>
+              <a:ext uri="{FF2B5EF4-FFF2-40B4-BE49-F238E27FC236}">
+                <a16:creationId xmlns:a16="http://schemas.microsoft.com/office/drawing/2014/main" id="{4ED16A8D-2781-4884-8607-9F7E854924AA}"/>
+              </a:ext>
+            </a:extLst>
+          </p:cNvPr>
+          <p:cNvSpPr/>
+          <p:nvPr/>
+        </p:nvSpPr>
+        <p:spPr>
+          <a:xfrm>
+            <a:off x="162820" y="5102909"/>
+            <a:ext cx="4387215" cy="1487170"/>
+          </a:xfrm>
+          <a:prstGeom prst="roundRect">
+            <a:avLst/>
+          </a:prstGeom>
+          <a:noFill/>
+          <a:ln w="28575" cmpd="sng">
+            <a:solidFill>
+              <a:srgbClr val="00B050"/>
+            </a:solidFill>
+            <a:prstDash val="sysDot"/>
+          </a:ln>
+        </p:spPr>
+        <p:style>
+          <a:lnRef idx="2">
+            <a:schemeClr val="accent1">
+              <a:shade val="50000"/>
+            </a:schemeClr>
+          </a:lnRef>
+          <a:fillRef idx="1">
+            <a:schemeClr val="accent1"/>
+          </a:fillRef>
+          <a:effectRef idx="0">
+            <a:schemeClr val="accent1"/>
+          </a:effectRef>
+          <a:fontRef idx="minor">
+            <a:schemeClr val="lt1"/>
+          </a:fontRef>
+        </p:style>
+        <p:txBody>
+          <a:bodyPr rtlCol="0" anchor="ctr"/>
+          <a:lstStyle/>
+          <a:p>
+            <a:pPr algn="ctr"/>
+            <a:endParaRPr lang="en-US"/>
+          </a:p>
+        </p:txBody>
+      </p:sp>
+      <p:sp>
+        <p:nvSpPr>
+          <p:cNvPr id="41" name="Text Box 18">
+            <a:extLst>
+              <a:ext uri="{FF2B5EF4-FFF2-40B4-BE49-F238E27FC236}">
+                <a16:creationId xmlns:a16="http://schemas.microsoft.com/office/drawing/2014/main" id="{6E3080D7-384D-46D9-8E23-1C45F1836D8E}"/>
               </a:ext>
             </a:extLst>
           </p:cNvPr>
@@ -7000,55 +8072,15 @@
                   <a:srgbClr val="FF0000"/>
                 </a:solidFill>
               </a:rPr>
-              <a:t>- &lt;category-form&gt; is shown when we click add+</a:t>
-            </a:r>
-          </a:p>
-        </p:txBody>
-      </p:sp>
-      <p:sp>
-        <p:nvSpPr>
-          <p:cNvPr id="36" name="TextBox 35">
-            <a:extLst>
-              <a:ext uri="{FF2B5EF4-FFF2-40B4-BE49-F238E27FC236}">
-                <a16:creationId xmlns:a16="http://schemas.microsoft.com/office/drawing/2014/main" id="{BD9005A7-DAB2-4A84-A821-0B43538FFA62}"/>
-              </a:ext>
-            </a:extLst>
-          </p:cNvPr>
-          <p:cNvSpPr txBox="1"/>
-          <p:nvPr/>
-        </p:nvSpPr>
-        <p:spPr>
-          <a:xfrm>
-            <a:off x="7508682" y="6220747"/>
-            <a:ext cx="956096" cy="369332"/>
-          </a:xfrm>
-          <a:prstGeom prst="rect">
-            <a:avLst/>
-          </a:prstGeom>
-          <a:noFill/>
-        </p:spPr>
-        <p:txBody>
-          <a:bodyPr wrap="none" rtlCol="0">
-            <a:spAutoFit/>
-          </a:bodyPr>
-          <a:lstStyle/>
-          <a:p>
-            <a:r>
-              <a:rPr lang="en-US" b="1" dirty="0">
-                <a:solidFill>
-                  <a:srgbClr val="00B050"/>
-                </a:solidFill>
-              </a:rPr>
-              <a:t>isDelete</a:t>
-            </a:r>
-            <a:endParaRPr lang="en-US" b="1" dirty="0"/>
+              <a:t>- &lt;event-form&gt; is shown when we click add+</a:t>
+            </a:r>
           </a:p>
         </p:txBody>
       </p:sp>
     </p:spTree>
     <p:extLst>
       <p:ext uri="{BB962C8B-B14F-4D97-AF65-F5344CB8AC3E}">
-        <p14:creationId xmlns:p14="http://schemas.microsoft.com/office/powerpoint/2010/main" val="3599471506"/>
+        <p14:creationId xmlns:p14="http://schemas.microsoft.com/office/powerpoint/2010/main" val="2720118587"/>
       </p:ext>
     </p:extLst>
   </p:cSld>

</xml_diff>

<commit_message>
#update myevent CD document
</commit_message>
<xml_diff>
--- a/docs/COMPONENT-DIAGRAM.pptx
+++ b/docs/COMPONENT-DIAGRAM.pptx
@@ -6925,7 +6925,7 @@
         <p:spPr>
           <a:xfrm>
             <a:off x="2615069" y="3391168"/>
-            <a:ext cx="1624868" cy="400110"/>
+            <a:ext cx="2029017" cy="400110"/>
           </a:xfrm>
           <a:prstGeom prst="rect">
             <a:avLst/>
@@ -6940,7 +6940,7 @@
           <a:p>
             <a:r>
               <a:rPr lang="en-US" sz="2000" b="1" dirty="0"/>
-              <a:t>&lt;event-view&gt;</a:t>
+              <a:t>&lt;my-event-view&gt;</a:t>
             </a:r>
           </a:p>
         </p:txBody>
@@ -7888,7 +7888,7 @@
           <a:p>
             <a:r>
               <a:rPr lang="en-US" altLang="en-US" sz="2400" b="1" dirty="0"/>
-              <a:t>Event Component </a:t>
+              <a:t>My Event Component </a:t>
             </a:r>
           </a:p>
         </p:txBody>

</xml_diff>

<commit_message>
#47 update myevent CD document again
</commit_message>
<xml_diff>
--- a/docs/COMPONENT-DIAGRAM.pptx
+++ b/docs/COMPONENT-DIAGRAM.pptx
@@ -366,7 +366,7 @@
           <a:p>
             <a:fld id="{E88365C0-BE66-4276-A4A8-B9C86C352910}" type="datetimeFigureOut">
               <a:rPr lang="en-US" smtClean="0"/>
-              <a:t>12/2/2021</a:t>
+              <a:t>12/3/2021</a:t>
             </a:fld>
             <a:endParaRPr lang="en-US"/>
           </a:p>
@@ -823,7 +823,7 @@
           <a:p>
             <a:fld id="{28BE630F-C39C-4DB9-8258-0B48CA067079}" type="datetimeFigureOut">
               <a:rPr lang="en-US" smtClean="0"/>
-              <a:t>12/2/2021</a:t>
+              <a:t>12/3/2021</a:t>
             </a:fld>
             <a:endParaRPr lang="en-US"/>
           </a:p>
@@ -991,7 +991,7 @@
           <a:p>
             <a:fld id="{28BE630F-C39C-4DB9-8258-0B48CA067079}" type="datetimeFigureOut">
               <a:rPr lang="en-US" smtClean="0"/>
-              <a:t>12/2/2021</a:t>
+              <a:t>12/3/2021</a:t>
             </a:fld>
             <a:endParaRPr lang="en-US"/>
           </a:p>
@@ -1169,7 +1169,7 @@
           <a:p>
             <a:fld id="{28BE630F-C39C-4DB9-8258-0B48CA067079}" type="datetimeFigureOut">
               <a:rPr lang="en-US" smtClean="0"/>
-              <a:t>12/2/2021</a:t>
+              <a:t>12/3/2021</a:t>
             </a:fld>
             <a:endParaRPr lang="en-US"/>
           </a:p>
@@ -1337,7 +1337,7 @@
           <a:p>
             <a:fld id="{28BE630F-C39C-4DB9-8258-0B48CA067079}" type="datetimeFigureOut">
               <a:rPr lang="en-US" smtClean="0"/>
-              <a:t>12/2/2021</a:t>
+              <a:t>12/3/2021</a:t>
             </a:fld>
             <a:endParaRPr lang="en-US"/>
           </a:p>
@@ -1582,7 +1582,7 @@
           <a:p>
             <a:fld id="{28BE630F-C39C-4DB9-8258-0B48CA067079}" type="datetimeFigureOut">
               <a:rPr lang="en-US" smtClean="0"/>
-              <a:t>12/2/2021</a:t>
+              <a:t>12/3/2021</a:t>
             </a:fld>
             <a:endParaRPr lang="en-US"/>
           </a:p>
@@ -1811,7 +1811,7 @@
           <a:p>
             <a:fld id="{28BE630F-C39C-4DB9-8258-0B48CA067079}" type="datetimeFigureOut">
               <a:rPr lang="en-US" smtClean="0"/>
-              <a:t>12/2/2021</a:t>
+              <a:t>12/3/2021</a:t>
             </a:fld>
             <a:endParaRPr lang="en-US"/>
           </a:p>
@@ -2175,7 +2175,7 @@
           <a:p>
             <a:fld id="{28BE630F-C39C-4DB9-8258-0B48CA067079}" type="datetimeFigureOut">
               <a:rPr lang="en-US" smtClean="0"/>
-              <a:t>12/2/2021</a:t>
+              <a:t>12/3/2021</a:t>
             </a:fld>
             <a:endParaRPr lang="en-US"/>
           </a:p>
@@ -2292,7 +2292,7 @@
           <a:p>
             <a:fld id="{28BE630F-C39C-4DB9-8258-0B48CA067079}" type="datetimeFigureOut">
               <a:rPr lang="en-US" smtClean="0"/>
-              <a:t>12/2/2021</a:t>
+              <a:t>12/3/2021</a:t>
             </a:fld>
             <a:endParaRPr lang="en-US"/>
           </a:p>
@@ -2387,7 +2387,7 @@
           <a:p>
             <a:fld id="{28BE630F-C39C-4DB9-8258-0B48CA067079}" type="datetimeFigureOut">
               <a:rPr lang="en-US" smtClean="0"/>
-              <a:t>12/2/2021</a:t>
+              <a:t>12/3/2021</a:t>
             </a:fld>
             <a:endParaRPr lang="en-US"/>
           </a:p>
@@ -2662,7 +2662,7 @@
           <a:p>
             <a:fld id="{28BE630F-C39C-4DB9-8258-0B48CA067079}" type="datetimeFigureOut">
               <a:rPr lang="en-US" smtClean="0"/>
-              <a:t>12/2/2021</a:t>
+              <a:t>12/3/2021</a:t>
             </a:fld>
             <a:endParaRPr lang="en-US"/>
           </a:p>
@@ -2914,7 +2914,7 @@
           <a:p>
             <a:fld id="{28BE630F-C39C-4DB9-8258-0B48CA067079}" type="datetimeFigureOut">
               <a:rPr lang="en-US" smtClean="0"/>
-              <a:t>12/2/2021</a:t>
+              <a:t>12/3/2021</a:t>
             </a:fld>
             <a:endParaRPr lang="en-US"/>
           </a:p>
@@ -3125,7 +3125,7 @@
           <a:p>
             <a:fld id="{28BE630F-C39C-4DB9-8258-0B48CA067079}" type="datetimeFigureOut">
               <a:rPr lang="en-US" smtClean="0"/>
-              <a:t>12/2/2021</a:t>
+              <a:t>12/3/2021</a:t>
             </a:fld>
             <a:endParaRPr lang="en-US"/>
           </a:p>
@@ -7057,7 +7057,7 @@
         <p:spPr>
           <a:xfrm>
             <a:off x="4600894" y="3874547"/>
-            <a:ext cx="1017651" cy="369332"/>
+            <a:ext cx="1307474" cy="369332"/>
           </a:xfrm>
           <a:prstGeom prst="rect">
             <a:avLst/>
@@ -7076,7 +7076,7 @@
                   <a:srgbClr val="00B050"/>
                 </a:solidFill>
               </a:rPr>
-              <a:t>events</a:t>
+              <a:t>myevents</a:t>
             </a:r>
             <a:r>
               <a:rPr lang="en-US" b="1" dirty="0"/>
@@ -7269,7 +7269,7 @@
         <p:spPr>
           <a:xfrm>
             <a:off x="7636220" y="3351786"/>
-            <a:ext cx="1636666" cy="400110"/>
+            <a:ext cx="2040815" cy="400110"/>
           </a:xfrm>
           <a:prstGeom prst="rect">
             <a:avLst/>
@@ -7284,7 +7284,7 @@
           <a:p>
             <a:r>
               <a:rPr lang="en-US" sz="2000" b="1" dirty="0"/>
-              <a:t>&lt;event-form&gt;</a:t>
+              <a:t>&lt;my-event-form&gt;</a:t>
             </a:r>
           </a:p>
         </p:txBody>
@@ -7304,7 +7304,7 @@
         <p:spPr>
           <a:xfrm>
             <a:off x="7731601" y="5047078"/>
-            <a:ext cx="1579856" cy="400110"/>
+            <a:ext cx="1984005" cy="400110"/>
           </a:xfrm>
           <a:prstGeom prst="rect">
             <a:avLst/>
@@ -7319,7 +7319,7 @@
           <a:p>
             <a:r>
               <a:rPr lang="en-US" sz="2000" b="1" dirty="0"/>
-              <a:t>&lt;event-card&gt;</a:t>
+              <a:t>&lt;my-event-card&gt;</a:t>
             </a:r>
           </a:p>
         </p:txBody>
@@ -8072,7 +8072,7 @@
                   <a:srgbClr val="FF0000"/>
                 </a:solidFill>
               </a:rPr>
-              <a:t>- &lt;event-form&gt; is shown when we click add+</a:t>
+              <a:t>- &lt;my-event-form&gt; is shown when we click add+</a:t>
             </a:r>
           </a:p>
         </p:txBody>

</xml_diff>

<commit_message>
#47 update myevent CD document and update route
</commit_message>
<xml_diff>
--- a/docs/COMPONENT-DIAGRAM.pptx
+++ b/docs/COMPONENT-DIAGRAM.pptx
@@ -5621,10 +5621,10 @@
       </p:grpSpPr>
       <p:sp>
         <p:nvSpPr>
-          <p:cNvPr id="2" name="Rectangle: Rounded Corners 1">
-            <a:extLst>
-              <a:ext uri="{FF2B5EF4-FFF2-40B4-BE49-F238E27FC236}">
-                <a16:creationId xmlns:a16="http://schemas.microsoft.com/office/drawing/2014/main" id="{D00F3D06-C8CF-491B-B15D-5A8CE9D7D01E}"/>
+          <p:cNvPr id="32" name="Rectangle: Rounded Corners 31">
+            <a:extLst>
+              <a:ext uri="{FF2B5EF4-FFF2-40B4-BE49-F238E27FC236}">
+                <a16:creationId xmlns:a16="http://schemas.microsoft.com/office/drawing/2014/main" id="{A69894B1-1D5B-4A3D-AFAA-9ECB34C95A08}"/>
               </a:ext>
             </a:extLst>
           </p:cNvPr>
@@ -5633,8 +5633,8 @@
         </p:nvSpPr>
         <p:spPr>
           <a:xfrm>
-            <a:off x="174971" y="2744645"/>
-            <a:ext cx="1683028" cy="1349277"/>
+            <a:off x="2693838" y="1358812"/>
+            <a:ext cx="2112047" cy="5081394"/>
           </a:xfrm>
           <a:prstGeom prst="roundRect">
             <a:avLst/>
@@ -5668,10 +5668,10 @@
       </p:sp>
       <p:sp>
         <p:nvSpPr>
-          <p:cNvPr id="3" name="TextBox 2">
-            <a:extLst>
-              <a:ext uri="{FF2B5EF4-FFF2-40B4-BE49-F238E27FC236}">
-                <a16:creationId xmlns:a16="http://schemas.microsoft.com/office/drawing/2014/main" id="{62128D14-806A-4CD9-9DF6-6922470ABE93}"/>
+          <p:cNvPr id="37" name="TextBox 36">
+            <a:extLst>
+              <a:ext uri="{FF2B5EF4-FFF2-40B4-BE49-F238E27FC236}">
+                <a16:creationId xmlns:a16="http://schemas.microsoft.com/office/drawing/2014/main" id="{80A84FD1-3A6E-4A5D-AC99-7620C85D6E9C}"/>
               </a:ext>
             </a:extLst>
           </p:cNvPr>
@@ -5680,8 +5680,8 @@
         </p:nvSpPr>
         <p:spPr>
           <a:xfrm>
-            <a:off x="580307" y="2915355"/>
-            <a:ext cx="872355" cy="400110"/>
+            <a:off x="2660242" y="3638758"/>
+            <a:ext cx="1939955" cy="400110"/>
           </a:xfrm>
           <a:prstGeom prst="rect">
             <a:avLst/>
@@ -5696,17 +5696,56 @@
           <a:p>
             <a:r>
               <a:rPr lang="en-US" sz="2000" b="1" dirty="0"/>
-              <a:t>&lt;App&gt;</a:t>
-            </a:r>
-          </a:p>
-        </p:txBody>
-      </p:sp>
-      <p:sp>
-        <p:nvSpPr>
-          <p:cNvPr id="4" name="Rectangle: Rounded Corners 3">
-            <a:extLst>
-              <a:ext uri="{FF2B5EF4-FFF2-40B4-BE49-F238E27FC236}">
-                <a16:creationId xmlns:a16="http://schemas.microsoft.com/office/drawing/2014/main" id="{D1511BC5-D758-4FB0-9483-BF22515E6345}"/>
+              <a:t>&lt;category-view&gt;</a:t>
+            </a:r>
+          </a:p>
+        </p:txBody>
+      </p:sp>
+      <p:sp>
+        <p:nvSpPr>
+          <p:cNvPr id="38" name="TextBox 37">
+            <a:extLst>
+              <a:ext uri="{FF2B5EF4-FFF2-40B4-BE49-F238E27FC236}">
+                <a16:creationId xmlns:a16="http://schemas.microsoft.com/office/drawing/2014/main" id="{423625C7-2E97-4136-A10B-895D13491E53}"/>
+              </a:ext>
+            </a:extLst>
+          </p:cNvPr>
+          <p:cNvSpPr txBox="1"/>
+          <p:nvPr/>
+        </p:nvSpPr>
+        <p:spPr>
+          <a:xfrm>
+            <a:off x="5719208" y="3547734"/>
+            <a:ext cx="838691" cy="461665"/>
+          </a:xfrm>
+          <a:prstGeom prst="rect">
+            <a:avLst/>
+          </a:prstGeom>
+          <a:noFill/>
+        </p:spPr>
+        <p:txBody>
+          <a:bodyPr wrap="none" rtlCol="0">
+            <a:spAutoFit/>
+          </a:bodyPr>
+          <a:lstStyle/>
+          <a:p>
+            <a:r>
+              <a:rPr lang="en-US" sz="2400" b="1" dirty="0">
+                <a:solidFill>
+                  <a:srgbClr val="FF0000"/>
+                </a:solidFill>
+              </a:rPr>
+              <a:t>EMIT</a:t>
+            </a:r>
+          </a:p>
+        </p:txBody>
+      </p:sp>
+      <p:sp>
+        <p:nvSpPr>
+          <p:cNvPr id="39" name="Arrow: Right 38">
+            <a:extLst>
+              <a:ext uri="{FF2B5EF4-FFF2-40B4-BE49-F238E27FC236}">
+                <a16:creationId xmlns:a16="http://schemas.microsoft.com/office/drawing/2014/main" id="{4D72F616-E2D6-4D07-A2E4-7191D46F1AF4}"/>
               </a:ext>
             </a:extLst>
           </p:cNvPr>
@@ -5714,14 +5753,21 @@
           <p:nvPr/>
         </p:nvSpPr>
         <p:spPr>
-          <a:xfrm>
-            <a:off x="2991525" y="2687797"/>
-            <a:ext cx="2112047" cy="1349276"/>
-          </a:xfrm>
-          <a:prstGeom prst="roundRect">
-            <a:avLst/>
-          </a:prstGeom>
-          <a:noFill/>
+          <a:xfrm flipH="1">
+            <a:off x="4779661" y="3860992"/>
+            <a:ext cx="2632677" cy="382704"/>
+          </a:xfrm>
+          <a:prstGeom prst="rightArrow">
+            <a:avLst/>
+          </a:prstGeom>
+          <a:solidFill>
+            <a:srgbClr val="FF0000"/>
+          </a:solidFill>
+          <a:ln>
+            <a:solidFill>
+              <a:srgbClr val="FF0000"/>
+            </a:solidFill>
+          </a:ln>
         </p:spPr>
         <p:style>
           <a:lnRef idx="2">
@@ -5744,16 +5790,20 @@
           <a:lstStyle/>
           <a:p>
             <a:pPr algn="ctr"/>
-            <a:endParaRPr lang="en-US"/>
-          </a:p>
-        </p:txBody>
-      </p:sp>
-      <p:sp>
-        <p:nvSpPr>
-          <p:cNvPr id="5" name="TextBox 4">
-            <a:extLst>
-              <a:ext uri="{FF2B5EF4-FFF2-40B4-BE49-F238E27FC236}">
-                <a16:creationId xmlns:a16="http://schemas.microsoft.com/office/drawing/2014/main" id="{FE438AA2-6315-47A7-A645-8E7E6DF83C66}"/>
+            <a:endParaRPr lang="en-US">
+              <a:solidFill>
+                <a:srgbClr val="FF0000"/>
+              </a:solidFill>
+            </a:endParaRPr>
+          </a:p>
+        </p:txBody>
+      </p:sp>
+      <p:sp>
+        <p:nvSpPr>
+          <p:cNvPr id="40" name="TextBox 39">
+            <a:extLst>
+              <a:ext uri="{FF2B5EF4-FFF2-40B4-BE49-F238E27FC236}">
+                <a16:creationId xmlns:a16="http://schemas.microsoft.com/office/drawing/2014/main" id="{8F06B537-D0FA-4A8A-B933-2E1686D74BB0}"/>
               </a:ext>
             </a:extLst>
           </p:cNvPr>
@@ -5762,8 +5812,8 @@
         </p:nvSpPr>
         <p:spPr>
           <a:xfrm>
-            <a:off x="3067047" y="2991385"/>
-            <a:ext cx="1939955" cy="400110"/>
+            <a:off x="2806138" y="3937795"/>
+            <a:ext cx="1362361" cy="369332"/>
           </a:xfrm>
           <a:prstGeom prst="rect">
             <a:avLst/>
@@ -5777,18 +5827,26 @@
           <a:lstStyle/>
           <a:p>
             <a:r>
-              <a:rPr lang="en-US" sz="2000" b="1" dirty="0"/>
-              <a:t>&lt;category-view&gt;</a:t>
-            </a:r>
-          </a:p>
-        </p:txBody>
-      </p:sp>
-      <p:sp>
-        <p:nvSpPr>
-          <p:cNvPr id="8" name="TextBox 7">
-            <a:extLst>
-              <a:ext uri="{FF2B5EF4-FFF2-40B4-BE49-F238E27FC236}">
-                <a16:creationId xmlns:a16="http://schemas.microsoft.com/office/drawing/2014/main" id="{490B685F-10FA-4CF7-8685-443D4DCA42EC}"/>
+              <a:rPr lang="en-US" b="1" dirty="0">
+                <a:solidFill>
+                  <a:srgbClr val="00B050"/>
+                </a:solidFill>
+              </a:rPr>
+              <a:t>categories</a:t>
+            </a:r>
+            <a:r>
+              <a:rPr lang="en-US" b="1" dirty="0"/>
+              <a:t>[ ]</a:t>
+            </a:r>
+          </a:p>
+        </p:txBody>
+      </p:sp>
+      <p:sp>
+        <p:nvSpPr>
+          <p:cNvPr id="41" name="TextBox 40">
+            <a:extLst>
+              <a:ext uri="{FF2B5EF4-FFF2-40B4-BE49-F238E27FC236}">
+                <a16:creationId xmlns:a16="http://schemas.microsoft.com/office/drawing/2014/main" id="{F45F2206-85AB-4971-BAD3-76BBF1564F4D}"/>
               </a:ext>
             </a:extLst>
           </p:cNvPr>
@@ -5797,8 +5855,8 @@
         </p:nvSpPr>
         <p:spPr>
           <a:xfrm>
-            <a:off x="7853586" y="3225176"/>
-            <a:ext cx="838691" cy="461665"/>
+            <a:off x="5820669" y="4149319"/>
+            <a:ext cx="2971776" cy="369332"/>
           </a:xfrm>
           <a:prstGeom prst="rect">
             <a:avLst/>
@@ -5812,22 +5870,31 @@
           <a:lstStyle/>
           <a:p>
             <a:r>
-              <a:rPr lang="en-US" sz="2400" b="1" dirty="0">
+              <a:rPr lang="en-US" b="1" dirty="0">
                 <a:solidFill>
-                  <a:srgbClr val="FF0000"/>
+                  <a:srgbClr val="00B050"/>
                 </a:solidFill>
               </a:rPr>
-              <a:t>EMIT</a:t>
-            </a:r>
-          </a:p>
-        </p:txBody>
-      </p:sp>
-      <p:sp>
-        <p:nvSpPr>
-          <p:cNvPr id="9" name="Arrow: Right 8">
-            <a:extLst>
-              <a:ext uri="{FF2B5EF4-FFF2-40B4-BE49-F238E27FC236}">
-                <a16:creationId xmlns:a16="http://schemas.microsoft.com/office/drawing/2014/main" id="{0E409D9A-0BFF-4850-A930-C33FBADB26F5}"/>
+              <a:t>newCategory (</a:t>
+            </a:r>
+            <a:r>
+              <a:rPr lang="en-US" dirty="0">
+                <a:solidFill>
+                  <a:srgbClr val="00B050"/>
+                </a:solidFill>
+              </a:rPr>
+              <a:t>categorytData)</a:t>
+            </a:r>
+            <a:endParaRPr lang="en-US" dirty="0"/>
+          </a:p>
+        </p:txBody>
+      </p:sp>
+      <p:sp>
+        <p:nvSpPr>
+          <p:cNvPr id="42" name="Rectangle: Rounded Corners 41">
+            <a:extLst>
+              <a:ext uri="{FF2B5EF4-FFF2-40B4-BE49-F238E27FC236}">
+                <a16:creationId xmlns:a16="http://schemas.microsoft.com/office/drawing/2014/main" id="{91926CF6-9177-4723-BB64-C5A8BA28E16A}"/>
               </a:ext>
             </a:extLst>
           </p:cNvPr>
@@ -5835,21 +5902,14 @@
           <p:nvPr/>
         </p:nvSpPr>
         <p:spPr>
-          <a:xfrm flipH="1">
-            <a:off x="7553300" y="3601488"/>
-            <a:ext cx="1283420" cy="478371"/>
-          </a:xfrm>
-          <a:prstGeom prst="rightArrow">
-            <a:avLst/>
-          </a:prstGeom>
-          <a:solidFill>
-            <a:srgbClr val="FF0000"/>
-          </a:solidFill>
-          <a:ln>
-            <a:solidFill>
-              <a:srgbClr val="FF0000"/>
-            </a:solidFill>
-          </a:ln>
+          <a:xfrm>
+            <a:off x="7373588" y="1358926"/>
+            <a:ext cx="2573027" cy="1130766"/>
+          </a:xfrm>
+          <a:prstGeom prst="roundRect">
+            <a:avLst/>
+          </a:prstGeom>
+          <a:noFill/>
         </p:spPr>
         <p:style>
           <a:lnRef idx="2">
@@ -5872,20 +5932,16 @@
           <a:lstStyle/>
           <a:p>
             <a:pPr algn="ctr"/>
-            <a:endParaRPr lang="en-US">
-              <a:solidFill>
-                <a:srgbClr val="FF0000"/>
-              </a:solidFill>
-            </a:endParaRPr>
-          </a:p>
-        </p:txBody>
-      </p:sp>
-      <p:sp>
-        <p:nvSpPr>
-          <p:cNvPr id="10" name="Text Box 16">
-            <a:extLst>
-              <a:ext uri="{FF2B5EF4-FFF2-40B4-BE49-F238E27FC236}">
-                <a16:creationId xmlns:a16="http://schemas.microsoft.com/office/drawing/2014/main" id="{15694AD7-32E2-48B4-809E-D2677F9C7027}"/>
+            <a:endParaRPr lang="en-US"/>
+          </a:p>
+        </p:txBody>
+      </p:sp>
+      <p:sp>
+        <p:nvSpPr>
+          <p:cNvPr id="43" name="TextBox 42">
+            <a:extLst>
+              <a:ext uri="{FF2B5EF4-FFF2-40B4-BE49-F238E27FC236}">
+                <a16:creationId xmlns:a16="http://schemas.microsoft.com/office/drawing/2014/main" id="{F95CD09C-F7D4-486B-A30C-43711F8ACEE5}"/>
               </a:ext>
             </a:extLst>
           </p:cNvPr>
@@ -5894,43 +5950,8 @@
         </p:nvSpPr>
         <p:spPr>
           <a:xfrm>
-            <a:off x="648061" y="937416"/>
-            <a:ext cx="2996130" cy="461665"/>
-          </a:xfrm>
-          <a:prstGeom prst="rect">
-            <a:avLst/>
-          </a:prstGeom>
-          <a:noFill/>
-        </p:spPr>
-        <p:txBody>
-          <a:bodyPr wrap="square" rtlCol="0">
-            <a:spAutoFit/>
-          </a:bodyPr>
-          <a:lstStyle/>
-          <a:p>
-            <a:r>
-              <a:rPr lang="en-US" altLang="en-US" sz="2400" b="1" dirty="0"/>
-              <a:t>Category Component </a:t>
-            </a:r>
-          </a:p>
-        </p:txBody>
-      </p:sp>
-      <p:sp>
-        <p:nvSpPr>
-          <p:cNvPr id="11" name="TextBox 10">
-            <a:extLst>
-              <a:ext uri="{FF2B5EF4-FFF2-40B4-BE49-F238E27FC236}">
-                <a16:creationId xmlns:a16="http://schemas.microsoft.com/office/drawing/2014/main" id="{7F980D71-7E83-46A1-874C-A9F8A4A28572}"/>
-              </a:ext>
-            </a:extLst>
-          </p:cNvPr>
-          <p:cNvSpPr txBox="1"/>
-          <p:nvPr/>
-        </p:nvSpPr>
-        <p:spPr>
-          <a:xfrm>
-            <a:off x="5052872" y="3474764"/>
-            <a:ext cx="1362361" cy="369332"/>
+            <a:off x="7853052" y="1654343"/>
+            <a:ext cx="1614096" cy="400110"/>
           </a:xfrm>
           <a:prstGeom prst="rect">
             <a:avLst/>
@@ -5944,66 +5965,18 @@
           <a:lstStyle/>
           <a:p>
             <a:r>
-              <a:rPr lang="en-US" b="1" dirty="0">
-                <a:solidFill>
-                  <a:srgbClr val="00B050"/>
-                </a:solidFill>
-              </a:rPr>
-              <a:t>categories</a:t>
-            </a:r>
-            <a:r>
-              <a:rPr lang="en-US" b="1" dirty="0"/>
-              <a:t>[ ]</a:t>
-            </a:r>
-          </a:p>
-        </p:txBody>
-      </p:sp>
-      <p:sp>
-        <p:nvSpPr>
-          <p:cNvPr id="45" name="TextBox 44">
-            <a:extLst>
-              <a:ext uri="{FF2B5EF4-FFF2-40B4-BE49-F238E27FC236}">
-                <a16:creationId xmlns:a16="http://schemas.microsoft.com/office/drawing/2014/main" id="{EE3CAFBF-22E3-49F3-80A5-80ADD67FF69A}"/>
-              </a:ext>
-            </a:extLst>
-          </p:cNvPr>
-          <p:cNvSpPr txBox="1"/>
-          <p:nvPr/>
-        </p:nvSpPr>
-        <p:spPr>
-          <a:xfrm>
-            <a:off x="7577363" y="4030559"/>
-            <a:ext cx="1891415" cy="369332"/>
-          </a:xfrm>
-          <a:prstGeom prst="rect">
-            <a:avLst/>
-          </a:prstGeom>
-          <a:noFill/>
-        </p:spPr>
-        <p:txBody>
-          <a:bodyPr wrap="none" rtlCol="0">
-            <a:spAutoFit/>
-          </a:bodyPr>
-          <a:lstStyle/>
-          <a:p>
-            <a:r>
-              <a:rPr lang="en-US" b="1" dirty="0">
-                <a:solidFill>
-                  <a:srgbClr val="00B050"/>
-                </a:solidFill>
-              </a:rPr>
-              <a:t>newCategoryData</a:t>
-            </a:r>
-            <a:endParaRPr lang="en-US" b="1" dirty="0"/>
-          </a:p>
-        </p:txBody>
-      </p:sp>
-      <p:sp>
-        <p:nvSpPr>
-          <p:cNvPr id="15" name="Rectangle: Rounded Corners 14">
-            <a:extLst>
-              <a:ext uri="{FF2B5EF4-FFF2-40B4-BE49-F238E27FC236}">
-                <a16:creationId xmlns:a16="http://schemas.microsoft.com/office/drawing/2014/main" id="{B6D03331-41CD-4E49-8D24-F6ACBB8AB742}"/>
+              <a:rPr lang="en-US" sz="2000" b="1" dirty="0"/>
+              <a:t>&lt;add-search&gt;</a:t>
+            </a:r>
+          </a:p>
+        </p:txBody>
+      </p:sp>
+      <p:sp>
+        <p:nvSpPr>
+          <p:cNvPr id="44" name="Rectangle: Rounded Corners 43">
+            <a:extLst>
+              <a:ext uri="{FF2B5EF4-FFF2-40B4-BE49-F238E27FC236}">
+                <a16:creationId xmlns:a16="http://schemas.microsoft.com/office/drawing/2014/main" id="{664C5A80-87F5-41B1-862E-84DCD78B2ECC}"/>
               </a:ext>
             </a:extLst>
           </p:cNvPr>
@@ -6012,7 +5985,7 @@
         </p:nvSpPr>
         <p:spPr>
           <a:xfrm>
-            <a:off x="8711760" y="937416"/>
+            <a:off x="7417394" y="3151526"/>
             <a:ext cx="2573027" cy="1130766"/>
           </a:xfrm>
           <a:prstGeom prst="roundRect">
@@ -6047,10 +6020,10 @@
       </p:sp>
       <p:sp>
         <p:nvSpPr>
-          <p:cNvPr id="16" name="TextBox 15">
-            <a:extLst>
-              <a:ext uri="{FF2B5EF4-FFF2-40B4-BE49-F238E27FC236}">
-                <a16:creationId xmlns:a16="http://schemas.microsoft.com/office/drawing/2014/main" id="{08FDC1B9-8B7A-48BC-AC29-B5AE5D9556AD}"/>
+          <p:cNvPr id="46" name="TextBox 45">
+            <a:extLst>
+              <a:ext uri="{FF2B5EF4-FFF2-40B4-BE49-F238E27FC236}">
+                <a16:creationId xmlns:a16="http://schemas.microsoft.com/office/drawing/2014/main" id="{DB392420-545B-4B50-AC33-71BEE4E3D509}"/>
               </a:ext>
             </a:extLst>
           </p:cNvPr>
@@ -6059,8 +6032,8 @@
         </p:nvSpPr>
         <p:spPr>
           <a:xfrm>
-            <a:off x="9191224" y="1232833"/>
-            <a:ext cx="1614096" cy="400110"/>
+            <a:off x="7790511" y="3442097"/>
+            <a:ext cx="1951753" cy="400110"/>
           </a:xfrm>
           <a:prstGeom prst="rect">
             <a:avLst/>
@@ -6075,17 +6048,91 @@
           <a:p>
             <a:r>
               <a:rPr lang="en-US" sz="2000" b="1" dirty="0"/>
-              <a:t>&lt;add-search&gt;</a:t>
-            </a:r>
-          </a:p>
-        </p:txBody>
-      </p:sp>
-      <p:sp>
-        <p:nvSpPr>
-          <p:cNvPr id="17" name="Rectangle: Rounded Corners 16">
-            <a:extLst>
-              <a:ext uri="{FF2B5EF4-FFF2-40B4-BE49-F238E27FC236}">
-                <a16:creationId xmlns:a16="http://schemas.microsoft.com/office/drawing/2014/main" id="{D643B8F4-9D19-4871-9F16-81BDC20E6653}"/>
+              <a:t>&lt;category-form&gt;</a:t>
+            </a:r>
+          </a:p>
+        </p:txBody>
+      </p:sp>
+      <p:sp>
+        <p:nvSpPr>
+          <p:cNvPr id="47" name="TextBox 46">
+            <a:extLst>
+              <a:ext uri="{FF2B5EF4-FFF2-40B4-BE49-F238E27FC236}">
+                <a16:creationId xmlns:a16="http://schemas.microsoft.com/office/drawing/2014/main" id="{5E8ECDFC-1728-4792-9AC9-25F98A4235C5}"/>
+              </a:ext>
+            </a:extLst>
+          </p:cNvPr>
+          <p:cNvSpPr txBox="1"/>
+          <p:nvPr/>
+        </p:nvSpPr>
+        <p:spPr>
+          <a:xfrm>
+            <a:off x="7885892" y="5137389"/>
+            <a:ext cx="1894942" cy="400110"/>
+          </a:xfrm>
+          <a:prstGeom prst="rect">
+            <a:avLst/>
+          </a:prstGeom>
+          <a:noFill/>
+        </p:spPr>
+        <p:txBody>
+          <a:bodyPr wrap="none" rtlCol="0">
+            <a:spAutoFit/>
+          </a:bodyPr>
+          <a:lstStyle/>
+          <a:p>
+            <a:r>
+              <a:rPr lang="en-US" sz="2000" b="1" dirty="0"/>
+              <a:t>&lt;category-card&gt;</a:t>
+            </a:r>
+          </a:p>
+        </p:txBody>
+      </p:sp>
+      <p:sp>
+        <p:nvSpPr>
+          <p:cNvPr id="48" name="TextBox 47">
+            <a:extLst>
+              <a:ext uri="{FF2B5EF4-FFF2-40B4-BE49-F238E27FC236}">
+                <a16:creationId xmlns:a16="http://schemas.microsoft.com/office/drawing/2014/main" id="{EA761E69-BEB4-41AF-8A70-02ABCABC4A42}"/>
+              </a:ext>
+            </a:extLst>
+          </p:cNvPr>
+          <p:cNvSpPr txBox="1"/>
+          <p:nvPr/>
+        </p:nvSpPr>
+        <p:spPr>
+          <a:xfrm>
+            <a:off x="5901664" y="1800353"/>
+            <a:ext cx="838691" cy="461665"/>
+          </a:xfrm>
+          <a:prstGeom prst="rect">
+            <a:avLst/>
+          </a:prstGeom>
+          <a:noFill/>
+        </p:spPr>
+        <p:txBody>
+          <a:bodyPr wrap="none" rtlCol="0">
+            <a:spAutoFit/>
+          </a:bodyPr>
+          <a:lstStyle/>
+          <a:p>
+            <a:r>
+              <a:rPr lang="en-US" sz="2400" b="1" dirty="0">
+                <a:solidFill>
+                  <a:srgbClr val="FF0000"/>
+                </a:solidFill>
+              </a:rPr>
+              <a:t>EMIT</a:t>
+            </a:r>
+          </a:p>
+        </p:txBody>
+      </p:sp>
+      <p:sp>
+        <p:nvSpPr>
+          <p:cNvPr id="49" name="Arrow: Right 48">
+            <a:extLst>
+              <a:ext uri="{FF2B5EF4-FFF2-40B4-BE49-F238E27FC236}">
+                <a16:creationId xmlns:a16="http://schemas.microsoft.com/office/drawing/2014/main" id="{FC3E781F-8D60-45EF-A02F-E3B51589BEDB}"/>
               </a:ext>
             </a:extLst>
           </p:cNvPr>
@@ -6093,14 +6140,21 @@
           <p:nvPr/>
         </p:nvSpPr>
         <p:spPr>
-          <a:xfrm>
-            <a:off x="8711760" y="3205053"/>
-            <a:ext cx="2573027" cy="1130766"/>
-          </a:xfrm>
-          <a:prstGeom prst="roundRect">
-            <a:avLst/>
-          </a:prstGeom>
-          <a:noFill/>
+          <a:xfrm flipH="1">
+            <a:off x="4853908" y="2124552"/>
+            <a:ext cx="2558430" cy="373813"/>
+          </a:xfrm>
+          <a:prstGeom prst="rightArrow">
+            <a:avLst/>
+          </a:prstGeom>
+          <a:solidFill>
+            <a:srgbClr val="FF0000"/>
+          </a:solidFill>
+          <a:ln>
+            <a:solidFill>
+              <a:srgbClr val="FF0000"/>
+            </a:solidFill>
+          </a:ln>
         </p:spPr>
         <p:style>
           <a:lnRef idx="2">
@@ -6123,16 +6177,20 @@
           <a:lstStyle/>
           <a:p>
             <a:pPr algn="ctr"/>
-            <a:endParaRPr lang="en-US"/>
-          </a:p>
-        </p:txBody>
-      </p:sp>
-      <p:sp>
-        <p:nvSpPr>
-          <p:cNvPr id="18" name="TextBox 17">
-            <a:extLst>
-              <a:ext uri="{FF2B5EF4-FFF2-40B4-BE49-F238E27FC236}">
-                <a16:creationId xmlns:a16="http://schemas.microsoft.com/office/drawing/2014/main" id="{01ABDD8A-BA10-470B-910D-39F7E60BC90D}"/>
+            <a:endParaRPr lang="en-US">
+              <a:solidFill>
+                <a:srgbClr val="FF0000"/>
+              </a:solidFill>
+            </a:endParaRPr>
+          </a:p>
+        </p:txBody>
+      </p:sp>
+      <p:sp>
+        <p:nvSpPr>
+          <p:cNvPr id="50" name="TextBox 49">
+            <a:extLst>
+              <a:ext uri="{FF2B5EF4-FFF2-40B4-BE49-F238E27FC236}">
+                <a16:creationId xmlns:a16="http://schemas.microsoft.com/office/drawing/2014/main" id="{40958F88-6B2D-4C2C-94C1-88B2EE62E4E6}"/>
               </a:ext>
             </a:extLst>
           </p:cNvPr>
@@ -6141,8 +6199,8 @@
         </p:nvSpPr>
         <p:spPr>
           <a:xfrm>
-            <a:off x="9084877" y="3495624"/>
-            <a:ext cx="1951753" cy="400110"/>
+            <a:off x="6140109" y="2374625"/>
+            <a:ext cx="2037930" cy="369332"/>
           </a:xfrm>
           <a:prstGeom prst="rect">
             <a:avLst/>
@@ -6156,18 +6214,63 @@
           <a:lstStyle/>
           <a:p>
             <a:r>
-              <a:rPr lang="en-US" sz="2000" b="1" dirty="0"/>
-              <a:t>&lt;category-form&gt;</a:t>
-            </a:r>
-          </a:p>
-        </p:txBody>
-      </p:sp>
-      <p:sp>
-        <p:nvSpPr>
-          <p:cNvPr id="19" name="Rectangle: Rounded Corners 18">
-            <a:extLst>
-              <a:ext uri="{FF2B5EF4-FFF2-40B4-BE49-F238E27FC236}">
-                <a16:creationId xmlns:a16="http://schemas.microsoft.com/office/drawing/2014/main" id="{C4D910ED-90C3-4211-8538-7770D3A0DF8F}"/>
+              <a:rPr lang="en-US" b="1" dirty="0">
+                <a:solidFill>
+                  <a:srgbClr val="00B050"/>
+                </a:solidFill>
+              </a:rPr>
+              <a:t>showCategoryFrom</a:t>
+            </a:r>
+            <a:endParaRPr lang="en-US" b="1" dirty="0"/>
+          </a:p>
+        </p:txBody>
+      </p:sp>
+      <p:sp>
+        <p:nvSpPr>
+          <p:cNvPr id="51" name="TextBox 50">
+            <a:extLst>
+              <a:ext uri="{FF2B5EF4-FFF2-40B4-BE49-F238E27FC236}">
+                <a16:creationId xmlns:a16="http://schemas.microsoft.com/office/drawing/2014/main" id="{AF84CB29-04F2-41DD-B48D-7020FD033445}"/>
+              </a:ext>
+            </a:extLst>
+          </p:cNvPr>
+          <p:cNvSpPr txBox="1"/>
+          <p:nvPr/>
+        </p:nvSpPr>
+        <p:spPr>
+          <a:xfrm>
+            <a:off x="6133123" y="2598765"/>
+            <a:ext cx="1574983" cy="369332"/>
+          </a:xfrm>
+          <a:prstGeom prst="rect">
+            <a:avLst/>
+          </a:prstGeom>
+          <a:noFill/>
+        </p:spPr>
+        <p:txBody>
+          <a:bodyPr wrap="none" rtlCol="0">
+            <a:spAutoFit/>
+          </a:bodyPr>
+          <a:lstStyle/>
+          <a:p>
+            <a:r>
+              <a:rPr lang="en-US" b="1" dirty="0">
+                <a:solidFill>
+                  <a:srgbClr val="00B050"/>
+                </a:solidFill>
+              </a:rPr>
+              <a:t>categoryName</a:t>
+            </a:r>
+            <a:endParaRPr lang="en-US" b="1" dirty="0"/>
+          </a:p>
+        </p:txBody>
+      </p:sp>
+      <p:sp>
+        <p:nvSpPr>
+          <p:cNvPr id="52" name="Arrow: Right 51">
+            <a:extLst>
+              <a:ext uri="{FF2B5EF4-FFF2-40B4-BE49-F238E27FC236}">
+                <a16:creationId xmlns:a16="http://schemas.microsoft.com/office/drawing/2014/main" id="{EB8E28EA-BD8A-46D9-8624-C0F8DFC1C8A8}"/>
               </a:ext>
             </a:extLst>
           </p:cNvPr>
@@ -6176,13 +6279,20 @@
         </p:nvSpPr>
         <p:spPr>
           <a:xfrm>
-            <a:off x="8989056" y="4948698"/>
-            <a:ext cx="2573027" cy="1130766"/>
-          </a:xfrm>
-          <a:prstGeom prst="roundRect">
-            <a:avLst/>
-          </a:prstGeom>
-          <a:noFill/>
+            <a:off x="4582619" y="5113725"/>
+            <a:ext cx="2883563" cy="461665"/>
+          </a:xfrm>
+          <a:prstGeom prst="rightArrow">
+            <a:avLst/>
+          </a:prstGeom>
+          <a:solidFill>
+            <a:srgbClr val="00B050"/>
+          </a:solidFill>
+          <a:ln>
+            <a:solidFill>
+              <a:srgbClr val="00B050"/>
+            </a:solidFill>
+          </a:ln>
         </p:spPr>
         <p:style>
           <a:lnRef idx="2">
@@ -6211,10 +6321,10 @@
       </p:sp>
       <p:sp>
         <p:nvSpPr>
-          <p:cNvPr id="20" name="TextBox 19">
-            <a:extLst>
-              <a:ext uri="{FF2B5EF4-FFF2-40B4-BE49-F238E27FC236}">
-                <a16:creationId xmlns:a16="http://schemas.microsoft.com/office/drawing/2014/main" id="{E5C54773-D013-4D8C-950D-1205FF0281CB}"/>
+          <p:cNvPr id="53" name="TextBox 52">
+            <a:extLst>
+              <a:ext uri="{FF2B5EF4-FFF2-40B4-BE49-F238E27FC236}">
+                <a16:creationId xmlns:a16="http://schemas.microsoft.com/office/drawing/2014/main" id="{49C01199-BAC7-4BED-9C70-58B6032FEFCF}"/>
               </a:ext>
             </a:extLst>
           </p:cNvPr>
@@ -6223,8 +6333,8 @@
         </p:nvSpPr>
         <p:spPr>
           <a:xfrm>
-            <a:off x="9362173" y="5239269"/>
-            <a:ext cx="1894942" cy="400110"/>
+            <a:off x="4755095" y="4644623"/>
+            <a:ext cx="1036053" cy="461665"/>
           </a:xfrm>
           <a:prstGeom prst="rect">
             <a:avLst/>
@@ -6238,18 +6348,22 @@
           <a:lstStyle/>
           <a:p>
             <a:r>
-              <a:rPr lang="en-US" sz="2000" b="1" dirty="0"/>
-              <a:t>&lt;category-card&gt;</a:t>
-            </a:r>
-          </a:p>
-        </p:txBody>
-      </p:sp>
-      <p:sp>
-        <p:nvSpPr>
-          <p:cNvPr id="21" name="TextBox 20">
-            <a:extLst>
-              <a:ext uri="{FF2B5EF4-FFF2-40B4-BE49-F238E27FC236}">
-                <a16:creationId xmlns:a16="http://schemas.microsoft.com/office/drawing/2014/main" id="{0CF67BF5-D282-4E79-89C1-EACEC9CAEA63}"/>
+              <a:rPr lang="en-US" sz="2400" b="1" dirty="0">
+                <a:solidFill>
+                  <a:srgbClr val="00B050"/>
+                </a:solidFill>
+              </a:rPr>
+              <a:t>PROPS</a:t>
+            </a:r>
+          </a:p>
+        </p:txBody>
+      </p:sp>
+      <p:sp>
+        <p:nvSpPr>
+          <p:cNvPr id="54" name="TextBox 53">
+            <a:extLst>
+              <a:ext uri="{FF2B5EF4-FFF2-40B4-BE49-F238E27FC236}">
+                <a16:creationId xmlns:a16="http://schemas.microsoft.com/office/drawing/2014/main" id="{FC1FFDD5-7BC8-4E5D-B45C-A0B02CBD7DFD}"/>
               </a:ext>
             </a:extLst>
           </p:cNvPr>
@@ -6258,7 +6372,7 @@
         </p:nvSpPr>
         <p:spPr>
           <a:xfrm>
-            <a:off x="7709143" y="1173211"/>
+            <a:off x="5917125" y="5375059"/>
             <a:ext cx="838691" cy="461665"/>
           </a:xfrm>
           <a:prstGeom prst="rect">
@@ -6285,10 +6399,10 @@
       </p:sp>
       <p:sp>
         <p:nvSpPr>
-          <p:cNvPr id="22" name="Arrow: Right 21">
-            <a:extLst>
-              <a:ext uri="{FF2B5EF4-FFF2-40B4-BE49-F238E27FC236}">
-                <a16:creationId xmlns:a16="http://schemas.microsoft.com/office/drawing/2014/main" id="{1C9302FA-AB17-4BD2-8B89-88D14559792D}"/>
+          <p:cNvPr id="55" name="Arrow: Right 54">
+            <a:extLst>
+              <a:ext uri="{FF2B5EF4-FFF2-40B4-BE49-F238E27FC236}">
+                <a16:creationId xmlns:a16="http://schemas.microsoft.com/office/drawing/2014/main" id="{73AE479B-40CB-4544-B195-38E077C6E103}"/>
               </a:ext>
             </a:extLst>
           </p:cNvPr>
@@ -6297,8 +6411,8 @@
         </p:nvSpPr>
         <p:spPr>
           <a:xfrm flipH="1">
-            <a:off x="7408857" y="1549523"/>
-            <a:ext cx="1283420" cy="478371"/>
+            <a:off x="4840258" y="5716285"/>
+            <a:ext cx="2547526" cy="267274"/>
           </a:xfrm>
           <a:prstGeom prst="rightArrow">
             <a:avLst/>
@@ -6343,10 +6457,10 @@
       </p:sp>
       <p:sp>
         <p:nvSpPr>
-          <p:cNvPr id="23" name="TextBox 22">
-            <a:extLst>
-              <a:ext uri="{FF2B5EF4-FFF2-40B4-BE49-F238E27FC236}">
-                <a16:creationId xmlns:a16="http://schemas.microsoft.com/office/drawing/2014/main" id="{BC366F20-846F-49EF-A41E-E59905944DD2}"/>
+          <p:cNvPr id="56" name="TextBox 55">
+            <a:extLst>
+              <a:ext uri="{FF2B5EF4-FFF2-40B4-BE49-F238E27FC236}">
+                <a16:creationId xmlns:a16="http://schemas.microsoft.com/office/drawing/2014/main" id="{1134A2B7-A5A8-4904-90D6-57C59FE30AD1}"/>
               </a:ext>
             </a:extLst>
           </p:cNvPr>
@@ -6355,8 +6469,48 @@
         </p:nvSpPr>
         <p:spPr>
           <a:xfrm>
-            <a:off x="7432920" y="1978594"/>
-            <a:ext cx="2037930" cy="369332"/>
+            <a:off x="6306579" y="5896160"/>
+            <a:ext cx="1392304" cy="369332"/>
+          </a:xfrm>
+          <a:prstGeom prst="rect">
+            <a:avLst/>
+          </a:prstGeom>
+          <a:noFill/>
+        </p:spPr>
+        <p:txBody>
+          <a:bodyPr wrap="none" rtlCol="0">
+            <a:spAutoFit/>
+          </a:bodyPr>
+          <a:lstStyle/>
+          <a:p>
+            <a:r>
+              <a:rPr lang="en-US" dirty="0">
+                <a:solidFill>
+                  <a:srgbClr val="00B050"/>
+                </a:solidFill>
+              </a:rPr>
+              <a:t>(categorytId)</a:t>
+            </a:r>
+            <a:endParaRPr lang="en-US" dirty="0"/>
+          </a:p>
+        </p:txBody>
+      </p:sp>
+      <p:sp>
+        <p:nvSpPr>
+          <p:cNvPr id="57" name="TextBox 56">
+            <a:extLst>
+              <a:ext uri="{FF2B5EF4-FFF2-40B4-BE49-F238E27FC236}">
+                <a16:creationId xmlns:a16="http://schemas.microsoft.com/office/drawing/2014/main" id="{9B2EB551-260C-4C31-99C4-5FE673094C13}"/>
+              </a:ext>
+            </a:extLst>
+          </p:cNvPr>
+          <p:cNvSpPr txBox="1"/>
+          <p:nvPr/>
+        </p:nvSpPr>
+        <p:spPr>
+          <a:xfrm>
+            <a:off x="5407073" y="5899832"/>
+            <a:ext cx="989182" cy="369332"/>
           </a:xfrm>
           <a:prstGeom prst="rect">
             <a:avLst/>
@@ -6375,7 +6529,7 @@
                   <a:srgbClr val="00B050"/>
                 </a:solidFill>
               </a:rPr>
-              <a:t>showCategoryFrom</a:t>
+              <a:t>isEditing</a:t>
             </a:r>
             <a:endParaRPr lang="en-US" b="1" dirty="0"/>
           </a:p>
@@ -6383,10 +6537,10 @@
       </p:sp>
       <p:sp>
         <p:nvSpPr>
-          <p:cNvPr id="24" name="TextBox 23">
-            <a:extLst>
-              <a:ext uri="{FF2B5EF4-FFF2-40B4-BE49-F238E27FC236}">
-                <a16:creationId xmlns:a16="http://schemas.microsoft.com/office/drawing/2014/main" id="{1D1C391E-EAF2-4CDA-9B8E-B34499FC2652}"/>
+          <p:cNvPr id="58" name="TextBox 57">
+            <a:extLst>
+              <a:ext uri="{FF2B5EF4-FFF2-40B4-BE49-F238E27FC236}">
+                <a16:creationId xmlns:a16="http://schemas.microsoft.com/office/drawing/2014/main" id="{E381ADBC-9E3E-4149-8C93-550196C998AA}"/>
               </a:ext>
             </a:extLst>
           </p:cNvPr>
@@ -6395,8 +6549,8 @@
         </p:nvSpPr>
         <p:spPr>
           <a:xfrm>
-            <a:off x="7456983" y="2318465"/>
-            <a:ext cx="1574983" cy="369332"/>
+            <a:off x="5426020" y="6168603"/>
+            <a:ext cx="956096" cy="369332"/>
           </a:xfrm>
           <a:prstGeom prst="rect">
             <a:avLst/>
@@ -6415,7 +6569,7 @@
                   <a:srgbClr val="00B050"/>
                 </a:solidFill>
               </a:rPr>
-              <a:t>categoryName</a:t>
+              <a:t>isDelete</a:t>
             </a:r>
             <a:endParaRPr lang="en-US" b="1" dirty="0"/>
           </a:p>
@@ -6423,10 +6577,10 @@
       </p:sp>
       <p:sp>
         <p:nvSpPr>
-          <p:cNvPr id="25" name="Arrow: Right 24">
-            <a:extLst>
-              <a:ext uri="{FF2B5EF4-FFF2-40B4-BE49-F238E27FC236}">
-                <a16:creationId xmlns:a16="http://schemas.microsoft.com/office/drawing/2014/main" id="{517C185A-273B-469F-9D88-5EA5278DCB17}"/>
+          <p:cNvPr id="59" name="Rectangle: Rounded Corners 58">
+            <a:extLst>
+              <a:ext uri="{FF2B5EF4-FFF2-40B4-BE49-F238E27FC236}">
+                <a16:creationId xmlns:a16="http://schemas.microsoft.com/office/drawing/2014/main" id="{473D3EFC-BE14-46DE-BBEE-3F1AB02C253B}"/>
               </a:ext>
             </a:extLst>
           </p:cNvPr>
@@ -6435,20 +6589,13 @@
         </p:nvSpPr>
         <p:spPr>
           <a:xfrm>
-            <a:off x="4931302" y="2996192"/>
-            <a:ext cx="1362361" cy="478371"/>
-          </a:xfrm>
-          <a:prstGeom prst="rightArrow">
-            <a:avLst/>
-          </a:prstGeom>
-          <a:solidFill>
-            <a:srgbClr val="00B050"/>
-          </a:solidFill>
-          <a:ln>
-            <a:solidFill>
-              <a:srgbClr val="00B050"/>
-            </a:solidFill>
-          </a:ln>
+            <a:off x="7477755" y="4806464"/>
+            <a:ext cx="2573027" cy="1130766"/>
+          </a:xfrm>
+          <a:prstGeom prst="roundRect">
+            <a:avLst/>
+          </a:prstGeom>
+          <a:noFill/>
         </p:spPr>
         <p:style>
           <a:lnRef idx="2">
@@ -6477,10 +6624,10 @@
       </p:sp>
       <p:sp>
         <p:nvSpPr>
-          <p:cNvPr id="26" name="TextBox 25">
-            <a:extLst>
-              <a:ext uri="{FF2B5EF4-FFF2-40B4-BE49-F238E27FC236}">
-                <a16:creationId xmlns:a16="http://schemas.microsoft.com/office/drawing/2014/main" id="{D2660A66-D548-4AF6-B291-99FD1DD83EE3}"/>
+          <p:cNvPr id="60" name="Text Box 16">
+            <a:extLst>
+              <a:ext uri="{FF2B5EF4-FFF2-40B4-BE49-F238E27FC236}">
+                <a16:creationId xmlns:a16="http://schemas.microsoft.com/office/drawing/2014/main" id="{549F8771-897D-4A16-81BC-1869D0056AB1}"/>
               </a:ext>
             </a:extLst>
           </p:cNvPr>
@@ -6489,8 +6636,8 @@
         </p:nvSpPr>
         <p:spPr>
           <a:xfrm>
-            <a:off x="5094457" y="2713287"/>
-            <a:ext cx="1036053" cy="461665"/>
+            <a:off x="483468" y="367583"/>
+            <a:ext cx="3266393" cy="461665"/>
           </a:xfrm>
           <a:prstGeom prst="rect">
             <a:avLst/>
@@ -6498,89 +6645,39 @@
           <a:noFill/>
         </p:spPr>
         <p:txBody>
-          <a:bodyPr wrap="none" rtlCol="0">
+          <a:bodyPr wrap="square" rtlCol="0">
             <a:spAutoFit/>
           </a:bodyPr>
           <a:lstStyle/>
           <a:p>
             <a:r>
-              <a:rPr lang="en-US" sz="2400" b="1" dirty="0">
-                <a:solidFill>
-                  <a:srgbClr val="00B050"/>
-                </a:solidFill>
-              </a:rPr>
-              <a:t>PROPS</a:t>
-            </a:r>
-          </a:p>
-        </p:txBody>
-      </p:sp>
-      <p:sp>
-        <p:nvSpPr>
-          <p:cNvPr id="29" name="TextBox 28">
-            <a:extLst>
-              <a:ext uri="{FF2B5EF4-FFF2-40B4-BE49-F238E27FC236}">
-                <a16:creationId xmlns:a16="http://schemas.microsoft.com/office/drawing/2014/main" id="{44376D2A-F1F8-4AD4-8D15-D79AACDD8CC2}"/>
-              </a:ext>
-            </a:extLst>
-          </p:cNvPr>
-          <p:cNvSpPr txBox="1"/>
-          <p:nvPr/>
-        </p:nvSpPr>
-        <p:spPr>
-          <a:xfrm>
-            <a:off x="7751819" y="4814643"/>
-            <a:ext cx="838691" cy="461665"/>
-          </a:xfrm>
-          <a:prstGeom prst="rect">
+              <a:rPr lang="en-US" altLang="en-US" sz="2400" b="1" dirty="0"/>
+              <a:t>Category Component </a:t>
+            </a:r>
+          </a:p>
+        </p:txBody>
+      </p:sp>
+      <p:sp>
+        <p:nvSpPr>
+          <p:cNvPr id="61" name="Rectangle: Rounded Corners 60">
+            <a:extLst>
+              <a:ext uri="{FF2B5EF4-FFF2-40B4-BE49-F238E27FC236}">
+                <a16:creationId xmlns:a16="http://schemas.microsoft.com/office/drawing/2014/main" id="{65477AEF-A7A1-4222-9973-4240C2F08516}"/>
+              </a:ext>
+            </a:extLst>
+          </p:cNvPr>
+          <p:cNvSpPr/>
+          <p:nvPr/>
+        </p:nvSpPr>
+        <p:spPr>
+          <a:xfrm>
+            <a:off x="375212" y="3206950"/>
+            <a:ext cx="1683028" cy="1349277"/>
+          </a:xfrm>
+          <a:prstGeom prst="roundRect">
             <a:avLst/>
           </a:prstGeom>
           <a:noFill/>
-        </p:spPr>
-        <p:txBody>
-          <a:bodyPr wrap="none" rtlCol="0">
-            <a:spAutoFit/>
-          </a:bodyPr>
-          <a:lstStyle/>
-          <a:p>
-            <a:r>
-              <a:rPr lang="en-US" sz="2400" b="1" dirty="0">
-                <a:solidFill>
-                  <a:srgbClr val="FF0000"/>
-                </a:solidFill>
-              </a:rPr>
-              <a:t>EMIT</a:t>
-            </a:r>
-          </a:p>
-        </p:txBody>
-      </p:sp>
-      <p:sp>
-        <p:nvSpPr>
-          <p:cNvPr id="30" name="Arrow: Right 29">
-            <a:extLst>
-              <a:ext uri="{FF2B5EF4-FFF2-40B4-BE49-F238E27FC236}">
-                <a16:creationId xmlns:a16="http://schemas.microsoft.com/office/drawing/2014/main" id="{9CB95AE0-F140-4635-BB19-4D2684FF1E16}"/>
-              </a:ext>
-            </a:extLst>
-          </p:cNvPr>
-          <p:cNvSpPr/>
-          <p:nvPr/>
-        </p:nvSpPr>
-        <p:spPr>
-          <a:xfrm flipH="1">
-            <a:off x="7451533" y="5190955"/>
-            <a:ext cx="1283420" cy="478371"/>
-          </a:xfrm>
-          <a:prstGeom prst="rightArrow">
-            <a:avLst/>
-          </a:prstGeom>
-          <a:solidFill>
-            <a:srgbClr val="FF0000"/>
-          </a:solidFill>
-          <a:ln>
-            <a:solidFill>
-              <a:srgbClr val="FF0000"/>
-            </a:solidFill>
-          </a:ln>
         </p:spPr>
         <p:style>
           <a:lnRef idx="2">
@@ -6603,20 +6700,16 @@
           <a:lstStyle/>
           <a:p>
             <a:pPr algn="ctr"/>
-            <a:endParaRPr lang="en-US">
-              <a:solidFill>
-                <a:srgbClr val="FF0000"/>
-              </a:solidFill>
-            </a:endParaRPr>
-          </a:p>
-        </p:txBody>
-      </p:sp>
-      <p:sp>
-        <p:nvSpPr>
-          <p:cNvPr id="31" name="TextBox 30">
-            <a:extLst>
-              <a:ext uri="{FF2B5EF4-FFF2-40B4-BE49-F238E27FC236}">
-                <a16:creationId xmlns:a16="http://schemas.microsoft.com/office/drawing/2014/main" id="{B260FA0F-07A6-4284-B12B-5C2E0153839F}"/>
+            <a:endParaRPr lang="en-US"/>
+          </a:p>
+        </p:txBody>
+      </p:sp>
+      <p:sp>
+        <p:nvSpPr>
+          <p:cNvPr id="62" name="TextBox 61">
+            <a:extLst>
+              <a:ext uri="{FF2B5EF4-FFF2-40B4-BE49-F238E27FC236}">
+                <a16:creationId xmlns:a16="http://schemas.microsoft.com/office/drawing/2014/main" id="{3449175F-F2D9-4869-8E82-07F161C2F8BB}"/>
               </a:ext>
             </a:extLst>
           </p:cNvPr>
@@ -6625,8 +6718,132 @@
         </p:nvSpPr>
         <p:spPr>
           <a:xfrm>
-            <a:off x="7475596" y="5620026"/>
-            <a:ext cx="1190262" cy="369332"/>
+            <a:off x="780548" y="3377660"/>
+            <a:ext cx="872355" cy="400110"/>
+          </a:xfrm>
+          <a:prstGeom prst="rect">
+            <a:avLst/>
+          </a:prstGeom>
+          <a:noFill/>
+        </p:spPr>
+        <p:txBody>
+          <a:bodyPr wrap="none" rtlCol="0">
+            <a:spAutoFit/>
+          </a:bodyPr>
+          <a:lstStyle/>
+          <a:p>
+            <a:r>
+              <a:rPr lang="en-US" sz="2000" b="1" dirty="0"/>
+              <a:t>&lt;App&gt;</a:t>
+            </a:r>
+          </a:p>
+        </p:txBody>
+      </p:sp>
+      <p:sp>
+        <p:nvSpPr>
+          <p:cNvPr id="63" name="Text Box 18">
+            <a:extLst>
+              <a:ext uri="{FF2B5EF4-FFF2-40B4-BE49-F238E27FC236}">
+                <a16:creationId xmlns:a16="http://schemas.microsoft.com/office/drawing/2014/main" id="{0812D639-BB73-45A7-90FF-B5D8FCFF9374}"/>
+              </a:ext>
+            </a:extLst>
+          </p:cNvPr>
+          <p:cNvSpPr txBox="1"/>
+          <p:nvPr/>
+        </p:nvSpPr>
+        <p:spPr>
+          <a:xfrm>
+            <a:off x="8431840" y="281593"/>
+            <a:ext cx="4034953" cy="1077218"/>
+          </a:xfrm>
+          <a:prstGeom prst="rect">
+            <a:avLst/>
+          </a:prstGeom>
+          <a:noFill/>
+        </p:spPr>
+        <p:txBody>
+          <a:bodyPr wrap="square" rtlCol="0">
+            <a:spAutoFit/>
+          </a:bodyPr>
+          <a:lstStyle/>
+          <a:p>
+            <a:r>
+              <a:rPr lang="" altLang="en-US" sz="1600" b="1" dirty="0">
+                <a:solidFill>
+                  <a:srgbClr val="FF0000"/>
+                </a:solidFill>
+              </a:rPr>
+              <a:t>- &lt;add-search&gt; contain add+ button and search bar</a:t>
+            </a:r>
+          </a:p>
+          <a:p>
+            <a:r>
+              <a:rPr lang="" altLang="en-US" sz="1600" b="1" dirty="0">
+                <a:solidFill>
+                  <a:srgbClr val="FF0000"/>
+                </a:solidFill>
+              </a:rPr>
+              <a:t>- &lt;category-form&gt; is shown when we click add+</a:t>
+            </a:r>
+          </a:p>
+        </p:txBody>
+      </p:sp>
+      <p:sp>
+        <p:nvSpPr>
+          <p:cNvPr id="64" name="TextBox 63">
+            <a:extLst>
+              <a:ext uri="{FF2B5EF4-FFF2-40B4-BE49-F238E27FC236}">
+                <a16:creationId xmlns:a16="http://schemas.microsoft.com/office/drawing/2014/main" id="{9C364682-D268-439E-A09C-A1CD04C622A8}"/>
+              </a:ext>
+            </a:extLst>
+          </p:cNvPr>
+          <p:cNvSpPr txBox="1"/>
+          <p:nvPr/>
+        </p:nvSpPr>
+        <p:spPr>
+          <a:xfrm>
+            <a:off x="6336470" y="6149398"/>
+            <a:ext cx="1314206" cy="369332"/>
+          </a:xfrm>
+          <a:prstGeom prst="rect">
+            <a:avLst/>
+          </a:prstGeom>
+          <a:noFill/>
+        </p:spPr>
+        <p:txBody>
+          <a:bodyPr wrap="none" rtlCol="0">
+            <a:spAutoFit/>
+          </a:bodyPr>
+          <a:lstStyle/>
+          <a:p>
+            <a:r>
+              <a:rPr lang="en-US" dirty="0">
+                <a:solidFill>
+                  <a:srgbClr val="00B050"/>
+                </a:solidFill>
+              </a:rPr>
+              <a:t>(categoryId)</a:t>
+            </a:r>
+            <a:endParaRPr lang="en-US" dirty="0"/>
+          </a:p>
+        </p:txBody>
+      </p:sp>
+      <p:sp>
+        <p:nvSpPr>
+          <p:cNvPr id="65" name="TextBox 64">
+            <a:extLst>
+              <a:ext uri="{FF2B5EF4-FFF2-40B4-BE49-F238E27FC236}">
+                <a16:creationId xmlns:a16="http://schemas.microsoft.com/office/drawing/2014/main" id="{FC34B1F0-BCD2-46AA-864E-EB81E45B18F1}"/>
+              </a:ext>
+            </a:extLst>
+          </p:cNvPr>
+          <p:cNvSpPr txBox="1"/>
+          <p:nvPr/>
+        </p:nvSpPr>
+        <p:spPr>
+          <a:xfrm>
+            <a:off x="5382162" y="4921622"/>
+            <a:ext cx="1005916" cy="369332"/>
           </a:xfrm>
           <a:prstGeom prst="rect">
             <a:avLst/>
@@ -6645,7 +6862,7 @@
                   <a:srgbClr val="00B050"/>
                 </a:solidFill>
               </a:rPr>
-              <a:t>categoryId</a:t>
+              <a:t>category</a:t>
             </a:r>
             <a:endParaRPr lang="en-US" b="1" dirty="0"/>
           </a:p>
@@ -6653,50 +6870,10 @@
       </p:sp>
       <p:sp>
         <p:nvSpPr>
-          <p:cNvPr id="33" name="TextBox 32">
-            <a:extLst>
-              <a:ext uri="{FF2B5EF4-FFF2-40B4-BE49-F238E27FC236}">
-                <a16:creationId xmlns:a16="http://schemas.microsoft.com/office/drawing/2014/main" id="{539DDD33-0D8E-4322-A6E2-DBCC838B7B4A}"/>
-              </a:ext>
-            </a:extLst>
-          </p:cNvPr>
-          <p:cNvSpPr txBox="1"/>
-          <p:nvPr/>
-        </p:nvSpPr>
-        <p:spPr>
-          <a:xfrm>
-            <a:off x="7483237" y="5894798"/>
-            <a:ext cx="993990" cy="369332"/>
-          </a:xfrm>
-          <a:prstGeom prst="rect">
-            <a:avLst/>
-          </a:prstGeom>
-          <a:noFill/>
-        </p:spPr>
-        <p:txBody>
-          <a:bodyPr wrap="none" rtlCol="0">
-            <a:spAutoFit/>
-          </a:bodyPr>
-          <a:lstStyle/>
-          <a:p>
-            <a:r>
-              <a:rPr lang="en-US" b="1" dirty="0">
-                <a:solidFill>
-                  <a:srgbClr val="00B050"/>
-                </a:solidFill>
-              </a:rPr>
-              <a:t>IsEditing</a:t>
-            </a:r>
-            <a:endParaRPr lang="en-US" b="1" dirty="0"/>
-          </a:p>
-        </p:txBody>
-      </p:sp>
-      <p:sp>
-        <p:nvSpPr>
-          <p:cNvPr id="34" name="Rounded Rectangle 17">
-            <a:extLst>
-              <a:ext uri="{FF2B5EF4-FFF2-40B4-BE49-F238E27FC236}">
-                <a16:creationId xmlns:a16="http://schemas.microsoft.com/office/drawing/2014/main" id="{FF28E4AB-A79A-46D8-9376-444D38944408}"/>
+          <p:cNvPr id="66" name="Arrow: Right 65">
+            <a:extLst>
+              <a:ext uri="{FF2B5EF4-FFF2-40B4-BE49-F238E27FC236}">
+                <a16:creationId xmlns:a16="http://schemas.microsoft.com/office/drawing/2014/main" id="{B2F20B67-6E8F-4459-AB0C-A73024424BCB}"/>
               </a:ext>
             </a:extLst>
           </p:cNvPr>
@@ -6705,18 +6882,19 @@
         </p:nvSpPr>
         <p:spPr>
           <a:xfrm>
-            <a:off x="162820" y="5102909"/>
-            <a:ext cx="4387215" cy="1487170"/>
-          </a:xfrm>
-          <a:prstGeom prst="roundRect">
-            <a:avLst/>
-          </a:prstGeom>
-          <a:noFill/>
-          <a:ln w="28575" cmpd="sng">
+            <a:off x="4661517" y="3259407"/>
+            <a:ext cx="2703981" cy="461665"/>
+          </a:xfrm>
+          <a:prstGeom prst="rightArrow">
+            <a:avLst/>
+          </a:prstGeom>
+          <a:solidFill>
+            <a:srgbClr val="00B050"/>
+          </a:solidFill>
+          <a:ln>
             <a:solidFill>
               <a:srgbClr val="00B050"/>
             </a:solidFill>
-            <a:prstDash val="sysDot"/>
           </a:ln>
         </p:spPr>
         <p:style>
@@ -6746,10 +6924,10 @@
       </p:sp>
       <p:sp>
         <p:nvSpPr>
-          <p:cNvPr id="35" name="Text Box 18">
-            <a:extLst>
-              <a:ext uri="{FF2B5EF4-FFF2-40B4-BE49-F238E27FC236}">
-                <a16:creationId xmlns:a16="http://schemas.microsoft.com/office/drawing/2014/main" id="{48049348-C002-48A4-9B0A-CCA56818563C}"/>
+          <p:cNvPr id="67" name="TextBox 66">
+            <a:extLst>
+              <a:ext uri="{FF2B5EF4-FFF2-40B4-BE49-F238E27FC236}">
+                <a16:creationId xmlns:a16="http://schemas.microsoft.com/office/drawing/2014/main" id="{CA273260-931D-44D4-9873-1AE489730BA4}"/>
               </a:ext>
             </a:extLst>
           </p:cNvPr>
@@ -6758,8 +6936,8 @@
         </p:nvSpPr>
         <p:spPr>
           <a:xfrm>
-            <a:off x="338950" y="5320419"/>
-            <a:ext cx="4034953" cy="1200329"/>
+            <a:off x="4707538" y="1084979"/>
+            <a:ext cx="1036053" cy="461665"/>
           </a:xfrm>
           <a:prstGeom prst="rect">
             <a:avLst/>
@@ -6767,38 +6945,28 @@
           <a:noFill/>
         </p:spPr>
         <p:txBody>
-          <a:bodyPr wrap="square" rtlCol="0">
+          <a:bodyPr wrap="none" rtlCol="0">
             <a:spAutoFit/>
           </a:bodyPr>
           <a:lstStyle/>
           <a:p>
             <a:r>
-              <a:rPr lang="" altLang="en-US" b="1" dirty="0">
+              <a:rPr lang="en-US" sz="2400" b="1" dirty="0">
                 <a:solidFill>
-                  <a:srgbClr val="FF0000"/>
+                  <a:srgbClr val="00B050"/>
                 </a:solidFill>
               </a:rPr>
-              <a:t>- &lt;add-search&gt; contain add+ button and search bar</a:t>
-            </a:r>
-          </a:p>
-          <a:p>
-            <a:r>
-              <a:rPr lang="" altLang="en-US" b="1" dirty="0">
-                <a:solidFill>
-                  <a:srgbClr val="FF0000"/>
-                </a:solidFill>
-              </a:rPr>
-              <a:t>- &lt;category-form&gt; is shown when we click add+</a:t>
-            </a:r>
-          </a:p>
-        </p:txBody>
-      </p:sp>
-      <p:sp>
-        <p:nvSpPr>
-          <p:cNvPr id="36" name="TextBox 35">
-            <a:extLst>
-              <a:ext uri="{FF2B5EF4-FFF2-40B4-BE49-F238E27FC236}">
-                <a16:creationId xmlns:a16="http://schemas.microsoft.com/office/drawing/2014/main" id="{BD9005A7-DAB2-4A84-A821-0B43538FFA62}"/>
+              <a:t>PROPS</a:t>
+            </a:r>
+          </a:p>
+        </p:txBody>
+      </p:sp>
+      <p:sp>
+        <p:nvSpPr>
+          <p:cNvPr id="68" name="TextBox 67">
+            <a:extLst>
+              <a:ext uri="{FF2B5EF4-FFF2-40B4-BE49-F238E27FC236}">
+                <a16:creationId xmlns:a16="http://schemas.microsoft.com/office/drawing/2014/main" id="{DC5FDEC7-EE5F-4D8E-A265-DEEE8C2C77EF}"/>
               </a:ext>
             </a:extLst>
           </p:cNvPr>
@@ -6807,8 +6975,8 @@
         </p:nvSpPr>
         <p:spPr>
           <a:xfrm>
-            <a:off x="7508682" y="6220747"/>
-            <a:ext cx="956096" cy="369332"/>
+            <a:off x="5317711" y="1331609"/>
+            <a:ext cx="1005916" cy="369332"/>
           </a:xfrm>
           <a:prstGeom prst="rect">
             <a:avLst/>
@@ -6827,7 +6995,140 @@
                   <a:srgbClr val="00B050"/>
                 </a:solidFill>
               </a:rPr>
-              <a:t>isDelete</a:t>
+              <a:t>category</a:t>
+            </a:r>
+            <a:endParaRPr lang="en-US" b="1" dirty="0"/>
+          </a:p>
+        </p:txBody>
+      </p:sp>
+      <p:sp>
+        <p:nvSpPr>
+          <p:cNvPr id="69" name="Arrow: Right 68">
+            <a:extLst>
+              <a:ext uri="{FF2B5EF4-FFF2-40B4-BE49-F238E27FC236}">
+                <a16:creationId xmlns:a16="http://schemas.microsoft.com/office/drawing/2014/main" id="{ADAA8ED8-5333-423A-B3C1-AE8A4BA909DD}"/>
+              </a:ext>
+            </a:extLst>
+          </p:cNvPr>
+          <p:cNvSpPr/>
+          <p:nvPr/>
+        </p:nvSpPr>
+        <p:spPr>
+          <a:xfrm>
+            <a:off x="4853410" y="1565849"/>
+            <a:ext cx="2703981" cy="461665"/>
+          </a:xfrm>
+          <a:prstGeom prst="rightArrow">
+            <a:avLst/>
+          </a:prstGeom>
+          <a:solidFill>
+            <a:srgbClr val="00B050"/>
+          </a:solidFill>
+          <a:ln>
+            <a:solidFill>
+              <a:srgbClr val="00B050"/>
+            </a:solidFill>
+          </a:ln>
+        </p:spPr>
+        <p:style>
+          <a:lnRef idx="2">
+            <a:schemeClr val="accent1">
+              <a:shade val="50000"/>
+            </a:schemeClr>
+          </a:lnRef>
+          <a:fillRef idx="1">
+            <a:schemeClr val="accent1"/>
+          </a:fillRef>
+          <a:effectRef idx="0">
+            <a:schemeClr val="accent1"/>
+          </a:effectRef>
+          <a:fontRef idx="minor">
+            <a:schemeClr val="lt1"/>
+          </a:fontRef>
+        </p:style>
+        <p:txBody>
+          <a:bodyPr rtlCol="0" anchor="ctr"/>
+          <a:lstStyle/>
+          <a:p>
+            <a:pPr algn="ctr"/>
+            <a:endParaRPr lang="en-US"/>
+          </a:p>
+        </p:txBody>
+      </p:sp>
+      <p:sp>
+        <p:nvSpPr>
+          <p:cNvPr id="70" name="TextBox 69">
+            <a:extLst>
+              <a:ext uri="{FF2B5EF4-FFF2-40B4-BE49-F238E27FC236}">
+                <a16:creationId xmlns:a16="http://schemas.microsoft.com/office/drawing/2014/main" id="{4769FE22-46C8-45B5-ACF8-717459CF0387}"/>
+              </a:ext>
+            </a:extLst>
+          </p:cNvPr>
+          <p:cNvSpPr txBox="1"/>
+          <p:nvPr/>
+        </p:nvSpPr>
+        <p:spPr>
+          <a:xfrm>
+            <a:off x="4766362" y="2752968"/>
+            <a:ext cx="1036053" cy="461665"/>
+          </a:xfrm>
+          <a:prstGeom prst="rect">
+            <a:avLst/>
+          </a:prstGeom>
+          <a:noFill/>
+        </p:spPr>
+        <p:txBody>
+          <a:bodyPr wrap="none" rtlCol="0">
+            <a:spAutoFit/>
+          </a:bodyPr>
+          <a:lstStyle/>
+          <a:p>
+            <a:r>
+              <a:rPr lang="en-US" sz="2400" b="1" dirty="0">
+                <a:solidFill>
+                  <a:srgbClr val="00B050"/>
+                </a:solidFill>
+              </a:rPr>
+              <a:t>PROPS</a:t>
+            </a:r>
+          </a:p>
+        </p:txBody>
+      </p:sp>
+      <p:sp>
+        <p:nvSpPr>
+          <p:cNvPr id="71" name="TextBox 70">
+            <a:extLst>
+              <a:ext uri="{FF2B5EF4-FFF2-40B4-BE49-F238E27FC236}">
+                <a16:creationId xmlns:a16="http://schemas.microsoft.com/office/drawing/2014/main" id="{1DB37B80-6B5A-461A-8802-BDBACD9070F9}"/>
+              </a:ext>
+            </a:extLst>
+          </p:cNvPr>
+          <p:cNvSpPr txBox="1"/>
+          <p:nvPr/>
+        </p:nvSpPr>
+        <p:spPr>
+          <a:xfrm>
+            <a:off x="5317711" y="3041946"/>
+            <a:ext cx="1005916" cy="369332"/>
+          </a:xfrm>
+          <a:prstGeom prst="rect">
+            <a:avLst/>
+          </a:prstGeom>
+          <a:noFill/>
+        </p:spPr>
+        <p:txBody>
+          <a:bodyPr wrap="none" rtlCol="0">
+            <a:spAutoFit/>
+          </a:bodyPr>
+          <a:lstStyle/>
+          <a:p>
+            <a:r>
+              <a:rPr lang="en-US" b="1" dirty="0">
+                <a:solidFill>
+                  <a:srgbClr val="00B050"/>
+                </a:solidFill>
+              </a:rPr>
+              <a:t>category</a:t>
             </a:r>
             <a:endParaRPr lang="en-US" b="1" dirty="0"/>
           </a:p>
@@ -6865,10 +7166,10 @@
       </p:grpSpPr>
       <p:sp>
         <p:nvSpPr>
-          <p:cNvPr id="14" name="Rectangle: Rounded Corners 13">
-            <a:extLst>
-              <a:ext uri="{FF2B5EF4-FFF2-40B4-BE49-F238E27FC236}">
-                <a16:creationId xmlns:a16="http://schemas.microsoft.com/office/drawing/2014/main" id="{509071B7-F367-4F82-97EE-FC373F10438D}"/>
+          <p:cNvPr id="42" name="Rectangle: Rounded Corners 41">
+            <a:extLst>
+              <a:ext uri="{FF2B5EF4-FFF2-40B4-BE49-F238E27FC236}">
+                <a16:creationId xmlns:a16="http://schemas.microsoft.com/office/drawing/2014/main" id="{9050B018-03FD-4F8A-BE1A-21C5F666EF9D}"/>
               </a:ext>
             </a:extLst>
           </p:cNvPr>
@@ -6877,8 +7178,8 @@
         </p:nvSpPr>
         <p:spPr>
           <a:xfrm>
-            <a:off x="2539547" y="3087580"/>
-            <a:ext cx="2112047" cy="1349276"/>
+            <a:off x="2539547" y="1268615"/>
+            <a:ext cx="2112047" cy="5081279"/>
           </a:xfrm>
           <a:prstGeom prst="roundRect">
             <a:avLst/>
@@ -6912,10 +7213,10 @@
       </p:sp>
       <p:sp>
         <p:nvSpPr>
-          <p:cNvPr id="15" name="TextBox 14">
-            <a:extLst>
-              <a:ext uri="{FF2B5EF4-FFF2-40B4-BE49-F238E27FC236}">
-                <a16:creationId xmlns:a16="http://schemas.microsoft.com/office/drawing/2014/main" id="{4EA7DCF7-B16F-4D2B-ADCC-DE85633242EA}"/>
+          <p:cNvPr id="43" name="TextBox 42">
+            <a:extLst>
+              <a:ext uri="{FF2B5EF4-FFF2-40B4-BE49-F238E27FC236}">
+                <a16:creationId xmlns:a16="http://schemas.microsoft.com/office/drawing/2014/main" id="{68597A93-2EA6-4F61-9BAF-83AA2EB8DD01}"/>
               </a:ext>
             </a:extLst>
           </p:cNvPr>
@@ -6924,7 +7225,7 @@
         </p:nvSpPr>
         <p:spPr>
           <a:xfrm>
-            <a:off x="2615069" y="3391168"/>
+            <a:off x="2505951" y="3548447"/>
             <a:ext cx="2029017" cy="400110"/>
           </a:xfrm>
           <a:prstGeom prst="rect">
@@ -6947,10 +7248,10 @@
       </p:sp>
       <p:sp>
         <p:nvSpPr>
-          <p:cNvPr id="16" name="TextBox 15">
-            <a:extLst>
-              <a:ext uri="{FF2B5EF4-FFF2-40B4-BE49-F238E27FC236}">
-                <a16:creationId xmlns:a16="http://schemas.microsoft.com/office/drawing/2014/main" id="{56D989C1-7D4D-4A8B-8527-F2D3C83E5E41}"/>
+          <p:cNvPr id="44" name="TextBox 43">
+            <a:extLst>
+              <a:ext uri="{FF2B5EF4-FFF2-40B4-BE49-F238E27FC236}">
+                <a16:creationId xmlns:a16="http://schemas.microsoft.com/office/drawing/2014/main" id="{FFB1FCD7-F6D4-46B7-868E-FB913555E87A}"/>
               </a:ext>
             </a:extLst>
           </p:cNvPr>
@@ -6959,7 +7260,7 @@
         </p:nvSpPr>
         <p:spPr>
           <a:xfrm>
-            <a:off x="6404929" y="3081338"/>
+            <a:off x="5564917" y="3457423"/>
             <a:ext cx="838691" cy="461665"/>
           </a:xfrm>
           <a:prstGeom prst="rect">
@@ -6986,10 +7287,10 @@
       </p:sp>
       <p:sp>
         <p:nvSpPr>
-          <p:cNvPr id="17" name="Arrow: Right 16">
-            <a:extLst>
-              <a:ext uri="{FF2B5EF4-FFF2-40B4-BE49-F238E27FC236}">
-                <a16:creationId xmlns:a16="http://schemas.microsoft.com/office/drawing/2014/main" id="{0F3D2B4E-6AD9-4D00-80C2-7862EC63104F}"/>
+          <p:cNvPr id="45" name="Arrow: Right 44">
+            <a:extLst>
+              <a:ext uri="{FF2B5EF4-FFF2-40B4-BE49-F238E27FC236}">
+                <a16:creationId xmlns:a16="http://schemas.microsoft.com/office/drawing/2014/main" id="{81F3EC81-4836-492A-939D-864EBE404A61}"/>
               </a:ext>
             </a:extLst>
           </p:cNvPr>
@@ -6998,8 +7299,8 @@
         </p:nvSpPr>
         <p:spPr>
           <a:xfrm flipH="1">
-            <a:off x="6104643" y="3457650"/>
-            <a:ext cx="1283420" cy="478371"/>
+            <a:off x="4625370" y="3770681"/>
+            <a:ext cx="2632677" cy="382704"/>
           </a:xfrm>
           <a:prstGeom prst="rightArrow">
             <a:avLst/>
@@ -7044,10 +7345,10 @@
       </p:sp>
       <p:sp>
         <p:nvSpPr>
-          <p:cNvPr id="18" name="TextBox 17">
-            <a:extLst>
-              <a:ext uri="{FF2B5EF4-FFF2-40B4-BE49-F238E27FC236}">
-                <a16:creationId xmlns:a16="http://schemas.microsoft.com/office/drawing/2014/main" id="{1211DC2F-28EF-4139-9332-1F4EB270B28B}"/>
+          <p:cNvPr id="46" name="TextBox 45">
+            <a:extLst>
+              <a:ext uri="{FF2B5EF4-FFF2-40B4-BE49-F238E27FC236}">
+                <a16:creationId xmlns:a16="http://schemas.microsoft.com/office/drawing/2014/main" id="{BFA83EEA-D0C9-4BBD-9895-85F9E3576914}"/>
               </a:ext>
             </a:extLst>
           </p:cNvPr>
@@ -7056,8 +7357,8 @@
         </p:nvSpPr>
         <p:spPr>
           <a:xfrm>
-            <a:off x="4600894" y="3874547"/>
-            <a:ext cx="1307474" cy="369332"/>
+            <a:off x="2651847" y="3847484"/>
+            <a:ext cx="1017651" cy="369332"/>
           </a:xfrm>
           <a:prstGeom prst="rect">
             <a:avLst/>
@@ -7076,7 +7377,7 @@
                   <a:srgbClr val="00B050"/>
                 </a:solidFill>
               </a:rPr>
-              <a:t>myevents</a:t>
+              <a:t>events</a:t>
             </a:r>
             <a:r>
               <a:rPr lang="en-US" b="1" dirty="0"/>
@@ -7087,10 +7388,10 @@
       </p:sp>
       <p:sp>
         <p:nvSpPr>
-          <p:cNvPr id="19" name="TextBox 18">
-            <a:extLst>
-              <a:ext uri="{FF2B5EF4-FFF2-40B4-BE49-F238E27FC236}">
-                <a16:creationId xmlns:a16="http://schemas.microsoft.com/office/drawing/2014/main" id="{4F3814EB-78BB-4565-A979-31B478076D60}"/>
+          <p:cNvPr id="47" name="TextBox 46">
+            <a:extLst>
+              <a:ext uri="{FF2B5EF4-FFF2-40B4-BE49-F238E27FC236}">
+                <a16:creationId xmlns:a16="http://schemas.microsoft.com/office/drawing/2014/main" id="{D80C5C30-2EB7-411B-9C0F-F66BE9505F7D}"/>
               </a:ext>
             </a:extLst>
           </p:cNvPr>
@@ -7099,8 +7400,8 @@
         </p:nvSpPr>
         <p:spPr>
           <a:xfrm>
-            <a:off x="6128706" y="3886721"/>
-            <a:ext cx="1573188" cy="369332"/>
+            <a:off x="5666378" y="4059008"/>
+            <a:ext cx="2386807" cy="369332"/>
           </a:xfrm>
           <a:prstGeom prst="rect">
             <a:avLst/>
@@ -7119,18 +7420,26 @@
                   <a:srgbClr val="00B050"/>
                 </a:solidFill>
               </a:rPr>
-              <a:t>newEventData</a:t>
-            </a:r>
-            <a:endParaRPr lang="en-US" b="1" dirty="0"/>
-          </a:p>
-        </p:txBody>
-      </p:sp>
-      <p:sp>
-        <p:nvSpPr>
-          <p:cNvPr id="20" name="Rectangle: Rounded Corners 19">
-            <a:extLst>
-              <a:ext uri="{FF2B5EF4-FFF2-40B4-BE49-F238E27FC236}">
-                <a16:creationId xmlns:a16="http://schemas.microsoft.com/office/drawing/2014/main" id="{849D6E0A-2AA8-409E-AECD-6CC2490EB442}"/>
+              <a:t>newEvent (</a:t>
+            </a:r>
+            <a:r>
+              <a:rPr lang="en-US" dirty="0">
+                <a:solidFill>
+                  <a:srgbClr val="00B050"/>
+                </a:solidFill>
+              </a:rPr>
+              <a:t>evenytData)</a:t>
+            </a:r>
+            <a:endParaRPr lang="en-US" dirty="0"/>
+          </a:p>
+        </p:txBody>
+      </p:sp>
+      <p:sp>
+        <p:nvSpPr>
+          <p:cNvPr id="48" name="Rectangle: Rounded Corners 47">
+            <a:extLst>
+              <a:ext uri="{FF2B5EF4-FFF2-40B4-BE49-F238E27FC236}">
+                <a16:creationId xmlns:a16="http://schemas.microsoft.com/office/drawing/2014/main" id="{B8B39299-780A-4452-AA1A-F9266AC5E3A2}"/>
               </a:ext>
             </a:extLst>
           </p:cNvPr>
@@ -7139,7 +7448,7 @@
         </p:nvSpPr>
         <p:spPr>
           <a:xfrm>
-            <a:off x="7263103" y="793578"/>
+            <a:off x="7219297" y="1268615"/>
             <a:ext cx="2573027" cy="1130766"/>
           </a:xfrm>
           <a:prstGeom prst="roundRect">
@@ -7174,10 +7483,10 @@
       </p:sp>
       <p:sp>
         <p:nvSpPr>
-          <p:cNvPr id="21" name="TextBox 20">
-            <a:extLst>
-              <a:ext uri="{FF2B5EF4-FFF2-40B4-BE49-F238E27FC236}">
-                <a16:creationId xmlns:a16="http://schemas.microsoft.com/office/drawing/2014/main" id="{9D33FF50-2281-41E5-B17B-CF742417838A}"/>
+          <p:cNvPr id="49" name="TextBox 48">
+            <a:extLst>
+              <a:ext uri="{FF2B5EF4-FFF2-40B4-BE49-F238E27FC236}">
+                <a16:creationId xmlns:a16="http://schemas.microsoft.com/office/drawing/2014/main" id="{400EF8CA-805B-4AC1-8451-415F0868DC3A}"/>
               </a:ext>
             </a:extLst>
           </p:cNvPr>
@@ -7186,7 +7495,7 @@
         </p:nvSpPr>
         <p:spPr>
           <a:xfrm>
-            <a:off x="7742567" y="1088995"/>
+            <a:off x="7698761" y="1564032"/>
             <a:ext cx="1614096" cy="400110"/>
           </a:xfrm>
           <a:prstGeom prst="rect">
@@ -7209,10 +7518,10 @@
       </p:sp>
       <p:sp>
         <p:nvSpPr>
-          <p:cNvPr id="22" name="Rectangle: Rounded Corners 21">
-            <a:extLst>
-              <a:ext uri="{FF2B5EF4-FFF2-40B4-BE49-F238E27FC236}">
-                <a16:creationId xmlns:a16="http://schemas.microsoft.com/office/drawing/2014/main" id="{FA7420F0-1EC0-4D80-884B-284FA36DCDA8}"/>
+          <p:cNvPr id="50" name="Rectangle: Rounded Corners 49">
+            <a:extLst>
+              <a:ext uri="{FF2B5EF4-FFF2-40B4-BE49-F238E27FC236}">
+                <a16:creationId xmlns:a16="http://schemas.microsoft.com/office/drawing/2014/main" id="{6997C7FB-9738-4BF8-A480-D9CBBDE5EFE0}"/>
               </a:ext>
             </a:extLst>
           </p:cNvPr>
@@ -7256,10 +7565,10 @@
       </p:sp>
       <p:sp>
         <p:nvSpPr>
-          <p:cNvPr id="23" name="TextBox 22">
-            <a:extLst>
-              <a:ext uri="{FF2B5EF4-FFF2-40B4-BE49-F238E27FC236}">
-                <a16:creationId xmlns:a16="http://schemas.microsoft.com/office/drawing/2014/main" id="{72BFCE9A-604B-4223-B108-0D98844C186A}"/>
+          <p:cNvPr id="51" name="TextBox 50">
+            <a:extLst>
+              <a:ext uri="{FF2B5EF4-FFF2-40B4-BE49-F238E27FC236}">
+                <a16:creationId xmlns:a16="http://schemas.microsoft.com/office/drawing/2014/main" id="{5670D968-1EF3-43CC-A8D8-15857552BF3E}"/>
               </a:ext>
             </a:extLst>
           </p:cNvPr>
@@ -7291,10 +7600,10 @@
       </p:sp>
       <p:sp>
         <p:nvSpPr>
-          <p:cNvPr id="24" name="TextBox 23">
-            <a:extLst>
-              <a:ext uri="{FF2B5EF4-FFF2-40B4-BE49-F238E27FC236}">
-                <a16:creationId xmlns:a16="http://schemas.microsoft.com/office/drawing/2014/main" id="{9A26E2D6-0322-4818-A13D-4D8F40BB9D7B}"/>
+          <p:cNvPr id="52" name="TextBox 51">
+            <a:extLst>
+              <a:ext uri="{FF2B5EF4-FFF2-40B4-BE49-F238E27FC236}">
+                <a16:creationId xmlns:a16="http://schemas.microsoft.com/office/drawing/2014/main" id="{307141E2-C767-4CD1-9683-4288BE305A2F}"/>
               </a:ext>
             </a:extLst>
           </p:cNvPr>
@@ -7326,10 +7635,10 @@
       </p:sp>
       <p:sp>
         <p:nvSpPr>
-          <p:cNvPr id="25" name="TextBox 24">
-            <a:extLst>
-              <a:ext uri="{FF2B5EF4-FFF2-40B4-BE49-F238E27FC236}">
-                <a16:creationId xmlns:a16="http://schemas.microsoft.com/office/drawing/2014/main" id="{AFFC6E12-571B-479C-B098-0C873A86454D}"/>
+          <p:cNvPr id="53" name="TextBox 52">
+            <a:extLst>
+              <a:ext uri="{FF2B5EF4-FFF2-40B4-BE49-F238E27FC236}">
+                <a16:creationId xmlns:a16="http://schemas.microsoft.com/office/drawing/2014/main" id="{FBDFFD91-81E0-40FF-985E-D3501FD9EEC4}"/>
               </a:ext>
             </a:extLst>
           </p:cNvPr>
@@ -7338,7 +7647,7 @@
         </p:nvSpPr>
         <p:spPr>
           <a:xfrm>
-            <a:off x="6260486" y="1029373"/>
+            <a:off x="5739024" y="1739535"/>
             <a:ext cx="838691" cy="461665"/>
           </a:xfrm>
           <a:prstGeom prst="rect">
@@ -7365,10 +7674,10 @@
       </p:sp>
       <p:sp>
         <p:nvSpPr>
-          <p:cNvPr id="26" name="Arrow: Right 25">
-            <a:extLst>
-              <a:ext uri="{FF2B5EF4-FFF2-40B4-BE49-F238E27FC236}">
-                <a16:creationId xmlns:a16="http://schemas.microsoft.com/office/drawing/2014/main" id="{147B98C3-2516-4D30-86AE-BFE994286DFA}"/>
+          <p:cNvPr id="54" name="Arrow: Right 53">
+            <a:extLst>
+              <a:ext uri="{FF2B5EF4-FFF2-40B4-BE49-F238E27FC236}">
+                <a16:creationId xmlns:a16="http://schemas.microsoft.com/office/drawing/2014/main" id="{A34F3213-EC3B-43B8-8888-3D4E49942B2A}"/>
               </a:ext>
             </a:extLst>
           </p:cNvPr>
@@ -7377,8 +7686,8 @@
         </p:nvSpPr>
         <p:spPr>
           <a:xfrm flipH="1">
-            <a:off x="5960200" y="1405685"/>
-            <a:ext cx="1283420" cy="478371"/>
+            <a:off x="4699617" y="2034241"/>
+            <a:ext cx="2558430" cy="373813"/>
           </a:xfrm>
           <a:prstGeom prst="rightArrow">
             <a:avLst/>
@@ -7423,10 +7732,10 @@
       </p:sp>
       <p:sp>
         <p:nvSpPr>
-          <p:cNvPr id="27" name="TextBox 26">
-            <a:extLst>
-              <a:ext uri="{FF2B5EF4-FFF2-40B4-BE49-F238E27FC236}">
-                <a16:creationId xmlns:a16="http://schemas.microsoft.com/office/drawing/2014/main" id="{80D37595-2921-4C65-9C66-691D88D5B244}"/>
+          <p:cNvPr id="55" name="TextBox 54">
+            <a:extLst>
+              <a:ext uri="{FF2B5EF4-FFF2-40B4-BE49-F238E27FC236}">
+                <a16:creationId xmlns:a16="http://schemas.microsoft.com/office/drawing/2014/main" id="{D0C4A111-0D33-4BC6-B3BB-6A1ACFAF6225}"/>
               </a:ext>
             </a:extLst>
           </p:cNvPr>
@@ -7435,7 +7744,7 @@
         </p:nvSpPr>
         <p:spPr>
           <a:xfrm>
-            <a:off x="5984263" y="1834756"/>
+            <a:off x="5985818" y="2284314"/>
             <a:ext cx="1719702" cy="369332"/>
           </a:xfrm>
           <a:prstGeom prst="rect">
@@ -7463,10 +7772,10 @@
       </p:sp>
       <p:sp>
         <p:nvSpPr>
-          <p:cNvPr id="28" name="TextBox 27">
-            <a:extLst>
-              <a:ext uri="{FF2B5EF4-FFF2-40B4-BE49-F238E27FC236}">
-                <a16:creationId xmlns:a16="http://schemas.microsoft.com/office/drawing/2014/main" id="{8BAA8566-E121-4F0A-930B-170155A57F7B}"/>
+          <p:cNvPr id="56" name="TextBox 55">
+            <a:extLst>
+              <a:ext uri="{FF2B5EF4-FFF2-40B4-BE49-F238E27FC236}">
+                <a16:creationId xmlns:a16="http://schemas.microsoft.com/office/drawing/2014/main" id="{CBCF149D-4F51-478D-B6BA-60A93B7B2830}"/>
               </a:ext>
             </a:extLst>
           </p:cNvPr>
@@ -7475,7 +7784,7 @@
         </p:nvSpPr>
         <p:spPr>
           <a:xfrm>
-            <a:off x="6008326" y="2174627"/>
+            <a:off x="6009881" y="2624185"/>
             <a:ext cx="1291764" cy="369332"/>
           </a:xfrm>
           <a:prstGeom prst="rect">
@@ -7503,10 +7812,10 @@
       </p:sp>
       <p:sp>
         <p:nvSpPr>
-          <p:cNvPr id="29" name="Arrow: Right 28">
-            <a:extLst>
-              <a:ext uri="{FF2B5EF4-FFF2-40B4-BE49-F238E27FC236}">
-                <a16:creationId xmlns:a16="http://schemas.microsoft.com/office/drawing/2014/main" id="{DFD8AFB9-AE17-473E-A468-D9A47C90AD52}"/>
+          <p:cNvPr id="57" name="Arrow: Right 56">
+            <a:extLst>
+              <a:ext uri="{FF2B5EF4-FFF2-40B4-BE49-F238E27FC236}">
+                <a16:creationId xmlns:a16="http://schemas.microsoft.com/office/drawing/2014/main" id="{6086B0A8-D661-4EC7-8CFA-41405430E875}"/>
               </a:ext>
             </a:extLst>
           </p:cNvPr>
@@ -7515,8 +7824,8 @@
         </p:nvSpPr>
         <p:spPr>
           <a:xfrm>
-            <a:off x="4479324" y="3395975"/>
-            <a:ext cx="1362361" cy="478371"/>
+            <a:off x="4428328" y="5023414"/>
+            <a:ext cx="2883563" cy="461665"/>
           </a:xfrm>
           <a:prstGeom prst="rightArrow">
             <a:avLst/>
@@ -7557,10 +7866,10 @@
       </p:sp>
       <p:sp>
         <p:nvSpPr>
-          <p:cNvPr id="30" name="TextBox 29">
-            <a:extLst>
-              <a:ext uri="{FF2B5EF4-FFF2-40B4-BE49-F238E27FC236}">
-                <a16:creationId xmlns:a16="http://schemas.microsoft.com/office/drawing/2014/main" id="{9BDAE91D-247E-452C-89FB-024F33FF5C03}"/>
+          <p:cNvPr id="58" name="TextBox 57">
+            <a:extLst>
+              <a:ext uri="{FF2B5EF4-FFF2-40B4-BE49-F238E27FC236}">
+                <a16:creationId xmlns:a16="http://schemas.microsoft.com/office/drawing/2014/main" id="{2AD4F023-36DF-4B4A-B455-1C2941079115}"/>
               </a:ext>
             </a:extLst>
           </p:cNvPr>
@@ -7569,7 +7878,7 @@
         </p:nvSpPr>
         <p:spPr>
           <a:xfrm>
-            <a:off x="4642479" y="3113070"/>
+            <a:off x="4600804" y="4554312"/>
             <a:ext cx="1036053" cy="461665"/>
           </a:xfrm>
           <a:prstGeom prst="rect">
@@ -7596,10 +7905,10 @@
       </p:sp>
       <p:sp>
         <p:nvSpPr>
-          <p:cNvPr id="31" name="TextBox 30">
-            <a:extLst>
-              <a:ext uri="{FF2B5EF4-FFF2-40B4-BE49-F238E27FC236}">
-                <a16:creationId xmlns:a16="http://schemas.microsoft.com/office/drawing/2014/main" id="{79330B4B-C6FA-4373-87AF-49551A591890}"/>
+          <p:cNvPr id="59" name="TextBox 58">
+            <a:extLst>
+              <a:ext uri="{FF2B5EF4-FFF2-40B4-BE49-F238E27FC236}">
+                <a16:creationId xmlns:a16="http://schemas.microsoft.com/office/drawing/2014/main" id="{93F8EB3D-E4F5-44C3-8AFA-49937D62B84D}"/>
               </a:ext>
             </a:extLst>
           </p:cNvPr>
@@ -7608,7 +7917,7 @@
         </p:nvSpPr>
         <p:spPr>
           <a:xfrm>
-            <a:off x="6409425" y="4631636"/>
+            <a:off x="5762834" y="5284748"/>
             <a:ext cx="838691" cy="461665"/>
           </a:xfrm>
           <a:prstGeom prst="rect">
@@ -7635,10 +7944,10 @@
       </p:sp>
       <p:sp>
         <p:nvSpPr>
-          <p:cNvPr id="32" name="Arrow: Right 31">
-            <a:extLst>
-              <a:ext uri="{FF2B5EF4-FFF2-40B4-BE49-F238E27FC236}">
-                <a16:creationId xmlns:a16="http://schemas.microsoft.com/office/drawing/2014/main" id="{FE427EB0-31AD-4C95-809C-CBA09D4B6D69}"/>
+          <p:cNvPr id="60" name="Arrow: Right 59">
+            <a:extLst>
+              <a:ext uri="{FF2B5EF4-FFF2-40B4-BE49-F238E27FC236}">
+                <a16:creationId xmlns:a16="http://schemas.microsoft.com/office/drawing/2014/main" id="{5D84B032-7DD7-4463-B608-49B616665F58}"/>
               </a:ext>
             </a:extLst>
           </p:cNvPr>
@@ -7647,8 +7956,8 @@
         </p:nvSpPr>
         <p:spPr>
           <a:xfrm flipH="1">
-            <a:off x="6109139" y="5007948"/>
-            <a:ext cx="1283420" cy="478371"/>
+            <a:off x="4685967" y="5625974"/>
+            <a:ext cx="2547526" cy="267274"/>
           </a:xfrm>
           <a:prstGeom prst="rightArrow">
             <a:avLst/>
@@ -7693,10 +8002,10 @@
       </p:sp>
       <p:sp>
         <p:nvSpPr>
-          <p:cNvPr id="33" name="TextBox 32">
-            <a:extLst>
-              <a:ext uri="{FF2B5EF4-FFF2-40B4-BE49-F238E27FC236}">
-                <a16:creationId xmlns:a16="http://schemas.microsoft.com/office/drawing/2014/main" id="{DDD742EA-2BC7-43E8-B02D-81DE61F861B1}"/>
+          <p:cNvPr id="61" name="TextBox 60">
+            <a:extLst>
+              <a:ext uri="{FF2B5EF4-FFF2-40B4-BE49-F238E27FC236}">
+                <a16:creationId xmlns:a16="http://schemas.microsoft.com/office/drawing/2014/main" id="{AA0D98E4-3BEC-4BD4-9075-0A58E51F7CD4}"/>
               </a:ext>
             </a:extLst>
           </p:cNvPr>
@@ -7705,8 +8014,48 @@
         </p:nvSpPr>
         <p:spPr>
           <a:xfrm>
-            <a:off x="6133202" y="5437019"/>
-            <a:ext cx="907043" cy="369332"/>
+            <a:off x="6152288" y="5805849"/>
+            <a:ext cx="1051313" cy="369332"/>
+          </a:xfrm>
+          <a:prstGeom prst="rect">
+            <a:avLst/>
+          </a:prstGeom>
+          <a:noFill/>
+        </p:spPr>
+        <p:txBody>
+          <a:bodyPr wrap="none" rtlCol="0">
+            <a:spAutoFit/>
+          </a:bodyPr>
+          <a:lstStyle/>
+          <a:p>
+            <a:r>
+              <a:rPr lang="en-US" dirty="0">
+                <a:solidFill>
+                  <a:srgbClr val="00B050"/>
+                </a:solidFill>
+              </a:rPr>
+              <a:t>(eventId)</a:t>
+            </a:r>
+            <a:endParaRPr lang="en-US" dirty="0"/>
+          </a:p>
+        </p:txBody>
+      </p:sp>
+      <p:sp>
+        <p:nvSpPr>
+          <p:cNvPr id="62" name="TextBox 61">
+            <a:extLst>
+              <a:ext uri="{FF2B5EF4-FFF2-40B4-BE49-F238E27FC236}">
+                <a16:creationId xmlns:a16="http://schemas.microsoft.com/office/drawing/2014/main" id="{B4F97C69-1650-4545-8082-F477DD18E54A}"/>
+              </a:ext>
+            </a:extLst>
+          </p:cNvPr>
+          <p:cNvSpPr txBox="1"/>
+          <p:nvPr/>
+        </p:nvSpPr>
+        <p:spPr>
+          <a:xfrm>
+            <a:off x="5252782" y="5809521"/>
+            <a:ext cx="989182" cy="369332"/>
           </a:xfrm>
           <a:prstGeom prst="rect">
             <a:avLst/>
@@ -7725,7 +8074,7 @@
                   <a:srgbClr val="00B050"/>
                 </a:solidFill>
               </a:rPr>
-              <a:t>eventId</a:t>
+              <a:t>isEditing</a:t>
             </a:r>
             <a:endParaRPr lang="en-US" b="1" dirty="0"/>
           </a:p>
@@ -7733,10 +8082,10 @@
       </p:sp>
       <p:sp>
         <p:nvSpPr>
-          <p:cNvPr id="34" name="TextBox 33">
-            <a:extLst>
-              <a:ext uri="{FF2B5EF4-FFF2-40B4-BE49-F238E27FC236}">
-                <a16:creationId xmlns:a16="http://schemas.microsoft.com/office/drawing/2014/main" id="{8081AC17-B864-434C-B6D1-A2C2C960C779}"/>
+          <p:cNvPr id="63" name="TextBox 62">
+            <a:extLst>
+              <a:ext uri="{FF2B5EF4-FFF2-40B4-BE49-F238E27FC236}">
+                <a16:creationId xmlns:a16="http://schemas.microsoft.com/office/drawing/2014/main" id="{9D91D999-26A2-4CAC-8CAB-04499723E4E5}"/>
               </a:ext>
             </a:extLst>
           </p:cNvPr>
@@ -7745,47 +8094,7 @@
         </p:nvSpPr>
         <p:spPr>
           <a:xfrm>
-            <a:off x="6140843" y="5711791"/>
-            <a:ext cx="993990" cy="369332"/>
-          </a:xfrm>
-          <a:prstGeom prst="rect">
-            <a:avLst/>
-          </a:prstGeom>
-          <a:noFill/>
-        </p:spPr>
-        <p:txBody>
-          <a:bodyPr wrap="none" rtlCol="0">
-            <a:spAutoFit/>
-          </a:bodyPr>
-          <a:lstStyle/>
-          <a:p>
-            <a:r>
-              <a:rPr lang="en-US" b="1" dirty="0">
-                <a:solidFill>
-                  <a:srgbClr val="00B050"/>
-                </a:solidFill>
-              </a:rPr>
-              <a:t>IsEditing</a:t>
-            </a:r>
-            <a:endParaRPr lang="en-US" b="1" dirty="0"/>
-          </a:p>
-        </p:txBody>
-      </p:sp>
-      <p:sp>
-        <p:nvSpPr>
-          <p:cNvPr id="35" name="TextBox 34">
-            <a:extLst>
-              <a:ext uri="{FF2B5EF4-FFF2-40B4-BE49-F238E27FC236}">
-                <a16:creationId xmlns:a16="http://schemas.microsoft.com/office/drawing/2014/main" id="{281C488C-967D-4AF5-A9E4-78B8CD9A6984}"/>
-              </a:ext>
-            </a:extLst>
-          </p:cNvPr>
-          <p:cNvSpPr txBox="1"/>
-          <p:nvPr/>
-        </p:nvSpPr>
-        <p:spPr>
-          <a:xfrm>
-            <a:off x="6166288" y="6037740"/>
+            <a:off x="5271729" y="6078292"/>
             <a:ext cx="956096" cy="369332"/>
           </a:xfrm>
           <a:prstGeom prst="rect">
@@ -7813,10 +8122,10 @@
       </p:sp>
       <p:sp>
         <p:nvSpPr>
-          <p:cNvPr id="36" name="Rectangle: Rounded Corners 35">
-            <a:extLst>
-              <a:ext uri="{FF2B5EF4-FFF2-40B4-BE49-F238E27FC236}">
-                <a16:creationId xmlns:a16="http://schemas.microsoft.com/office/drawing/2014/main" id="{20AC8CD3-B01F-4E84-9D89-81A847826DB5}"/>
+          <p:cNvPr id="64" name="Rectangle: Rounded Corners 63">
+            <a:extLst>
+              <a:ext uri="{FF2B5EF4-FFF2-40B4-BE49-F238E27FC236}">
+                <a16:creationId xmlns:a16="http://schemas.microsoft.com/office/drawing/2014/main" id="{7D2DFF65-2213-4479-B25C-D6887ADA67A0}"/>
               </a:ext>
             </a:extLst>
           </p:cNvPr>
@@ -7860,10 +8169,10 @@
       </p:sp>
       <p:sp>
         <p:nvSpPr>
-          <p:cNvPr id="37" name="Text Box 16">
-            <a:extLst>
-              <a:ext uri="{FF2B5EF4-FFF2-40B4-BE49-F238E27FC236}">
-                <a16:creationId xmlns:a16="http://schemas.microsoft.com/office/drawing/2014/main" id="{869296E5-1AFF-482E-8FFF-9F15D8D720BC}"/>
+          <p:cNvPr id="65" name="Text Box 16">
+            <a:extLst>
+              <a:ext uri="{FF2B5EF4-FFF2-40B4-BE49-F238E27FC236}">
+                <a16:creationId xmlns:a16="http://schemas.microsoft.com/office/drawing/2014/main" id="{DB7C4299-153C-455D-B93F-BD932645E4FF}"/>
               </a:ext>
             </a:extLst>
           </p:cNvPr>
@@ -7872,7 +8181,7 @@
         </p:nvSpPr>
         <p:spPr>
           <a:xfrm>
-            <a:off x="648060" y="937416"/>
+            <a:off x="329177" y="516608"/>
             <a:ext cx="3266393" cy="461665"/>
           </a:xfrm>
           <a:prstGeom prst="rect">
@@ -7895,10 +8204,10 @@
       </p:sp>
       <p:sp>
         <p:nvSpPr>
-          <p:cNvPr id="38" name="Rectangle: Rounded Corners 37">
-            <a:extLst>
-              <a:ext uri="{FF2B5EF4-FFF2-40B4-BE49-F238E27FC236}">
-                <a16:creationId xmlns:a16="http://schemas.microsoft.com/office/drawing/2014/main" id="{75310A7C-E7D2-4ED6-AA26-692803341C4B}"/>
+          <p:cNvPr id="66" name="Rectangle: Rounded Corners 65">
+            <a:extLst>
+              <a:ext uri="{FF2B5EF4-FFF2-40B4-BE49-F238E27FC236}">
+                <a16:creationId xmlns:a16="http://schemas.microsoft.com/office/drawing/2014/main" id="{7FF374FD-BE31-4625-9937-C16468EDF74B}"/>
               </a:ext>
             </a:extLst>
           </p:cNvPr>
@@ -7942,10 +8251,10 @@
       </p:sp>
       <p:sp>
         <p:nvSpPr>
-          <p:cNvPr id="39" name="TextBox 38">
-            <a:extLst>
-              <a:ext uri="{FF2B5EF4-FFF2-40B4-BE49-F238E27FC236}">
-                <a16:creationId xmlns:a16="http://schemas.microsoft.com/office/drawing/2014/main" id="{61FAC964-8645-4A8F-B7D6-3FA6D5A32D28}"/>
+          <p:cNvPr id="67" name="TextBox 66">
+            <a:extLst>
+              <a:ext uri="{FF2B5EF4-FFF2-40B4-BE49-F238E27FC236}">
+                <a16:creationId xmlns:a16="http://schemas.microsoft.com/office/drawing/2014/main" id="{8412B0FA-155C-41A8-8EA1-867456EE4EEB}"/>
               </a:ext>
             </a:extLst>
           </p:cNvPr>
@@ -7977,10 +8286,139 @@
       </p:sp>
       <p:sp>
         <p:nvSpPr>
-          <p:cNvPr id="40" name="Rounded Rectangle 17">
-            <a:extLst>
-              <a:ext uri="{FF2B5EF4-FFF2-40B4-BE49-F238E27FC236}">
-                <a16:creationId xmlns:a16="http://schemas.microsoft.com/office/drawing/2014/main" id="{4ED16A8D-2781-4884-8607-9F7E854924AA}"/>
+          <p:cNvPr id="68" name="Text Box 18">
+            <a:extLst>
+              <a:ext uri="{FF2B5EF4-FFF2-40B4-BE49-F238E27FC236}">
+                <a16:creationId xmlns:a16="http://schemas.microsoft.com/office/drawing/2014/main" id="{47365794-05A5-4646-8F2D-6C5D10262F71}"/>
+              </a:ext>
+            </a:extLst>
+          </p:cNvPr>
+          <p:cNvSpPr txBox="1"/>
+          <p:nvPr/>
+        </p:nvSpPr>
+        <p:spPr>
+          <a:xfrm>
+            <a:off x="8277549" y="191282"/>
+            <a:ext cx="4034953" cy="830997"/>
+          </a:xfrm>
+          <a:prstGeom prst="rect">
+            <a:avLst/>
+          </a:prstGeom>
+          <a:noFill/>
+        </p:spPr>
+        <p:txBody>
+          <a:bodyPr wrap="square" rtlCol="0">
+            <a:spAutoFit/>
+          </a:bodyPr>
+          <a:lstStyle/>
+          <a:p>
+            <a:r>
+              <a:rPr lang="" altLang="en-US" sz="1600" b="1" dirty="0">
+                <a:solidFill>
+                  <a:srgbClr val="FF0000"/>
+                </a:solidFill>
+              </a:rPr>
+              <a:t>- &lt;add-search&gt; contain add+ button and search bar</a:t>
+            </a:r>
+          </a:p>
+          <a:p>
+            <a:r>
+              <a:rPr lang="" altLang="en-US" sz="1600" b="1" dirty="0">
+                <a:solidFill>
+                  <a:srgbClr val="FF0000"/>
+                </a:solidFill>
+              </a:rPr>
+              <a:t>- &lt;event-form&gt; is shown when we click add+</a:t>
+            </a:r>
+          </a:p>
+        </p:txBody>
+      </p:sp>
+      <p:sp>
+        <p:nvSpPr>
+          <p:cNvPr id="69" name="TextBox 68">
+            <a:extLst>
+              <a:ext uri="{FF2B5EF4-FFF2-40B4-BE49-F238E27FC236}">
+                <a16:creationId xmlns:a16="http://schemas.microsoft.com/office/drawing/2014/main" id="{2AC41E46-7CF8-428F-92C0-EEEF98BD087E}"/>
+              </a:ext>
+            </a:extLst>
+          </p:cNvPr>
+          <p:cNvSpPr txBox="1"/>
+          <p:nvPr/>
+        </p:nvSpPr>
+        <p:spPr>
+          <a:xfrm>
+            <a:off x="6182179" y="6059087"/>
+            <a:ext cx="1051313" cy="369332"/>
+          </a:xfrm>
+          <a:prstGeom prst="rect">
+            <a:avLst/>
+          </a:prstGeom>
+          <a:noFill/>
+        </p:spPr>
+        <p:txBody>
+          <a:bodyPr wrap="none" rtlCol="0">
+            <a:spAutoFit/>
+          </a:bodyPr>
+          <a:lstStyle/>
+          <a:p>
+            <a:r>
+              <a:rPr lang="en-US" dirty="0">
+                <a:solidFill>
+                  <a:srgbClr val="00B050"/>
+                </a:solidFill>
+              </a:rPr>
+              <a:t>(eventId)</a:t>
+            </a:r>
+            <a:endParaRPr lang="en-US" dirty="0"/>
+          </a:p>
+        </p:txBody>
+      </p:sp>
+      <p:sp>
+        <p:nvSpPr>
+          <p:cNvPr id="70" name="TextBox 69">
+            <a:extLst>
+              <a:ext uri="{FF2B5EF4-FFF2-40B4-BE49-F238E27FC236}">
+                <a16:creationId xmlns:a16="http://schemas.microsoft.com/office/drawing/2014/main" id="{AB71476A-F951-4C1F-B423-A7B5C74F9A14}"/>
+              </a:ext>
+            </a:extLst>
+          </p:cNvPr>
+          <p:cNvSpPr txBox="1"/>
+          <p:nvPr/>
+        </p:nvSpPr>
+        <p:spPr>
+          <a:xfrm>
+            <a:off x="5229822" y="4845262"/>
+            <a:ext cx="722698" cy="369332"/>
+          </a:xfrm>
+          <a:prstGeom prst="rect">
+            <a:avLst/>
+          </a:prstGeom>
+          <a:noFill/>
+        </p:spPr>
+        <p:txBody>
+          <a:bodyPr wrap="none" rtlCol="0">
+            <a:spAutoFit/>
+          </a:bodyPr>
+          <a:lstStyle/>
+          <a:p>
+            <a:r>
+              <a:rPr lang="en-US" b="1" dirty="0">
+                <a:solidFill>
+                  <a:srgbClr val="00B050"/>
+                </a:solidFill>
+              </a:rPr>
+              <a:t>event</a:t>
+            </a:r>
+            <a:endParaRPr lang="en-US" b="1" dirty="0"/>
+          </a:p>
+        </p:txBody>
+      </p:sp>
+      <p:sp>
+        <p:nvSpPr>
+          <p:cNvPr id="71" name="Arrow: Right 70">
+            <a:extLst>
+              <a:ext uri="{FF2B5EF4-FFF2-40B4-BE49-F238E27FC236}">
+                <a16:creationId xmlns:a16="http://schemas.microsoft.com/office/drawing/2014/main" id="{FD001102-E9FB-4DFA-84A0-E6D662D3E428}"/>
               </a:ext>
             </a:extLst>
           </p:cNvPr>
@@ -7989,18 +8427,19 @@
         </p:nvSpPr>
         <p:spPr>
           <a:xfrm>
-            <a:off x="162820" y="5102909"/>
-            <a:ext cx="4387215" cy="1487170"/>
-          </a:xfrm>
-          <a:prstGeom prst="roundRect">
-            <a:avLst/>
-          </a:prstGeom>
-          <a:noFill/>
-          <a:ln w="28575" cmpd="sng">
+            <a:off x="4507226" y="3169096"/>
+            <a:ext cx="2703981" cy="461665"/>
+          </a:xfrm>
+          <a:prstGeom prst="rightArrow">
+            <a:avLst/>
+          </a:prstGeom>
+          <a:solidFill>
+            <a:srgbClr val="00B050"/>
+          </a:solidFill>
+          <a:ln>
             <a:solidFill>
               <a:srgbClr val="00B050"/>
             </a:solidFill>
-            <a:prstDash val="sysDot"/>
           </a:ln>
         </p:spPr>
         <p:style>
@@ -8030,10 +8469,10 @@
       </p:sp>
       <p:sp>
         <p:nvSpPr>
-          <p:cNvPr id="41" name="Text Box 18">
-            <a:extLst>
-              <a:ext uri="{FF2B5EF4-FFF2-40B4-BE49-F238E27FC236}">
-                <a16:creationId xmlns:a16="http://schemas.microsoft.com/office/drawing/2014/main" id="{6E3080D7-384D-46D9-8E23-1C45F1836D8E}"/>
+          <p:cNvPr id="72" name="TextBox 71">
+            <a:extLst>
+              <a:ext uri="{FF2B5EF4-FFF2-40B4-BE49-F238E27FC236}">
+                <a16:creationId xmlns:a16="http://schemas.microsoft.com/office/drawing/2014/main" id="{2206F2AE-84C8-4C27-946F-40DDA3CB0D2D}"/>
               </a:ext>
             </a:extLst>
           </p:cNvPr>
@@ -8042,8 +8481,8 @@
         </p:nvSpPr>
         <p:spPr>
           <a:xfrm>
-            <a:off x="338950" y="5320419"/>
-            <a:ext cx="4034953" cy="1200329"/>
+            <a:off x="4553247" y="994668"/>
+            <a:ext cx="1036053" cy="461665"/>
           </a:xfrm>
           <a:prstGeom prst="rect">
             <a:avLst/>
@@ -8051,29 +8490,192 @@
           <a:noFill/>
         </p:spPr>
         <p:txBody>
-          <a:bodyPr wrap="square" rtlCol="0">
+          <a:bodyPr wrap="none" rtlCol="0">
             <a:spAutoFit/>
           </a:bodyPr>
           <a:lstStyle/>
           <a:p>
             <a:r>
-              <a:rPr lang="" altLang="en-US" b="1" dirty="0">
+              <a:rPr lang="en-US" sz="2400" b="1" dirty="0">
                 <a:solidFill>
-                  <a:srgbClr val="FF0000"/>
+                  <a:srgbClr val="00B050"/>
                 </a:solidFill>
               </a:rPr>
-              <a:t>- &lt;add-search&gt; contain add+ button and search bar</a:t>
-            </a:r>
-          </a:p>
-          <a:p>
-            <a:r>
-              <a:rPr lang="" altLang="en-US" b="1" dirty="0">
+              <a:t>PROPS</a:t>
+            </a:r>
+          </a:p>
+        </p:txBody>
+      </p:sp>
+      <p:sp>
+        <p:nvSpPr>
+          <p:cNvPr id="73" name="TextBox 72">
+            <a:extLst>
+              <a:ext uri="{FF2B5EF4-FFF2-40B4-BE49-F238E27FC236}">
+                <a16:creationId xmlns:a16="http://schemas.microsoft.com/office/drawing/2014/main" id="{14898E02-1088-4988-8C10-795F2A94BEC4}"/>
+              </a:ext>
+            </a:extLst>
+          </p:cNvPr>
+          <p:cNvSpPr txBox="1"/>
+          <p:nvPr/>
+        </p:nvSpPr>
+        <p:spPr>
+          <a:xfrm>
+            <a:off x="5243819" y="1282856"/>
+            <a:ext cx="722698" cy="369332"/>
+          </a:xfrm>
+          <a:prstGeom prst="rect">
+            <a:avLst/>
+          </a:prstGeom>
+          <a:noFill/>
+        </p:spPr>
+        <p:txBody>
+          <a:bodyPr wrap="none" rtlCol="0">
+            <a:spAutoFit/>
+          </a:bodyPr>
+          <a:lstStyle/>
+          <a:p>
+            <a:r>
+              <a:rPr lang="en-US" b="1" dirty="0">
                 <a:solidFill>
-                  <a:srgbClr val="FF0000"/>
+                  <a:srgbClr val="00B050"/>
                 </a:solidFill>
               </a:rPr>
-              <a:t>- &lt;my-event-form&gt; is shown when we click add+</a:t>
-            </a:r>
+              <a:t>event</a:t>
+            </a:r>
+            <a:endParaRPr lang="en-US" b="1" dirty="0"/>
+          </a:p>
+        </p:txBody>
+      </p:sp>
+      <p:sp>
+        <p:nvSpPr>
+          <p:cNvPr id="74" name="Arrow: Right 73">
+            <a:extLst>
+              <a:ext uri="{FF2B5EF4-FFF2-40B4-BE49-F238E27FC236}">
+                <a16:creationId xmlns:a16="http://schemas.microsoft.com/office/drawing/2014/main" id="{38E16319-9E8E-4014-8AB0-039477C52FD8}"/>
+              </a:ext>
+            </a:extLst>
+          </p:cNvPr>
+          <p:cNvSpPr/>
+          <p:nvPr/>
+        </p:nvSpPr>
+        <p:spPr>
+          <a:xfrm>
+            <a:off x="4589717" y="1489404"/>
+            <a:ext cx="2703981" cy="461665"/>
+          </a:xfrm>
+          <a:prstGeom prst="rightArrow">
+            <a:avLst/>
+          </a:prstGeom>
+          <a:solidFill>
+            <a:srgbClr val="00B050"/>
+          </a:solidFill>
+          <a:ln>
+            <a:solidFill>
+              <a:srgbClr val="00B050"/>
+            </a:solidFill>
+          </a:ln>
+        </p:spPr>
+        <p:style>
+          <a:lnRef idx="2">
+            <a:schemeClr val="accent1">
+              <a:shade val="50000"/>
+            </a:schemeClr>
+          </a:lnRef>
+          <a:fillRef idx="1">
+            <a:schemeClr val="accent1"/>
+          </a:fillRef>
+          <a:effectRef idx="0">
+            <a:schemeClr val="accent1"/>
+          </a:effectRef>
+          <a:fontRef idx="minor">
+            <a:schemeClr val="lt1"/>
+          </a:fontRef>
+        </p:style>
+        <p:txBody>
+          <a:bodyPr rtlCol="0" anchor="ctr"/>
+          <a:lstStyle/>
+          <a:p>
+            <a:pPr algn="ctr"/>
+            <a:endParaRPr lang="en-US"/>
+          </a:p>
+        </p:txBody>
+      </p:sp>
+      <p:sp>
+        <p:nvSpPr>
+          <p:cNvPr id="75" name="TextBox 74">
+            <a:extLst>
+              <a:ext uri="{FF2B5EF4-FFF2-40B4-BE49-F238E27FC236}">
+                <a16:creationId xmlns:a16="http://schemas.microsoft.com/office/drawing/2014/main" id="{61EAF7EE-F7CF-49B6-AFD6-8A3F132012A3}"/>
+              </a:ext>
+            </a:extLst>
+          </p:cNvPr>
+          <p:cNvSpPr txBox="1"/>
+          <p:nvPr/>
+        </p:nvSpPr>
+        <p:spPr>
+          <a:xfrm>
+            <a:off x="4612071" y="2662657"/>
+            <a:ext cx="1036053" cy="461665"/>
+          </a:xfrm>
+          <a:prstGeom prst="rect">
+            <a:avLst/>
+          </a:prstGeom>
+          <a:noFill/>
+        </p:spPr>
+        <p:txBody>
+          <a:bodyPr wrap="none" rtlCol="0">
+            <a:spAutoFit/>
+          </a:bodyPr>
+          <a:lstStyle/>
+          <a:p>
+            <a:r>
+              <a:rPr lang="en-US" sz="2400" b="1" dirty="0">
+                <a:solidFill>
+                  <a:srgbClr val="00B050"/>
+                </a:solidFill>
+              </a:rPr>
+              <a:t>PROPS</a:t>
+            </a:r>
+          </a:p>
+        </p:txBody>
+      </p:sp>
+      <p:sp>
+        <p:nvSpPr>
+          <p:cNvPr id="76" name="TextBox 75">
+            <a:extLst>
+              <a:ext uri="{FF2B5EF4-FFF2-40B4-BE49-F238E27FC236}">
+                <a16:creationId xmlns:a16="http://schemas.microsoft.com/office/drawing/2014/main" id="{41818832-0350-4EAD-A36F-B529957D3386}"/>
+              </a:ext>
+            </a:extLst>
+          </p:cNvPr>
+          <p:cNvSpPr txBox="1"/>
+          <p:nvPr/>
+        </p:nvSpPr>
+        <p:spPr>
+          <a:xfrm>
+            <a:off x="5302643" y="2950845"/>
+            <a:ext cx="722698" cy="369332"/>
+          </a:xfrm>
+          <a:prstGeom prst="rect">
+            <a:avLst/>
+          </a:prstGeom>
+          <a:noFill/>
+        </p:spPr>
+        <p:txBody>
+          <a:bodyPr wrap="none" rtlCol="0">
+            <a:spAutoFit/>
+          </a:bodyPr>
+          <a:lstStyle/>
+          <a:p>
+            <a:r>
+              <a:rPr lang="en-US" b="1" dirty="0">
+                <a:solidFill>
+                  <a:srgbClr val="00B050"/>
+                </a:solidFill>
+              </a:rPr>
+              <a:t>event</a:t>
+            </a:r>
+            <a:endParaRPr lang="en-US" b="1" dirty="0"/>
           </a:p>
         </p:txBody>
       </p:sp>

</xml_diff>